<commit_message>
aula dia 10 11
</commit_message>
<xml_diff>
--- a/Professor/Aula3.pptx
+++ b/Professor/Aula3.pptx
@@ -5,10 +5,10 @@
     <p:sldMasterId id="2147483672" r:id="rId1"/>
   </p:sldMasterIdLst>
   <p:notesMasterIdLst>
-    <p:notesMasterId r:id="rId61"/>
+    <p:notesMasterId r:id="rId62"/>
   </p:notesMasterIdLst>
   <p:handoutMasterIdLst>
-    <p:handoutMasterId r:id="rId62"/>
+    <p:handoutMasterId r:id="rId63"/>
   </p:handoutMasterIdLst>
   <p:sldIdLst>
     <p:sldId id="256" r:id="rId2"/>
@@ -59,17 +59,18 @@
     <p:sldId id="279" r:id="rId47"/>
     <p:sldId id="292" r:id="rId48"/>
     <p:sldId id="291" r:id="rId49"/>
-    <p:sldId id="309" r:id="rId50"/>
-    <p:sldId id="310" r:id="rId51"/>
+    <p:sldId id="310" r:id="rId50"/>
+    <p:sldId id="325" r:id="rId51"/>
     <p:sldId id="308" r:id="rId52"/>
     <p:sldId id="322" r:id="rId53"/>
-    <p:sldId id="324" r:id="rId54"/>
-    <p:sldId id="319" r:id="rId55"/>
-    <p:sldId id="320" r:id="rId56"/>
-    <p:sldId id="290" r:id="rId57"/>
-    <p:sldId id="281" r:id="rId58"/>
-    <p:sldId id="323" r:id="rId59"/>
-    <p:sldId id="289" r:id="rId60"/>
+    <p:sldId id="326" r:id="rId54"/>
+    <p:sldId id="309" r:id="rId55"/>
+    <p:sldId id="324" r:id="rId56"/>
+    <p:sldId id="320" r:id="rId57"/>
+    <p:sldId id="327" r:id="rId58"/>
+    <p:sldId id="290" r:id="rId59"/>
+    <p:sldId id="281" r:id="rId60"/>
+    <p:sldId id="289" r:id="rId61"/>
   </p:sldIdLst>
   <p:sldSz cx="12192000" cy="6858000"/>
   <p:notesSz cx="6858000" cy="9144000"/>
@@ -5062,7 +5063,7 @@
           <a:graphicData uri="http://schemas.openxmlformats.org/presentationml/2006/ole">
             <mc:AlternateContent xmlns:mc="http://schemas.openxmlformats.org/markup-compatibility/2006">
               <mc:Choice xmlns:v="urn:schemas-microsoft-com:vml" Requires="v">
-                <p:oleObj spid="_x0000_s1139" name="Slide do think-cell" r:id="rId7" imgW="270" imgH="270" progId="TCLayout.ActiveDocument.1">
+                <p:oleObj spid="_x0000_s1170" name="Slide do think-cell" r:id="rId7" imgW="270" imgH="270" progId="TCLayout.ActiveDocument.1">
                   <p:embed/>
                 </p:oleObj>
               </mc:Choice>
@@ -25966,6 +25967,53 @@
           </a:p>
         </p:txBody>
       </p:sp>
+      <p:sp>
+        <p:nvSpPr>
+          <p:cNvPr id="5" name="Elipse 4"/>
+          <p:cNvSpPr/>
+          <p:nvPr/>
+        </p:nvSpPr>
+        <p:spPr>
+          <a:xfrm>
+            <a:off x="1450489" y="2820296"/>
+            <a:ext cx="1798319" cy="1493520"/>
+          </a:xfrm>
+          <a:prstGeom prst="ellipse">
+            <a:avLst/>
+          </a:prstGeom>
+          <a:solidFill>
+            <a:schemeClr val="accent2"/>
+          </a:solidFill>
+        </p:spPr>
+        <p:style>
+          <a:lnRef idx="2">
+            <a:schemeClr val="accent1">
+              <a:shade val="50000"/>
+            </a:schemeClr>
+          </a:lnRef>
+          <a:fillRef idx="1">
+            <a:schemeClr val="accent1"/>
+          </a:fillRef>
+          <a:effectRef idx="0">
+            <a:schemeClr val="accent1"/>
+          </a:effectRef>
+          <a:fontRef idx="minor">
+            <a:schemeClr val="lt1"/>
+          </a:fontRef>
+        </p:style>
+        <p:txBody>
+          <a:bodyPr rtlCol="0" anchor="ctr"/>
+          <a:lstStyle/>
+          <a:p>
+            <a:pPr algn="ctr"/>
+            <a:r>
+              <a:rPr lang="pt-BR" dirty="0" smtClean="0"/>
+              <a:t>Paramos aqui</a:t>
+            </a:r>
+            <a:endParaRPr lang="pt-BR" dirty="0"/>
+          </a:p>
+        </p:txBody>
+      </p:sp>
     </p:spTree>
     <p:extLst>
       <p:ext uri="{BB962C8B-B14F-4D97-AF65-F5344CB8AC3E}">
@@ -26059,11 +26107,7 @@
             </a:r>
             <a:r>
               <a:rPr lang="pt-BR" sz="2000" dirty="0" smtClean="0"/>
-              <a:t>Excluir , </a:t>
-            </a:r>
-            <a:r>
-              <a:rPr lang="pt-BR" sz="2000" dirty="0" smtClean="0"/>
-              <a:t>Inserir comentários e imagens</a:t>
+              <a:t>Excluir , Inserir comentários e imagens</a:t>
             </a:r>
           </a:p>
           <a:p>
@@ -26084,7 +26128,6 @@
               <a:rPr lang="pt-BR" sz="2000" dirty="0" smtClean="0"/>
               <a:t>  linha e Coluna</a:t>
             </a:r>
-            <a:endParaRPr lang="pt-BR" sz="2000" dirty="0" smtClean="0"/>
           </a:p>
           <a:p>
             <a:pPr>
@@ -26096,7 +26139,6 @@
               <a:rPr lang="pt-BR" sz="2000" dirty="0" smtClean="0"/>
               <a:t>Estrutura de Tópico – Agrupar linha e Coluna</a:t>
             </a:r>
-            <a:endParaRPr lang="pt-BR" sz="2000" dirty="0" smtClean="0"/>
           </a:p>
           <a:p>
             <a:pPr>
@@ -26124,7 +26166,6 @@
               <a:rPr lang="pt-BR" sz="2000" dirty="0" smtClean="0"/>
               <a:t>  Deletar múltiplas planilhas</a:t>
             </a:r>
-            <a:endParaRPr lang="pt-BR" sz="2000" dirty="0" smtClean="0"/>
           </a:p>
           <a:p>
             <a:pPr>
@@ -26147,7 +26188,6 @@
               <a:rPr lang="pt-BR" sz="2000" dirty="0" smtClean="0"/>
               <a:t>Formulas tridimensionais</a:t>
             </a:r>
-            <a:endParaRPr lang="pt-BR" sz="2000" dirty="0" smtClean="0"/>
           </a:p>
         </p:txBody>
       </p:sp>
@@ -26732,7 +26772,7 @@
         <p:spPr>
           <a:xfrm>
             <a:off x="210670" y="153054"/>
-            <a:ext cx="10058400" cy="718315"/>
+            <a:ext cx="11364558" cy="718315"/>
           </a:xfrm>
         </p:spPr>
         <p:txBody>
@@ -26908,25 +26948,14 @@
                 </a:solidFill>
                 <a:latin typeface="Corbel" panose="020B0503020204020204" pitchFamily="34" charset="0"/>
               </a:rPr>
-              <a:t>Para RELEMBRAR &gt; Fórmulas </a:t>
-            </a:r>
-            <a:r>
-              <a:rPr lang="pt-BR" sz="2400" b="1" dirty="0" smtClean="0">
-                <a:solidFill>
-                  <a:schemeClr val="accent6">
-                    <a:lumMod val="75000"/>
-                  </a:schemeClr>
-                </a:solidFill>
-                <a:latin typeface="Corbel" panose="020B0503020204020204" pitchFamily="34" charset="0"/>
-              </a:rPr>
-              <a:t>e ações Tridimensionais</a:t>
+              <a:t>Para RELEMBRAR &gt; Fórmulas e ações Tridimensionais e trabalho com Planilha</a:t>
             </a:r>
           </a:p>
         </p:txBody>
       </p:sp>
       <p:sp>
         <p:nvSpPr>
-          <p:cNvPr id="6" name="Elipse 5"/>
+          <p:cNvPr id="5" name="Elipse 4"/>
           <p:cNvSpPr/>
           <p:nvPr/>
         </p:nvSpPr>
@@ -26968,7 +26997,7 @@
             <a:pPr algn="ctr"/>
             <a:r>
               <a:rPr lang="pt-BR" dirty="0" smtClean="0"/>
-              <a:t>46</a:t>
+              <a:t>45</a:t>
             </a:r>
             <a:endParaRPr lang="pt-BR" dirty="0"/>
           </a:p>
@@ -28174,11 +28203,11 @@
   <p:clrMapOvr>
     <a:masterClrMapping/>
   </p:clrMapOvr>
-  <mc:AlternateContent xmlns:mc="http://schemas.openxmlformats.org/markup-compatibility/2006">
-    <mc:Choice xmlns:p14="http://schemas.microsoft.com/office/powerpoint/2010/main" Requires="p14">
+  <mc:AlternateContent xmlns:mc="http://schemas.openxmlformats.org/markup-compatibility/2006" xmlns:p14="http://schemas.microsoft.com/office/powerpoint/2010/main">
+    <mc:Choice Requires="p14">
       <p:transition spd="slow" p14:dur="2000"/>
     </mc:Choice>
-    <mc:Fallback>
+    <mc:Fallback xmlns="">
       <p:transition spd="slow"/>
     </mc:Fallback>
   </mc:AlternateContent>
@@ -28749,11 +28778,11 @@
   <p:clrMapOvr>
     <a:masterClrMapping/>
   </p:clrMapOvr>
-  <mc:AlternateContent xmlns:mc="http://schemas.openxmlformats.org/markup-compatibility/2006">
-    <mc:Choice xmlns:p14="http://schemas.microsoft.com/office/powerpoint/2010/main" Requires="p14">
+  <mc:AlternateContent xmlns:mc="http://schemas.openxmlformats.org/markup-compatibility/2006" xmlns:p14="http://schemas.microsoft.com/office/powerpoint/2010/main">
+    <mc:Choice Requires="p14">
       <p:transition spd="slow" p14:dur="2000"/>
     </mc:Choice>
-    <mc:Fallback>
+    <mc:Fallback xmlns="">
       <p:transition spd="slow"/>
     </mc:Fallback>
   </mc:AlternateContent>
@@ -28971,16 +29000,8 @@
                 </a:solidFill>
                 <a:latin typeface="Corbel" panose="020B0503020204020204" pitchFamily="34" charset="0"/>
               </a:rPr>
-              <a:t>ORDENAR LISTAS NO EXCEL</a:t>
-            </a:r>
-            <a:endParaRPr lang="pt-BR" sz="2400" b="1" dirty="0" smtClean="0">
-              <a:solidFill>
-                <a:schemeClr val="accent6">
-                  <a:lumMod val="75000"/>
-                </a:schemeClr>
-              </a:solidFill>
-              <a:latin typeface="Corbel" panose="020B0503020204020204" pitchFamily="34" charset="0"/>
-            </a:endParaRPr>
+              <a:t>Comandos com Listas -  Classificar</a:t>
+            </a:r>
           </a:p>
         </p:txBody>
       </p:sp>
@@ -28994,7 +29015,7 @@
         </p:nvSpPr>
         <p:spPr>
           <a:xfrm>
-            <a:off x="531607" y="1106970"/>
+            <a:off x="391757" y="871369"/>
             <a:ext cx="10896600" cy="2817812"/>
           </a:xfrm>
         </p:spPr>
@@ -29155,85 +29176,135 @@
             </a:lvl9pPr>
           </a:lstStyle>
           <a:p>
-            <a:pPr>
-              <a:buFontTx/>
-              <a:buChar char="-"/>
-            </a:pPr>
-            <a:r>
-              <a:rPr lang="pt-BR" sz="1800" dirty="0" smtClean="0"/>
-              <a:t>COMEÇAR O DIA RETOMANDO AULA,</a:t>
-            </a:r>
-          </a:p>
-          <a:p>
-            <a:pPr>
-              <a:buFontTx/>
-              <a:buChar char="-"/>
-            </a:pPr>
-            <a:r>
-              <a:rPr lang="pt-BR" sz="1800" dirty="0" smtClean="0"/>
-              <a:t>EXPLICAR FLUXO DE CAIXA E EXERCICIO DE ORDENAÇÂO DO FLUXO DE CAIXA</a:t>
-            </a:r>
-          </a:p>
-          <a:p>
-            <a:pPr>
-              <a:buFontTx/>
-              <a:buChar char="-"/>
-            </a:pPr>
-            <a:r>
-              <a:rPr lang="pt-BR" sz="1800" dirty="0" smtClean="0"/>
-              <a:t>PLICAR BUDGET</a:t>
-            </a:r>
-          </a:p>
-          <a:p>
-            <a:pPr>
-              <a:buFontTx/>
-              <a:buChar char="-"/>
-            </a:pPr>
-            <a:r>
-              <a:rPr lang="pt-BR" sz="1800" dirty="0"/>
-              <a:t>USAR EXERCICIO DO BUDGET PARA ORDENAR</a:t>
-            </a:r>
-          </a:p>
-          <a:p>
-            <a:pPr>
-              <a:buFontTx/>
-              <a:buChar char="-"/>
-            </a:pPr>
-            <a:r>
-              <a:rPr lang="pt-BR" sz="1800" dirty="0" smtClean="0"/>
-              <a:t>APLICAR BANCO DE DADOS – USAR TXT DE FORNCEDORES</a:t>
-            </a:r>
-          </a:p>
-          <a:p>
-            <a:pPr>
-              <a:buFontTx/>
-              <a:buChar char="-"/>
-            </a:pPr>
-            <a:r>
-              <a:rPr lang="pt-BR" sz="1800" dirty="0" smtClean="0"/>
-              <a:t>EXEMPLIFICAR EXERCICIO DE ORDENAÇÂO  COM PACOTE DE GRUPO DE CONTAS E DEPOIS LANÇAMENTOS</a:t>
-            </a:r>
-          </a:p>
-          <a:p>
-            <a:pPr>
-              <a:buFontTx/>
-              <a:buChar char="-"/>
-            </a:pPr>
-            <a:endParaRPr lang="pt-BR" sz="1800" dirty="0" smtClean="0"/>
-          </a:p>
-          <a:p>
             <a:pPr marL="0" indent="0">
               <a:buFont typeface="Arial" charset="0"/>
               <a:buNone/>
             </a:pPr>
-            <a:endParaRPr lang="pt-BR" sz="1800" dirty="0" smtClean="0"/>
+            <a:r>
+              <a:rPr lang="pt-BR" sz="1800" dirty="0" smtClean="0">
+                <a:latin typeface="Corbel" panose="020B0503020204020204" pitchFamily="34" charset="0"/>
+              </a:rPr>
+              <a:t>O Excel Permite Classificar as listas (linhas e também colunas) automaticamente de acordo com regras pré-estabelecidas (ordem numérica ou ordem alfabética) ou ainda baseada nas lista nativas e personalizadas.</a:t>
+            </a:r>
+          </a:p>
+          <a:p>
+            <a:pPr marL="0" indent="0">
+              <a:buFont typeface="Arial" charset="0"/>
+              <a:buNone/>
+            </a:pPr>
+            <a:endParaRPr lang="pt-BR" sz="1800" dirty="0">
+              <a:latin typeface="Corbel" panose="020B0503020204020204" pitchFamily="34" charset="0"/>
+            </a:endParaRPr>
+          </a:p>
+          <a:p>
+            <a:pPr marL="0" indent="0">
+              <a:buFont typeface="Arial" charset="0"/>
+              <a:buNone/>
+            </a:pPr>
+            <a:r>
+              <a:rPr lang="pt-BR" sz="1800" dirty="0" smtClean="0">
+                <a:latin typeface="Corbel" panose="020B0503020204020204" pitchFamily="34" charset="0"/>
+              </a:rPr>
+              <a:t>Listas nativas do Excel são aquelas já instaladas com o programa : dias da semana, nome do mês</a:t>
+            </a:r>
+          </a:p>
+          <a:p>
+            <a:pPr marL="0" indent="0">
+              <a:buFont typeface="Arial" charset="0"/>
+              <a:buNone/>
+            </a:pPr>
+            <a:r>
+              <a:rPr lang="pt-BR" sz="1800" dirty="0" smtClean="0">
+                <a:latin typeface="Corbel" panose="020B0503020204020204" pitchFamily="34" charset="0"/>
+              </a:rPr>
+              <a:t>Listas personalizadas: qualquer uma criada pelo próprio usuário.</a:t>
+            </a:r>
+          </a:p>
+          <a:p>
+            <a:pPr marL="0" indent="0">
+              <a:buFont typeface="Arial" charset="0"/>
+              <a:buNone/>
+            </a:pPr>
+            <a:endParaRPr lang="pt-BR" sz="1800" dirty="0">
+              <a:latin typeface="Corbel" panose="020B0503020204020204" pitchFamily="34" charset="0"/>
+            </a:endParaRPr>
+          </a:p>
+          <a:p>
+            <a:pPr marL="0" indent="0">
+              <a:buFont typeface="Arial" charset="0"/>
+              <a:buNone/>
+            </a:pPr>
+            <a:r>
+              <a:rPr lang="pt-BR" sz="1800" dirty="0" smtClean="0">
+                <a:latin typeface="Corbel" panose="020B0503020204020204" pitchFamily="34" charset="0"/>
+              </a:rPr>
+              <a:t>Caminho:</a:t>
+            </a:r>
+          </a:p>
+          <a:p>
+            <a:pPr marL="0" indent="0">
+              <a:buFont typeface="Arial" charset="0"/>
+              <a:buNone/>
+            </a:pPr>
+            <a:r>
+              <a:rPr lang="pt-BR" sz="1800" dirty="0" smtClean="0">
+                <a:latin typeface="Corbel" panose="020B0503020204020204" pitchFamily="34" charset="0"/>
+              </a:rPr>
+              <a:t>Fazer ordenação: Selecionar intervalo, Guia Dados, grupo classificar e Filtrar, comando classificar</a:t>
+            </a:r>
+          </a:p>
+          <a:p>
+            <a:pPr marL="0" indent="0">
+              <a:buFont typeface="Arial" charset="0"/>
+              <a:buNone/>
+            </a:pPr>
+            <a:r>
+              <a:rPr lang="pt-BR" sz="1800" b="1" u="sng" dirty="0" smtClean="0">
+                <a:effectLst>
+                  <a:outerShdw blurRad="38100" dist="38100" dir="2700000" algn="tl">
+                    <a:srgbClr val="000000">
+                      <a:alpha val="43137"/>
+                    </a:srgbClr>
+                  </a:outerShdw>
+                </a:effectLst>
+                <a:latin typeface="Corbel" panose="020B0503020204020204" pitchFamily="34" charset="0"/>
+              </a:rPr>
+              <a:t>OU</a:t>
+            </a:r>
+            <a:r>
+              <a:rPr lang="pt-BR" sz="1800" dirty="0" smtClean="0">
+                <a:latin typeface="Corbel" panose="020B0503020204020204" pitchFamily="34" charset="0"/>
+              </a:rPr>
+              <a:t> Botão direito na coluna que quer usar como referencia&gt; Classificar.</a:t>
+            </a:r>
+          </a:p>
+          <a:p>
+            <a:pPr marL="0" indent="0">
+              <a:buFont typeface="Arial" charset="0"/>
+              <a:buNone/>
+            </a:pPr>
+            <a:endParaRPr lang="pt-BR" sz="1800" dirty="0" smtClean="0">
+              <a:latin typeface="Corbel" panose="020B0503020204020204" pitchFamily="34" charset="0"/>
+            </a:endParaRPr>
+          </a:p>
+          <a:p>
+            <a:pPr marL="0" indent="0">
+              <a:buFont typeface="Arial" charset="0"/>
+              <a:buNone/>
+            </a:pPr>
+            <a:r>
+              <a:rPr lang="pt-BR" sz="1800" dirty="0" smtClean="0">
+                <a:latin typeface="Corbel" panose="020B0503020204020204" pitchFamily="34" charset="0"/>
+              </a:rPr>
+              <a:t>Criar lista personalizada: guia Arquivo , Opções, Avançado, Geral, Editar lista Personalizada, Selecionar intervalo&gt; Importar&gt; OK.</a:t>
+            </a:r>
           </a:p>
         </p:txBody>
       </p:sp>
     </p:spTree>
     <p:extLst>
       <p:ext uri="{BB962C8B-B14F-4D97-AF65-F5344CB8AC3E}">
-        <p14:creationId xmlns:p14="http://schemas.microsoft.com/office/powerpoint/2010/main" val="1602921918"/>
+        <p14:creationId xmlns:p14="http://schemas.microsoft.com/office/powerpoint/2010/main" val="1929754879"/>
       </p:ext>
     </p:extLst>
   </p:cSld>
@@ -29832,27 +29903,8 @@
                 </a:solidFill>
                 <a:latin typeface="Corbel" panose="020B0503020204020204" pitchFamily="34" charset="0"/>
               </a:rPr>
-              <a:t>Comandos com </a:t>
-            </a:r>
-            <a:r>
-              <a:rPr lang="pt-BR" sz="2400" b="1" dirty="0" smtClean="0">
-                <a:solidFill>
-                  <a:schemeClr val="accent6">
-                    <a:lumMod val="75000"/>
-                  </a:schemeClr>
-                </a:solidFill>
-                <a:latin typeface="Corbel" panose="020B0503020204020204" pitchFamily="34" charset="0"/>
-              </a:rPr>
-              <a:t>Listas -  Classificar e usar FILTRO</a:t>
-            </a:r>
-            <a:endParaRPr lang="pt-BR" sz="2400" b="1" dirty="0" smtClean="0">
-              <a:solidFill>
-                <a:schemeClr val="accent6">
-                  <a:lumMod val="75000"/>
-                </a:schemeClr>
-              </a:solidFill>
-              <a:latin typeface="Corbel" panose="020B0503020204020204" pitchFamily="34" charset="0"/>
-            </a:endParaRPr>
+              <a:t>Comandos com Listas -  Auto Filtro</a:t>
+            </a:r>
           </a:p>
         </p:txBody>
       </p:sp>
@@ -29866,7 +29918,7 @@
         </p:nvSpPr>
         <p:spPr>
           <a:xfrm>
-            <a:off x="692971" y="1913794"/>
+            <a:off x="327211" y="988637"/>
             <a:ext cx="10896600" cy="2817812"/>
           </a:xfrm>
         </p:spPr>
@@ -30035,8 +30087,56 @@
               <a:rPr lang="pt-BR" sz="1800" dirty="0" smtClean="0">
                 <a:latin typeface="Corbel" panose="020B0503020204020204" pitchFamily="34" charset="0"/>
               </a:rPr>
-              <a:t>O Excel Permite Classificar as listas automaticamente de acordo com regras pré-estabelecidas (ordem numérica ou ordem alfabética) ou ainda baseada nas lista nativas e personalizadas.</a:t>
-            </a:r>
+              <a:t>Ainda temos uma poderosa ferramenta de analise de listas chamadas de </a:t>
+            </a:r>
+            <a:r>
+              <a:rPr lang="pt-BR" sz="1800" dirty="0" err="1" smtClean="0">
+                <a:latin typeface="Corbel" panose="020B0503020204020204" pitchFamily="34" charset="0"/>
+              </a:rPr>
+              <a:t>Auto-filtro</a:t>
+            </a:r>
+            <a:r>
+              <a:rPr lang="pt-BR" sz="1800" dirty="0" smtClean="0">
+                <a:latin typeface="Corbel" panose="020B0503020204020204" pitchFamily="34" charset="0"/>
+              </a:rPr>
+              <a:t> (somente para colunas) que agrupam automaticamente as informações repetidas e permitem deixar na tela somente o grupo que queremos analisar</a:t>
+            </a:r>
+          </a:p>
+          <a:p>
+            <a:pPr marL="0" indent="0">
+              <a:buFont typeface="Arial" charset="0"/>
+              <a:buNone/>
+            </a:pPr>
+            <a:r>
+              <a:rPr lang="pt-BR" sz="1800" dirty="0">
+                <a:latin typeface="Corbel" panose="020B0503020204020204" pitchFamily="34" charset="0"/>
+              </a:rPr>
+              <a:t> </a:t>
+            </a:r>
+            <a:r>
+              <a:rPr lang="pt-BR" sz="1800" dirty="0" smtClean="0">
+                <a:latin typeface="Corbel" panose="020B0503020204020204" pitchFamily="34" charset="0"/>
+              </a:rPr>
+              <a:t>- Filtro por Cor , valor único ou intervalo de valores, texto, caracteres curingas ( * e  ? </a:t>
+            </a:r>
+            <a:r>
+              <a:rPr lang="pt-BR" sz="1800" smtClean="0">
+                <a:latin typeface="Corbel" panose="020B0503020204020204" pitchFamily="34" charset="0"/>
+              </a:rPr>
+              <a:t>).</a:t>
+            </a:r>
+            <a:endParaRPr lang="pt-BR" sz="1800" dirty="0" smtClean="0">
+              <a:latin typeface="Corbel" panose="020B0503020204020204" pitchFamily="34" charset="0"/>
+            </a:endParaRPr>
+          </a:p>
+          <a:p>
+            <a:pPr marL="0" indent="0">
+              <a:buFont typeface="Arial" charset="0"/>
+              <a:buNone/>
+            </a:pPr>
+            <a:endParaRPr lang="pt-BR" sz="1800" dirty="0" smtClean="0">
+              <a:latin typeface="Corbel" panose="020B0503020204020204" pitchFamily="34" charset="0"/>
+            </a:endParaRPr>
           </a:p>
           <a:p>
             <a:pPr marL="0" indent="0">
@@ -30054,21 +30154,18 @@
             </a:pPr>
             <a:r>
               <a:rPr lang="pt-BR" sz="1800" dirty="0" smtClean="0">
-                <a:latin typeface="Corbel" panose="020B0503020204020204" pitchFamily="34" charset="0"/>
-              </a:rPr>
-              <a:t>Listas nativas do Excel são aquelas já instaladas com o programa : dias da semana, nome do mês</a:t>
-            </a:r>
-          </a:p>
-          <a:p>
-            <a:pPr marL="0" indent="0">
-              <a:buFont typeface="Arial" charset="0"/>
-              <a:buNone/>
-            </a:pPr>
+                <a:solidFill>
+                  <a:srgbClr val="FF0000"/>
+                </a:solidFill>
+                <a:latin typeface="Corbel" panose="020B0503020204020204" pitchFamily="34" charset="0"/>
+              </a:rPr>
+              <a:t>CUIDADO: </a:t>
+            </a:r>
             <a:r>
               <a:rPr lang="pt-BR" sz="1800" dirty="0" smtClean="0">
                 <a:latin typeface="Corbel" panose="020B0503020204020204" pitchFamily="34" charset="0"/>
               </a:rPr>
-              <a:t>Listas personalizadas: qualquer uma criada pelo próprio usuário.</a:t>
+              <a:t>Maioria das FÓRMULAS  desconsidera o FILTRO. Exceção: formula SUBTOTAL.</a:t>
             </a:r>
           </a:p>
           <a:p>
@@ -30089,7 +30186,7 @@
               <a:rPr lang="pt-BR" sz="1800" dirty="0" smtClean="0">
                 <a:latin typeface="Corbel" panose="020B0503020204020204" pitchFamily="34" charset="0"/>
               </a:rPr>
-              <a:t>Fazer ordenação: Guia Dados, grupo classificar e Filtrar, comando classificar</a:t>
+              <a:t>Acesso por: Selecionar intervalo de análise, Guia dados, grupo Classificar a Filtrar, Comando Filtro.</a:t>
             </a:r>
           </a:p>
           <a:p>
@@ -30101,15 +30198,45 @@
               <a:rPr lang="pt-BR" sz="1800" dirty="0" smtClean="0">
                 <a:latin typeface="Corbel" panose="020B0503020204020204" pitchFamily="34" charset="0"/>
               </a:rPr>
-              <a:t>Criar lista personalizada: guia Arquivo , Opções, Avançado, Geral, Editar lista Personalizada</a:t>
-            </a:r>
+              <a:t>(ira aparecer um “menu” no cabeçalho de cada Coluna</a:t>
+            </a:r>
+          </a:p>
+          <a:p>
+            <a:pPr marL="0" indent="0">
+              <a:buFont typeface="Arial" charset="0"/>
+              <a:buNone/>
+            </a:pPr>
+            <a:r>
+              <a:rPr lang="pt-BR" sz="1800" dirty="0" smtClean="0">
+                <a:latin typeface="Corbel" panose="020B0503020204020204" pitchFamily="34" charset="0"/>
+              </a:rPr>
+              <a:t> </a:t>
+            </a:r>
+          </a:p>
+          <a:p>
+            <a:pPr marL="0" indent="0">
+              <a:buFont typeface="Arial" charset="0"/>
+              <a:buNone/>
+            </a:pPr>
+            <a:endParaRPr lang="pt-BR" sz="1800" dirty="0" smtClean="0">
+              <a:latin typeface="Corbel" panose="020B0503020204020204" pitchFamily="34" charset="0"/>
+            </a:endParaRPr>
+          </a:p>
+          <a:p>
+            <a:pPr marL="0" indent="0">
+              <a:buFont typeface="Arial" charset="0"/>
+              <a:buNone/>
+            </a:pPr>
+            <a:endParaRPr lang="pt-BR" sz="1800" dirty="0" smtClean="0">
+              <a:latin typeface="Corbel" panose="020B0503020204020204" pitchFamily="34" charset="0"/>
+            </a:endParaRPr>
           </a:p>
         </p:txBody>
       </p:sp>
     </p:spTree>
     <p:extLst>
       <p:ext uri="{BB962C8B-B14F-4D97-AF65-F5344CB8AC3E}">
-        <p14:creationId xmlns:p14="http://schemas.microsoft.com/office/powerpoint/2010/main" val="1929754879"/>
+        <p14:creationId xmlns:p14="http://schemas.microsoft.com/office/powerpoint/2010/main" val="448371206"/>
       </p:ext>
     </p:extLst>
   </p:cSld>
@@ -30176,13 +30303,8 @@
             </a:pPr>
             <a:r>
               <a:rPr lang="pt-BR" sz="1800" dirty="0" smtClean="0"/>
-              <a:t>PROCV: busca em uma lista vertical </a:t>
-            </a:r>
-            <a:r>
-              <a:rPr lang="pt-BR" sz="1800" dirty="0" smtClean="0"/>
-              <a:t>coluna</a:t>
-            </a:r>
-            <a:endParaRPr lang="pt-BR" sz="1800" dirty="0" smtClean="0"/>
+              <a:t>PROCV: busca em uma lista vertical coluna</a:t>
+            </a:r>
           </a:p>
         </p:txBody>
       </p:sp>
@@ -30819,7 +30941,7 @@
             <a:pPr algn="ctr"/>
             <a:r>
               <a:rPr lang="pt-BR" dirty="0" smtClean="0"/>
-              <a:t>49</a:t>
+              <a:t>51</a:t>
             </a:r>
             <a:endParaRPr lang="pt-BR" dirty="0"/>
           </a:p>
@@ -31226,13 +31348,21 @@
           </a:lstStyle>
           <a:p>
             <a:pPr marL="0" indent="0">
-              <a:buFont typeface="Arial" charset="0"/>
               <a:buNone/>
             </a:pPr>
             <a:r>
               <a:rPr lang="pt-BR" sz="1800" dirty="0" smtClean="0"/>
-              <a:t>Usar material PROCV PROCH</a:t>
-            </a:r>
+              <a:t>Usar material </a:t>
+            </a:r>
+            <a:r>
+              <a:rPr lang="pt-BR" sz="1800" b="1" i="1" u="sng" dirty="0" err="1"/>
+              <a:t>Ex</a:t>
+            </a:r>
+            <a:r>
+              <a:rPr lang="pt-BR" sz="1800" b="1" i="1" u="sng" dirty="0"/>
+              <a:t> PROVC.xlsx</a:t>
+            </a:r>
+            <a:endParaRPr lang="pt-BR" sz="1800" b="1" i="1" u="sng" dirty="0" smtClean="0"/>
           </a:p>
         </p:txBody>
       </p:sp>
@@ -31460,16 +31590,8 @@
                 </a:solidFill>
                 <a:latin typeface="Corbel" panose="020B0503020204020204" pitchFamily="34" charset="0"/>
               </a:rPr>
-              <a:t>FORMULA DE LOGICA SE</a:t>
-            </a:r>
-            <a:endParaRPr lang="pt-BR" sz="2400" b="1" dirty="0" smtClean="0">
-              <a:solidFill>
-                <a:schemeClr val="accent6">
-                  <a:lumMod val="75000"/>
-                </a:schemeClr>
-              </a:solidFill>
-              <a:latin typeface="Corbel" panose="020B0503020204020204" pitchFamily="34" charset="0"/>
-            </a:endParaRPr>
+              <a:t>Alto Volume de Dados  - Banco de Dados em TXT</a:t>
+            </a:r>
           </a:p>
         </p:txBody>
       </p:sp>
@@ -31483,7 +31605,7 @@
         </p:nvSpPr>
         <p:spPr>
           <a:xfrm>
-            <a:off x="692971" y="1913794"/>
+            <a:off x="531607" y="1106970"/>
             <a:ext cx="10896600" cy="2817812"/>
           </a:xfrm>
         </p:spPr>
@@ -31644,21 +31766,229 @@
             </a:lvl9pPr>
           </a:lstStyle>
           <a:p>
+            <a:pPr>
+              <a:buFontTx/>
+              <a:buChar char="-"/>
+            </a:pPr>
+            <a:r>
+              <a:rPr lang="pt-BR" sz="1800" dirty="0" smtClean="0"/>
+              <a:t>Ao trabalhar com banco de dados, utilizar comando Texto para Colunas do Excel</a:t>
+            </a:r>
+            <a:endParaRPr lang="pt-BR" sz="1800" dirty="0"/>
+          </a:p>
+          <a:p>
+            <a:pPr>
+              <a:buFontTx/>
+              <a:buChar char="-"/>
+            </a:pPr>
+            <a:r>
+              <a:rPr lang="pt-BR" sz="1800" dirty="0" smtClean="0"/>
+              <a:t>&gt;No comando Abrir, ou copiando do Arquivo </a:t>
+            </a:r>
+            <a:r>
+              <a:rPr lang="pt-BR" sz="1800" dirty="0" err="1" smtClean="0"/>
+              <a:t>txt</a:t>
+            </a:r>
+            <a:r>
+              <a:rPr lang="pt-BR" sz="1800" dirty="0" smtClean="0"/>
+              <a:t> e colando no Excel:</a:t>
+            </a:r>
+          </a:p>
+          <a:p>
             <a:pPr marL="0" indent="0">
-              <a:buFont typeface="Arial" charset="0"/>
               <a:buNone/>
             </a:pPr>
             <a:r>
               <a:rPr lang="pt-BR" sz="1800" dirty="0" smtClean="0"/>
-              <a:t>Usar material PROCV PROCH</a:t>
-            </a:r>
+              <a:t>Com a coluna do Texto Selecionada: Guia dados&gt; Grupo Ferramenta de Dados &gt; Texto para Colunas.</a:t>
+            </a:r>
+          </a:p>
+          <a:p>
+            <a:pPr marL="0" indent="0">
+              <a:buNone/>
+            </a:pPr>
+            <a:endParaRPr lang="pt-BR" sz="1800" dirty="0" smtClean="0"/>
+          </a:p>
+          <a:p>
+            <a:pPr marL="0" indent="0">
+              <a:buNone/>
+            </a:pPr>
+            <a:r>
+              <a:rPr lang="pt-BR" sz="1800" dirty="0" smtClean="0"/>
+              <a:t>3 Passos para converter em Excel:</a:t>
+            </a:r>
+          </a:p>
+          <a:p>
+            <a:pPr>
+              <a:buFont typeface="+mj-lt"/>
+              <a:buAutoNum type="arabicPeriod"/>
+            </a:pPr>
+            <a:r>
+              <a:rPr lang="pt-BR" sz="1800" dirty="0" smtClean="0"/>
+              <a:t>Coluna com </a:t>
+            </a:r>
+            <a:r>
+              <a:rPr lang="pt-BR" sz="1800" dirty="0" err="1" smtClean="0"/>
+              <a:t>tamnho</a:t>
+            </a:r>
+            <a:r>
+              <a:rPr lang="pt-BR" sz="1800" dirty="0" smtClean="0"/>
+              <a:t> Fixo ou existe algum </a:t>
+            </a:r>
+            <a:r>
+              <a:rPr lang="pt-BR" sz="1800" dirty="0" err="1" smtClean="0"/>
+              <a:t>caracter</a:t>
+            </a:r>
+            <a:r>
+              <a:rPr lang="pt-BR" sz="1800" dirty="0" smtClean="0"/>
+              <a:t> que marca a separação de cada coluna?</a:t>
+            </a:r>
+          </a:p>
+          <a:p>
+            <a:pPr>
+              <a:buFont typeface="+mj-lt"/>
+              <a:buAutoNum type="arabicPeriod"/>
+            </a:pPr>
+            <a:r>
+              <a:rPr lang="pt-BR" sz="1800" dirty="0" smtClean="0"/>
+              <a:t>Onde separam-se as colunas (informar </a:t>
+            </a:r>
+            <a:r>
+              <a:rPr lang="pt-BR" sz="1800" dirty="0" err="1" smtClean="0"/>
+              <a:t>caracter</a:t>
+            </a:r>
+            <a:r>
+              <a:rPr lang="pt-BR" sz="1800" dirty="0" smtClean="0"/>
+              <a:t> ou a desenhar a divisória</a:t>
+            </a:r>
+          </a:p>
+          <a:p>
+            <a:pPr>
+              <a:buFont typeface="+mj-lt"/>
+              <a:buAutoNum type="arabicPeriod"/>
+            </a:pPr>
+            <a:r>
+              <a:rPr lang="pt-BR" sz="1800" dirty="0" smtClean="0"/>
+              <a:t>Dizer o tipo de dado de cada Coluna (texto ou numero).</a:t>
+            </a:r>
+          </a:p>
+          <a:p>
+            <a:pPr marL="0" indent="0">
+              <a:buNone/>
+            </a:pPr>
+            <a:endParaRPr lang="pt-BR" sz="1800" dirty="0"/>
+          </a:p>
+          <a:p>
+            <a:pPr marL="0" indent="0">
+              <a:buNone/>
+            </a:pPr>
+            <a:endParaRPr lang="pt-BR" sz="1800" dirty="0" smtClean="0"/>
+          </a:p>
+          <a:p>
+            <a:pPr>
+              <a:buFontTx/>
+              <a:buChar char="-"/>
+            </a:pPr>
+            <a:endParaRPr lang="pt-BR" sz="1800" dirty="0" smtClean="0"/>
+          </a:p>
+          <a:p>
+            <a:pPr marL="0" indent="0">
+              <a:buNone/>
+            </a:pPr>
+            <a:endParaRPr lang="pt-BR" sz="1800" dirty="0" smtClean="0"/>
+          </a:p>
+          <a:p>
+            <a:pPr>
+              <a:buFontTx/>
+              <a:buChar char="-"/>
+            </a:pPr>
+            <a:endParaRPr lang="pt-BR" sz="1800" dirty="0" smtClean="0"/>
+          </a:p>
+          <a:p>
+            <a:pPr marL="0" indent="0">
+              <a:buFont typeface="Arial" charset="0"/>
+              <a:buNone/>
+            </a:pPr>
+            <a:endParaRPr lang="pt-BR" sz="1800" dirty="0" smtClean="0"/>
           </a:p>
         </p:txBody>
       </p:sp>
+      <p:pic>
+        <p:nvPicPr>
+          <p:cNvPr id="3" name="Imagem 2"/>
+          <p:cNvPicPr>
+            <a:picLocks noChangeAspect="1"/>
+          </p:cNvPicPr>
+          <p:nvPr/>
+        </p:nvPicPr>
+        <p:blipFill>
+          <a:blip r:embed="rId2"/>
+          <a:stretch>
+            <a:fillRect/>
+          </a:stretch>
+        </p:blipFill>
+        <p:spPr>
+          <a:xfrm>
+            <a:off x="3852217" y="4094078"/>
+            <a:ext cx="2775305" cy="2231963"/>
+          </a:xfrm>
+          <a:prstGeom prst="rect">
+            <a:avLst/>
+          </a:prstGeom>
+        </p:spPr>
+      </p:pic>
+      <p:pic>
+        <p:nvPicPr>
+          <p:cNvPr id="4" name="Imagem 3"/>
+          <p:cNvPicPr>
+            <a:picLocks noChangeAspect="1"/>
+          </p:cNvPicPr>
+          <p:nvPr/>
+        </p:nvPicPr>
+        <p:blipFill>
+          <a:blip r:embed="rId3"/>
+          <a:stretch>
+            <a:fillRect/>
+          </a:stretch>
+        </p:blipFill>
+        <p:spPr>
+          <a:xfrm>
+            <a:off x="731687" y="4094078"/>
+            <a:ext cx="2775305" cy="2231963"/>
+          </a:xfrm>
+          <a:prstGeom prst="rect">
+            <a:avLst/>
+          </a:prstGeom>
+        </p:spPr>
+      </p:pic>
+      <p:pic>
+        <p:nvPicPr>
+          <p:cNvPr id="5" name="Imagem 4"/>
+          <p:cNvPicPr>
+            <a:picLocks noChangeAspect="1"/>
+          </p:cNvPicPr>
+          <p:nvPr/>
+        </p:nvPicPr>
+        <p:blipFill>
+          <a:blip r:embed="rId4"/>
+          <a:stretch>
+            <a:fillRect/>
+          </a:stretch>
+        </p:blipFill>
+        <p:spPr>
+          <a:xfrm>
+            <a:off x="7143245" y="4094078"/>
+            <a:ext cx="2786063" cy="2240615"/>
+          </a:xfrm>
+          <a:prstGeom prst="rect">
+            <a:avLst/>
+          </a:prstGeom>
+        </p:spPr>
+      </p:pic>
     </p:spTree>
     <p:extLst>
       <p:ext uri="{BB962C8B-B14F-4D97-AF65-F5344CB8AC3E}">
-        <p14:creationId xmlns:p14="http://schemas.microsoft.com/office/powerpoint/2010/main" val="3039994770"/>
+        <p14:creationId xmlns:p14="http://schemas.microsoft.com/office/powerpoint/2010/main" val="214291026"/>
       </p:ext>
     </p:extLst>
   </p:cSld>
@@ -31879,14 +32209,14 @@
                 </a:solidFill>
                 <a:latin typeface="Corbel" panose="020B0503020204020204" pitchFamily="34" charset="0"/>
               </a:rPr>
-              <a:t>FUNÇÃO SOMASE, CONTSE, MEDIASE</a:t>
+              <a:t>Atividade</a:t>
             </a:r>
           </a:p>
         </p:txBody>
       </p:sp>
       <p:sp>
         <p:nvSpPr>
-          <p:cNvPr id="11" name="Subtítulo 1"/>
+          <p:cNvPr id="4" name="Subtítulo 1"/>
           <p:cNvSpPr txBox="1">
             <a:spLocks/>
           </p:cNvSpPr>
@@ -31894,7 +32224,7 @@
         </p:nvSpPr>
         <p:spPr>
           <a:xfrm>
-            <a:off x="692971" y="1913794"/>
+            <a:off x="327211" y="988637"/>
             <a:ext cx="10896600" cy="2817812"/>
           </a:xfrm>
         </p:spPr>
@@ -32056,30 +32386,253 @@
           </a:lstStyle>
           <a:p>
             <a:pPr marL="0" indent="0">
-              <a:buFont typeface="Arial" charset="0"/>
               <a:buNone/>
             </a:pPr>
             <a:r>
-              <a:rPr lang="pt-BR" sz="1800" dirty="0" smtClean="0"/>
-              <a:t>Ao atender a um critério especifico, faz a soma de acordo com a parâmetro informado.</a:t>
+              <a:rPr lang="pt-BR" sz="1800" dirty="0" smtClean="0">
+                <a:latin typeface="Corbel" panose="020B0503020204020204" pitchFamily="34" charset="0"/>
+              </a:rPr>
+              <a:t>Você recebeu uma base de dados sobre as despesas da Empresa em </a:t>
+            </a:r>
+            <a:r>
+              <a:rPr lang="pt-BR" sz="1800" dirty="0" err="1" smtClean="0">
+                <a:latin typeface="Corbel" panose="020B0503020204020204" pitchFamily="34" charset="0"/>
+              </a:rPr>
+              <a:t>txt</a:t>
+            </a:r>
+            <a:r>
+              <a:rPr lang="pt-BR" sz="1800" dirty="0" smtClean="0">
+                <a:latin typeface="Corbel" panose="020B0503020204020204" pitchFamily="34" charset="0"/>
+              </a:rPr>
+              <a:t> extraída do sistema ERP de um relatório da contabilidade que não possui campos de descrição do Diretor responsável (arquivo Fornecedores.txt). </a:t>
             </a:r>
           </a:p>
           <a:p>
             <a:pPr marL="0" indent="0">
-              <a:buFont typeface="Arial" charset="0"/>
               <a:buNone/>
             </a:pPr>
             <a:r>
-              <a:rPr lang="pt-BR" sz="1800" dirty="0" smtClean="0"/>
-              <a:t>Usado em conjunto com ELIMINAR DUPLICATAS, pode ser uma alternativa para relatórios consolidados</a:t>
-            </a:r>
+              <a:rPr lang="pt-BR" sz="1800" dirty="0" smtClean="0">
+                <a:latin typeface="Corbel" panose="020B0503020204020204" pitchFamily="34" charset="0"/>
+              </a:rPr>
+              <a:t>Cada linha/registro  representa uma nota de pagamento</a:t>
+            </a:r>
+          </a:p>
+          <a:p>
+            <a:pPr marL="0" indent="0">
+              <a:buFont typeface="Arial" charset="0"/>
+              <a:buNone/>
+            </a:pPr>
+            <a:r>
+              <a:rPr lang="pt-BR" sz="1800" dirty="0" smtClean="0">
+                <a:latin typeface="Corbel" panose="020B0503020204020204" pitchFamily="34" charset="0"/>
+              </a:rPr>
+              <a:t>Nem todos os registro possuem nome do gerente ou centro de custo.</a:t>
+            </a:r>
+          </a:p>
+          <a:p>
+            <a:pPr marL="0" indent="0">
+              <a:buFont typeface="Arial" charset="0"/>
+              <a:buNone/>
+            </a:pPr>
+            <a:endParaRPr lang="pt-BR" sz="1800" dirty="0" smtClean="0">
+              <a:latin typeface="Corbel" panose="020B0503020204020204" pitchFamily="34" charset="0"/>
+            </a:endParaRPr>
+          </a:p>
+          <a:p>
+            <a:pPr marL="0" indent="0">
+              <a:buNone/>
+            </a:pPr>
+            <a:r>
+              <a:rPr lang="pt-BR" sz="1800" dirty="0" smtClean="0">
+                <a:latin typeface="Corbel" panose="020B0503020204020204" pitchFamily="34" charset="0"/>
+              </a:rPr>
+              <a:t>Cruze este banco de dados com o cadastro de outro </a:t>
+            </a:r>
+            <a:r>
+              <a:rPr lang="pt-BR" sz="1800" dirty="0">
+                <a:latin typeface="Corbel" panose="020B0503020204020204" pitchFamily="34" charset="0"/>
+              </a:rPr>
+              <a:t>sistema (De para </a:t>
+            </a:r>
+            <a:r>
+              <a:rPr lang="pt-BR" sz="1800" dirty="0" err="1">
+                <a:latin typeface="Corbel" panose="020B0503020204020204" pitchFamily="34" charset="0"/>
+              </a:rPr>
+              <a:t>CCusto</a:t>
+            </a:r>
+            <a:r>
+              <a:rPr lang="pt-BR" sz="1800" dirty="0">
+                <a:latin typeface="Corbel" panose="020B0503020204020204" pitchFamily="34" charset="0"/>
+              </a:rPr>
+              <a:t> X </a:t>
+            </a:r>
+            <a:r>
+              <a:rPr lang="pt-BR" sz="1800" dirty="0" smtClean="0">
+                <a:latin typeface="Corbel" panose="020B0503020204020204" pitchFamily="34" charset="0"/>
+              </a:rPr>
+              <a:t>Fornecedores.xlsx) e descubra:</a:t>
+            </a:r>
+          </a:p>
+          <a:p>
+            <a:pPr marL="0" indent="0">
+              <a:buFont typeface="Arial" charset="0"/>
+              <a:buNone/>
+            </a:pPr>
+            <a:endParaRPr lang="pt-BR" sz="1800" dirty="0">
+              <a:latin typeface="Corbel" panose="020B0503020204020204" pitchFamily="34" charset="0"/>
+            </a:endParaRPr>
+          </a:p>
+          <a:p>
+            <a:pPr marL="0" indent="0">
+              <a:buNone/>
+            </a:pPr>
+            <a:endParaRPr lang="pt-BR" sz="1800" dirty="0" smtClean="0">
+              <a:latin typeface="Corbel" panose="020B0503020204020204" pitchFamily="34" charset="0"/>
+            </a:endParaRPr>
+          </a:p>
+          <a:p>
+            <a:pPr>
+              <a:buFont typeface="Arial" panose="020B0604020202020204" pitchFamily="34" charset="0"/>
+              <a:buChar char="•"/>
+            </a:pPr>
+            <a:r>
+              <a:rPr lang="pt-BR" sz="1800" dirty="0" smtClean="0">
+                <a:latin typeface="Corbel" panose="020B0503020204020204" pitchFamily="34" charset="0"/>
+              </a:rPr>
+              <a:t>Qual o valor gasto total da empresa com “MATERIAL </a:t>
+            </a:r>
+            <a:r>
+              <a:rPr lang="pt-BR" sz="1800" dirty="0">
+                <a:latin typeface="Corbel" panose="020B0503020204020204" pitchFamily="34" charset="0"/>
+              </a:rPr>
+              <a:t>IMPRESSO </a:t>
+            </a:r>
+            <a:r>
+              <a:rPr lang="pt-BR" sz="1800" dirty="0" smtClean="0">
+                <a:latin typeface="Corbel" panose="020B0503020204020204" pitchFamily="34" charset="0"/>
+              </a:rPr>
+              <a:t>FÁBRICA”?</a:t>
+            </a:r>
+          </a:p>
+          <a:p>
+            <a:pPr>
+              <a:buFont typeface="Arial" panose="020B0604020202020204" pitchFamily="34" charset="0"/>
+              <a:buChar char="•"/>
+            </a:pPr>
+            <a:r>
+              <a:rPr lang="pt-BR" sz="1800" dirty="0" smtClean="0">
+                <a:latin typeface="Corbel" panose="020B0503020204020204" pitchFamily="34" charset="0"/>
+              </a:rPr>
+              <a:t>Qual o gasto total do Diretor Silvio (para centros de custo identificados)?</a:t>
+            </a:r>
+          </a:p>
+          <a:p>
+            <a:pPr>
+              <a:buFont typeface="Arial" panose="020B0604020202020204" pitchFamily="34" charset="0"/>
+              <a:buChar char="•"/>
+            </a:pPr>
+            <a:r>
+              <a:rPr lang="pt-BR" sz="1800" dirty="0" smtClean="0">
+                <a:latin typeface="Corbel" panose="020B0503020204020204" pitchFamily="34" charset="0"/>
+              </a:rPr>
+              <a:t>Quais os dados (responsável, fornecedor, diretor)  da NOTA de maior valor?</a:t>
+            </a:r>
+          </a:p>
+          <a:p>
+            <a:pPr>
+              <a:buFont typeface="Arial" panose="020B0604020202020204" pitchFamily="34" charset="0"/>
+              <a:buChar char="•"/>
+            </a:pPr>
+            <a:endParaRPr lang="pt-BR" sz="1800" dirty="0">
+              <a:latin typeface="Corbel" panose="020B0503020204020204" pitchFamily="34" charset="0"/>
+            </a:endParaRPr>
+          </a:p>
+          <a:p>
+            <a:pPr>
+              <a:buFont typeface="Arial" panose="020B0604020202020204" pitchFamily="34" charset="0"/>
+              <a:buChar char="•"/>
+            </a:pPr>
+            <a:endParaRPr lang="pt-BR" sz="1800" dirty="0" smtClean="0">
+              <a:latin typeface="Corbel" panose="020B0503020204020204" pitchFamily="34" charset="0"/>
+            </a:endParaRPr>
+          </a:p>
+          <a:p>
+            <a:pPr>
+              <a:buFont typeface="Arial" panose="020B0604020202020204" pitchFamily="34" charset="0"/>
+              <a:buChar char="•"/>
+            </a:pPr>
+            <a:endParaRPr lang="pt-BR" sz="1800" dirty="0">
+              <a:latin typeface="Corbel" panose="020B0503020204020204" pitchFamily="34" charset="0"/>
+            </a:endParaRPr>
+          </a:p>
+          <a:p>
+            <a:pPr marL="0" indent="0">
+              <a:buNone/>
+            </a:pPr>
+            <a:r>
+              <a:rPr lang="pt-BR" sz="1800" dirty="0" smtClean="0">
+                <a:latin typeface="Corbel" panose="020B0503020204020204" pitchFamily="34" charset="0"/>
+              </a:rPr>
+              <a:t>Dica: Converter Todos os IDS para numero, PROCV, Texto para Coluna, FILTRO, Classificação.</a:t>
+            </a:r>
+          </a:p>
+          <a:p>
+            <a:pPr marL="0" indent="0">
+              <a:buNone/>
+            </a:pPr>
+            <a:endParaRPr lang="pt-BR" sz="1800" dirty="0" smtClean="0">
+              <a:latin typeface="Corbel" panose="020B0503020204020204" pitchFamily="34" charset="0"/>
+            </a:endParaRPr>
+          </a:p>
+          <a:p>
+            <a:pPr marL="0" indent="0">
+              <a:buNone/>
+            </a:pPr>
+            <a:endParaRPr lang="pt-BR" sz="1800" dirty="0" smtClean="0">
+              <a:latin typeface="Corbel" panose="020B0503020204020204" pitchFamily="34" charset="0"/>
+            </a:endParaRPr>
+          </a:p>
+          <a:p>
+            <a:pPr marL="0" indent="0">
+              <a:buNone/>
+            </a:pPr>
+            <a:endParaRPr lang="pt-BR" sz="1800" dirty="0" smtClean="0">
+              <a:latin typeface="Corbel" panose="020B0503020204020204" pitchFamily="34" charset="0"/>
+            </a:endParaRPr>
+          </a:p>
+          <a:p>
+            <a:pPr marL="0" indent="0">
+              <a:buNone/>
+            </a:pPr>
+            <a:endParaRPr lang="pt-BR" sz="1800" dirty="0" smtClean="0">
+              <a:latin typeface="Corbel" panose="020B0503020204020204" pitchFamily="34" charset="0"/>
+            </a:endParaRPr>
+          </a:p>
+          <a:p>
+            <a:pPr marL="0" indent="0">
+              <a:buFont typeface="Arial" charset="0"/>
+              <a:buNone/>
+            </a:pPr>
+            <a:endParaRPr lang="pt-BR" sz="1800" dirty="0" smtClean="0">
+              <a:latin typeface="Corbel" panose="020B0503020204020204" pitchFamily="34" charset="0"/>
+            </a:endParaRPr>
+          </a:p>
+          <a:p>
+            <a:pPr marL="0" indent="0">
+              <a:buFont typeface="Arial" charset="0"/>
+              <a:buNone/>
+            </a:pPr>
+            <a:endParaRPr lang="pt-BR" sz="1800" dirty="0" smtClean="0">
+              <a:latin typeface="Corbel" panose="020B0503020204020204" pitchFamily="34" charset="0"/>
+            </a:endParaRPr>
           </a:p>
         </p:txBody>
       </p:sp>
     </p:spTree>
     <p:extLst>
       <p:ext uri="{BB962C8B-B14F-4D97-AF65-F5344CB8AC3E}">
-        <p14:creationId xmlns:p14="http://schemas.microsoft.com/office/powerpoint/2010/main" val="3520348011"/>
+        <p14:creationId xmlns:p14="http://schemas.microsoft.com/office/powerpoint/2010/main" val="1602921918"/>
       </p:ext>
     </p:extLst>
   </p:cSld>
@@ -32300,6 +32853,564 @@
                 </a:solidFill>
                 <a:latin typeface="Corbel" panose="020B0503020204020204" pitchFamily="34" charset="0"/>
               </a:rPr>
+              <a:t>FORMULA DE Banco de Dados e FLUXO DE LOGICA</a:t>
+            </a:r>
+          </a:p>
+        </p:txBody>
+      </p:sp>
+      <p:sp>
+        <p:nvSpPr>
+          <p:cNvPr id="11" name="Subtítulo 1"/>
+          <p:cNvSpPr txBox="1">
+            <a:spLocks/>
+          </p:cNvSpPr>
+          <p:nvPr/>
+        </p:nvSpPr>
+        <p:spPr>
+          <a:xfrm>
+            <a:off x="210670" y="871369"/>
+            <a:ext cx="10896600" cy="4658062"/>
+          </a:xfrm>
+        </p:spPr>
+        <p:txBody>
+          <a:bodyPr>
+            <a:noAutofit/>
+          </a:bodyPr>
+          <a:lstStyle>
+            <a:lvl1pPr marL="342900" indent="-342900" algn="l" rtl="0" eaLnBrk="0" fontAlgn="base" hangingPunct="0">
+              <a:spcBef>
+                <a:spcPct val="20000"/>
+              </a:spcBef>
+              <a:spcAft>
+                <a:spcPct val="0"/>
+              </a:spcAft>
+              <a:buFont typeface="Arial" charset="0"/>
+              <a:buChar char="•"/>
+              <a:defRPr lang="pt-BR" sz="2800" kern="1200" dirty="0">
+                <a:solidFill>
+                  <a:schemeClr val="tx1"/>
+                </a:solidFill>
+                <a:latin typeface="+mn-lt"/>
+                <a:ea typeface="+mn-ea"/>
+                <a:cs typeface="+mn-cs"/>
+              </a:defRPr>
+            </a:lvl1pPr>
+            <a:lvl2pPr marL="742950" indent="-285750" algn="l" rtl="0" eaLnBrk="0" fontAlgn="base" hangingPunct="0">
+              <a:spcBef>
+                <a:spcPct val="20000"/>
+              </a:spcBef>
+              <a:spcAft>
+                <a:spcPct val="0"/>
+              </a:spcAft>
+              <a:buFont typeface="Arial" charset="0"/>
+              <a:buChar char="•"/>
+              <a:defRPr lang="pt-BR" sz="2400" kern="1200" dirty="0">
+                <a:solidFill>
+                  <a:schemeClr val="tx1"/>
+                </a:solidFill>
+                <a:latin typeface="+mn-lt"/>
+                <a:ea typeface="+mn-ea"/>
+                <a:cs typeface="+mn-cs"/>
+              </a:defRPr>
+            </a:lvl2pPr>
+            <a:lvl3pPr marL="1143000" indent="-228600" algn="l" rtl="0" eaLnBrk="0" fontAlgn="base" hangingPunct="0">
+              <a:spcBef>
+                <a:spcPct val="20000"/>
+              </a:spcBef>
+              <a:spcAft>
+                <a:spcPct val="0"/>
+              </a:spcAft>
+              <a:buFont typeface="Arial" charset="0"/>
+              <a:buChar char="•"/>
+              <a:defRPr lang="pt-BR" sz="2400" kern="1200" dirty="0">
+                <a:solidFill>
+                  <a:schemeClr val="tx1"/>
+                </a:solidFill>
+                <a:latin typeface="+mn-lt"/>
+                <a:ea typeface="+mn-ea"/>
+                <a:cs typeface="+mn-cs"/>
+              </a:defRPr>
+            </a:lvl3pPr>
+            <a:lvl4pPr marL="1600200" indent="-228600" algn="l" rtl="0" eaLnBrk="0" fontAlgn="base" hangingPunct="0">
+              <a:spcBef>
+                <a:spcPct val="20000"/>
+              </a:spcBef>
+              <a:spcAft>
+                <a:spcPct val="0"/>
+              </a:spcAft>
+              <a:buFont typeface="Arial" charset="0"/>
+              <a:buChar char="•"/>
+              <a:defRPr lang="pt-BR" sz="2000" kern="1200" dirty="0">
+                <a:solidFill>
+                  <a:schemeClr val="tx1"/>
+                </a:solidFill>
+                <a:latin typeface="+mn-lt"/>
+                <a:ea typeface="+mn-ea"/>
+                <a:cs typeface="+mn-cs"/>
+              </a:defRPr>
+            </a:lvl4pPr>
+            <a:lvl5pPr marL="2057400" indent="-228600" algn="l" rtl="0" eaLnBrk="0" fontAlgn="base" hangingPunct="0">
+              <a:spcBef>
+                <a:spcPct val="20000"/>
+              </a:spcBef>
+              <a:spcAft>
+                <a:spcPct val="0"/>
+              </a:spcAft>
+              <a:buFont typeface="Arial" charset="0"/>
+              <a:buChar char="•"/>
+              <a:defRPr lang="pt-BR" sz="2000" kern="1200" dirty="0">
+                <a:solidFill>
+                  <a:schemeClr val="tx1"/>
+                </a:solidFill>
+                <a:latin typeface="+mn-lt"/>
+                <a:ea typeface="+mn-ea"/>
+                <a:cs typeface="+mn-cs"/>
+              </a:defRPr>
+            </a:lvl5pPr>
+            <a:lvl6pPr marL="2514600" indent="-228600" algn="l" defTabSz="914400" rtl="0" eaLnBrk="1" latinLnBrk="0" hangingPunct="1">
+              <a:spcBef>
+                <a:spcPct val="20000"/>
+              </a:spcBef>
+              <a:buFont typeface="Arial" pitchFamily="34" charset="0"/>
+              <a:buChar char="•"/>
+              <a:defRPr sz="2000" kern="1200">
+                <a:solidFill>
+                  <a:schemeClr val="tx1"/>
+                </a:solidFill>
+                <a:latin typeface="+mn-lt"/>
+                <a:ea typeface="+mn-ea"/>
+                <a:cs typeface="+mn-cs"/>
+              </a:defRPr>
+            </a:lvl6pPr>
+            <a:lvl7pPr marL="2971800" indent="-228600" algn="l" defTabSz="914400" rtl="0" eaLnBrk="1" latinLnBrk="0" hangingPunct="1">
+              <a:spcBef>
+                <a:spcPct val="20000"/>
+              </a:spcBef>
+              <a:buFont typeface="Arial" pitchFamily="34" charset="0"/>
+              <a:buChar char="•"/>
+              <a:defRPr sz="2000" kern="1200">
+                <a:solidFill>
+                  <a:schemeClr val="tx1"/>
+                </a:solidFill>
+                <a:latin typeface="+mn-lt"/>
+                <a:ea typeface="+mn-ea"/>
+                <a:cs typeface="+mn-cs"/>
+              </a:defRPr>
+            </a:lvl7pPr>
+            <a:lvl8pPr marL="3429000" indent="-228600" algn="l" defTabSz="914400" rtl="0" eaLnBrk="1" latinLnBrk="0" hangingPunct="1">
+              <a:spcBef>
+                <a:spcPct val="20000"/>
+              </a:spcBef>
+              <a:buFont typeface="Arial" pitchFamily="34" charset="0"/>
+              <a:buChar char="•"/>
+              <a:defRPr sz="2000" kern="1200">
+                <a:solidFill>
+                  <a:schemeClr val="tx1"/>
+                </a:solidFill>
+                <a:latin typeface="+mn-lt"/>
+                <a:ea typeface="+mn-ea"/>
+                <a:cs typeface="+mn-cs"/>
+              </a:defRPr>
+            </a:lvl8pPr>
+            <a:lvl9pPr marL="3886200" indent="-228600" algn="l" defTabSz="914400" rtl="0" eaLnBrk="1" latinLnBrk="0" hangingPunct="1">
+              <a:spcBef>
+                <a:spcPct val="20000"/>
+              </a:spcBef>
+              <a:buFont typeface="Arial" pitchFamily="34" charset="0"/>
+              <a:buChar char="•"/>
+              <a:defRPr sz="2000" kern="1200">
+                <a:solidFill>
+                  <a:schemeClr val="tx1"/>
+                </a:solidFill>
+                <a:latin typeface="+mn-lt"/>
+                <a:ea typeface="+mn-ea"/>
+                <a:cs typeface="+mn-cs"/>
+              </a:defRPr>
+            </a:lvl9pPr>
+          </a:lstStyle>
+          <a:p>
+            <a:pPr marL="0" indent="0">
+              <a:buNone/>
+            </a:pPr>
+            <a:r>
+              <a:rPr lang="pt-BR" sz="1800" dirty="0"/>
+              <a:t>O Excel possui uma biblioteca de funções próprias para listas grandes. </a:t>
+            </a:r>
+            <a:r>
+              <a:rPr lang="pt-BR" sz="1800" dirty="0" smtClean="0"/>
+              <a:t>Ao </a:t>
+            </a:r>
+            <a:r>
+              <a:rPr lang="pt-BR" sz="1800" dirty="0"/>
+              <a:t>atender a um critério especifico, faz a soma de acordo com a parâmetro informado</a:t>
+            </a:r>
+            <a:r>
+              <a:rPr lang="pt-BR" sz="1800" dirty="0" smtClean="0"/>
+              <a:t>. As função são:</a:t>
+            </a:r>
+            <a:endParaRPr lang="pt-BR" sz="1800" dirty="0"/>
+          </a:p>
+          <a:p>
+            <a:pPr marL="0" indent="0">
+              <a:buFont typeface="Arial" charset="0"/>
+              <a:buNone/>
+            </a:pPr>
+            <a:r>
+              <a:rPr lang="pt-BR" sz="1800" dirty="0" smtClean="0"/>
+              <a:t>SOMASE</a:t>
+            </a:r>
+          </a:p>
+          <a:p>
+            <a:pPr marL="0" indent="0">
+              <a:buFont typeface="Arial" charset="0"/>
+              <a:buNone/>
+            </a:pPr>
+            <a:r>
+              <a:rPr lang="pt-BR" sz="1800" dirty="0" smtClean="0"/>
+              <a:t>CONT.SE</a:t>
+            </a:r>
+          </a:p>
+          <a:p>
+            <a:pPr marL="0" indent="0">
+              <a:buFont typeface="Arial" charset="0"/>
+              <a:buNone/>
+            </a:pPr>
+            <a:r>
+              <a:rPr lang="pt-BR" sz="1800" dirty="0" smtClean="0"/>
+              <a:t>MÉDIASE</a:t>
+            </a:r>
+          </a:p>
+          <a:p>
+            <a:pPr marL="0" indent="0">
+              <a:buFont typeface="Arial" charset="0"/>
+              <a:buNone/>
+            </a:pPr>
+            <a:endParaRPr lang="pt-BR" sz="1800" dirty="0" smtClean="0"/>
+          </a:p>
+          <a:p>
+            <a:pPr marL="0" indent="0">
+              <a:buFont typeface="Arial" charset="0"/>
+              <a:buNone/>
+            </a:pPr>
+            <a:r>
+              <a:rPr lang="pt-BR" sz="1800" dirty="0" smtClean="0"/>
+              <a:t>Elas trabalham em conjunto com a o fluxo de símbolos abaixo que dizem qual é o Critério:</a:t>
+            </a:r>
+          </a:p>
+          <a:p>
+            <a:pPr marL="0" indent="0">
+              <a:buNone/>
+            </a:pPr>
+            <a:r>
+              <a:rPr lang="pt-BR" sz="1800" dirty="0" smtClean="0"/>
+              <a:t>2) &gt; (maior do que ) ; &lt; (menor do que) ;  = (igual a ); &lt;&gt; (diferente de).</a:t>
+            </a:r>
+          </a:p>
+          <a:p>
+            <a:pPr>
+              <a:buFont typeface="Wingdings" panose="05000000000000000000" pitchFamily="2" charset="2"/>
+              <a:buChar char="Ø"/>
+            </a:pPr>
+            <a:endParaRPr lang="pt-BR" sz="1800" dirty="0"/>
+          </a:p>
+          <a:p>
+            <a:pPr>
+              <a:buFont typeface="Wingdings" panose="05000000000000000000" pitchFamily="2" charset="2"/>
+              <a:buChar char="Ø"/>
+            </a:pPr>
+            <a:r>
+              <a:rPr lang="pt-BR" sz="1800" dirty="0" smtClean="0"/>
+              <a:t>Usando a formula “..SE” acima você consegue somar somente valores que atendam às condições proposta no item 2.</a:t>
+            </a:r>
+          </a:p>
+          <a:p>
+            <a:pPr>
+              <a:buFont typeface="Wingdings" panose="05000000000000000000" pitchFamily="2" charset="2"/>
+              <a:buChar char="Ø"/>
+            </a:pPr>
+            <a:endParaRPr lang="pt-BR" sz="1800" dirty="0"/>
+          </a:p>
+          <a:p>
+            <a:pPr>
+              <a:buFont typeface="Wingdings" panose="05000000000000000000" pitchFamily="2" charset="2"/>
+              <a:buChar char="Ø"/>
+            </a:pPr>
+            <a:endParaRPr lang="pt-BR" sz="1800" dirty="0" smtClean="0"/>
+          </a:p>
+        </p:txBody>
+      </p:sp>
+      <p:pic>
+        <p:nvPicPr>
+          <p:cNvPr id="2" name="Imagem 1"/>
+          <p:cNvPicPr>
+            <a:picLocks noChangeAspect="1"/>
+          </p:cNvPicPr>
+          <p:nvPr/>
+        </p:nvPicPr>
+        <p:blipFill>
+          <a:blip r:embed="rId2"/>
+          <a:stretch>
+            <a:fillRect/>
+          </a:stretch>
+        </p:blipFill>
+        <p:spPr>
+          <a:xfrm>
+            <a:off x="736824" y="4578699"/>
+            <a:ext cx="2908300" cy="1551840"/>
+          </a:xfrm>
+          <a:prstGeom prst="rect">
+            <a:avLst/>
+          </a:prstGeom>
+        </p:spPr>
+      </p:pic>
+      <p:pic>
+        <p:nvPicPr>
+          <p:cNvPr id="3" name="Imagem 2"/>
+          <p:cNvPicPr>
+            <a:picLocks noChangeAspect="1"/>
+          </p:cNvPicPr>
+          <p:nvPr/>
+        </p:nvPicPr>
+        <p:blipFill>
+          <a:blip r:embed="rId3"/>
+          <a:stretch>
+            <a:fillRect/>
+          </a:stretch>
+        </p:blipFill>
+        <p:spPr>
+          <a:xfrm>
+            <a:off x="4314712" y="5093605"/>
+            <a:ext cx="3517900" cy="279840"/>
+          </a:xfrm>
+          <a:prstGeom prst="rect">
+            <a:avLst/>
+          </a:prstGeom>
+        </p:spPr>
+      </p:pic>
+    </p:spTree>
+    <p:extLst>
+      <p:ext uri="{BB962C8B-B14F-4D97-AF65-F5344CB8AC3E}">
+        <p14:creationId xmlns:p14="http://schemas.microsoft.com/office/powerpoint/2010/main" val="3039994770"/>
+      </p:ext>
+    </p:extLst>
+  </p:cSld>
+  <p:clrMapOvr>
+    <a:masterClrMapping/>
+  </p:clrMapOvr>
+  <p:timing>
+    <p:tnLst>
+      <p:par>
+        <p:cTn id="1" dur="indefinite" restart="never" nodeType="tmRoot"/>
+      </p:par>
+    </p:tnLst>
+  </p:timing>
+</p:sld>
+</file>
+
+<file path=ppt/slides/slide56.xml><?xml version="1.0" encoding="utf-8"?>
+<p:sld xmlns:a="http://schemas.openxmlformats.org/drawingml/2006/main" xmlns:r="http://schemas.openxmlformats.org/officeDocument/2006/relationships" xmlns:p="http://schemas.openxmlformats.org/presentationml/2006/main">
+  <p:cSld>
+    <p:spTree>
+      <p:nvGrpSpPr>
+        <p:cNvPr id="1" name=""/>
+        <p:cNvGrpSpPr/>
+        <p:nvPr/>
+      </p:nvGrpSpPr>
+      <p:grpSpPr>
+        <a:xfrm>
+          <a:off x="0" y="0"/>
+          <a:ext cx="0" cy="0"/>
+          <a:chOff x="0" y="0"/>
+          <a:chExt cx="0" cy="0"/>
+        </a:xfrm>
+      </p:grpSpPr>
+      <p:sp>
+        <p:nvSpPr>
+          <p:cNvPr id="6" name="Subtítulo 2"/>
+          <p:cNvSpPr txBox="1">
+            <a:spLocks/>
+          </p:cNvSpPr>
+          <p:nvPr/>
+        </p:nvSpPr>
+        <p:spPr>
+          <a:xfrm>
+            <a:off x="210670" y="153054"/>
+            <a:ext cx="10058400" cy="718315"/>
+          </a:xfrm>
+        </p:spPr>
+        <p:txBody>
+          <a:bodyPr>
+            <a:noAutofit/>
+          </a:bodyPr>
+          <a:lstStyle>
+            <a:lvl1pPr marL="342900" indent="-342900" algn="l" rtl="0" eaLnBrk="0" fontAlgn="base" hangingPunct="0">
+              <a:spcBef>
+                <a:spcPct val="20000"/>
+              </a:spcBef>
+              <a:spcAft>
+                <a:spcPct val="0"/>
+              </a:spcAft>
+              <a:buFont typeface="Arial" charset="0"/>
+              <a:buChar char="•"/>
+              <a:defRPr lang="pt-BR" sz="2800" kern="1200" dirty="0">
+                <a:solidFill>
+                  <a:schemeClr val="tx1"/>
+                </a:solidFill>
+                <a:latin typeface="+mn-lt"/>
+                <a:ea typeface="+mn-ea"/>
+                <a:cs typeface="+mn-cs"/>
+              </a:defRPr>
+            </a:lvl1pPr>
+            <a:lvl2pPr marL="742950" indent="-285750" algn="l" rtl="0" eaLnBrk="0" fontAlgn="base" hangingPunct="0">
+              <a:spcBef>
+                <a:spcPct val="20000"/>
+              </a:spcBef>
+              <a:spcAft>
+                <a:spcPct val="0"/>
+              </a:spcAft>
+              <a:buFont typeface="Arial" charset="0"/>
+              <a:buChar char="•"/>
+              <a:defRPr lang="pt-BR" sz="2400" kern="1200" dirty="0">
+                <a:solidFill>
+                  <a:schemeClr val="tx1"/>
+                </a:solidFill>
+                <a:latin typeface="+mn-lt"/>
+                <a:ea typeface="+mn-ea"/>
+                <a:cs typeface="+mn-cs"/>
+              </a:defRPr>
+            </a:lvl2pPr>
+            <a:lvl3pPr marL="1143000" indent="-228600" algn="l" rtl="0" eaLnBrk="0" fontAlgn="base" hangingPunct="0">
+              <a:spcBef>
+                <a:spcPct val="20000"/>
+              </a:spcBef>
+              <a:spcAft>
+                <a:spcPct val="0"/>
+              </a:spcAft>
+              <a:buFont typeface="Arial" charset="0"/>
+              <a:buChar char="•"/>
+              <a:defRPr lang="pt-BR" sz="2400" kern="1200" dirty="0">
+                <a:solidFill>
+                  <a:schemeClr val="tx1"/>
+                </a:solidFill>
+                <a:latin typeface="+mn-lt"/>
+                <a:ea typeface="+mn-ea"/>
+                <a:cs typeface="+mn-cs"/>
+              </a:defRPr>
+            </a:lvl3pPr>
+            <a:lvl4pPr marL="1600200" indent="-228600" algn="l" rtl="0" eaLnBrk="0" fontAlgn="base" hangingPunct="0">
+              <a:spcBef>
+                <a:spcPct val="20000"/>
+              </a:spcBef>
+              <a:spcAft>
+                <a:spcPct val="0"/>
+              </a:spcAft>
+              <a:buFont typeface="Arial" charset="0"/>
+              <a:buChar char="•"/>
+              <a:defRPr lang="pt-BR" sz="2000" kern="1200" dirty="0">
+                <a:solidFill>
+                  <a:schemeClr val="tx1"/>
+                </a:solidFill>
+                <a:latin typeface="+mn-lt"/>
+                <a:ea typeface="+mn-ea"/>
+                <a:cs typeface="+mn-cs"/>
+              </a:defRPr>
+            </a:lvl4pPr>
+            <a:lvl5pPr marL="2057400" indent="-228600" algn="l" rtl="0" eaLnBrk="0" fontAlgn="base" hangingPunct="0">
+              <a:spcBef>
+                <a:spcPct val="20000"/>
+              </a:spcBef>
+              <a:spcAft>
+                <a:spcPct val="0"/>
+              </a:spcAft>
+              <a:buFont typeface="Arial" charset="0"/>
+              <a:buChar char="•"/>
+              <a:defRPr lang="pt-BR" sz="2000" kern="1200" dirty="0">
+                <a:solidFill>
+                  <a:schemeClr val="tx1"/>
+                </a:solidFill>
+                <a:latin typeface="+mn-lt"/>
+                <a:ea typeface="+mn-ea"/>
+                <a:cs typeface="+mn-cs"/>
+              </a:defRPr>
+            </a:lvl5pPr>
+            <a:lvl6pPr marL="2514600" indent="-228600" algn="l" defTabSz="914400" rtl="0" eaLnBrk="1" latinLnBrk="0" hangingPunct="1">
+              <a:spcBef>
+                <a:spcPct val="20000"/>
+              </a:spcBef>
+              <a:buFont typeface="Arial" pitchFamily="34" charset="0"/>
+              <a:buChar char="•"/>
+              <a:defRPr sz="2000" kern="1200">
+                <a:solidFill>
+                  <a:schemeClr val="tx1"/>
+                </a:solidFill>
+                <a:latin typeface="+mn-lt"/>
+                <a:ea typeface="+mn-ea"/>
+                <a:cs typeface="+mn-cs"/>
+              </a:defRPr>
+            </a:lvl6pPr>
+            <a:lvl7pPr marL="2971800" indent="-228600" algn="l" defTabSz="914400" rtl="0" eaLnBrk="1" latinLnBrk="0" hangingPunct="1">
+              <a:spcBef>
+                <a:spcPct val="20000"/>
+              </a:spcBef>
+              <a:buFont typeface="Arial" pitchFamily="34" charset="0"/>
+              <a:buChar char="•"/>
+              <a:defRPr sz="2000" kern="1200">
+                <a:solidFill>
+                  <a:schemeClr val="tx1"/>
+                </a:solidFill>
+                <a:latin typeface="+mn-lt"/>
+                <a:ea typeface="+mn-ea"/>
+                <a:cs typeface="+mn-cs"/>
+              </a:defRPr>
+            </a:lvl7pPr>
+            <a:lvl8pPr marL="3429000" indent="-228600" algn="l" defTabSz="914400" rtl="0" eaLnBrk="1" latinLnBrk="0" hangingPunct="1">
+              <a:spcBef>
+                <a:spcPct val="20000"/>
+              </a:spcBef>
+              <a:buFont typeface="Arial" pitchFamily="34" charset="0"/>
+              <a:buChar char="•"/>
+              <a:defRPr sz="2000" kern="1200">
+                <a:solidFill>
+                  <a:schemeClr val="tx1"/>
+                </a:solidFill>
+                <a:latin typeface="+mn-lt"/>
+                <a:ea typeface="+mn-ea"/>
+                <a:cs typeface="+mn-cs"/>
+              </a:defRPr>
+            </a:lvl8pPr>
+            <a:lvl9pPr marL="3886200" indent="-228600" algn="l" defTabSz="914400" rtl="0" eaLnBrk="1" latinLnBrk="0" hangingPunct="1">
+              <a:spcBef>
+                <a:spcPct val="20000"/>
+              </a:spcBef>
+              <a:buFont typeface="Arial" pitchFamily="34" charset="0"/>
+              <a:buChar char="•"/>
+              <a:defRPr sz="2000" kern="1200">
+                <a:solidFill>
+                  <a:schemeClr val="tx1"/>
+                </a:solidFill>
+                <a:latin typeface="+mn-lt"/>
+                <a:ea typeface="+mn-ea"/>
+                <a:cs typeface="+mn-cs"/>
+              </a:defRPr>
+            </a:lvl9pPr>
+          </a:lstStyle>
+          <a:p>
+            <a:pPr marL="0" indent="0">
+              <a:lnSpc>
+                <a:spcPct val="150000"/>
+              </a:lnSpc>
+              <a:buFont typeface="Arial" charset="0"/>
+              <a:buNone/>
+            </a:pPr>
+            <a:r>
+              <a:rPr lang="pt-BR" sz="2400" b="1" dirty="0" smtClean="0">
+                <a:solidFill>
+                  <a:schemeClr val="accent6">
+                    <a:lumMod val="75000"/>
+                  </a:schemeClr>
+                </a:solidFill>
+                <a:latin typeface="Corbel" panose="020B0503020204020204" pitchFamily="34" charset="0"/>
+              </a:rPr>
               <a:t>ATIVIDADE</a:t>
             </a:r>
           </a:p>
@@ -32482,7 +33593,7 @@
             </a:pPr>
             <a:r>
               <a:rPr lang="pt-BR" sz="1800" dirty="0" smtClean="0"/>
-              <a:t>USE ARQUIVO DE VENDAS PARA FAZER MEDIA, SOMA, CONTAGEM POR UF x CATEGORIA DE PRODUTO.</a:t>
+              <a:t>USE ARQUIVO DE FORNECEDORES PARA FAZER MEDIA, SOMA, CONTAGEM POR GERENTE, DIRETOR E DEPARTARMENTO.</a:t>
             </a:r>
           </a:p>
         </p:txBody>
@@ -32507,7 +33618,484 @@
 </p:sld>
 </file>
 
-<file path=ppt/slides/slide56.xml><?xml version="1.0" encoding="utf-8"?>
+<file path=ppt/slides/slide57.xml><?xml version="1.0" encoding="utf-8"?>
+<p:sld xmlns:a="http://schemas.openxmlformats.org/drawingml/2006/main" xmlns:r="http://schemas.openxmlformats.org/officeDocument/2006/relationships" xmlns:p="http://schemas.openxmlformats.org/presentationml/2006/main">
+  <p:cSld>
+    <p:spTree>
+      <p:nvGrpSpPr>
+        <p:cNvPr id="1" name=""/>
+        <p:cNvGrpSpPr/>
+        <p:nvPr/>
+      </p:nvGrpSpPr>
+      <p:grpSpPr>
+        <a:xfrm>
+          <a:off x="0" y="0"/>
+          <a:ext cx="0" cy="0"/>
+          <a:chOff x="0" y="0"/>
+          <a:chExt cx="0" cy="0"/>
+        </a:xfrm>
+      </p:grpSpPr>
+      <p:sp>
+        <p:nvSpPr>
+          <p:cNvPr id="6" name="Subtítulo 2"/>
+          <p:cNvSpPr txBox="1">
+            <a:spLocks/>
+          </p:cNvSpPr>
+          <p:nvPr/>
+        </p:nvSpPr>
+        <p:spPr>
+          <a:xfrm>
+            <a:off x="210670" y="153054"/>
+            <a:ext cx="10058400" cy="718315"/>
+          </a:xfrm>
+        </p:spPr>
+        <p:txBody>
+          <a:bodyPr>
+            <a:noAutofit/>
+          </a:bodyPr>
+          <a:lstStyle>
+            <a:lvl1pPr marL="342900" indent="-342900" algn="l" rtl="0" eaLnBrk="0" fontAlgn="base" hangingPunct="0">
+              <a:spcBef>
+                <a:spcPct val="20000"/>
+              </a:spcBef>
+              <a:spcAft>
+                <a:spcPct val="0"/>
+              </a:spcAft>
+              <a:buFont typeface="Arial" charset="0"/>
+              <a:buChar char="•"/>
+              <a:defRPr lang="pt-BR" sz="2800" kern="1200" dirty="0">
+                <a:solidFill>
+                  <a:schemeClr val="tx1"/>
+                </a:solidFill>
+                <a:latin typeface="+mn-lt"/>
+                <a:ea typeface="+mn-ea"/>
+                <a:cs typeface="+mn-cs"/>
+              </a:defRPr>
+            </a:lvl1pPr>
+            <a:lvl2pPr marL="742950" indent="-285750" algn="l" rtl="0" eaLnBrk="0" fontAlgn="base" hangingPunct="0">
+              <a:spcBef>
+                <a:spcPct val="20000"/>
+              </a:spcBef>
+              <a:spcAft>
+                <a:spcPct val="0"/>
+              </a:spcAft>
+              <a:buFont typeface="Arial" charset="0"/>
+              <a:buChar char="•"/>
+              <a:defRPr lang="pt-BR" sz="2400" kern="1200" dirty="0">
+                <a:solidFill>
+                  <a:schemeClr val="tx1"/>
+                </a:solidFill>
+                <a:latin typeface="+mn-lt"/>
+                <a:ea typeface="+mn-ea"/>
+                <a:cs typeface="+mn-cs"/>
+              </a:defRPr>
+            </a:lvl2pPr>
+            <a:lvl3pPr marL="1143000" indent="-228600" algn="l" rtl="0" eaLnBrk="0" fontAlgn="base" hangingPunct="0">
+              <a:spcBef>
+                <a:spcPct val="20000"/>
+              </a:spcBef>
+              <a:spcAft>
+                <a:spcPct val="0"/>
+              </a:spcAft>
+              <a:buFont typeface="Arial" charset="0"/>
+              <a:buChar char="•"/>
+              <a:defRPr lang="pt-BR" sz="2400" kern="1200" dirty="0">
+                <a:solidFill>
+                  <a:schemeClr val="tx1"/>
+                </a:solidFill>
+                <a:latin typeface="+mn-lt"/>
+                <a:ea typeface="+mn-ea"/>
+                <a:cs typeface="+mn-cs"/>
+              </a:defRPr>
+            </a:lvl3pPr>
+            <a:lvl4pPr marL="1600200" indent="-228600" algn="l" rtl="0" eaLnBrk="0" fontAlgn="base" hangingPunct="0">
+              <a:spcBef>
+                <a:spcPct val="20000"/>
+              </a:spcBef>
+              <a:spcAft>
+                <a:spcPct val="0"/>
+              </a:spcAft>
+              <a:buFont typeface="Arial" charset="0"/>
+              <a:buChar char="•"/>
+              <a:defRPr lang="pt-BR" sz="2000" kern="1200" dirty="0">
+                <a:solidFill>
+                  <a:schemeClr val="tx1"/>
+                </a:solidFill>
+                <a:latin typeface="+mn-lt"/>
+                <a:ea typeface="+mn-ea"/>
+                <a:cs typeface="+mn-cs"/>
+              </a:defRPr>
+            </a:lvl4pPr>
+            <a:lvl5pPr marL="2057400" indent="-228600" algn="l" rtl="0" eaLnBrk="0" fontAlgn="base" hangingPunct="0">
+              <a:spcBef>
+                <a:spcPct val="20000"/>
+              </a:spcBef>
+              <a:spcAft>
+                <a:spcPct val="0"/>
+              </a:spcAft>
+              <a:buFont typeface="Arial" charset="0"/>
+              <a:buChar char="•"/>
+              <a:defRPr lang="pt-BR" sz="2000" kern="1200" dirty="0">
+                <a:solidFill>
+                  <a:schemeClr val="tx1"/>
+                </a:solidFill>
+                <a:latin typeface="+mn-lt"/>
+                <a:ea typeface="+mn-ea"/>
+                <a:cs typeface="+mn-cs"/>
+              </a:defRPr>
+            </a:lvl5pPr>
+            <a:lvl6pPr marL="2514600" indent="-228600" algn="l" defTabSz="914400" rtl="0" eaLnBrk="1" latinLnBrk="0" hangingPunct="1">
+              <a:spcBef>
+                <a:spcPct val="20000"/>
+              </a:spcBef>
+              <a:buFont typeface="Arial" pitchFamily="34" charset="0"/>
+              <a:buChar char="•"/>
+              <a:defRPr sz="2000" kern="1200">
+                <a:solidFill>
+                  <a:schemeClr val="tx1"/>
+                </a:solidFill>
+                <a:latin typeface="+mn-lt"/>
+                <a:ea typeface="+mn-ea"/>
+                <a:cs typeface="+mn-cs"/>
+              </a:defRPr>
+            </a:lvl6pPr>
+            <a:lvl7pPr marL="2971800" indent="-228600" algn="l" defTabSz="914400" rtl="0" eaLnBrk="1" latinLnBrk="0" hangingPunct="1">
+              <a:spcBef>
+                <a:spcPct val="20000"/>
+              </a:spcBef>
+              <a:buFont typeface="Arial" pitchFamily="34" charset="0"/>
+              <a:buChar char="•"/>
+              <a:defRPr sz="2000" kern="1200">
+                <a:solidFill>
+                  <a:schemeClr val="tx1"/>
+                </a:solidFill>
+                <a:latin typeface="+mn-lt"/>
+                <a:ea typeface="+mn-ea"/>
+                <a:cs typeface="+mn-cs"/>
+              </a:defRPr>
+            </a:lvl7pPr>
+            <a:lvl8pPr marL="3429000" indent="-228600" algn="l" defTabSz="914400" rtl="0" eaLnBrk="1" latinLnBrk="0" hangingPunct="1">
+              <a:spcBef>
+                <a:spcPct val="20000"/>
+              </a:spcBef>
+              <a:buFont typeface="Arial" pitchFamily="34" charset="0"/>
+              <a:buChar char="•"/>
+              <a:defRPr sz="2000" kern="1200">
+                <a:solidFill>
+                  <a:schemeClr val="tx1"/>
+                </a:solidFill>
+                <a:latin typeface="+mn-lt"/>
+                <a:ea typeface="+mn-ea"/>
+                <a:cs typeface="+mn-cs"/>
+              </a:defRPr>
+            </a:lvl8pPr>
+            <a:lvl9pPr marL="3886200" indent="-228600" algn="l" defTabSz="914400" rtl="0" eaLnBrk="1" latinLnBrk="0" hangingPunct="1">
+              <a:spcBef>
+                <a:spcPct val="20000"/>
+              </a:spcBef>
+              <a:buFont typeface="Arial" pitchFamily="34" charset="0"/>
+              <a:buChar char="•"/>
+              <a:defRPr sz="2000" kern="1200">
+                <a:solidFill>
+                  <a:schemeClr val="tx1"/>
+                </a:solidFill>
+                <a:latin typeface="+mn-lt"/>
+                <a:ea typeface="+mn-ea"/>
+                <a:cs typeface="+mn-cs"/>
+              </a:defRPr>
+            </a:lvl9pPr>
+          </a:lstStyle>
+          <a:p>
+            <a:pPr marL="0" indent="0">
+              <a:lnSpc>
+                <a:spcPct val="150000"/>
+              </a:lnSpc>
+              <a:buFont typeface="Arial" charset="0"/>
+              <a:buNone/>
+            </a:pPr>
+            <a:r>
+              <a:rPr lang="pt-BR" sz="2400" b="1" dirty="0" smtClean="0">
+                <a:solidFill>
+                  <a:schemeClr val="accent6">
+                    <a:lumMod val="75000"/>
+                  </a:schemeClr>
+                </a:solidFill>
+                <a:latin typeface="Corbel" panose="020B0503020204020204" pitchFamily="34" charset="0"/>
+              </a:rPr>
+              <a:t>ATIVIDADE</a:t>
+            </a:r>
+          </a:p>
+        </p:txBody>
+      </p:sp>
+      <p:sp>
+        <p:nvSpPr>
+          <p:cNvPr id="11" name="Subtítulo 1"/>
+          <p:cNvSpPr txBox="1">
+            <a:spLocks/>
+          </p:cNvSpPr>
+          <p:nvPr/>
+        </p:nvSpPr>
+        <p:spPr>
+          <a:xfrm>
+            <a:off x="692971" y="1913794"/>
+            <a:ext cx="10896600" cy="2817812"/>
+          </a:xfrm>
+        </p:spPr>
+        <p:txBody>
+          <a:bodyPr>
+            <a:noAutofit/>
+          </a:bodyPr>
+          <a:lstStyle>
+            <a:lvl1pPr marL="342900" indent="-342900" algn="l" rtl="0" eaLnBrk="0" fontAlgn="base" hangingPunct="0">
+              <a:spcBef>
+                <a:spcPct val="20000"/>
+              </a:spcBef>
+              <a:spcAft>
+                <a:spcPct val="0"/>
+              </a:spcAft>
+              <a:buFont typeface="Arial" charset="0"/>
+              <a:buChar char="•"/>
+              <a:defRPr lang="pt-BR" sz="2800" kern="1200" dirty="0">
+                <a:solidFill>
+                  <a:schemeClr val="tx1"/>
+                </a:solidFill>
+                <a:latin typeface="+mn-lt"/>
+                <a:ea typeface="+mn-ea"/>
+                <a:cs typeface="+mn-cs"/>
+              </a:defRPr>
+            </a:lvl1pPr>
+            <a:lvl2pPr marL="742950" indent="-285750" algn="l" rtl="0" eaLnBrk="0" fontAlgn="base" hangingPunct="0">
+              <a:spcBef>
+                <a:spcPct val="20000"/>
+              </a:spcBef>
+              <a:spcAft>
+                <a:spcPct val="0"/>
+              </a:spcAft>
+              <a:buFont typeface="Arial" charset="0"/>
+              <a:buChar char="•"/>
+              <a:defRPr lang="pt-BR" sz="2400" kern="1200" dirty="0">
+                <a:solidFill>
+                  <a:schemeClr val="tx1"/>
+                </a:solidFill>
+                <a:latin typeface="+mn-lt"/>
+                <a:ea typeface="+mn-ea"/>
+                <a:cs typeface="+mn-cs"/>
+              </a:defRPr>
+            </a:lvl2pPr>
+            <a:lvl3pPr marL="1143000" indent="-228600" algn="l" rtl="0" eaLnBrk="0" fontAlgn="base" hangingPunct="0">
+              <a:spcBef>
+                <a:spcPct val="20000"/>
+              </a:spcBef>
+              <a:spcAft>
+                <a:spcPct val="0"/>
+              </a:spcAft>
+              <a:buFont typeface="Arial" charset="0"/>
+              <a:buChar char="•"/>
+              <a:defRPr lang="pt-BR" sz="2400" kern="1200" dirty="0">
+                <a:solidFill>
+                  <a:schemeClr val="tx1"/>
+                </a:solidFill>
+                <a:latin typeface="+mn-lt"/>
+                <a:ea typeface="+mn-ea"/>
+                <a:cs typeface="+mn-cs"/>
+              </a:defRPr>
+            </a:lvl3pPr>
+            <a:lvl4pPr marL="1600200" indent="-228600" algn="l" rtl="0" eaLnBrk="0" fontAlgn="base" hangingPunct="0">
+              <a:spcBef>
+                <a:spcPct val="20000"/>
+              </a:spcBef>
+              <a:spcAft>
+                <a:spcPct val="0"/>
+              </a:spcAft>
+              <a:buFont typeface="Arial" charset="0"/>
+              <a:buChar char="•"/>
+              <a:defRPr lang="pt-BR" sz="2000" kern="1200" dirty="0">
+                <a:solidFill>
+                  <a:schemeClr val="tx1"/>
+                </a:solidFill>
+                <a:latin typeface="+mn-lt"/>
+                <a:ea typeface="+mn-ea"/>
+                <a:cs typeface="+mn-cs"/>
+              </a:defRPr>
+            </a:lvl4pPr>
+            <a:lvl5pPr marL="2057400" indent="-228600" algn="l" rtl="0" eaLnBrk="0" fontAlgn="base" hangingPunct="0">
+              <a:spcBef>
+                <a:spcPct val="20000"/>
+              </a:spcBef>
+              <a:spcAft>
+                <a:spcPct val="0"/>
+              </a:spcAft>
+              <a:buFont typeface="Arial" charset="0"/>
+              <a:buChar char="•"/>
+              <a:defRPr lang="pt-BR" sz="2000" kern="1200" dirty="0">
+                <a:solidFill>
+                  <a:schemeClr val="tx1"/>
+                </a:solidFill>
+                <a:latin typeface="+mn-lt"/>
+                <a:ea typeface="+mn-ea"/>
+                <a:cs typeface="+mn-cs"/>
+              </a:defRPr>
+            </a:lvl5pPr>
+            <a:lvl6pPr marL="2514600" indent="-228600" algn="l" defTabSz="914400" rtl="0" eaLnBrk="1" latinLnBrk="0" hangingPunct="1">
+              <a:spcBef>
+                <a:spcPct val="20000"/>
+              </a:spcBef>
+              <a:buFont typeface="Arial" pitchFamily="34" charset="0"/>
+              <a:buChar char="•"/>
+              <a:defRPr sz="2000" kern="1200">
+                <a:solidFill>
+                  <a:schemeClr val="tx1"/>
+                </a:solidFill>
+                <a:latin typeface="+mn-lt"/>
+                <a:ea typeface="+mn-ea"/>
+                <a:cs typeface="+mn-cs"/>
+              </a:defRPr>
+            </a:lvl6pPr>
+            <a:lvl7pPr marL="2971800" indent="-228600" algn="l" defTabSz="914400" rtl="0" eaLnBrk="1" latinLnBrk="0" hangingPunct="1">
+              <a:spcBef>
+                <a:spcPct val="20000"/>
+              </a:spcBef>
+              <a:buFont typeface="Arial" pitchFamily="34" charset="0"/>
+              <a:buChar char="•"/>
+              <a:defRPr sz="2000" kern="1200">
+                <a:solidFill>
+                  <a:schemeClr val="tx1"/>
+                </a:solidFill>
+                <a:latin typeface="+mn-lt"/>
+                <a:ea typeface="+mn-ea"/>
+                <a:cs typeface="+mn-cs"/>
+              </a:defRPr>
+            </a:lvl7pPr>
+            <a:lvl8pPr marL="3429000" indent="-228600" algn="l" defTabSz="914400" rtl="0" eaLnBrk="1" latinLnBrk="0" hangingPunct="1">
+              <a:spcBef>
+                <a:spcPct val="20000"/>
+              </a:spcBef>
+              <a:buFont typeface="Arial" pitchFamily="34" charset="0"/>
+              <a:buChar char="•"/>
+              <a:defRPr sz="2000" kern="1200">
+                <a:solidFill>
+                  <a:schemeClr val="tx1"/>
+                </a:solidFill>
+                <a:latin typeface="+mn-lt"/>
+                <a:ea typeface="+mn-ea"/>
+                <a:cs typeface="+mn-cs"/>
+              </a:defRPr>
+            </a:lvl8pPr>
+            <a:lvl9pPr marL="3886200" indent="-228600" algn="l" defTabSz="914400" rtl="0" eaLnBrk="1" latinLnBrk="0" hangingPunct="1">
+              <a:spcBef>
+                <a:spcPct val="20000"/>
+              </a:spcBef>
+              <a:buFont typeface="Arial" pitchFamily="34" charset="0"/>
+              <a:buChar char="•"/>
+              <a:defRPr sz="2000" kern="1200">
+                <a:solidFill>
+                  <a:schemeClr val="tx1"/>
+                </a:solidFill>
+                <a:latin typeface="+mn-lt"/>
+                <a:ea typeface="+mn-ea"/>
+                <a:cs typeface="+mn-cs"/>
+              </a:defRPr>
+            </a:lvl9pPr>
+          </a:lstStyle>
+          <a:p>
+            <a:pPr marL="0" indent="0">
+              <a:buFont typeface="Arial" charset="0"/>
+              <a:buNone/>
+            </a:pPr>
+            <a:r>
+              <a:rPr lang="pt-BR" sz="1800" dirty="0" err="1" smtClean="0"/>
+              <a:t>VocÊ</a:t>
+            </a:r>
+            <a:r>
+              <a:rPr lang="pt-BR" sz="1800" dirty="0" smtClean="0"/>
+              <a:t> consegue </a:t>
+            </a:r>
+            <a:r>
+              <a:rPr lang="pt-BR" sz="1800" dirty="0" err="1" smtClean="0"/>
+              <a:t>priorizare</a:t>
+            </a:r>
+            <a:r>
+              <a:rPr lang="pt-BR" sz="1800" dirty="0" smtClean="0"/>
+              <a:t> os pagamentos de uma empresa?,</a:t>
+            </a:r>
+          </a:p>
+          <a:p>
+            <a:pPr marL="0" indent="0">
+              <a:buFont typeface="Arial" charset="0"/>
+              <a:buNone/>
+            </a:pPr>
+            <a:endParaRPr lang="pt-BR" sz="1800" dirty="0"/>
+          </a:p>
+          <a:p>
+            <a:pPr marL="0" indent="0">
+              <a:buFont typeface="Arial" charset="0"/>
+              <a:buNone/>
+            </a:pPr>
+            <a:r>
+              <a:rPr lang="pt-BR" sz="1800" dirty="0" smtClean="0"/>
+              <a:t>Usar a </a:t>
+            </a:r>
+            <a:r>
+              <a:rPr lang="pt-BR" sz="1800" dirty="0" err="1" smtClean="0"/>
+              <a:t>pordem</a:t>
+            </a:r>
+            <a:r>
+              <a:rPr lang="pt-BR" sz="1800" dirty="0" smtClean="0"/>
+              <a:t> data, limite de caixa de 450 mil reais.</a:t>
+            </a:r>
+          </a:p>
+          <a:p>
+            <a:pPr marL="0" indent="0">
+              <a:buFont typeface="Arial" charset="0"/>
+              <a:buNone/>
+            </a:pPr>
+            <a:r>
+              <a:rPr lang="pt-BR" sz="1800" dirty="0" smtClean="0"/>
+              <a:t>Primeiro </a:t>
+            </a:r>
+            <a:r>
+              <a:rPr lang="pt-BR" sz="1800" dirty="0" err="1" smtClean="0"/>
+              <a:t>pea</a:t>
+            </a:r>
+            <a:r>
+              <a:rPr lang="pt-BR" sz="1800" dirty="0" smtClean="0"/>
+              <a:t> ordem dada de fornecedor.</a:t>
+            </a:r>
+          </a:p>
+          <a:p>
+            <a:pPr marL="0" indent="0">
+              <a:buFont typeface="Arial" charset="0"/>
+              <a:buNone/>
+            </a:pPr>
+            <a:r>
+              <a:rPr lang="pt-BR" sz="1800" dirty="0" smtClean="0"/>
+              <a:t>Depois por empresa</a:t>
+            </a:r>
+            <a:endParaRPr lang="pt-BR" sz="1800" dirty="0" smtClean="0"/>
+          </a:p>
+        </p:txBody>
+      </p:sp>
+    </p:spTree>
+    <p:extLst>
+      <p:ext uri="{BB962C8B-B14F-4D97-AF65-F5344CB8AC3E}">
+        <p14:creationId xmlns:p14="http://schemas.microsoft.com/office/powerpoint/2010/main" val="2386450769"/>
+      </p:ext>
+    </p:extLst>
+  </p:cSld>
+  <p:clrMapOvr>
+    <a:masterClrMapping/>
+  </p:clrMapOvr>
+  <p:timing>
+    <p:tnLst>
+      <p:par>
+        <p:cTn id="1" dur="indefinite" restart="never" nodeType="tmRoot"/>
+      </p:par>
+    </p:tnLst>
+  </p:timing>
+</p:sld>
+</file>
+
+<file path=ppt/slides/slide58.xml><?xml version="1.0" encoding="utf-8"?>
 <p:sld xmlns:a="http://schemas.openxmlformats.org/drawingml/2006/main" xmlns:r="http://schemas.openxmlformats.org/officeDocument/2006/relationships" xmlns:p="http://schemas.openxmlformats.org/presentationml/2006/main" show="0">
   <p:cSld>
     <p:spTree>
@@ -32966,846 +34554,6 @@
       <p:transition spd="slow"/>
     </mc:Fallback>
   </mc:AlternateContent>
-  <p:timing>
-    <p:tnLst>
-      <p:par>
-        <p:cTn id="1" dur="indefinite" restart="never" nodeType="tmRoot"/>
-      </p:par>
-    </p:tnLst>
-  </p:timing>
-</p:sld>
-</file>
-
-<file path=ppt/slides/slide57.xml><?xml version="1.0" encoding="utf-8"?>
-<p:sld xmlns:a="http://schemas.openxmlformats.org/drawingml/2006/main" xmlns:r="http://schemas.openxmlformats.org/officeDocument/2006/relationships" xmlns:p="http://schemas.openxmlformats.org/presentationml/2006/main" show="0">
-  <p:cSld>
-    <p:spTree>
-      <p:nvGrpSpPr>
-        <p:cNvPr id="1" name=""/>
-        <p:cNvGrpSpPr/>
-        <p:nvPr/>
-      </p:nvGrpSpPr>
-      <p:grpSpPr>
-        <a:xfrm>
-          <a:off x="0" y="0"/>
-          <a:ext cx="0" cy="0"/>
-          <a:chOff x="0" y="0"/>
-          <a:chExt cx="0" cy="0"/>
-        </a:xfrm>
-      </p:grpSpPr>
-      <p:sp>
-        <p:nvSpPr>
-          <p:cNvPr id="3" name="Subtítulo 1"/>
-          <p:cNvSpPr>
-            <a:spLocks noGrp="1"/>
-          </p:cNvSpPr>
-          <p:nvPr>
-            <p:ph type="subTitle" idx="4294967295"/>
-          </p:nvPr>
-        </p:nvSpPr>
-        <p:spPr>
-          <a:xfrm>
-            <a:off x="591671" y="754063"/>
-            <a:ext cx="11600329" cy="5495925"/>
-          </a:xfrm>
-        </p:spPr>
-        <p:txBody>
-          <a:bodyPr>
-            <a:noAutofit/>
-          </a:bodyPr>
-          <a:lstStyle/>
-          <a:p>
-            <a:pPr marL="0" indent="0">
-              <a:buNone/>
-            </a:pPr>
-            <a:endParaRPr lang="pt-BR" sz="2000" dirty="0"/>
-          </a:p>
-          <a:p>
-            <a:pPr marL="0" indent="0" algn="just">
-              <a:buNone/>
-            </a:pPr>
-            <a:r>
-              <a:rPr lang="pt-BR" sz="2000" dirty="0" smtClean="0"/>
-              <a:t> Criar relatório de fluxo de caixa de 1 ano com entradas, saídas e saldo.</a:t>
-            </a:r>
-          </a:p>
-          <a:p>
-            <a:pPr algn="just"/>
-            <a:r>
-              <a:rPr lang="pt-BR" sz="2000" dirty="0" smtClean="0"/>
-              <a:t>1 - Um mês em cada planilha.</a:t>
-            </a:r>
-          </a:p>
-          <a:p>
-            <a:pPr algn="just"/>
-            <a:r>
-              <a:rPr lang="pt-BR" sz="2000" dirty="0" smtClean="0"/>
-              <a:t>2 - Entrada/Recebimentos  Às terças de R$ 3.000, demais dias de R$ 2.000 (bruto)</a:t>
-            </a:r>
-          </a:p>
-          <a:p>
-            <a:pPr algn="just"/>
-            <a:r>
-              <a:rPr lang="pt-BR" sz="2000" dirty="0" smtClean="0"/>
-              <a:t>3 - Saídas/Pagamentos as quintas de R$ 4.000, demais dias de R$ 1.600 (bruto)</a:t>
-            </a:r>
-          </a:p>
-          <a:p>
-            <a:pPr algn="just"/>
-            <a:r>
-              <a:rPr lang="pt-BR" sz="2000" dirty="0" smtClean="0"/>
-              <a:t>4 - Todo dia 15 de cada mês, saída adicional de 6.000 (bruto)</a:t>
-            </a:r>
-          </a:p>
-          <a:p>
-            <a:pPr algn="just"/>
-            <a:r>
-              <a:rPr lang="pt-BR" sz="2000" dirty="0" smtClean="0"/>
-              <a:t>5 - calcular imposto ICMS de 18% sobre entrada/recebimentos + </a:t>
-            </a:r>
-            <a:r>
-              <a:rPr lang="pt-BR" sz="2000" dirty="0" err="1" smtClean="0"/>
-              <a:t>Pis</a:t>
-            </a:r>
-            <a:r>
-              <a:rPr lang="pt-BR" sz="2000" dirty="0" smtClean="0"/>
-              <a:t>/</a:t>
-            </a:r>
-            <a:r>
-              <a:rPr lang="pt-BR" sz="2000" dirty="0" err="1" smtClean="0"/>
-              <a:t>Cofins</a:t>
-            </a:r>
-            <a:r>
-              <a:rPr lang="pt-BR" sz="2000" dirty="0" smtClean="0"/>
-              <a:t> de 9,25%.</a:t>
-            </a:r>
-          </a:p>
-          <a:p>
-            <a:pPr algn="just"/>
-            <a:r>
-              <a:rPr lang="pt-BR" sz="2000" dirty="0" smtClean="0"/>
-              <a:t>6 - calcular imposto de 9,25% sobre saída/pagamentos.</a:t>
-            </a:r>
-          </a:p>
-          <a:p>
-            <a:pPr algn="just"/>
-            <a:r>
-              <a:rPr lang="pt-BR" sz="2000" dirty="0" smtClean="0"/>
-              <a:t>8 - Criar uma aba resumo mostrando recebimento por dia do mês, recebimento, pagamento e impostos líquidos pagos no ano.</a:t>
-            </a:r>
-          </a:p>
-          <a:p>
-            <a:pPr algn="just"/>
-            <a:r>
-              <a:rPr lang="pt-BR" sz="2000" dirty="0" smtClean="0"/>
-              <a:t>8 - Aba resumo deverá ser o local onde digitaremos as alíquotas e as demais planilhas deverão obedecer a estas alíquotas.</a:t>
-            </a:r>
-          </a:p>
-          <a:p>
-            <a:pPr algn="just"/>
-            <a:endParaRPr lang="pt-BR" sz="2000" dirty="0"/>
-          </a:p>
-          <a:p>
-            <a:pPr marL="0" indent="0" algn="just">
-              <a:buNone/>
-            </a:pPr>
-            <a:r>
-              <a:rPr lang="pt-BR" sz="2000" dirty="0" smtClean="0"/>
-              <a:t>Dica: Fórmula soma 3D, formula aritmética, formatação, copia de planilhas, referência externa.</a:t>
-            </a:r>
-            <a:endParaRPr lang="pt-BR" sz="2000" dirty="0"/>
-          </a:p>
-        </p:txBody>
-      </p:sp>
-      <p:sp>
-        <p:nvSpPr>
-          <p:cNvPr id="4" name="Subtítulo 2"/>
-          <p:cNvSpPr txBox="1">
-            <a:spLocks/>
-          </p:cNvSpPr>
-          <p:nvPr/>
-        </p:nvSpPr>
-        <p:spPr>
-          <a:xfrm>
-            <a:off x="210670" y="153054"/>
-            <a:ext cx="10058400" cy="718315"/>
-          </a:xfrm>
-        </p:spPr>
-        <p:txBody>
-          <a:bodyPr>
-            <a:noAutofit/>
-          </a:bodyPr>
-          <a:lstStyle>
-            <a:lvl1pPr marL="342900" indent="-342900" algn="l" rtl="0" eaLnBrk="0" fontAlgn="base" hangingPunct="0">
-              <a:spcBef>
-                <a:spcPct val="20000"/>
-              </a:spcBef>
-              <a:spcAft>
-                <a:spcPct val="0"/>
-              </a:spcAft>
-              <a:buFont typeface="Arial" charset="0"/>
-              <a:buChar char="•"/>
-              <a:defRPr lang="pt-BR" sz="2800" kern="1200" dirty="0">
-                <a:solidFill>
-                  <a:schemeClr val="tx1"/>
-                </a:solidFill>
-                <a:latin typeface="+mn-lt"/>
-                <a:ea typeface="+mn-ea"/>
-                <a:cs typeface="+mn-cs"/>
-              </a:defRPr>
-            </a:lvl1pPr>
-            <a:lvl2pPr marL="742950" indent="-285750" algn="l" rtl="0" eaLnBrk="0" fontAlgn="base" hangingPunct="0">
-              <a:spcBef>
-                <a:spcPct val="20000"/>
-              </a:spcBef>
-              <a:spcAft>
-                <a:spcPct val="0"/>
-              </a:spcAft>
-              <a:buFont typeface="Arial" charset="0"/>
-              <a:buChar char="•"/>
-              <a:defRPr lang="pt-BR" sz="2400" kern="1200" dirty="0">
-                <a:solidFill>
-                  <a:schemeClr val="tx1"/>
-                </a:solidFill>
-                <a:latin typeface="+mn-lt"/>
-                <a:ea typeface="+mn-ea"/>
-                <a:cs typeface="+mn-cs"/>
-              </a:defRPr>
-            </a:lvl2pPr>
-            <a:lvl3pPr marL="1143000" indent="-228600" algn="l" rtl="0" eaLnBrk="0" fontAlgn="base" hangingPunct="0">
-              <a:spcBef>
-                <a:spcPct val="20000"/>
-              </a:spcBef>
-              <a:spcAft>
-                <a:spcPct val="0"/>
-              </a:spcAft>
-              <a:buFont typeface="Arial" charset="0"/>
-              <a:buChar char="•"/>
-              <a:defRPr lang="pt-BR" sz="2400" kern="1200" dirty="0">
-                <a:solidFill>
-                  <a:schemeClr val="tx1"/>
-                </a:solidFill>
-                <a:latin typeface="+mn-lt"/>
-                <a:ea typeface="+mn-ea"/>
-                <a:cs typeface="+mn-cs"/>
-              </a:defRPr>
-            </a:lvl3pPr>
-            <a:lvl4pPr marL="1600200" indent="-228600" algn="l" rtl="0" eaLnBrk="0" fontAlgn="base" hangingPunct="0">
-              <a:spcBef>
-                <a:spcPct val="20000"/>
-              </a:spcBef>
-              <a:spcAft>
-                <a:spcPct val="0"/>
-              </a:spcAft>
-              <a:buFont typeface="Arial" charset="0"/>
-              <a:buChar char="•"/>
-              <a:defRPr lang="pt-BR" sz="2000" kern="1200" dirty="0">
-                <a:solidFill>
-                  <a:schemeClr val="tx1"/>
-                </a:solidFill>
-                <a:latin typeface="+mn-lt"/>
-                <a:ea typeface="+mn-ea"/>
-                <a:cs typeface="+mn-cs"/>
-              </a:defRPr>
-            </a:lvl4pPr>
-            <a:lvl5pPr marL="2057400" indent="-228600" algn="l" rtl="0" eaLnBrk="0" fontAlgn="base" hangingPunct="0">
-              <a:spcBef>
-                <a:spcPct val="20000"/>
-              </a:spcBef>
-              <a:spcAft>
-                <a:spcPct val="0"/>
-              </a:spcAft>
-              <a:buFont typeface="Arial" charset="0"/>
-              <a:buChar char="•"/>
-              <a:defRPr lang="pt-BR" sz="2000" kern="1200" dirty="0">
-                <a:solidFill>
-                  <a:schemeClr val="tx1"/>
-                </a:solidFill>
-                <a:latin typeface="+mn-lt"/>
-                <a:ea typeface="+mn-ea"/>
-                <a:cs typeface="+mn-cs"/>
-              </a:defRPr>
-            </a:lvl5pPr>
-            <a:lvl6pPr marL="2514600" indent="-228600" algn="l" defTabSz="914400" rtl="0" eaLnBrk="1" latinLnBrk="0" hangingPunct="1">
-              <a:spcBef>
-                <a:spcPct val="20000"/>
-              </a:spcBef>
-              <a:buFont typeface="Arial" pitchFamily="34" charset="0"/>
-              <a:buChar char="•"/>
-              <a:defRPr sz="2000" kern="1200">
-                <a:solidFill>
-                  <a:schemeClr val="tx1"/>
-                </a:solidFill>
-                <a:latin typeface="+mn-lt"/>
-                <a:ea typeface="+mn-ea"/>
-                <a:cs typeface="+mn-cs"/>
-              </a:defRPr>
-            </a:lvl6pPr>
-            <a:lvl7pPr marL="2971800" indent="-228600" algn="l" defTabSz="914400" rtl="0" eaLnBrk="1" latinLnBrk="0" hangingPunct="1">
-              <a:spcBef>
-                <a:spcPct val="20000"/>
-              </a:spcBef>
-              <a:buFont typeface="Arial" pitchFamily="34" charset="0"/>
-              <a:buChar char="•"/>
-              <a:defRPr sz="2000" kern="1200">
-                <a:solidFill>
-                  <a:schemeClr val="tx1"/>
-                </a:solidFill>
-                <a:latin typeface="+mn-lt"/>
-                <a:ea typeface="+mn-ea"/>
-                <a:cs typeface="+mn-cs"/>
-              </a:defRPr>
-            </a:lvl7pPr>
-            <a:lvl8pPr marL="3429000" indent="-228600" algn="l" defTabSz="914400" rtl="0" eaLnBrk="1" latinLnBrk="0" hangingPunct="1">
-              <a:spcBef>
-                <a:spcPct val="20000"/>
-              </a:spcBef>
-              <a:buFont typeface="Arial" pitchFamily="34" charset="0"/>
-              <a:buChar char="•"/>
-              <a:defRPr sz="2000" kern="1200">
-                <a:solidFill>
-                  <a:schemeClr val="tx1"/>
-                </a:solidFill>
-                <a:latin typeface="+mn-lt"/>
-                <a:ea typeface="+mn-ea"/>
-                <a:cs typeface="+mn-cs"/>
-              </a:defRPr>
-            </a:lvl8pPr>
-            <a:lvl9pPr marL="3886200" indent="-228600" algn="l" defTabSz="914400" rtl="0" eaLnBrk="1" latinLnBrk="0" hangingPunct="1">
-              <a:spcBef>
-                <a:spcPct val="20000"/>
-              </a:spcBef>
-              <a:buFont typeface="Arial" pitchFamily="34" charset="0"/>
-              <a:buChar char="•"/>
-              <a:defRPr sz="2000" kern="1200">
-                <a:solidFill>
-                  <a:schemeClr val="tx1"/>
-                </a:solidFill>
-                <a:latin typeface="+mn-lt"/>
-                <a:ea typeface="+mn-ea"/>
-                <a:cs typeface="+mn-cs"/>
-              </a:defRPr>
-            </a:lvl9pPr>
-          </a:lstStyle>
-          <a:p>
-            <a:pPr marL="0" indent="0">
-              <a:lnSpc>
-                <a:spcPct val="150000"/>
-              </a:lnSpc>
-              <a:buFont typeface="Arial" charset="0"/>
-              <a:buNone/>
-            </a:pPr>
-            <a:r>
-              <a:rPr lang="pt-BR" sz="2400" b="1" dirty="0" smtClean="0">
-                <a:solidFill>
-                  <a:schemeClr val="accent6">
-                    <a:lumMod val="75000"/>
-                  </a:schemeClr>
-                </a:solidFill>
-                <a:latin typeface="Corbel" panose="020B0503020204020204" pitchFamily="34" charset="0"/>
-              </a:rPr>
-              <a:t>Atividade</a:t>
-            </a:r>
-          </a:p>
-        </p:txBody>
-      </p:sp>
-    </p:spTree>
-    <p:extLst>
-      <p:ext uri="{BB962C8B-B14F-4D97-AF65-F5344CB8AC3E}">
-        <p14:creationId xmlns:p14="http://schemas.microsoft.com/office/powerpoint/2010/main" val="2083101853"/>
-      </p:ext>
-    </p:extLst>
-  </p:cSld>
-  <p:clrMapOvr>
-    <a:masterClrMapping/>
-  </p:clrMapOvr>
-  <mc:AlternateContent xmlns:mc="http://schemas.openxmlformats.org/markup-compatibility/2006" xmlns:p14="http://schemas.microsoft.com/office/powerpoint/2010/main">
-    <mc:Choice Requires="p14">
-      <p:transition spd="slow" p14:dur="2000"/>
-    </mc:Choice>
-    <mc:Fallback xmlns="">
-      <p:transition spd="slow"/>
-    </mc:Fallback>
-  </mc:AlternateContent>
-  <p:timing>
-    <p:tnLst>
-      <p:par>
-        <p:cTn id="1" dur="indefinite" restart="never" nodeType="tmRoot"/>
-      </p:par>
-    </p:tnLst>
-  </p:timing>
-</p:sld>
-</file>
-
-<file path=ppt/slides/slide58.xml><?xml version="1.0" encoding="utf-8"?>
-<p:sld xmlns:a="http://schemas.openxmlformats.org/drawingml/2006/main" xmlns:r="http://schemas.openxmlformats.org/officeDocument/2006/relationships" xmlns:p="http://schemas.openxmlformats.org/presentationml/2006/main">
-  <p:cSld>
-    <p:spTree>
-      <p:nvGrpSpPr>
-        <p:cNvPr id="1" name=""/>
-        <p:cNvGrpSpPr/>
-        <p:nvPr/>
-      </p:nvGrpSpPr>
-      <p:grpSpPr>
-        <a:xfrm>
-          <a:off x="0" y="0"/>
-          <a:ext cx="0" cy="0"/>
-          <a:chOff x="0" y="0"/>
-          <a:chExt cx="0" cy="0"/>
-        </a:xfrm>
-      </p:grpSpPr>
-      <p:sp>
-        <p:nvSpPr>
-          <p:cNvPr id="6" name="Subtítulo 2"/>
-          <p:cNvSpPr txBox="1">
-            <a:spLocks/>
-          </p:cNvSpPr>
-          <p:nvPr/>
-        </p:nvSpPr>
-        <p:spPr>
-          <a:xfrm>
-            <a:off x="210670" y="153054"/>
-            <a:ext cx="10058400" cy="718315"/>
-          </a:xfrm>
-        </p:spPr>
-        <p:txBody>
-          <a:bodyPr>
-            <a:noAutofit/>
-          </a:bodyPr>
-          <a:lstStyle>
-            <a:lvl1pPr marL="342900" indent="-342900" algn="l" rtl="0" eaLnBrk="0" fontAlgn="base" hangingPunct="0">
-              <a:spcBef>
-                <a:spcPct val="20000"/>
-              </a:spcBef>
-              <a:spcAft>
-                <a:spcPct val="0"/>
-              </a:spcAft>
-              <a:buFont typeface="Arial" charset="0"/>
-              <a:buChar char="•"/>
-              <a:defRPr lang="pt-BR" sz="2800" kern="1200" dirty="0">
-                <a:solidFill>
-                  <a:schemeClr val="tx1"/>
-                </a:solidFill>
-                <a:latin typeface="+mn-lt"/>
-                <a:ea typeface="+mn-ea"/>
-                <a:cs typeface="+mn-cs"/>
-              </a:defRPr>
-            </a:lvl1pPr>
-            <a:lvl2pPr marL="742950" indent="-285750" algn="l" rtl="0" eaLnBrk="0" fontAlgn="base" hangingPunct="0">
-              <a:spcBef>
-                <a:spcPct val="20000"/>
-              </a:spcBef>
-              <a:spcAft>
-                <a:spcPct val="0"/>
-              </a:spcAft>
-              <a:buFont typeface="Arial" charset="0"/>
-              <a:buChar char="•"/>
-              <a:defRPr lang="pt-BR" sz="2400" kern="1200" dirty="0">
-                <a:solidFill>
-                  <a:schemeClr val="tx1"/>
-                </a:solidFill>
-                <a:latin typeface="+mn-lt"/>
-                <a:ea typeface="+mn-ea"/>
-                <a:cs typeface="+mn-cs"/>
-              </a:defRPr>
-            </a:lvl2pPr>
-            <a:lvl3pPr marL="1143000" indent="-228600" algn="l" rtl="0" eaLnBrk="0" fontAlgn="base" hangingPunct="0">
-              <a:spcBef>
-                <a:spcPct val="20000"/>
-              </a:spcBef>
-              <a:spcAft>
-                <a:spcPct val="0"/>
-              </a:spcAft>
-              <a:buFont typeface="Arial" charset="0"/>
-              <a:buChar char="•"/>
-              <a:defRPr lang="pt-BR" sz="2400" kern="1200" dirty="0">
-                <a:solidFill>
-                  <a:schemeClr val="tx1"/>
-                </a:solidFill>
-                <a:latin typeface="+mn-lt"/>
-                <a:ea typeface="+mn-ea"/>
-                <a:cs typeface="+mn-cs"/>
-              </a:defRPr>
-            </a:lvl3pPr>
-            <a:lvl4pPr marL="1600200" indent="-228600" algn="l" rtl="0" eaLnBrk="0" fontAlgn="base" hangingPunct="0">
-              <a:spcBef>
-                <a:spcPct val="20000"/>
-              </a:spcBef>
-              <a:spcAft>
-                <a:spcPct val="0"/>
-              </a:spcAft>
-              <a:buFont typeface="Arial" charset="0"/>
-              <a:buChar char="•"/>
-              <a:defRPr lang="pt-BR" sz="2000" kern="1200" dirty="0">
-                <a:solidFill>
-                  <a:schemeClr val="tx1"/>
-                </a:solidFill>
-                <a:latin typeface="+mn-lt"/>
-                <a:ea typeface="+mn-ea"/>
-                <a:cs typeface="+mn-cs"/>
-              </a:defRPr>
-            </a:lvl4pPr>
-            <a:lvl5pPr marL="2057400" indent="-228600" algn="l" rtl="0" eaLnBrk="0" fontAlgn="base" hangingPunct="0">
-              <a:spcBef>
-                <a:spcPct val="20000"/>
-              </a:spcBef>
-              <a:spcAft>
-                <a:spcPct val="0"/>
-              </a:spcAft>
-              <a:buFont typeface="Arial" charset="0"/>
-              <a:buChar char="•"/>
-              <a:defRPr lang="pt-BR" sz="2000" kern="1200" dirty="0">
-                <a:solidFill>
-                  <a:schemeClr val="tx1"/>
-                </a:solidFill>
-                <a:latin typeface="+mn-lt"/>
-                <a:ea typeface="+mn-ea"/>
-                <a:cs typeface="+mn-cs"/>
-              </a:defRPr>
-            </a:lvl5pPr>
-            <a:lvl6pPr marL="2514600" indent="-228600" algn="l" defTabSz="914400" rtl="0" eaLnBrk="1" latinLnBrk="0" hangingPunct="1">
-              <a:spcBef>
-                <a:spcPct val="20000"/>
-              </a:spcBef>
-              <a:buFont typeface="Arial" pitchFamily="34" charset="0"/>
-              <a:buChar char="•"/>
-              <a:defRPr sz="2000" kern="1200">
-                <a:solidFill>
-                  <a:schemeClr val="tx1"/>
-                </a:solidFill>
-                <a:latin typeface="+mn-lt"/>
-                <a:ea typeface="+mn-ea"/>
-                <a:cs typeface="+mn-cs"/>
-              </a:defRPr>
-            </a:lvl6pPr>
-            <a:lvl7pPr marL="2971800" indent="-228600" algn="l" defTabSz="914400" rtl="0" eaLnBrk="1" latinLnBrk="0" hangingPunct="1">
-              <a:spcBef>
-                <a:spcPct val="20000"/>
-              </a:spcBef>
-              <a:buFont typeface="Arial" pitchFamily="34" charset="0"/>
-              <a:buChar char="•"/>
-              <a:defRPr sz="2000" kern="1200">
-                <a:solidFill>
-                  <a:schemeClr val="tx1"/>
-                </a:solidFill>
-                <a:latin typeface="+mn-lt"/>
-                <a:ea typeface="+mn-ea"/>
-                <a:cs typeface="+mn-cs"/>
-              </a:defRPr>
-            </a:lvl7pPr>
-            <a:lvl8pPr marL="3429000" indent="-228600" algn="l" defTabSz="914400" rtl="0" eaLnBrk="1" latinLnBrk="0" hangingPunct="1">
-              <a:spcBef>
-                <a:spcPct val="20000"/>
-              </a:spcBef>
-              <a:buFont typeface="Arial" pitchFamily="34" charset="0"/>
-              <a:buChar char="•"/>
-              <a:defRPr sz="2000" kern="1200">
-                <a:solidFill>
-                  <a:schemeClr val="tx1"/>
-                </a:solidFill>
-                <a:latin typeface="+mn-lt"/>
-                <a:ea typeface="+mn-ea"/>
-                <a:cs typeface="+mn-cs"/>
-              </a:defRPr>
-            </a:lvl8pPr>
-            <a:lvl9pPr marL="3886200" indent="-228600" algn="l" defTabSz="914400" rtl="0" eaLnBrk="1" latinLnBrk="0" hangingPunct="1">
-              <a:spcBef>
-                <a:spcPct val="20000"/>
-              </a:spcBef>
-              <a:buFont typeface="Arial" pitchFamily="34" charset="0"/>
-              <a:buChar char="•"/>
-              <a:defRPr sz="2000" kern="1200">
-                <a:solidFill>
-                  <a:schemeClr val="tx1"/>
-                </a:solidFill>
-                <a:latin typeface="+mn-lt"/>
-                <a:ea typeface="+mn-ea"/>
-                <a:cs typeface="+mn-cs"/>
-              </a:defRPr>
-            </a:lvl9pPr>
-          </a:lstStyle>
-          <a:p>
-            <a:pPr marL="0" indent="0">
-              <a:lnSpc>
-                <a:spcPct val="150000"/>
-              </a:lnSpc>
-              <a:buFont typeface="Arial" charset="0"/>
-              <a:buNone/>
-            </a:pPr>
-            <a:r>
-              <a:rPr lang="pt-BR" sz="2400" b="1" dirty="0" smtClean="0">
-                <a:solidFill>
-                  <a:schemeClr val="accent6">
-                    <a:lumMod val="75000"/>
-                  </a:schemeClr>
-                </a:solidFill>
-                <a:latin typeface="Corbel" panose="020B0503020204020204" pitchFamily="34" charset="0"/>
-              </a:rPr>
-              <a:t>Comandos com Listas</a:t>
-            </a:r>
-          </a:p>
-        </p:txBody>
-      </p:sp>
-      <p:sp>
-        <p:nvSpPr>
-          <p:cNvPr id="11" name="Subtítulo 1"/>
-          <p:cNvSpPr txBox="1">
-            <a:spLocks/>
-          </p:cNvSpPr>
-          <p:nvPr/>
-        </p:nvSpPr>
-        <p:spPr>
-          <a:xfrm>
-            <a:off x="692971" y="1913794"/>
-            <a:ext cx="10896600" cy="2817812"/>
-          </a:xfrm>
-        </p:spPr>
-        <p:txBody>
-          <a:bodyPr>
-            <a:noAutofit/>
-          </a:bodyPr>
-          <a:lstStyle>
-            <a:lvl1pPr marL="342900" indent="-342900" algn="l" rtl="0" eaLnBrk="0" fontAlgn="base" hangingPunct="0">
-              <a:spcBef>
-                <a:spcPct val="20000"/>
-              </a:spcBef>
-              <a:spcAft>
-                <a:spcPct val="0"/>
-              </a:spcAft>
-              <a:buFont typeface="Arial" charset="0"/>
-              <a:buChar char="•"/>
-              <a:defRPr lang="pt-BR" sz="2800" kern="1200" dirty="0">
-                <a:solidFill>
-                  <a:schemeClr val="tx1"/>
-                </a:solidFill>
-                <a:latin typeface="+mn-lt"/>
-                <a:ea typeface="+mn-ea"/>
-                <a:cs typeface="+mn-cs"/>
-              </a:defRPr>
-            </a:lvl1pPr>
-            <a:lvl2pPr marL="742950" indent="-285750" algn="l" rtl="0" eaLnBrk="0" fontAlgn="base" hangingPunct="0">
-              <a:spcBef>
-                <a:spcPct val="20000"/>
-              </a:spcBef>
-              <a:spcAft>
-                <a:spcPct val="0"/>
-              </a:spcAft>
-              <a:buFont typeface="Arial" charset="0"/>
-              <a:buChar char="•"/>
-              <a:defRPr lang="pt-BR" sz="2400" kern="1200" dirty="0">
-                <a:solidFill>
-                  <a:schemeClr val="tx1"/>
-                </a:solidFill>
-                <a:latin typeface="+mn-lt"/>
-                <a:ea typeface="+mn-ea"/>
-                <a:cs typeface="+mn-cs"/>
-              </a:defRPr>
-            </a:lvl2pPr>
-            <a:lvl3pPr marL="1143000" indent="-228600" algn="l" rtl="0" eaLnBrk="0" fontAlgn="base" hangingPunct="0">
-              <a:spcBef>
-                <a:spcPct val="20000"/>
-              </a:spcBef>
-              <a:spcAft>
-                <a:spcPct val="0"/>
-              </a:spcAft>
-              <a:buFont typeface="Arial" charset="0"/>
-              <a:buChar char="•"/>
-              <a:defRPr lang="pt-BR" sz="2400" kern="1200" dirty="0">
-                <a:solidFill>
-                  <a:schemeClr val="tx1"/>
-                </a:solidFill>
-                <a:latin typeface="+mn-lt"/>
-                <a:ea typeface="+mn-ea"/>
-                <a:cs typeface="+mn-cs"/>
-              </a:defRPr>
-            </a:lvl3pPr>
-            <a:lvl4pPr marL="1600200" indent="-228600" algn="l" rtl="0" eaLnBrk="0" fontAlgn="base" hangingPunct="0">
-              <a:spcBef>
-                <a:spcPct val="20000"/>
-              </a:spcBef>
-              <a:spcAft>
-                <a:spcPct val="0"/>
-              </a:spcAft>
-              <a:buFont typeface="Arial" charset="0"/>
-              <a:buChar char="•"/>
-              <a:defRPr lang="pt-BR" sz="2000" kern="1200" dirty="0">
-                <a:solidFill>
-                  <a:schemeClr val="tx1"/>
-                </a:solidFill>
-                <a:latin typeface="+mn-lt"/>
-                <a:ea typeface="+mn-ea"/>
-                <a:cs typeface="+mn-cs"/>
-              </a:defRPr>
-            </a:lvl4pPr>
-            <a:lvl5pPr marL="2057400" indent="-228600" algn="l" rtl="0" eaLnBrk="0" fontAlgn="base" hangingPunct="0">
-              <a:spcBef>
-                <a:spcPct val="20000"/>
-              </a:spcBef>
-              <a:spcAft>
-                <a:spcPct val="0"/>
-              </a:spcAft>
-              <a:buFont typeface="Arial" charset="0"/>
-              <a:buChar char="•"/>
-              <a:defRPr lang="pt-BR" sz="2000" kern="1200" dirty="0">
-                <a:solidFill>
-                  <a:schemeClr val="tx1"/>
-                </a:solidFill>
-                <a:latin typeface="+mn-lt"/>
-                <a:ea typeface="+mn-ea"/>
-                <a:cs typeface="+mn-cs"/>
-              </a:defRPr>
-            </a:lvl5pPr>
-            <a:lvl6pPr marL="2514600" indent="-228600" algn="l" defTabSz="914400" rtl="0" eaLnBrk="1" latinLnBrk="0" hangingPunct="1">
-              <a:spcBef>
-                <a:spcPct val="20000"/>
-              </a:spcBef>
-              <a:buFont typeface="Arial" pitchFamily="34" charset="0"/>
-              <a:buChar char="•"/>
-              <a:defRPr sz="2000" kern="1200">
-                <a:solidFill>
-                  <a:schemeClr val="tx1"/>
-                </a:solidFill>
-                <a:latin typeface="+mn-lt"/>
-                <a:ea typeface="+mn-ea"/>
-                <a:cs typeface="+mn-cs"/>
-              </a:defRPr>
-            </a:lvl6pPr>
-            <a:lvl7pPr marL="2971800" indent="-228600" algn="l" defTabSz="914400" rtl="0" eaLnBrk="1" latinLnBrk="0" hangingPunct="1">
-              <a:spcBef>
-                <a:spcPct val="20000"/>
-              </a:spcBef>
-              <a:buFont typeface="Arial" pitchFamily="34" charset="0"/>
-              <a:buChar char="•"/>
-              <a:defRPr sz="2000" kern="1200">
-                <a:solidFill>
-                  <a:schemeClr val="tx1"/>
-                </a:solidFill>
-                <a:latin typeface="+mn-lt"/>
-                <a:ea typeface="+mn-ea"/>
-                <a:cs typeface="+mn-cs"/>
-              </a:defRPr>
-            </a:lvl7pPr>
-            <a:lvl8pPr marL="3429000" indent="-228600" algn="l" defTabSz="914400" rtl="0" eaLnBrk="1" latinLnBrk="0" hangingPunct="1">
-              <a:spcBef>
-                <a:spcPct val="20000"/>
-              </a:spcBef>
-              <a:buFont typeface="Arial" pitchFamily="34" charset="0"/>
-              <a:buChar char="•"/>
-              <a:defRPr sz="2000" kern="1200">
-                <a:solidFill>
-                  <a:schemeClr val="tx1"/>
-                </a:solidFill>
-                <a:latin typeface="+mn-lt"/>
-                <a:ea typeface="+mn-ea"/>
-                <a:cs typeface="+mn-cs"/>
-              </a:defRPr>
-            </a:lvl8pPr>
-            <a:lvl9pPr marL="3886200" indent="-228600" algn="l" defTabSz="914400" rtl="0" eaLnBrk="1" latinLnBrk="0" hangingPunct="1">
-              <a:spcBef>
-                <a:spcPct val="20000"/>
-              </a:spcBef>
-              <a:buFont typeface="Arial" pitchFamily="34" charset="0"/>
-              <a:buChar char="•"/>
-              <a:defRPr sz="2000" kern="1200">
-                <a:solidFill>
-                  <a:schemeClr val="tx1"/>
-                </a:solidFill>
-                <a:latin typeface="+mn-lt"/>
-                <a:ea typeface="+mn-ea"/>
-                <a:cs typeface="+mn-cs"/>
-              </a:defRPr>
-            </a:lvl9pPr>
-          </a:lstStyle>
-          <a:p>
-            <a:pPr marL="0" indent="0">
-              <a:buFont typeface="Arial" charset="0"/>
-              <a:buNone/>
-            </a:pPr>
-            <a:r>
-              <a:rPr lang="pt-BR" sz="1800" dirty="0" smtClean="0">
-                <a:latin typeface="Corbel" panose="020B0503020204020204" pitchFamily="34" charset="0"/>
-              </a:rPr>
-              <a:t>O Excel Permite Classificar as listas automaticamente de acordo com regras pré-estabelecidas (ordem numérica ou ordem alfabética) ou ainda baseada nas lista nativas e personalizadas.</a:t>
-            </a:r>
-          </a:p>
-          <a:p>
-            <a:pPr marL="0" indent="0">
-              <a:buFont typeface="Arial" charset="0"/>
-              <a:buNone/>
-            </a:pPr>
-            <a:endParaRPr lang="pt-BR" sz="1800" dirty="0">
-              <a:latin typeface="Corbel" panose="020B0503020204020204" pitchFamily="34" charset="0"/>
-            </a:endParaRPr>
-          </a:p>
-          <a:p>
-            <a:pPr marL="0" indent="0">
-              <a:buFont typeface="Arial" charset="0"/>
-              <a:buNone/>
-            </a:pPr>
-            <a:r>
-              <a:rPr lang="pt-BR" sz="1800" dirty="0" smtClean="0">
-                <a:latin typeface="Corbel" panose="020B0503020204020204" pitchFamily="34" charset="0"/>
-              </a:rPr>
-              <a:t>Listas nativas do Excel são aquelas já instaladas com o programa : dias da semana, nome do mês</a:t>
-            </a:r>
-          </a:p>
-          <a:p>
-            <a:pPr marL="0" indent="0">
-              <a:buFont typeface="Arial" charset="0"/>
-              <a:buNone/>
-            </a:pPr>
-            <a:r>
-              <a:rPr lang="pt-BR" sz="1800" dirty="0" smtClean="0">
-                <a:latin typeface="Corbel" panose="020B0503020204020204" pitchFamily="34" charset="0"/>
-              </a:rPr>
-              <a:t>Listas personalizadas: qualquer uma criada pelo próprio usuário.</a:t>
-            </a:r>
-          </a:p>
-          <a:p>
-            <a:pPr marL="0" indent="0">
-              <a:buFont typeface="Arial" charset="0"/>
-              <a:buNone/>
-            </a:pPr>
-            <a:endParaRPr lang="pt-BR" sz="1800" dirty="0">
-              <a:latin typeface="Corbel" panose="020B0503020204020204" pitchFamily="34" charset="0"/>
-            </a:endParaRPr>
-          </a:p>
-          <a:p>
-            <a:pPr marL="0" indent="0">
-              <a:buFont typeface="Arial" charset="0"/>
-              <a:buNone/>
-            </a:pPr>
-            <a:r>
-              <a:rPr lang="pt-BR" sz="1800" dirty="0" smtClean="0">
-                <a:latin typeface="Corbel" panose="020B0503020204020204" pitchFamily="34" charset="0"/>
-              </a:rPr>
-              <a:t>Fazer ordenação: Guia Dados, grupo classificar e Filtrar, comando classificar</a:t>
-            </a:r>
-          </a:p>
-          <a:p>
-            <a:pPr marL="0" indent="0">
-              <a:buFont typeface="Arial" charset="0"/>
-              <a:buNone/>
-            </a:pPr>
-            <a:r>
-              <a:rPr lang="pt-BR" sz="1800" dirty="0" smtClean="0">
-                <a:latin typeface="Corbel" panose="020B0503020204020204" pitchFamily="34" charset="0"/>
-              </a:rPr>
-              <a:t>Criar lista personalizada: guia Arquivo , Opções, Avançado, Geral, Editar lista Personalizada</a:t>
-            </a:r>
-          </a:p>
-        </p:txBody>
-      </p:sp>
-    </p:spTree>
-    <p:extLst>
-      <p:ext uri="{BB962C8B-B14F-4D97-AF65-F5344CB8AC3E}">
-        <p14:creationId xmlns:p14="http://schemas.microsoft.com/office/powerpoint/2010/main" val="2873385173"/>
-      </p:ext>
-    </p:extLst>
-  </p:cSld>
-  <p:clrMapOvr>
-    <a:masterClrMapping/>
-  </p:clrMapOvr>
   <p:timing>
     <p:tnLst>
       <p:par>
@@ -33845,8 +34593,8 @@
         </p:nvSpPr>
         <p:spPr>
           <a:xfrm>
-            <a:off x="450664" y="786336"/>
-            <a:ext cx="9966325" cy="5495925"/>
+            <a:off x="591671" y="754063"/>
+            <a:ext cx="11600329" cy="5495925"/>
           </a:xfrm>
         </p:spPr>
         <p:txBody>
@@ -33861,17 +34609,84 @@
             <a:endParaRPr lang="pt-BR" sz="2000" dirty="0"/>
           </a:p>
           <a:p>
+            <a:pPr marL="0" indent="0" algn="just">
+              <a:buNone/>
+            </a:pPr>
+            <a:r>
+              <a:rPr lang="pt-BR" sz="2000" dirty="0" smtClean="0"/>
+              <a:t> Criar relatório de fluxo de caixa de 1 ano com entradas, saídas e saldo.</a:t>
+            </a:r>
+          </a:p>
+          <a:p>
             <a:pPr algn="just"/>
             <a:r>
               <a:rPr lang="pt-BR" sz="2000" dirty="0" smtClean="0"/>
-              <a:t>1- Com base no exercício anterior, qual é o dia com o maior saldo? E com menor Saldo? Qual a media de pagamento?</a:t>
+              <a:t>1 - Um mês em cada planilha.</a:t>
             </a:r>
           </a:p>
           <a:p>
             <a:pPr algn="just"/>
             <a:r>
               <a:rPr lang="pt-BR" sz="2000" dirty="0" smtClean="0"/>
-              <a:t>Dica: Formulas Soma, mínimo, Máximo, Média, Referencia e fórmulas 3D</a:t>
+              <a:t>2 - Entrada/Recebimentos  Às terças de R$ 3.000, demais dias de R$ 2.000 (bruto)</a:t>
+            </a:r>
+          </a:p>
+          <a:p>
+            <a:pPr algn="just"/>
+            <a:r>
+              <a:rPr lang="pt-BR" sz="2000" dirty="0" smtClean="0"/>
+              <a:t>3 - Saídas/Pagamentos as quintas de R$ 4.000, demais dias de R$ 1.600 (bruto)</a:t>
+            </a:r>
+          </a:p>
+          <a:p>
+            <a:pPr algn="just"/>
+            <a:r>
+              <a:rPr lang="pt-BR" sz="2000" dirty="0" smtClean="0"/>
+              <a:t>4 - Todo dia 15 de cada mês, saída adicional de 6.000 (bruto)</a:t>
+            </a:r>
+          </a:p>
+          <a:p>
+            <a:pPr algn="just"/>
+            <a:r>
+              <a:rPr lang="pt-BR" sz="2000" dirty="0" smtClean="0"/>
+              <a:t>5 - calcular imposto ICMS de 18% sobre entrada/recebimentos + </a:t>
+            </a:r>
+            <a:r>
+              <a:rPr lang="pt-BR" sz="2000" dirty="0" err="1" smtClean="0"/>
+              <a:t>Pis</a:t>
+            </a:r>
+            <a:r>
+              <a:rPr lang="pt-BR" sz="2000" dirty="0" smtClean="0"/>
+              <a:t>/</a:t>
+            </a:r>
+            <a:r>
+              <a:rPr lang="pt-BR" sz="2000" dirty="0" err="1" smtClean="0"/>
+              <a:t>Cofins</a:t>
+            </a:r>
+            <a:r>
+              <a:rPr lang="pt-BR" sz="2000" dirty="0" smtClean="0"/>
+              <a:t> de 9,25%.</a:t>
+            </a:r>
+          </a:p>
+          <a:p>
+            <a:pPr algn="just"/>
+            <a:r>
+              <a:rPr lang="pt-BR" sz="2000" dirty="0" smtClean="0"/>
+              <a:t>6 - calcular imposto de 9,25% sobre saída/pagamentos.</a:t>
+            </a:r>
+          </a:p>
+          <a:p>
+            <a:pPr algn="just"/>
+            <a:r>
+              <a:rPr lang="pt-BR" sz="2000" dirty="0" smtClean="0"/>
+              <a:t>8 - Criar uma aba resumo mostrando recebimento por dia do mês, recebimento, pagamento e impostos líquidos pagos no ano.</a:t>
+            </a:r>
+          </a:p>
+          <a:p>
+            <a:pPr algn="just"/>
+            <a:r>
+              <a:rPr lang="pt-BR" sz="2000" dirty="0" smtClean="0"/>
+              <a:t>8 - Aba resumo deverá ser o local onde digitaremos as alíquotas e as demais planilhas deverão obedecer a estas alíquotas.</a:t>
             </a:r>
           </a:p>
           <a:p>
@@ -33879,17 +34694,12 @@
             <a:endParaRPr lang="pt-BR" sz="2000" dirty="0"/>
           </a:p>
           <a:p>
-            <a:pPr algn="just"/>
+            <a:pPr marL="0" indent="0" algn="just">
+              <a:buNone/>
+            </a:pPr>
             <a:r>
               <a:rPr lang="pt-BR" sz="2000" dirty="0" smtClean="0"/>
-              <a:t>2- Mostre os dados acima em uma única aba de forma que possamos comparar entre os meses.</a:t>
-            </a:r>
-          </a:p>
-          <a:p>
-            <a:pPr algn="just"/>
-            <a:r>
-              <a:rPr lang="pt-BR" sz="2000" dirty="0" smtClean="0"/>
-              <a:t>Dica: Recortar e colar</a:t>
+              <a:t>Dica: Fórmula soma 3D, formula aritmética, formatação, copia de planilhas, referência externa.</a:t>
             </a:r>
             <a:endParaRPr lang="pt-BR" sz="2000" dirty="0"/>
           </a:p>
@@ -34090,7 +34900,7 @@
     </p:spTree>
     <p:extLst>
       <p:ext uri="{BB962C8B-B14F-4D97-AF65-F5344CB8AC3E}">
-        <p14:creationId xmlns:p14="http://schemas.microsoft.com/office/powerpoint/2010/main" val="2118764348"/>
+        <p14:creationId xmlns:p14="http://schemas.microsoft.com/office/powerpoint/2010/main" val="2083101853"/>
       </p:ext>
     </p:extLst>
   </p:cSld>
@@ -34483,6 +35293,305 @@
   <p:clrMapOvr>
     <a:masterClrMapping/>
   </p:clrMapOvr>
+  <p:timing>
+    <p:tnLst>
+      <p:par>
+        <p:cTn id="1" dur="indefinite" restart="never" nodeType="tmRoot"/>
+      </p:par>
+    </p:tnLst>
+  </p:timing>
+</p:sld>
+</file>
+
+<file path=ppt/slides/slide60.xml><?xml version="1.0" encoding="utf-8"?>
+<p:sld xmlns:a="http://schemas.openxmlformats.org/drawingml/2006/main" xmlns:r="http://schemas.openxmlformats.org/officeDocument/2006/relationships" xmlns:p="http://schemas.openxmlformats.org/presentationml/2006/main" show="0">
+  <p:cSld>
+    <p:spTree>
+      <p:nvGrpSpPr>
+        <p:cNvPr id="1" name=""/>
+        <p:cNvGrpSpPr/>
+        <p:nvPr/>
+      </p:nvGrpSpPr>
+      <p:grpSpPr>
+        <a:xfrm>
+          <a:off x="0" y="0"/>
+          <a:ext cx="0" cy="0"/>
+          <a:chOff x="0" y="0"/>
+          <a:chExt cx="0" cy="0"/>
+        </a:xfrm>
+      </p:grpSpPr>
+      <p:sp>
+        <p:nvSpPr>
+          <p:cNvPr id="3" name="Subtítulo 1"/>
+          <p:cNvSpPr>
+            <a:spLocks noGrp="1"/>
+          </p:cNvSpPr>
+          <p:nvPr>
+            <p:ph type="subTitle" idx="4294967295"/>
+          </p:nvPr>
+        </p:nvSpPr>
+        <p:spPr>
+          <a:xfrm>
+            <a:off x="450664" y="786336"/>
+            <a:ext cx="9966325" cy="5495925"/>
+          </a:xfrm>
+        </p:spPr>
+        <p:txBody>
+          <a:bodyPr>
+            <a:noAutofit/>
+          </a:bodyPr>
+          <a:lstStyle/>
+          <a:p>
+            <a:pPr marL="0" indent="0">
+              <a:buNone/>
+            </a:pPr>
+            <a:endParaRPr lang="pt-BR" sz="2000" dirty="0"/>
+          </a:p>
+          <a:p>
+            <a:pPr algn="just"/>
+            <a:r>
+              <a:rPr lang="pt-BR" sz="2000" dirty="0" smtClean="0"/>
+              <a:t>1- Com base no exercício anterior, qual é o dia com o maior saldo? E com menor Saldo? Qual a media de pagamento?</a:t>
+            </a:r>
+          </a:p>
+          <a:p>
+            <a:pPr algn="just"/>
+            <a:r>
+              <a:rPr lang="pt-BR" sz="2000" dirty="0" smtClean="0"/>
+              <a:t>Dica: Formulas Soma, mínimo, Máximo, Média, Referencia e fórmulas 3D</a:t>
+            </a:r>
+          </a:p>
+          <a:p>
+            <a:pPr algn="just"/>
+            <a:endParaRPr lang="pt-BR" sz="2000" dirty="0"/>
+          </a:p>
+          <a:p>
+            <a:pPr algn="just"/>
+            <a:r>
+              <a:rPr lang="pt-BR" sz="2000" dirty="0" smtClean="0"/>
+              <a:t>2- Mostre os dados acima em uma única aba de forma que possamos comparar entre os meses.</a:t>
+            </a:r>
+          </a:p>
+          <a:p>
+            <a:pPr algn="just"/>
+            <a:r>
+              <a:rPr lang="pt-BR" sz="2000" dirty="0" smtClean="0"/>
+              <a:t>Dica: Recortar e colar</a:t>
+            </a:r>
+            <a:endParaRPr lang="pt-BR" sz="2000" dirty="0"/>
+          </a:p>
+        </p:txBody>
+      </p:sp>
+      <p:sp>
+        <p:nvSpPr>
+          <p:cNvPr id="4" name="Subtítulo 2"/>
+          <p:cNvSpPr txBox="1">
+            <a:spLocks/>
+          </p:cNvSpPr>
+          <p:nvPr/>
+        </p:nvSpPr>
+        <p:spPr>
+          <a:xfrm>
+            <a:off x="210670" y="153054"/>
+            <a:ext cx="10058400" cy="718315"/>
+          </a:xfrm>
+        </p:spPr>
+        <p:txBody>
+          <a:bodyPr>
+            <a:noAutofit/>
+          </a:bodyPr>
+          <a:lstStyle>
+            <a:lvl1pPr marL="342900" indent="-342900" algn="l" rtl="0" eaLnBrk="0" fontAlgn="base" hangingPunct="0">
+              <a:spcBef>
+                <a:spcPct val="20000"/>
+              </a:spcBef>
+              <a:spcAft>
+                <a:spcPct val="0"/>
+              </a:spcAft>
+              <a:buFont typeface="Arial" charset="0"/>
+              <a:buChar char="•"/>
+              <a:defRPr lang="pt-BR" sz="2800" kern="1200" dirty="0">
+                <a:solidFill>
+                  <a:schemeClr val="tx1"/>
+                </a:solidFill>
+                <a:latin typeface="+mn-lt"/>
+                <a:ea typeface="+mn-ea"/>
+                <a:cs typeface="+mn-cs"/>
+              </a:defRPr>
+            </a:lvl1pPr>
+            <a:lvl2pPr marL="742950" indent="-285750" algn="l" rtl="0" eaLnBrk="0" fontAlgn="base" hangingPunct="0">
+              <a:spcBef>
+                <a:spcPct val="20000"/>
+              </a:spcBef>
+              <a:spcAft>
+                <a:spcPct val="0"/>
+              </a:spcAft>
+              <a:buFont typeface="Arial" charset="0"/>
+              <a:buChar char="•"/>
+              <a:defRPr lang="pt-BR" sz="2400" kern="1200" dirty="0">
+                <a:solidFill>
+                  <a:schemeClr val="tx1"/>
+                </a:solidFill>
+                <a:latin typeface="+mn-lt"/>
+                <a:ea typeface="+mn-ea"/>
+                <a:cs typeface="+mn-cs"/>
+              </a:defRPr>
+            </a:lvl2pPr>
+            <a:lvl3pPr marL="1143000" indent="-228600" algn="l" rtl="0" eaLnBrk="0" fontAlgn="base" hangingPunct="0">
+              <a:spcBef>
+                <a:spcPct val="20000"/>
+              </a:spcBef>
+              <a:spcAft>
+                <a:spcPct val="0"/>
+              </a:spcAft>
+              <a:buFont typeface="Arial" charset="0"/>
+              <a:buChar char="•"/>
+              <a:defRPr lang="pt-BR" sz="2400" kern="1200" dirty="0">
+                <a:solidFill>
+                  <a:schemeClr val="tx1"/>
+                </a:solidFill>
+                <a:latin typeface="+mn-lt"/>
+                <a:ea typeface="+mn-ea"/>
+                <a:cs typeface="+mn-cs"/>
+              </a:defRPr>
+            </a:lvl3pPr>
+            <a:lvl4pPr marL="1600200" indent="-228600" algn="l" rtl="0" eaLnBrk="0" fontAlgn="base" hangingPunct="0">
+              <a:spcBef>
+                <a:spcPct val="20000"/>
+              </a:spcBef>
+              <a:spcAft>
+                <a:spcPct val="0"/>
+              </a:spcAft>
+              <a:buFont typeface="Arial" charset="0"/>
+              <a:buChar char="•"/>
+              <a:defRPr lang="pt-BR" sz="2000" kern="1200" dirty="0">
+                <a:solidFill>
+                  <a:schemeClr val="tx1"/>
+                </a:solidFill>
+                <a:latin typeface="+mn-lt"/>
+                <a:ea typeface="+mn-ea"/>
+                <a:cs typeface="+mn-cs"/>
+              </a:defRPr>
+            </a:lvl4pPr>
+            <a:lvl5pPr marL="2057400" indent="-228600" algn="l" rtl="0" eaLnBrk="0" fontAlgn="base" hangingPunct="0">
+              <a:spcBef>
+                <a:spcPct val="20000"/>
+              </a:spcBef>
+              <a:spcAft>
+                <a:spcPct val="0"/>
+              </a:spcAft>
+              <a:buFont typeface="Arial" charset="0"/>
+              <a:buChar char="•"/>
+              <a:defRPr lang="pt-BR" sz="2000" kern="1200" dirty="0">
+                <a:solidFill>
+                  <a:schemeClr val="tx1"/>
+                </a:solidFill>
+                <a:latin typeface="+mn-lt"/>
+                <a:ea typeface="+mn-ea"/>
+                <a:cs typeface="+mn-cs"/>
+              </a:defRPr>
+            </a:lvl5pPr>
+            <a:lvl6pPr marL="2514600" indent="-228600" algn="l" defTabSz="914400" rtl="0" eaLnBrk="1" latinLnBrk="0" hangingPunct="1">
+              <a:spcBef>
+                <a:spcPct val="20000"/>
+              </a:spcBef>
+              <a:buFont typeface="Arial" pitchFamily="34" charset="0"/>
+              <a:buChar char="•"/>
+              <a:defRPr sz="2000" kern="1200">
+                <a:solidFill>
+                  <a:schemeClr val="tx1"/>
+                </a:solidFill>
+                <a:latin typeface="+mn-lt"/>
+                <a:ea typeface="+mn-ea"/>
+                <a:cs typeface="+mn-cs"/>
+              </a:defRPr>
+            </a:lvl6pPr>
+            <a:lvl7pPr marL="2971800" indent="-228600" algn="l" defTabSz="914400" rtl="0" eaLnBrk="1" latinLnBrk="0" hangingPunct="1">
+              <a:spcBef>
+                <a:spcPct val="20000"/>
+              </a:spcBef>
+              <a:buFont typeface="Arial" pitchFamily="34" charset="0"/>
+              <a:buChar char="•"/>
+              <a:defRPr sz="2000" kern="1200">
+                <a:solidFill>
+                  <a:schemeClr val="tx1"/>
+                </a:solidFill>
+                <a:latin typeface="+mn-lt"/>
+                <a:ea typeface="+mn-ea"/>
+                <a:cs typeface="+mn-cs"/>
+              </a:defRPr>
+            </a:lvl7pPr>
+            <a:lvl8pPr marL="3429000" indent="-228600" algn="l" defTabSz="914400" rtl="0" eaLnBrk="1" latinLnBrk="0" hangingPunct="1">
+              <a:spcBef>
+                <a:spcPct val="20000"/>
+              </a:spcBef>
+              <a:buFont typeface="Arial" pitchFamily="34" charset="0"/>
+              <a:buChar char="•"/>
+              <a:defRPr sz="2000" kern="1200">
+                <a:solidFill>
+                  <a:schemeClr val="tx1"/>
+                </a:solidFill>
+                <a:latin typeface="+mn-lt"/>
+                <a:ea typeface="+mn-ea"/>
+                <a:cs typeface="+mn-cs"/>
+              </a:defRPr>
+            </a:lvl8pPr>
+            <a:lvl9pPr marL="3886200" indent="-228600" algn="l" defTabSz="914400" rtl="0" eaLnBrk="1" latinLnBrk="0" hangingPunct="1">
+              <a:spcBef>
+                <a:spcPct val="20000"/>
+              </a:spcBef>
+              <a:buFont typeface="Arial" pitchFamily="34" charset="0"/>
+              <a:buChar char="•"/>
+              <a:defRPr sz="2000" kern="1200">
+                <a:solidFill>
+                  <a:schemeClr val="tx1"/>
+                </a:solidFill>
+                <a:latin typeface="+mn-lt"/>
+                <a:ea typeface="+mn-ea"/>
+                <a:cs typeface="+mn-cs"/>
+              </a:defRPr>
+            </a:lvl9pPr>
+          </a:lstStyle>
+          <a:p>
+            <a:pPr marL="0" indent="0">
+              <a:lnSpc>
+                <a:spcPct val="150000"/>
+              </a:lnSpc>
+              <a:buFont typeface="Arial" charset="0"/>
+              <a:buNone/>
+            </a:pPr>
+            <a:r>
+              <a:rPr lang="pt-BR" sz="2400" b="1" dirty="0" smtClean="0">
+                <a:solidFill>
+                  <a:schemeClr val="accent6">
+                    <a:lumMod val="75000"/>
+                  </a:schemeClr>
+                </a:solidFill>
+                <a:latin typeface="Corbel" panose="020B0503020204020204" pitchFamily="34" charset="0"/>
+              </a:rPr>
+              <a:t>Atividade</a:t>
+            </a:r>
+          </a:p>
+        </p:txBody>
+      </p:sp>
+    </p:spTree>
+    <p:extLst>
+      <p:ext uri="{BB962C8B-B14F-4D97-AF65-F5344CB8AC3E}">
+        <p14:creationId xmlns:p14="http://schemas.microsoft.com/office/powerpoint/2010/main" val="2118764348"/>
+      </p:ext>
+    </p:extLst>
+  </p:cSld>
+  <p:clrMapOvr>
+    <a:masterClrMapping/>
+  </p:clrMapOvr>
+  <mc:AlternateContent xmlns:mc="http://schemas.openxmlformats.org/markup-compatibility/2006" xmlns:p14="http://schemas.microsoft.com/office/powerpoint/2010/main">
+    <mc:Choice Requires="p14">
+      <p:transition spd="slow" p14:dur="2000"/>
+    </mc:Choice>
+    <mc:Fallback xmlns="">
+      <p:transition spd="slow"/>
+    </mc:Fallback>
+  </mc:AlternateContent>
   <p:timing>
     <p:tnLst>
       <p:par>

</xml_diff>

<commit_message>
pre revisao antes do feriado
</commit_message>
<xml_diff>
--- a/Professor/Aula3.pptx
+++ b/Professor/Aula3.pptx
@@ -5,10 +5,10 @@
     <p:sldMasterId id="2147483672" r:id="rId1"/>
   </p:sldMasterIdLst>
   <p:notesMasterIdLst>
-    <p:notesMasterId r:id="rId62"/>
+    <p:notesMasterId r:id="rId64"/>
   </p:notesMasterIdLst>
   <p:handoutMasterIdLst>
-    <p:handoutMasterId r:id="rId63"/>
+    <p:handoutMasterId r:id="rId65"/>
   </p:handoutMasterIdLst>
   <p:sldIdLst>
     <p:sldId id="256" r:id="rId2"/>
@@ -61,16 +61,18 @@
     <p:sldId id="291" r:id="rId49"/>
     <p:sldId id="310" r:id="rId50"/>
     <p:sldId id="325" r:id="rId51"/>
-    <p:sldId id="308" r:id="rId52"/>
-    <p:sldId id="322" r:id="rId53"/>
-    <p:sldId id="326" r:id="rId54"/>
-    <p:sldId id="309" r:id="rId55"/>
-    <p:sldId id="324" r:id="rId56"/>
-    <p:sldId id="320" r:id="rId57"/>
-    <p:sldId id="327" r:id="rId58"/>
-    <p:sldId id="290" r:id="rId59"/>
-    <p:sldId id="281" r:id="rId60"/>
-    <p:sldId id="289" r:id="rId61"/>
+    <p:sldId id="329" r:id="rId52"/>
+    <p:sldId id="308" r:id="rId53"/>
+    <p:sldId id="328" r:id="rId54"/>
+    <p:sldId id="322" r:id="rId55"/>
+    <p:sldId id="326" r:id="rId56"/>
+    <p:sldId id="309" r:id="rId57"/>
+    <p:sldId id="324" r:id="rId58"/>
+    <p:sldId id="320" r:id="rId59"/>
+    <p:sldId id="327" r:id="rId60"/>
+    <p:sldId id="290" r:id="rId61"/>
+    <p:sldId id="281" r:id="rId62"/>
+    <p:sldId id="289" r:id="rId63"/>
   </p:sldIdLst>
   <p:sldSz cx="12192000" cy="6858000"/>
   <p:notesSz cx="6858000" cy="9144000"/>
@@ -4344,7 +4346,7 @@
           <a:p>
             <a:fld id="{CE9EE758-9CAE-433F-B796-16C56E17460B}" type="datetimeFigureOut">
               <a:rPr lang="pt-BR" smtClean="0"/>
-              <a:t>09/11/2018</a:t>
+              <a:t>12/11/2018</a:t>
             </a:fld>
             <a:endParaRPr lang="pt-BR"/>
           </a:p>
@@ -4510,7 +4512,7 @@
           <a:p>
             <a:fld id="{FBCA46B2-73EF-4C4A-BBF3-1FCF65D31F9F}" type="datetimeFigureOut">
               <a:rPr lang="pt-BR" smtClean="0"/>
-              <a:t>09/11/2018</a:t>
+              <a:t>12/11/2018</a:t>
             </a:fld>
             <a:endParaRPr lang="pt-BR"/>
           </a:p>
@@ -5063,7 +5065,7 @@
           <a:graphicData uri="http://schemas.openxmlformats.org/presentationml/2006/ole">
             <mc:AlternateContent xmlns:mc="http://schemas.openxmlformats.org/markup-compatibility/2006">
               <mc:Choice xmlns:v="urn:schemas-microsoft-com:vml" Requires="v">
-                <p:oleObj spid="_x0000_s1170" name="Slide do think-cell" r:id="rId7" imgW="270" imgH="270" progId="TCLayout.ActiveDocument.1">
+                <p:oleObj spid="_x0000_s1177" name="Slide do think-cell" r:id="rId7" imgW="270" imgH="270" progId="TCLayout.ActiveDocument.1">
                   <p:embed/>
                 </p:oleObj>
               </mc:Choice>
@@ -29181,10 +29183,40 @@
               <a:buNone/>
             </a:pPr>
             <a:r>
-              <a:rPr lang="pt-BR" sz="1800" dirty="0" smtClean="0">
-                <a:latin typeface="Corbel" panose="020B0503020204020204" pitchFamily="34" charset="0"/>
-              </a:rPr>
-              <a:t>O Excel Permite Classificar as listas (linhas e também colunas) automaticamente de acordo com regras pré-estabelecidas (ordem numérica ou ordem alfabética) ou ainda baseada nas lista nativas e personalizadas.</a:t>
+              <a:rPr lang="pt-BR" sz="1600" dirty="0" smtClean="0">
+                <a:latin typeface="Corbel" panose="020B0503020204020204" pitchFamily="34" charset="0"/>
+              </a:rPr>
+              <a:t>O Excel Permite Classificar as listas (linhas e também </a:t>
+            </a:r>
+            <a:r>
+              <a:rPr lang="pt-BR" sz="1600" dirty="0" smtClean="0">
+                <a:latin typeface="Corbel" panose="020B0503020204020204" pitchFamily="34" charset="0"/>
+              </a:rPr>
+              <a:t>colunas [fig2]) </a:t>
+            </a:r>
+            <a:r>
+              <a:rPr lang="pt-BR" sz="1600" dirty="0" smtClean="0">
+                <a:latin typeface="Corbel" panose="020B0503020204020204" pitchFamily="34" charset="0"/>
+              </a:rPr>
+              <a:t>automaticamente de acordo com regras pré-estabelecidas (ordem numérica ou ordem alfabética) </a:t>
+            </a:r>
+            <a:r>
+              <a:rPr lang="pt-BR" sz="1600" dirty="0" smtClean="0">
+                <a:latin typeface="Corbel" panose="020B0503020204020204" pitchFamily="34" charset="0"/>
+              </a:rPr>
+              <a:t>em diversos níveis de classificação tanto crescente quando </a:t>
+            </a:r>
+            <a:r>
+              <a:rPr lang="pt-BR" sz="1600" dirty="0" err="1" smtClean="0">
+                <a:latin typeface="Corbel" panose="020B0503020204020204" pitchFamily="34" charset="0"/>
+              </a:rPr>
+              <a:t>descrescente</a:t>
+            </a:r>
+            <a:r>
+              <a:rPr lang="pt-BR" sz="1600" dirty="0" smtClean="0">
+                <a:latin typeface="Corbel" panose="020B0503020204020204" pitchFamily="34" charset="0"/>
+              </a:rPr>
+              <a:t>.</a:t>
             </a:r>
           </a:p>
           <a:p>
@@ -29192,7 +29224,37 @@
               <a:buFont typeface="Arial" charset="0"/>
               <a:buNone/>
             </a:pPr>
-            <a:endParaRPr lang="pt-BR" sz="1800" dirty="0">
+            <a:r>
+              <a:rPr lang="pt-BR" sz="1600" dirty="0" smtClean="0">
+                <a:latin typeface="Corbel" panose="020B0503020204020204" pitchFamily="34" charset="0"/>
+              </a:rPr>
+              <a:t>EX&gt; Classificar alfabeticamente pelo </a:t>
+            </a:r>
+            <a:r>
+              <a:rPr lang="pt-BR" sz="1600" b="1" u="sng" dirty="0" smtClean="0">
+                <a:latin typeface="Corbel" panose="020B0503020204020204" pitchFamily="34" charset="0"/>
+              </a:rPr>
+              <a:t>Nome de Um pais </a:t>
+            </a:r>
+            <a:r>
+              <a:rPr lang="pt-BR" sz="1600" dirty="0" smtClean="0">
+                <a:latin typeface="Corbel" panose="020B0503020204020204" pitchFamily="34" charset="0"/>
+              </a:rPr>
+              <a:t>e depois </a:t>
+            </a:r>
+            <a:r>
+              <a:rPr lang="pt-BR" sz="1600" b="1" u="sng" dirty="0" smtClean="0">
+                <a:latin typeface="Corbel" panose="020B0503020204020204" pitchFamily="34" charset="0"/>
+              </a:rPr>
+              <a:t>pelo Estado</a:t>
+            </a:r>
+            <a:r>
+              <a:rPr lang="pt-BR" sz="1600" dirty="0" smtClean="0">
+                <a:latin typeface="Corbel" panose="020B0503020204020204" pitchFamily="34" charset="0"/>
+              </a:rPr>
+              <a:t>: 2 níveis (fig1).</a:t>
+            </a:r>
+            <a:endParaRPr lang="pt-BR" sz="1600" dirty="0" smtClean="0">
               <a:latin typeface="Corbel" panose="020B0503020204020204" pitchFamily="34" charset="0"/>
             </a:endParaRPr>
           </a:p>
@@ -29201,31 +29263,7 @@
               <a:buFont typeface="Arial" charset="0"/>
               <a:buNone/>
             </a:pPr>
-            <a:r>
-              <a:rPr lang="pt-BR" sz="1800" dirty="0" smtClean="0">
-                <a:latin typeface="Corbel" panose="020B0503020204020204" pitchFamily="34" charset="0"/>
-              </a:rPr>
-              <a:t>Listas nativas do Excel são aquelas já instaladas com o programa : dias da semana, nome do mês</a:t>
-            </a:r>
-          </a:p>
-          <a:p>
-            <a:pPr marL="0" indent="0">
-              <a:buFont typeface="Arial" charset="0"/>
-              <a:buNone/>
-            </a:pPr>
-            <a:r>
-              <a:rPr lang="pt-BR" sz="1800" dirty="0" smtClean="0">
-                <a:latin typeface="Corbel" panose="020B0503020204020204" pitchFamily="34" charset="0"/>
-              </a:rPr>
-              <a:t>Listas personalizadas: qualquer uma criada pelo próprio usuário.</a:t>
-            </a:r>
-          </a:p>
-          <a:p>
-            <a:pPr marL="0" indent="0">
-              <a:buFont typeface="Arial" charset="0"/>
-              <a:buNone/>
-            </a:pPr>
-            <a:endParaRPr lang="pt-BR" sz="1800" dirty="0">
+            <a:endParaRPr lang="pt-BR" sz="1600" dirty="0">
               <a:latin typeface="Corbel" panose="020B0503020204020204" pitchFamily="34" charset="0"/>
             </a:endParaRPr>
           </a:p>
@@ -29235,7 +29273,49 @@
               <a:buNone/>
             </a:pPr>
             <a:r>
-              <a:rPr lang="pt-BR" sz="1800" dirty="0" smtClean="0">
+              <a:rPr lang="pt-BR" sz="1600" dirty="0" smtClean="0">
+                <a:latin typeface="Corbel" panose="020B0503020204020204" pitchFamily="34" charset="0"/>
+              </a:rPr>
+              <a:t>Listas nativas do Excel são aquelas já instaladas com o programa : dias da semana, nome do mês</a:t>
+            </a:r>
+          </a:p>
+          <a:p>
+            <a:pPr marL="0" indent="0">
+              <a:buFont typeface="Arial" charset="0"/>
+              <a:buNone/>
+            </a:pPr>
+            <a:r>
+              <a:rPr lang="pt-BR" sz="1600" dirty="0" smtClean="0">
+                <a:latin typeface="Corbel" panose="020B0503020204020204" pitchFamily="34" charset="0"/>
+              </a:rPr>
+              <a:t>Listas personalizadas: qualquer uma criada pelo próprio usuário</a:t>
+            </a:r>
+            <a:r>
+              <a:rPr lang="pt-BR" sz="1600" dirty="0" smtClean="0">
+                <a:latin typeface="Corbel" panose="020B0503020204020204" pitchFamily="34" charset="0"/>
+              </a:rPr>
+              <a:t>.</a:t>
+            </a:r>
+            <a:endParaRPr lang="pt-BR" sz="1600" dirty="0" smtClean="0">
+              <a:latin typeface="Corbel" panose="020B0503020204020204" pitchFamily="34" charset="0"/>
+            </a:endParaRPr>
+          </a:p>
+          <a:p>
+            <a:pPr marL="0" indent="0">
+              <a:buFont typeface="Arial" charset="0"/>
+              <a:buNone/>
+            </a:pPr>
+            <a:endParaRPr lang="pt-BR" sz="1600" dirty="0">
+              <a:latin typeface="Corbel" panose="020B0503020204020204" pitchFamily="34" charset="0"/>
+            </a:endParaRPr>
+          </a:p>
+          <a:p>
+            <a:pPr marL="0" indent="0">
+              <a:buFont typeface="Arial" charset="0"/>
+              <a:buNone/>
+            </a:pPr>
+            <a:r>
+              <a:rPr lang="pt-BR" sz="1600" dirty="0" smtClean="0">
                 <a:latin typeface="Corbel" panose="020B0503020204020204" pitchFamily="34" charset="0"/>
               </a:rPr>
               <a:t>Caminho:</a:t>
@@ -29247,19 +29327,19 @@
               <a:buNone/>
             </a:pPr>
             <a:r>
-              <a:rPr lang="pt-BR" sz="1800" dirty="0" smtClean="0">
-                <a:latin typeface="Corbel" panose="020B0503020204020204" pitchFamily="34" charset="0"/>
-              </a:rPr>
-              <a:t>Fazer ordenação: Selecionar intervalo, Guia Dados, grupo classificar e Filtrar, comando classificar</a:t>
-            </a:r>
-          </a:p>
-          <a:p>
-            <a:pPr marL="0" indent="0">
-              <a:buFont typeface="Arial" charset="0"/>
-              <a:buNone/>
-            </a:pPr>
-            <a:r>
-              <a:rPr lang="pt-BR" sz="1800" b="1" u="sng" dirty="0" smtClean="0">
+              <a:rPr lang="pt-BR" sz="1600" dirty="0" smtClean="0">
+                <a:latin typeface="Corbel" panose="020B0503020204020204" pitchFamily="34" charset="0"/>
+              </a:rPr>
+              <a:t>Fazer ordenação: Selecionar intervalo, Guia Dados, grupo classificar e Filtrar, comando </a:t>
+            </a:r>
+            <a:r>
+              <a:rPr lang="pt-BR" sz="1600" dirty="0" smtClean="0">
+                <a:latin typeface="Corbel" panose="020B0503020204020204" pitchFamily="34" charset="0"/>
+              </a:rPr>
+              <a:t>classificar (permite +1 nível de classificação) </a:t>
+            </a:r>
+            <a:r>
+              <a:rPr lang="pt-BR" sz="1600" b="1" u="sng" dirty="0" smtClean="0">
                 <a:effectLst>
                   <a:outerShdw blurRad="38100" dist="38100" dir="2700000" algn="tl">
                     <a:srgbClr val="000000">
@@ -29272,18 +29352,24 @@
               <a:t>OU</a:t>
             </a:r>
             <a:r>
-              <a:rPr lang="pt-BR" sz="1800" dirty="0" smtClean="0">
-                <a:latin typeface="Corbel" panose="020B0503020204020204" pitchFamily="34" charset="0"/>
-              </a:rPr>
-              <a:t> Botão direito na coluna que quer usar como referencia&gt; Classificar.</a:t>
-            </a:r>
-          </a:p>
-          <a:p>
-            <a:pPr marL="0" indent="0">
-              <a:buFont typeface="Arial" charset="0"/>
-              <a:buNone/>
-            </a:pPr>
-            <a:endParaRPr lang="pt-BR" sz="1800" dirty="0" smtClean="0">
+              <a:rPr lang="pt-BR" sz="1600" dirty="0" smtClean="0">
+                <a:latin typeface="Corbel" panose="020B0503020204020204" pitchFamily="34" charset="0"/>
+              </a:rPr>
+              <a:t> </a:t>
+            </a:r>
+            <a:r>
+              <a:rPr lang="pt-BR" sz="1600" dirty="0" smtClean="0">
+                <a:latin typeface="Corbel" panose="020B0503020204020204" pitchFamily="34" charset="0"/>
+              </a:rPr>
+              <a:t>Botão direito na coluna que quer usar como referencia&gt; Classificar</a:t>
+            </a:r>
+            <a:r>
+              <a:rPr lang="pt-BR" sz="1600" dirty="0" smtClean="0">
+                <a:latin typeface="Corbel" panose="020B0503020204020204" pitchFamily="34" charset="0"/>
+              </a:rPr>
+              <a:t>. (somente 1 nível de classificação)</a:t>
+            </a:r>
+            <a:endParaRPr lang="pt-BR" sz="1600" dirty="0" smtClean="0">
               <a:latin typeface="Corbel" panose="020B0503020204020204" pitchFamily="34" charset="0"/>
             </a:endParaRPr>
           </a:p>
@@ -29292,12 +29378,199 @@
               <a:buFont typeface="Arial" charset="0"/>
               <a:buNone/>
             </a:pPr>
-            <a:r>
-              <a:rPr lang="pt-BR" sz="1800" dirty="0" smtClean="0">
-                <a:latin typeface="Corbel" panose="020B0503020204020204" pitchFamily="34" charset="0"/>
-              </a:rPr>
-              <a:t>Criar lista personalizada: guia Arquivo , Opções, Avançado, Geral, Editar lista Personalizada, Selecionar intervalo&gt; Importar&gt; OK.</a:t>
-            </a:r>
+            <a:endParaRPr lang="pt-BR" sz="1600" dirty="0" smtClean="0">
+              <a:latin typeface="Corbel" panose="020B0503020204020204" pitchFamily="34" charset="0"/>
+            </a:endParaRPr>
+          </a:p>
+        </p:txBody>
+      </p:sp>
+      <p:pic>
+        <p:nvPicPr>
+          <p:cNvPr id="2" name="Imagem 1"/>
+          <p:cNvPicPr>
+            <a:picLocks noChangeAspect="1"/>
+          </p:cNvPicPr>
+          <p:nvPr/>
+        </p:nvPicPr>
+        <p:blipFill>
+          <a:blip r:embed="rId2"/>
+          <a:stretch>
+            <a:fillRect/>
+          </a:stretch>
+        </p:blipFill>
+        <p:spPr>
+          <a:xfrm>
+            <a:off x="488576" y="3937411"/>
+            <a:ext cx="5223735" cy="2147275"/>
+          </a:xfrm>
+          <a:prstGeom prst="rect">
+            <a:avLst/>
+          </a:prstGeom>
+        </p:spPr>
+      </p:pic>
+      <p:sp>
+        <p:nvSpPr>
+          <p:cNvPr id="4" name="Elipse 3"/>
+          <p:cNvSpPr/>
+          <p:nvPr/>
+        </p:nvSpPr>
+        <p:spPr>
+          <a:xfrm>
+            <a:off x="3506993" y="4077148"/>
+            <a:ext cx="634701" cy="484094"/>
+          </a:xfrm>
+          <a:prstGeom prst="ellipse">
+            <a:avLst/>
+          </a:prstGeom>
+          <a:noFill/>
+          <a:ln>
+            <a:solidFill>
+              <a:srgbClr val="FF0000"/>
+            </a:solidFill>
+          </a:ln>
+        </p:spPr>
+        <p:style>
+          <a:lnRef idx="2">
+            <a:schemeClr val="accent1">
+              <a:shade val="50000"/>
+            </a:schemeClr>
+          </a:lnRef>
+          <a:fillRef idx="1">
+            <a:schemeClr val="accent1"/>
+          </a:fillRef>
+          <a:effectRef idx="0">
+            <a:schemeClr val="accent1"/>
+          </a:effectRef>
+          <a:fontRef idx="minor">
+            <a:schemeClr val="lt1"/>
+          </a:fontRef>
+        </p:style>
+        <p:txBody>
+          <a:bodyPr rtlCol="0" anchor="ctr"/>
+          <a:lstStyle/>
+          <a:p>
+            <a:pPr algn="ctr"/>
+            <a:endParaRPr lang="pt-BR"/>
+          </a:p>
+        </p:txBody>
+      </p:sp>
+      <p:cxnSp>
+        <p:nvCxnSpPr>
+          <p:cNvPr id="7" name="Conector de Seta Reta 6"/>
+          <p:cNvCxnSpPr/>
+          <p:nvPr/>
+        </p:nvCxnSpPr>
+        <p:spPr>
+          <a:xfrm>
+            <a:off x="4184725" y="4407496"/>
+            <a:ext cx="2883049" cy="351811"/>
+          </a:xfrm>
+          <a:prstGeom prst="straightConnector1">
+            <a:avLst/>
+          </a:prstGeom>
+          <a:ln>
+            <a:solidFill>
+              <a:srgbClr val="FF0000"/>
+            </a:solidFill>
+            <a:tailEnd type="triangle"/>
+          </a:ln>
+        </p:spPr>
+        <p:style>
+          <a:lnRef idx="1">
+            <a:schemeClr val="accent2"/>
+          </a:lnRef>
+          <a:fillRef idx="0">
+            <a:schemeClr val="accent2"/>
+          </a:fillRef>
+          <a:effectRef idx="0">
+            <a:schemeClr val="accent2"/>
+          </a:effectRef>
+          <a:fontRef idx="minor">
+            <a:schemeClr val="tx1"/>
+          </a:fontRef>
+        </p:style>
+      </p:cxnSp>
+      <p:pic>
+        <p:nvPicPr>
+          <p:cNvPr id="8" name="Imagem 7"/>
+          <p:cNvPicPr>
+            <a:picLocks noChangeAspect="1"/>
+          </p:cNvPicPr>
+          <p:nvPr/>
+        </p:nvPicPr>
+        <p:blipFill>
+          <a:blip r:embed="rId3"/>
+          <a:stretch>
+            <a:fillRect/>
+          </a:stretch>
+        </p:blipFill>
+        <p:spPr>
+          <a:xfrm>
+            <a:off x="7110805" y="3937411"/>
+            <a:ext cx="2276475" cy="1647825"/>
+          </a:xfrm>
+          <a:prstGeom prst="rect">
+            <a:avLst/>
+          </a:prstGeom>
+        </p:spPr>
+      </p:pic>
+      <p:sp>
+        <p:nvSpPr>
+          <p:cNvPr id="9" name="CaixaDeTexto 8"/>
+          <p:cNvSpPr txBox="1"/>
+          <p:nvPr/>
+        </p:nvSpPr>
+        <p:spPr>
+          <a:xfrm>
+            <a:off x="1409251" y="6239435"/>
+            <a:ext cx="763793" cy="369332"/>
+          </a:xfrm>
+          <a:prstGeom prst="rect">
+            <a:avLst/>
+          </a:prstGeom>
+          <a:noFill/>
+        </p:spPr>
+        <p:txBody>
+          <a:bodyPr wrap="square" rtlCol="0">
+            <a:spAutoFit/>
+          </a:bodyPr>
+          <a:lstStyle/>
+          <a:p>
+            <a:r>
+              <a:rPr lang="pt-BR" dirty="0" smtClean="0"/>
+              <a:t>fig1</a:t>
+            </a:r>
+            <a:endParaRPr lang="pt-BR" dirty="0"/>
+          </a:p>
+        </p:txBody>
+      </p:sp>
+      <p:sp>
+        <p:nvSpPr>
+          <p:cNvPr id="12" name="CaixaDeTexto 11"/>
+          <p:cNvSpPr txBox="1"/>
+          <p:nvPr/>
+        </p:nvSpPr>
+        <p:spPr>
+          <a:xfrm>
+            <a:off x="7121562" y="5648800"/>
+            <a:ext cx="763793" cy="369332"/>
+          </a:xfrm>
+          <a:prstGeom prst="rect">
+            <a:avLst/>
+          </a:prstGeom>
+          <a:noFill/>
+        </p:spPr>
+        <p:txBody>
+          <a:bodyPr wrap="square" rtlCol="0">
+            <a:spAutoFit/>
+          </a:bodyPr>
+          <a:lstStyle/>
+          <a:p>
+            <a:r>
+              <a:rPr lang="pt-BR" dirty="0" smtClean="0"/>
+              <a:t>fig2</a:t>
+            </a:r>
+            <a:endParaRPr lang="pt-BR" dirty="0"/>
           </a:p>
         </p:txBody>
       </p:sp>
@@ -30120,10 +30393,112 @@
               <a:t>- Filtro por Cor , valor único ou intervalo de valores, texto, caracteres curingas ( * e  ? </a:t>
             </a:r>
             <a:r>
-              <a:rPr lang="pt-BR" sz="1800" smtClean="0">
+              <a:rPr lang="pt-BR" sz="1800" dirty="0" smtClean="0">
                 <a:latin typeface="Corbel" panose="020B0503020204020204" pitchFamily="34" charset="0"/>
               </a:rPr>
               <a:t>).</a:t>
+            </a:r>
+          </a:p>
+          <a:p>
+            <a:pPr marL="0" indent="0">
+              <a:buFont typeface="Arial" charset="0"/>
+              <a:buNone/>
+            </a:pPr>
+            <a:r>
+              <a:rPr lang="pt-BR" sz="1800" dirty="0">
+                <a:latin typeface="Corbel" panose="020B0503020204020204" pitchFamily="34" charset="0"/>
+              </a:rPr>
+              <a:t>	</a:t>
+            </a:r>
+            <a:r>
+              <a:rPr lang="pt-BR" sz="1800" dirty="0" smtClean="0">
+                <a:latin typeface="Corbel" panose="020B0503020204020204" pitchFamily="34" charset="0"/>
+              </a:rPr>
+              <a:t>-? &gt; “1 único” </a:t>
+            </a:r>
+            <a:r>
+              <a:rPr lang="pt-BR" sz="1800" dirty="0" err="1" smtClean="0">
+                <a:latin typeface="Corbel" panose="020B0503020204020204" pitchFamily="34" charset="0"/>
+              </a:rPr>
+              <a:t>caracter</a:t>
+            </a:r>
+            <a:r>
+              <a:rPr lang="pt-BR" sz="1800" dirty="0" smtClean="0">
+                <a:latin typeface="Corbel" panose="020B0503020204020204" pitchFamily="34" charset="0"/>
+              </a:rPr>
+              <a:t> qualquer</a:t>
+            </a:r>
+          </a:p>
+          <a:p>
+            <a:pPr marL="0" indent="0">
+              <a:buFont typeface="Arial" charset="0"/>
+              <a:buNone/>
+            </a:pPr>
+            <a:r>
+              <a:rPr lang="pt-BR" sz="1800" dirty="0">
+                <a:latin typeface="Corbel" panose="020B0503020204020204" pitchFamily="34" charset="0"/>
+              </a:rPr>
+              <a:t>	</a:t>
+            </a:r>
+            <a:r>
+              <a:rPr lang="pt-BR" sz="1800" dirty="0" smtClean="0">
+                <a:latin typeface="Corbel" panose="020B0503020204020204" pitchFamily="34" charset="0"/>
+              </a:rPr>
+              <a:t>-* &gt; qualquer coisa serve</a:t>
+            </a:r>
+          </a:p>
+          <a:p>
+            <a:pPr marL="0" indent="0">
+              <a:buFont typeface="Arial" charset="0"/>
+              <a:buNone/>
+            </a:pPr>
+            <a:r>
+              <a:rPr lang="pt-BR" sz="1800" dirty="0">
+                <a:latin typeface="Corbel" panose="020B0503020204020204" pitchFamily="34" charset="0"/>
+              </a:rPr>
+              <a:t>	</a:t>
+            </a:r>
+            <a:r>
+              <a:rPr lang="pt-BR" sz="1800" dirty="0" smtClean="0">
+                <a:latin typeface="Corbel" panose="020B0503020204020204" pitchFamily="34" charset="0"/>
+              </a:rPr>
+              <a:t>?p*  &gt; toda as palavras onde “p” esta na segunda posição</a:t>
+            </a:r>
+          </a:p>
+          <a:p>
+            <a:pPr marL="0" indent="0">
+              <a:buFont typeface="Arial" charset="0"/>
+              <a:buNone/>
+            </a:pPr>
+            <a:r>
+              <a:rPr lang="pt-BR" sz="1800" dirty="0">
+                <a:latin typeface="Corbel" panose="020B0503020204020204" pitchFamily="34" charset="0"/>
+              </a:rPr>
+              <a:t>	</a:t>
+            </a:r>
+            <a:r>
+              <a:rPr lang="pt-BR" sz="1800" dirty="0" err="1" smtClean="0">
+                <a:latin typeface="Corbel" panose="020B0503020204020204" pitchFamily="34" charset="0"/>
+              </a:rPr>
+              <a:t>Br</a:t>
+            </a:r>
+            <a:r>
+              <a:rPr lang="pt-BR" sz="1800" dirty="0" smtClean="0">
+                <a:latin typeface="Corbel" panose="020B0503020204020204" pitchFamily="34" charset="0"/>
+              </a:rPr>
+              <a:t>* &gt; todas as palavras que comecem com “</a:t>
+            </a:r>
+            <a:r>
+              <a:rPr lang="pt-BR" sz="1800" dirty="0" err="1" smtClean="0">
+                <a:latin typeface="Corbel" panose="020B0503020204020204" pitchFamily="34" charset="0"/>
+              </a:rPr>
+              <a:t>Br</a:t>
+            </a:r>
+            <a:r>
+              <a:rPr lang="pt-BR" sz="1800" dirty="0" smtClean="0">
+                <a:latin typeface="Corbel" panose="020B0503020204020204" pitchFamily="34" charset="0"/>
+              </a:rPr>
+              <a:t>”.</a:t>
             </a:r>
             <a:endParaRPr lang="pt-BR" sz="1800" dirty="0" smtClean="0">
               <a:latin typeface="Corbel" panose="020B0503020204020204" pitchFamily="34" charset="0"/>
@@ -30254,6 +30629,861 @@
 </file>
 
 <file path=ppt/slides/slide51.xml><?xml version="1.0" encoding="utf-8"?>
+<p:sld xmlns:a="http://schemas.openxmlformats.org/drawingml/2006/main" xmlns:r="http://schemas.openxmlformats.org/officeDocument/2006/relationships" xmlns:p="http://schemas.openxmlformats.org/presentationml/2006/main">
+  <p:cSld>
+    <p:spTree>
+      <p:nvGrpSpPr>
+        <p:cNvPr id="1" name=""/>
+        <p:cNvGrpSpPr/>
+        <p:nvPr/>
+      </p:nvGrpSpPr>
+      <p:grpSpPr>
+        <a:xfrm>
+          <a:off x="0" y="0"/>
+          <a:ext cx="0" cy="0"/>
+          <a:chOff x="0" y="0"/>
+          <a:chExt cx="0" cy="0"/>
+        </a:xfrm>
+      </p:grpSpPr>
+      <p:sp>
+        <p:nvSpPr>
+          <p:cNvPr id="6" name="Subtítulo 2"/>
+          <p:cNvSpPr txBox="1">
+            <a:spLocks/>
+          </p:cNvSpPr>
+          <p:nvPr/>
+        </p:nvSpPr>
+        <p:spPr>
+          <a:xfrm>
+            <a:off x="210670" y="153054"/>
+            <a:ext cx="10058400" cy="718315"/>
+          </a:xfrm>
+        </p:spPr>
+        <p:txBody>
+          <a:bodyPr>
+            <a:noAutofit/>
+          </a:bodyPr>
+          <a:lstStyle>
+            <a:lvl1pPr marL="342900" indent="-342900" algn="l" rtl="0" eaLnBrk="0" fontAlgn="base" hangingPunct="0">
+              <a:spcBef>
+                <a:spcPct val="20000"/>
+              </a:spcBef>
+              <a:spcAft>
+                <a:spcPct val="0"/>
+              </a:spcAft>
+              <a:buFont typeface="Arial" charset="0"/>
+              <a:buChar char="•"/>
+              <a:defRPr lang="pt-BR" sz="2800" kern="1200" dirty="0">
+                <a:solidFill>
+                  <a:schemeClr val="tx1"/>
+                </a:solidFill>
+                <a:latin typeface="+mn-lt"/>
+                <a:ea typeface="+mn-ea"/>
+                <a:cs typeface="+mn-cs"/>
+              </a:defRPr>
+            </a:lvl1pPr>
+            <a:lvl2pPr marL="742950" indent="-285750" algn="l" rtl="0" eaLnBrk="0" fontAlgn="base" hangingPunct="0">
+              <a:spcBef>
+                <a:spcPct val="20000"/>
+              </a:spcBef>
+              <a:spcAft>
+                <a:spcPct val="0"/>
+              </a:spcAft>
+              <a:buFont typeface="Arial" charset="0"/>
+              <a:buChar char="•"/>
+              <a:defRPr lang="pt-BR" sz="2400" kern="1200" dirty="0">
+                <a:solidFill>
+                  <a:schemeClr val="tx1"/>
+                </a:solidFill>
+                <a:latin typeface="+mn-lt"/>
+                <a:ea typeface="+mn-ea"/>
+                <a:cs typeface="+mn-cs"/>
+              </a:defRPr>
+            </a:lvl2pPr>
+            <a:lvl3pPr marL="1143000" indent="-228600" algn="l" rtl="0" eaLnBrk="0" fontAlgn="base" hangingPunct="0">
+              <a:spcBef>
+                <a:spcPct val="20000"/>
+              </a:spcBef>
+              <a:spcAft>
+                <a:spcPct val="0"/>
+              </a:spcAft>
+              <a:buFont typeface="Arial" charset="0"/>
+              <a:buChar char="•"/>
+              <a:defRPr lang="pt-BR" sz="2400" kern="1200" dirty="0">
+                <a:solidFill>
+                  <a:schemeClr val="tx1"/>
+                </a:solidFill>
+                <a:latin typeface="+mn-lt"/>
+                <a:ea typeface="+mn-ea"/>
+                <a:cs typeface="+mn-cs"/>
+              </a:defRPr>
+            </a:lvl3pPr>
+            <a:lvl4pPr marL="1600200" indent="-228600" algn="l" rtl="0" eaLnBrk="0" fontAlgn="base" hangingPunct="0">
+              <a:spcBef>
+                <a:spcPct val="20000"/>
+              </a:spcBef>
+              <a:spcAft>
+                <a:spcPct val="0"/>
+              </a:spcAft>
+              <a:buFont typeface="Arial" charset="0"/>
+              <a:buChar char="•"/>
+              <a:defRPr lang="pt-BR" sz="2000" kern="1200" dirty="0">
+                <a:solidFill>
+                  <a:schemeClr val="tx1"/>
+                </a:solidFill>
+                <a:latin typeface="+mn-lt"/>
+                <a:ea typeface="+mn-ea"/>
+                <a:cs typeface="+mn-cs"/>
+              </a:defRPr>
+            </a:lvl4pPr>
+            <a:lvl5pPr marL="2057400" indent="-228600" algn="l" rtl="0" eaLnBrk="0" fontAlgn="base" hangingPunct="0">
+              <a:spcBef>
+                <a:spcPct val="20000"/>
+              </a:spcBef>
+              <a:spcAft>
+                <a:spcPct val="0"/>
+              </a:spcAft>
+              <a:buFont typeface="Arial" charset="0"/>
+              <a:buChar char="•"/>
+              <a:defRPr lang="pt-BR" sz="2000" kern="1200" dirty="0">
+                <a:solidFill>
+                  <a:schemeClr val="tx1"/>
+                </a:solidFill>
+                <a:latin typeface="+mn-lt"/>
+                <a:ea typeface="+mn-ea"/>
+                <a:cs typeface="+mn-cs"/>
+              </a:defRPr>
+            </a:lvl5pPr>
+            <a:lvl6pPr marL="2514600" indent="-228600" algn="l" defTabSz="914400" rtl="0" eaLnBrk="1" latinLnBrk="0" hangingPunct="1">
+              <a:spcBef>
+                <a:spcPct val="20000"/>
+              </a:spcBef>
+              <a:buFont typeface="Arial" pitchFamily="34" charset="0"/>
+              <a:buChar char="•"/>
+              <a:defRPr sz="2000" kern="1200">
+                <a:solidFill>
+                  <a:schemeClr val="tx1"/>
+                </a:solidFill>
+                <a:latin typeface="+mn-lt"/>
+                <a:ea typeface="+mn-ea"/>
+                <a:cs typeface="+mn-cs"/>
+              </a:defRPr>
+            </a:lvl6pPr>
+            <a:lvl7pPr marL="2971800" indent="-228600" algn="l" defTabSz="914400" rtl="0" eaLnBrk="1" latinLnBrk="0" hangingPunct="1">
+              <a:spcBef>
+                <a:spcPct val="20000"/>
+              </a:spcBef>
+              <a:buFont typeface="Arial" pitchFamily="34" charset="0"/>
+              <a:buChar char="•"/>
+              <a:defRPr sz="2000" kern="1200">
+                <a:solidFill>
+                  <a:schemeClr val="tx1"/>
+                </a:solidFill>
+                <a:latin typeface="+mn-lt"/>
+                <a:ea typeface="+mn-ea"/>
+                <a:cs typeface="+mn-cs"/>
+              </a:defRPr>
+            </a:lvl7pPr>
+            <a:lvl8pPr marL="3429000" indent="-228600" algn="l" defTabSz="914400" rtl="0" eaLnBrk="1" latinLnBrk="0" hangingPunct="1">
+              <a:spcBef>
+                <a:spcPct val="20000"/>
+              </a:spcBef>
+              <a:buFont typeface="Arial" pitchFamily="34" charset="0"/>
+              <a:buChar char="•"/>
+              <a:defRPr sz="2000" kern="1200">
+                <a:solidFill>
+                  <a:schemeClr val="tx1"/>
+                </a:solidFill>
+                <a:latin typeface="+mn-lt"/>
+                <a:ea typeface="+mn-ea"/>
+                <a:cs typeface="+mn-cs"/>
+              </a:defRPr>
+            </a:lvl8pPr>
+            <a:lvl9pPr marL="3886200" indent="-228600" algn="l" defTabSz="914400" rtl="0" eaLnBrk="1" latinLnBrk="0" hangingPunct="1">
+              <a:spcBef>
+                <a:spcPct val="20000"/>
+              </a:spcBef>
+              <a:buFont typeface="Arial" pitchFamily="34" charset="0"/>
+              <a:buChar char="•"/>
+              <a:defRPr sz="2000" kern="1200">
+                <a:solidFill>
+                  <a:schemeClr val="tx1"/>
+                </a:solidFill>
+                <a:latin typeface="+mn-lt"/>
+                <a:ea typeface="+mn-ea"/>
+                <a:cs typeface="+mn-cs"/>
+              </a:defRPr>
+            </a:lvl9pPr>
+          </a:lstStyle>
+          <a:p>
+            <a:pPr marL="0" indent="0">
+              <a:lnSpc>
+                <a:spcPct val="150000"/>
+              </a:lnSpc>
+              <a:buFont typeface="Arial" charset="0"/>
+              <a:buNone/>
+            </a:pPr>
+            <a:r>
+              <a:rPr lang="pt-BR" sz="2400" b="1" dirty="0" smtClean="0">
+                <a:solidFill>
+                  <a:schemeClr val="accent6">
+                    <a:lumMod val="75000"/>
+                  </a:schemeClr>
+                </a:solidFill>
+                <a:latin typeface="Corbel" panose="020B0503020204020204" pitchFamily="34" charset="0"/>
+              </a:rPr>
+              <a:t>Comandos com Listas -  </a:t>
+            </a:r>
+            <a:r>
+              <a:rPr lang="pt-BR" sz="2400" b="1" dirty="0" smtClean="0">
+                <a:solidFill>
+                  <a:schemeClr val="accent6">
+                    <a:lumMod val="75000"/>
+                  </a:schemeClr>
+                </a:solidFill>
+                <a:latin typeface="Corbel" panose="020B0503020204020204" pitchFamily="34" charset="0"/>
+              </a:rPr>
+              <a:t>Subtotal</a:t>
+            </a:r>
+            <a:endParaRPr lang="pt-BR" sz="2400" b="1" dirty="0" smtClean="0">
+              <a:solidFill>
+                <a:schemeClr val="accent6">
+                  <a:lumMod val="75000"/>
+                </a:schemeClr>
+              </a:solidFill>
+              <a:latin typeface="Corbel" panose="020B0503020204020204" pitchFamily="34" charset="0"/>
+            </a:endParaRPr>
+          </a:p>
+        </p:txBody>
+      </p:sp>
+      <p:sp>
+        <p:nvSpPr>
+          <p:cNvPr id="11" name="Subtítulo 1"/>
+          <p:cNvSpPr txBox="1">
+            <a:spLocks/>
+          </p:cNvSpPr>
+          <p:nvPr/>
+        </p:nvSpPr>
+        <p:spPr>
+          <a:xfrm>
+            <a:off x="327211" y="988637"/>
+            <a:ext cx="10896600" cy="2817812"/>
+          </a:xfrm>
+        </p:spPr>
+        <p:txBody>
+          <a:bodyPr>
+            <a:noAutofit/>
+          </a:bodyPr>
+          <a:lstStyle>
+            <a:lvl1pPr marL="342900" indent="-342900" algn="l" rtl="0" eaLnBrk="0" fontAlgn="base" hangingPunct="0">
+              <a:spcBef>
+                <a:spcPct val="20000"/>
+              </a:spcBef>
+              <a:spcAft>
+                <a:spcPct val="0"/>
+              </a:spcAft>
+              <a:buFont typeface="Arial" charset="0"/>
+              <a:buChar char="•"/>
+              <a:defRPr lang="pt-BR" sz="2800" kern="1200" dirty="0">
+                <a:solidFill>
+                  <a:schemeClr val="tx1"/>
+                </a:solidFill>
+                <a:latin typeface="+mn-lt"/>
+                <a:ea typeface="+mn-ea"/>
+                <a:cs typeface="+mn-cs"/>
+              </a:defRPr>
+            </a:lvl1pPr>
+            <a:lvl2pPr marL="742950" indent="-285750" algn="l" rtl="0" eaLnBrk="0" fontAlgn="base" hangingPunct="0">
+              <a:spcBef>
+                <a:spcPct val="20000"/>
+              </a:spcBef>
+              <a:spcAft>
+                <a:spcPct val="0"/>
+              </a:spcAft>
+              <a:buFont typeface="Arial" charset="0"/>
+              <a:buChar char="•"/>
+              <a:defRPr lang="pt-BR" sz="2400" kern="1200" dirty="0">
+                <a:solidFill>
+                  <a:schemeClr val="tx1"/>
+                </a:solidFill>
+                <a:latin typeface="+mn-lt"/>
+                <a:ea typeface="+mn-ea"/>
+                <a:cs typeface="+mn-cs"/>
+              </a:defRPr>
+            </a:lvl2pPr>
+            <a:lvl3pPr marL="1143000" indent="-228600" algn="l" rtl="0" eaLnBrk="0" fontAlgn="base" hangingPunct="0">
+              <a:spcBef>
+                <a:spcPct val="20000"/>
+              </a:spcBef>
+              <a:spcAft>
+                <a:spcPct val="0"/>
+              </a:spcAft>
+              <a:buFont typeface="Arial" charset="0"/>
+              <a:buChar char="•"/>
+              <a:defRPr lang="pt-BR" sz="2400" kern="1200" dirty="0">
+                <a:solidFill>
+                  <a:schemeClr val="tx1"/>
+                </a:solidFill>
+                <a:latin typeface="+mn-lt"/>
+                <a:ea typeface="+mn-ea"/>
+                <a:cs typeface="+mn-cs"/>
+              </a:defRPr>
+            </a:lvl3pPr>
+            <a:lvl4pPr marL="1600200" indent="-228600" algn="l" rtl="0" eaLnBrk="0" fontAlgn="base" hangingPunct="0">
+              <a:spcBef>
+                <a:spcPct val="20000"/>
+              </a:spcBef>
+              <a:spcAft>
+                <a:spcPct val="0"/>
+              </a:spcAft>
+              <a:buFont typeface="Arial" charset="0"/>
+              <a:buChar char="•"/>
+              <a:defRPr lang="pt-BR" sz="2000" kern="1200" dirty="0">
+                <a:solidFill>
+                  <a:schemeClr val="tx1"/>
+                </a:solidFill>
+                <a:latin typeface="+mn-lt"/>
+                <a:ea typeface="+mn-ea"/>
+                <a:cs typeface="+mn-cs"/>
+              </a:defRPr>
+            </a:lvl4pPr>
+            <a:lvl5pPr marL="2057400" indent="-228600" algn="l" rtl="0" eaLnBrk="0" fontAlgn="base" hangingPunct="0">
+              <a:spcBef>
+                <a:spcPct val="20000"/>
+              </a:spcBef>
+              <a:spcAft>
+                <a:spcPct val="0"/>
+              </a:spcAft>
+              <a:buFont typeface="Arial" charset="0"/>
+              <a:buChar char="•"/>
+              <a:defRPr lang="pt-BR" sz="2000" kern="1200" dirty="0">
+                <a:solidFill>
+                  <a:schemeClr val="tx1"/>
+                </a:solidFill>
+                <a:latin typeface="+mn-lt"/>
+                <a:ea typeface="+mn-ea"/>
+                <a:cs typeface="+mn-cs"/>
+              </a:defRPr>
+            </a:lvl5pPr>
+            <a:lvl6pPr marL="2514600" indent="-228600" algn="l" defTabSz="914400" rtl="0" eaLnBrk="1" latinLnBrk="0" hangingPunct="1">
+              <a:spcBef>
+                <a:spcPct val="20000"/>
+              </a:spcBef>
+              <a:buFont typeface="Arial" pitchFamily="34" charset="0"/>
+              <a:buChar char="•"/>
+              <a:defRPr sz="2000" kern="1200">
+                <a:solidFill>
+                  <a:schemeClr val="tx1"/>
+                </a:solidFill>
+                <a:latin typeface="+mn-lt"/>
+                <a:ea typeface="+mn-ea"/>
+                <a:cs typeface="+mn-cs"/>
+              </a:defRPr>
+            </a:lvl6pPr>
+            <a:lvl7pPr marL="2971800" indent="-228600" algn="l" defTabSz="914400" rtl="0" eaLnBrk="1" latinLnBrk="0" hangingPunct="1">
+              <a:spcBef>
+                <a:spcPct val="20000"/>
+              </a:spcBef>
+              <a:buFont typeface="Arial" pitchFamily="34" charset="0"/>
+              <a:buChar char="•"/>
+              <a:defRPr sz="2000" kern="1200">
+                <a:solidFill>
+                  <a:schemeClr val="tx1"/>
+                </a:solidFill>
+                <a:latin typeface="+mn-lt"/>
+                <a:ea typeface="+mn-ea"/>
+                <a:cs typeface="+mn-cs"/>
+              </a:defRPr>
+            </a:lvl7pPr>
+            <a:lvl8pPr marL="3429000" indent="-228600" algn="l" defTabSz="914400" rtl="0" eaLnBrk="1" latinLnBrk="0" hangingPunct="1">
+              <a:spcBef>
+                <a:spcPct val="20000"/>
+              </a:spcBef>
+              <a:buFont typeface="Arial" pitchFamily="34" charset="0"/>
+              <a:buChar char="•"/>
+              <a:defRPr sz="2000" kern="1200">
+                <a:solidFill>
+                  <a:schemeClr val="tx1"/>
+                </a:solidFill>
+                <a:latin typeface="+mn-lt"/>
+                <a:ea typeface="+mn-ea"/>
+                <a:cs typeface="+mn-cs"/>
+              </a:defRPr>
+            </a:lvl8pPr>
+            <a:lvl9pPr marL="3886200" indent="-228600" algn="l" defTabSz="914400" rtl="0" eaLnBrk="1" latinLnBrk="0" hangingPunct="1">
+              <a:spcBef>
+                <a:spcPct val="20000"/>
+              </a:spcBef>
+              <a:buFont typeface="Arial" pitchFamily="34" charset="0"/>
+              <a:buChar char="•"/>
+              <a:defRPr sz="2000" kern="1200">
+                <a:solidFill>
+                  <a:schemeClr val="tx1"/>
+                </a:solidFill>
+                <a:latin typeface="+mn-lt"/>
+                <a:ea typeface="+mn-ea"/>
+                <a:cs typeface="+mn-cs"/>
+              </a:defRPr>
+            </a:lvl9pPr>
+          </a:lstStyle>
+          <a:p>
+            <a:pPr marL="0" indent="0">
+              <a:buFont typeface="Arial" charset="0"/>
+              <a:buNone/>
+            </a:pPr>
+            <a:r>
+              <a:rPr lang="pt-BR" sz="1800" dirty="0" smtClean="0">
+                <a:latin typeface="Corbel" panose="020B0503020204020204" pitchFamily="34" charset="0"/>
+              </a:rPr>
+              <a:t>Capaz de gerar em segundos um relatório resumindo uma operação (soma, media, contagem) em cada alteração do valor das linhas (</a:t>
+            </a:r>
+            <a:r>
+              <a:rPr lang="pt-BR" sz="1800" dirty="0" err="1" smtClean="0">
+                <a:latin typeface="Corbel" panose="020B0503020204020204" pitchFamily="34" charset="0"/>
+              </a:rPr>
+              <a:t>fig</a:t>
+            </a:r>
+            <a:r>
+              <a:rPr lang="pt-BR" sz="1800" dirty="0" smtClean="0">
+                <a:latin typeface="Corbel" panose="020B0503020204020204" pitchFamily="34" charset="0"/>
+              </a:rPr>
+              <a:t> 1).</a:t>
+            </a:r>
+          </a:p>
+          <a:p>
+            <a:pPr marL="0" indent="0">
+              <a:buFont typeface="Arial" charset="0"/>
+              <a:buNone/>
+            </a:pPr>
+            <a:r>
+              <a:rPr lang="pt-BR" sz="1800" dirty="0" smtClean="0">
+                <a:latin typeface="Corbel" panose="020B0503020204020204" pitchFamily="34" charset="0"/>
+              </a:rPr>
+              <a:t>Caminho:</a:t>
+            </a:r>
+          </a:p>
+          <a:p>
+            <a:pPr marL="0" indent="0">
+              <a:buFont typeface="Arial" charset="0"/>
+              <a:buNone/>
+            </a:pPr>
+            <a:r>
+              <a:rPr lang="pt-BR" sz="1800" dirty="0" smtClean="0">
+                <a:latin typeface="Corbel" panose="020B0503020204020204" pitchFamily="34" charset="0"/>
+              </a:rPr>
+              <a:t>Selecionar Lista (</a:t>
+            </a:r>
+            <a:r>
+              <a:rPr lang="pt-BR" sz="1800" dirty="0" err="1" smtClean="0">
+                <a:latin typeface="Corbel" panose="020B0503020204020204" pitchFamily="34" charset="0"/>
+              </a:rPr>
+              <a:t>ctrl</a:t>
+            </a:r>
+            <a:r>
+              <a:rPr lang="pt-BR" sz="1800" dirty="0" smtClean="0">
+                <a:latin typeface="Corbel" panose="020B0503020204020204" pitchFamily="34" charset="0"/>
+              </a:rPr>
+              <a:t> +</a:t>
+            </a:r>
+            <a:r>
+              <a:rPr lang="pt-BR" sz="1800" dirty="0" err="1" smtClean="0">
+                <a:latin typeface="Corbel" panose="020B0503020204020204" pitchFamily="34" charset="0"/>
+              </a:rPr>
+              <a:t>Shit</a:t>
+            </a:r>
+            <a:r>
+              <a:rPr lang="pt-BR" sz="1800" dirty="0" smtClean="0">
+                <a:latin typeface="Corbel" panose="020B0503020204020204" pitchFamily="34" charset="0"/>
+              </a:rPr>
+              <a:t> +barra de espaço), Guia Dados, grupo Estrutura de Tópicos, Comando Subtotal</a:t>
+            </a:r>
+          </a:p>
+          <a:p>
+            <a:pPr marL="0" indent="0">
+              <a:buFont typeface="Arial" charset="0"/>
+              <a:buNone/>
+            </a:pPr>
+            <a:endParaRPr lang="pt-BR" sz="1800" dirty="0">
+              <a:latin typeface="Corbel" panose="020B0503020204020204" pitchFamily="34" charset="0"/>
+            </a:endParaRPr>
+          </a:p>
+          <a:p>
+            <a:pPr marL="0" indent="0">
+              <a:buFont typeface="Arial" charset="0"/>
+              <a:buNone/>
+            </a:pPr>
+            <a:r>
+              <a:rPr lang="pt-BR" sz="1800" dirty="0" smtClean="0">
+                <a:solidFill>
+                  <a:srgbClr val="FF0000"/>
+                </a:solidFill>
+                <a:latin typeface="Corbel" panose="020B0503020204020204" pitchFamily="34" charset="0"/>
+              </a:rPr>
+              <a:t>CUIDADO</a:t>
+            </a:r>
+            <a:r>
+              <a:rPr lang="pt-BR" sz="1800" dirty="0" smtClean="0">
+                <a:solidFill>
+                  <a:srgbClr val="FF0000"/>
+                </a:solidFill>
+                <a:latin typeface="Corbel" panose="020B0503020204020204" pitchFamily="34" charset="0"/>
+              </a:rPr>
+              <a:t>: </a:t>
+            </a:r>
+            <a:r>
+              <a:rPr lang="pt-BR" sz="1800" dirty="0" smtClean="0">
+                <a:latin typeface="Corbel" panose="020B0503020204020204" pitchFamily="34" charset="0"/>
+              </a:rPr>
+              <a:t>Use esse comando somente APÓS usar o comando de classificaç</a:t>
+            </a:r>
+            <a:r>
+              <a:rPr lang="pt-BR" sz="1800" dirty="0" smtClean="0">
+                <a:latin typeface="Corbel" panose="020B0503020204020204" pitchFamily="34" charset="0"/>
+              </a:rPr>
+              <a:t>ão</a:t>
+            </a:r>
+            <a:endParaRPr lang="pt-BR" sz="1800" dirty="0" smtClean="0">
+              <a:latin typeface="Corbel" panose="020B0503020204020204" pitchFamily="34" charset="0"/>
+            </a:endParaRPr>
+          </a:p>
+          <a:p>
+            <a:pPr marL="0" indent="0">
+              <a:buFont typeface="Arial" charset="0"/>
+              <a:buNone/>
+            </a:pPr>
+            <a:endParaRPr lang="pt-BR" sz="1800" dirty="0">
+              <a:latin typeface="Corbel" panose="020B0503020204020204" pitchFamily="34" charset="0"/>
+            </a:endParaRPr>
+          </a:p>
+          <a:p>
+            <a:pPr marL="0" indent="0">
+              <a:buFont typeface="Arial" charset="0"/>
+              <a:buNone/>
+            </a:pPr>
+            <a:endParaRPr lang="pt-BR" sz="1800" dirty="0" smtClean="0">
+              <a:latin typeface="Corbel" panose="020B0503020204020204" pitchFamily="34" charset="0"/>
+            </a:endParaRPr>
+          </a:p>
+          <a:p>
+            <a:pPr marL="0" indent="0">
+              <a:buFont typeface="Arial" charset="0"/>
+              <a:buNone/>
+            </a:pPr>
+            <a:endParaRPr lang="pt-BR" sz="1800" dirty="0" smtClean="0">
+              <a:latin typeface="Corbel" panose="020B0503020204020204" pitchFamily="34" charset="0"/>
+            </a:endParaRPr>
+          </a:p>
+        </p:txBody>
+      </p:sp>
+      <p:pic>
+        <p:nvPicPr>
+          <p:cNvPr id="2" name="Imagem 1"/>
+          <p:cNvPicPr>
+            <a:picLocks noChangeAspect="1"/>
+          </p:cNvPicPr>
+          <p:nvPr/>
+        </p:nvPicPr>
+        <p:blipFill>
+          <a:blip r:embed="rId2"/>
+          <a:stretch>
+            <a:fillRect/>
+          </a:stretch>
+        </p:blipFill>
+        <p:spPr>
+          <a:xfrm>
+            <a:off x="729783" y="3276319"/>
+            <a:ext cx="2771775" cy="3209925"/>
+          </a:xfrm>
+          <a:prstGeom prst="rect">
+            <a:avLst/>
+          </a:prstGeom>
+        </p:spPr>
+      </p:pic>
+      <p:sp>
+        <p:nvSpPr>
+          <p:cNvPr id="3" name="Texto Explicativo Retangular com Cantos Arredondados 2"/>
+          <p:cNvSpPr/>
+          <p:nvPr/>
+        </p:nvSpPr>
+        <p:spPr>
+          <a:xfrm>
+            <a:off x="4388223" y="3276319"/>
+            <a:ext cx="1463937" cy="2371446"/>
+          </a:xfrm>
+          <a:prstGeom prst="wedgeRoundRectCallout">
+            <a:avLst>
+              <a:gd name="adj1" fmla="val -111115"/>
+              <a:gd name="adj2" fmla="val -6683"/>
+              <a:gd name="adj3" fmla="val 16667"/>
+            </a:avLst>
+          </a:prstGeom>
+        </p:spPr>
+        <p:style>
+          <a:lnRef idx="2">
+            <a:schemeClr val="accent1">
+              <a:shade val="50000"/>
+            </a:schemeClr>
+          </a:lnRef>
+          <a:fillRef idx="1">
+            <a:schemeClr val="accent1"/>
+          </a:fillRef>
+          <a:effectRef idx="0">
+            <a:schemeClr val="accent1"/>
+          </a:effectRef>
+          <a:fontRef idx="minor">
+            <a:schemeClr val="lt1"/>
+          </a:fontRef>
+        </p:style>
+        <p:txBody>
+          <a:bodyPr rtlCol="0" anchor="ctr"/>
+          <a:lstStyle/>
+          <a:p>
+            <a:pPr algn="ctr"/>
+            <a:r>
+              <a:rPr lang="pt-BR" sz="1200" dirty="0" smtClean="0"/>
+              <a:t>Toda vez que tiver alteração na Coluna “Empresa” o Excel vai usar a função Soma nas coluna “Mai”, “</a:t>
+            </a:r>
+            <a:r>
+              <a:rPr lang="pt-BR" sz="1200" dirty="0" err="1" smtClean="0"/>
+              <a:t>Jun</a:t>
+            </a:r>
+            <a:r>
+              <a:rPr lang="pt-BR" sz="1200" dirty="0" smtClean="0"/>
+              <a:t>”, “</a:t>
+            </a:r>
+            <a:r>
+              <a:rPr lang="pt-BR" sz="1200" dirty="0" err="1" smtClean="0"/>
+              <a:t>Ago</a:t>
+            </a:r>
+            <a:r>
+              <a:rPr lang="pt-BR" sz="1200" dirty="0" smtClean="0"/>
+              <a:t>” e “Set”.</a:t>
+            </a:r>
+            <a:endParaRPr lang="pt-BR" sz="1200" dirty="0"/>
+          </a:p>
+        </p:txBody>
+      </p:sp>
+      <p:pic>
+        <p:nvPicPr>
+          <p:cNvPr id="5" name="Imagem 4"/>
+          <p:cNvPicPr>
+            <a:picLocks noChangeAspect="1"/>
+          </p:cNvPicPr>
+          <p:nvPr/>
+        </p:nvPicPr>
+        <p:blipFill>
+          <a:blip r:embed="rId3"/>
+          <a:stretch>
+            <a:fillRect/>
+          </a:stretch>
+        </p:blipFill>
+        <p:spPr>
+          <a:xfrm>
+            <a:off x="6256187" y="3142084"/>
+            <a:ext cx="3205505" cy="1056682"/>
+          </a:xfrm>
+          <a:prstGeom prst="rect">
+            <a:avLst/>
+          </a:prstGeom>
+        </p:spPr>
+      </p:pic>
+      <p:pic>
+        <p:nvPicPr>
+          <p:cNvPr id="7" name="Imagem 6"/>
+          <p:cNvPicPr>
+            <a:picLocks noChangeAspect="1"/>
+          </p:cNvPicPr>
+          <p:nvPr/>
+        </p:nvPicPr>
+        <p:blipFill>
+          <a:blip r:embed="rId4"/>
+          <a:stretch>
+            <a:fillRect/>
+          </a:stretch>
+        </p:blipFill>
+        <p:spPr>
+          <a:xfrm>
+            <a:off x="6256187" y="5038165"/>
+            <a:ext cx="4886325" cy="1219200"/>
+          </a:xfrm>
+          <a:prstGeom prst="rect">
+            <a:avLst/>
+          </a:prstGeom>
+        </p:spPr>
+      </p:pic>
+      <p:sp>
+        <p:nvSpPr>
+          <p:cNvPr id="8" name="Seta para Baixo 7"/>
+          <p:cNvSpPr/>
+          <p:nvPr/>
+        </p:nvSpPr>
+        <p:spPr>
+          <a:xfrm>
+            <a:off x="7498080" y="4313816"/>
+            <a:ext cx="462579" cy="567465"/>
+          </a:xfrm>
+          <a:prstGeom prst="downArrow">
+            <a:avLst/>
+          </a:prstGeom>
+        </p:spPr>
+        <p:style>
+          <a:lnRef idx="2">
+            <a:schemeClr val="accent1">
+              <a:shade val="50000"/>
+            </a:schemeClr>
+          </a:lnRef>
+          <a:fillRef idx="1">
+            <a:schemeClr val="accent1"/>
+          </a:fillRef>
+          <a:effectRef idx="0">
+            <a:schemeClr val="accent1"/>
+          </a:effectRef>
+          <a:fontRef idx="minor">
+            <a:schemeClr val="lt1"/>
+          </a:fontRef>
+        </p:style>
+        <p:txBody>
+          <a:bodyPr rtlCol="0" anchor="ctr"/>
+          <a:lstStyle/>
+          <a:p>
+            <a:pPr algn="ctr"/>
+            <a:endParaRPr lang="pt-BR"/>
+          </a:p>
+        </p:txBody>
+      </p:sp>
+      <p:sp>
+        <p:nvSpPr>
+          <p:cNvPr id="9" name="Retângulo 8"/>
+          <p:cNvSpPr/>
+          <p:nvPr/>
+        </p:nvSpPr>
+        <p:spPr>
+          <a:xfrm>
+            <a:off x="8229600" y="4442908"/>
+            <a:ext cx="3872753" cy="438373"/>
+          </a:xfrm>
+          <a:prstGeom prst="rect">
+            <a:avLst/>
+          </a:prstGeom>
+        </p:spPr>
+        <p:style>
+          <a:lnRef idx="2">
+            <a:schemeClr val="accent1">
+              <a:shade val="50000"/>
+            </a:schemeClr>
+          </a:lnRef>
+          <a:fillRef idx="1">
+            <a:schemeClr val="accent1"/>
+          </a:fillRef>
+          <a:effectRef idx="0">
+            <a:schemeClr val="accent1"/>
+          </a:effectRef>
+          <a:fontRef idx="minor">
+            <a:schemeClr val="lt1"/>
+          </a:fontRef>
+        </p:style>
+        <p:txBody>
+          <a:bodyPr rtlCol="0" anchor="ctr"/>
+          <a:lstStyle/>
+          <a:p>
+            <a:pPr algn="ctr"/>
+            <a:r>
+              <a:rPr lang="pt-BR" sz="1000" dirty="0" smtClean="0"/>
+              <a:t>Excel inseriu uma linha (Banco do Vale Total) com a Soma (4000+2073) no local onde houve alteração (De Banco do Vale para Bradesco)</a:t>
+            </a:r>
+            <a:endParaRPr lang="pt-BR" sz="1000" dirty="0"/>
+          </a:p>
+        </p:txBody>
+      </p:sp>
+      <p:cxnSp>
+        <p:nvCxnSpPr>
+          <p:cNvPr id="12" name="Conector Angulado 11"/>
+          <p:cNvCxnSpPr/>
+          <p:nvPr/>
+        </p:nvCxnSpPr>
+        <p:spPr>
+          <a:xfrm>
+            <a:off x="6056554" y="3863978"/>
+            <a:ext cx="4840942" cy="491672"/>
+          </a:xfrm>
+          <a:prstGeom prst="bentConnector3">
+            <a:avLst>
+              <a:gd name="adj1" fmla="val 100000"/>
+            </a:avLst>
+          </a:prstGeom>
+          <a:ln w="25400">
+            <a:solidFill>
+              <a:srgbClr val="FF0000"/>
+            </a:solidFill>
+            <a:tailEnd type="triangle"/>
+          </a:ln>
+        </p:spPr>
+        <p:style>
+          <a:lnRef idx="1">
+            <a:schemeClr val="accent1"/>
+          </a:lnRef>
+          <a:fillRef idx="0">
+            <a:schemeClr val="accent1"/>
+          </a:fillRef>
+          <a:effectRef idx="0">
+            <a:schemeClr val="accent1"/>
+          </a:effectRef>
+          <a:fontRef idx="minor">
+            <a:schemeClr val="tx1"/>
+          </a:fontRef>
+        </p:style>
+      </p:cxnSp>
+      <p:sp>
+        <p:nvSpPr>
+          <p:cNvPr id="20" name="CaixaDeTexto 19"/>
+          <p:cNvSpPr txBox="1"/>
+          <p:nvPr/>
+        </p:nvSpPr>
+        <p:spPr>
+          <a:xfrm>
+            <a:off x="6433073" y="6301578"/>
+            <a:ext cx="570155" cy="369332"/>
+          </a:xfrm>
+          <a:prstGeom prst="rect">
+            <a:avLst/>
+          </a:prstGeom>
+          <a:noFill/>
+        </p:spPr>
+        <p:txBody>
+          <a:bodyPr wrap="square" rtlCol="0">
+            <a:spAutoFit/>
+          </a:bodyPr>
+          <a:lstStyle/>
+          <a:p>
+            <a:r>
+              <a:rPr lang="pt-BR" dirty="0" smtClean="0"/>
+              <a:t>fig1</a:t>
+            </a:r>
+            <a:endParaRPr lang="pt-BR" dirty="0"/>
+          </a:p>
+        </p:txBody>
+      </p:sp>
+    </p:spTree>
+    <p:extLst>
+      <p:ext uri="{BB962C8B-B14F-4D97-AF65-F5344CB8AC3E}">
+        <p14:creationId xmlns:p14="http://schemas.microsoft.com/office/powerpoint/2010/main" val="3942402686"/>
+      </p:ext>
+    </p:extLst>
+  </p:cSld>
+  <p:clrMapOvr>
+    <a:masterClrMapping/>
+  </p:clrMapOvr>
+  <p:timing>
+    <p:tnLst>
+      <p:par>
+        <p:cTn id="1" dur="indefinite" restart="never" nodeType="tmRoot"/>
+      </p:par>
+    </p:tnLst>
+  </p:timing>
+</p:sld>
+</file>
+
+<file path=ppt/slides/slide52.xml><?xml version="1.0" encoding="utf-8"?>
 <p:sld xmlns:a="http://schemas.openxmlformats.org/drawingml/2006/main" xmlns:r="http://schemas.openxmlformats.org/officeDocument/2006/relationships" xmlns:p="http://schemas.openxmlformats.org/presentationml/2006/main">
   <p:cSld>
     <p:spTree>
@@ -30967,7 +32197,637 @@
 </p:sld>
 </file>
 
-<file path=ppt/slides/slide52.xml><?xml version="1.0" encoding="utf-8"?>
+<file path=ppt/slides/slide53.xml><?xml version="1.0" encoding="utf-8"?>
+<p:sld xmlns:a="http://schemas.openxmlformats.org/drawingml/2006/main" xmlns:r="http://schemas.openxmlformats.org/officeDocument/2006/relationships" xmlns:p="http://schemas.openxmlformats.org/presentationml/2006/main">
+  <p:cSld>
+    <p:spTree>
+      <p:nvGrpSpPr>
+        <p:cNvPr id="1" name=""/>
+        <p:cNvGrpSpPr/>
+        <p:nvPr/>
+      </p:nvGrpSpPr>
+      <p:grpSpPr>
+        <a:xfrm>
+          <a:off x="0" y="0"/>
+          <a:ext cx="0" cy="0"/>
+          <a:chOff x="0" y="0"/>
+          <a:chExt cx="0" cy="0"/>
+        </a:xfrm>
+      </p:grpSpPr>
+      <p:sp>
+        <p:nvSpPr>
+          <p:cNvPr id="3" name="Subtítulo 1"/>
+          <p:cNvSpPr>
+            <a:spLocks noGrp="1"/>
+          </p:cNvSpPr>
+          <p:nvPr>
+            <p:ph type="subTitle" idx="4294967295"/>
+          </p:nvPr>
+        </p:nvSpPr>
+        <p:spPr>
+          <a:xfrm>
+            <a:off x="585395" y="719695"/>
+            <a:ext cx="10896600" cy="2817812"/>
+          </a:xfrm>
+        </p:spPr>
+        <p:txBody>
+          <a:bodyPr>
+            <a:noAutofit/>
+          </a:bodyPr>
+          <a:lstStyle/>
+          <a:p>
+            <a:pPr marL="0" indent="0">
+              <a:buNone/>
+            </a:pPr>
+            <a:endParaRPr lang="pt-BR" sz="1800" dirty="0" smtClean="0"/>
+          </a:p>
+          <a:p>
+            <a:pPr marL="0" indent="0">
+              <a:buNone/>
+            </a:pPr>
+            <a:r>
+              <a:rPr lang="pt-BR" sz="1800" dirty="0" smtClean="0"/>
+              <a:t>PROCV: busca em uma lista vertical coluna</a:t>
+            </a:r>
+          </a:p>
+        </p:txBody>
+      </p:sp>
+      <p:sp>
+        <p:nvSpPr>
+          <p:cNvPr id="5" name="Subtítulo 1"/>
+          <p:cNvSpPr txBox="1">
+            <a:spLocks/>
+          </p:cNvSpPr>
+          <p:nvPr/>
+        </p:nvSpPr>
+        <p:spPr>
+          <a:xfrm>
+            <a:off x="387275" y="3070109"/>
+            <a:ext cx="11585986" cy="3040235"/>
+          </a:xfrm>
+          <a:prstGeom prst="rect">
+            <a:avLst/>
+          </a:prstGeom>
+        </p:spPr>
+        <p:txBody>
+          <a:bodyPr vert="horz" lIns="91440" tIns="45720" rIns="91440" bIns="45720" rtlCol="0">
+            <a:noAutofit/>
+          </a:bodyPr>
+          <a:lstStyle>
+            <a:lvl1pPr marL="0" indent="0" algn="ctr" defTabSz="914400" rtl="0" eaLnBrk="1" latinLnBrk="0" hangingPunct="1">
+              <a:lnSpc>
+                <a:spcPct val="90000"/>
+              </a:lnSpc>
+              <a:spcBef>
+                <a:spcPts val="1000"/>
+              </a:spcBef>
+              <a:buFont typeface="Arial" panose="020B0604020202020204" pitchFamily="34" charset="0"/>
+              <a:buNone/>
+              <a:defRPr sz="2400" kern="1200">
+                <a:solidFill>
+                  <a:schemeClr val="tx1"/>
+                </a:solidFill>
+                <a:latin typeface="+mn-lt"/>
+                <a:ea typeface="+mn-ea"/>
+                <a:cs typeface="+mn-cs"/>
+              </a:defRPr>
+            </a:lvl1pPr>
+            <a:lvl2pPr marL="457200" indent="0" algn="ctr" defTabSz="914400" rtl="0" eaLnBrk="1" latinLnBrk="0" hangingPunct="1">
+              <a:lnSpc>
+                <a:spcPct val="90000"/>
+              </a:lnSpc>
+              <a:spcBef>
+                <a:spcPts val="500"/>
+              </a:spcBef>
+              <a:buFont typeface="Arial" panose="020B0604020202020204" pitchFamily="34" charset="0"/>
+              <a:buNone/>
+              <a:defRPr sz="2000" kern="1200">
+                <a:solidFill>
+                  <a:schemeClr val="tx1"/>
+                </a:solidFill>
+                <a:latin typeface="+mn-lt"/>
+                <a:ea typeface="+mn-ea"/>
+                <a:cs typeface="+mn-cs"/>
+              </a:defRPr>
+            </a:lvl2pPr>
+            <a:lvl3pPr marL="914400" indent="0" algn="ctr" defTabSz="914400" rtl="0" eaLnBrk="1" latinLnBrk="0" hangingPunct="1">
+              <a:lnSpc>
+                <a:spcPct val="90000"/>
+              </a:lnSpc>
+              <a:spcBef>
+                <a:spcPts val="500"/>
+              </a:spcBef>
+              <a:buFont typeface="Arial" panose="020B0604020202020204" pitchFamily="34" charset="0"/>
+              <a:buNone/>
+              <a:defRPr sz="1800" kern="1200">
+                <a:solidFill>
+                  <a:schemeClr val="tx1"/>
+                </a:solidFill>
+                <a:latin typeface="+mn-lt"/>
+                <a:ea typeface="+mn-ea"/>
+                <a:cs typeface="+mn-cs"/>
+              </a:defRPr>
+            </a:lvl3pPr>
+            <a:lvl4pPr marL="1371600" indent="0" algn="ctr" defTabSz="914400" rtl="0" eaLnBrk="1" latinLnBrk="0" hangingPunct="1">
+              <a:lnSpc>
+                <a:spcPct val="90000"/>
+              </a:lnSpc>
+              <a:spcBef>
+                <a:spcPts val="500"/>
+              </a:spcBef>
+              <a:buFont typeface="Arial" panose="020B0604020202020204" pitchFamily="34" charset="0"/>
+              <a:buNone/>
+              <a:defRPr sz="1600" kern="1200">
+                <a:solidFill>
+                  <a:schemeClr val="tx1"/>
+                </a:solidFill>
+                <a:latin typeface="+mn-lt"/>
+                <a:ea typeface="+mn-ea"/>
+                <a:cs typeface="+mn-cs"/>
+              </a:defRPr>
+            </a:lvl4pPr>
+            <a:lvl5pPr marL="1828800" indent="0" algn="ctr" defTabSz="914400" rtl="0" eaLnBrk="1" latinLnBrk="0" hangingPunct="1">
+              <a:lnSpc>
+                <a:spcPct val="90000"/>
+              </a:lnSpc>
+              <a:spcBef>
+                <a:spcPts val="500"/>
+              </a:spcBef>
+              <a:buFont typeface="Arial" panose="020B0604020202020204" pitchFamily="34" charset="0"/>
+              <a:buNone/>
+              <a:defRPr sz="1600" kern="1200">
+                <a:solidFill>
+                  <a:schemeClr val="tx1"/>
+                </a:solidFill>
+                <a:latin typeface="+mn-lt"/>
+                <a:ea typeface="+mn-ea"/>
+                <a:cs typeface="+mn-cs"/>
+              </a:defRPr>
+            </a:lvl5pPr>
+            <a:lvl6pPr marL="2286000" indent="0" algn="ctr" defTabSz="914400" rtl="0" eaLnBrk="1" latinLnBrk="0" hangingPunct="1">
+              <a:lnSpc>
+                <a:spcPct val="90000"/>
+              </a:lnSpc>
+              <a:spcBef>
+                <a:spcPts val="500"/>
+              </a:spcBef>
+              <a:buFont typeface="Arial" panose="020B0604020202020204" pitchFamily="34" charset="0"/>
+              <a:buNone/>
+              <a:defRPr sz="1600" kern="1200">
+                <a:solidFill>
+                  <a:schemeClr val="tx1"/>
+                </a:solidFill>
+                <a:latin typeface="+mn-lt"/>
+                <a:ea typeface="+mn-ea"/>
+                <a:cs typeface="+mn-cs"/>
+              </a:defRPr>
+            </a:lvl6pPr>
+            <a:lvl7pPr marL="2743200" indent="0" algn="ctr" defTabSz="914400" rtl="0" eaLnBrk="1" latinLnBrk="0" hangingPunct="1">
+              <a:lnSpc>
+                <a:spcPct val="90000"/>
+              </a:lnSpc>
+              <a:spcBef>
+                <a:spcPts val="500"/>
+              </a:spcBef>
+              <a:buFont typeface="Arial" panose="020B0604020202020204" pitchFamily="34" charset="0"/>
+              <a:buNone/>
+              <a:defRPr sz="1600" kern="1200">
+                <a:solidFill>
+                  <a:schemeClr val="tx1"/>
+                </a:solidFill>
+                <a:latin typeface="+mn-lt"/>
+                <a:ea typeface="+mn-ea"/>
+                <a:cs typeface="+mn-cs"/>
+              </a:defRPr>
+            </a:lvl7pPr>
+            <a:lvl8pPr marL="3200400" indent="0" algn="ctr" defTabSz="914400" rtl="0" eaLnBrk="1" latinLnBrk="0" hangingPunct="1">
+              <a:lnSpc>
+                <a:spcPct val="90000"/>
+              </a:lnSpc>
+              <a:spcBef>
+                <a:spcPts val="500"/>
+              </a:spcBef>
+              <a:buFont typeface="Arial" panose="020B0604020202020204" pitchFamily="34" charset="0"/>
+              <a:buNone/>
+              <a:defRPr sz="1600" kern="1200">
+                <a:solidFill>
+                  <a:schemeClr val="tx1"/>
+                </a:solidFill>
+                <a:latin typeface="+mn-lt"/>
+                <a:ea typeface="+mn-ea"/>
+                <a:cs typeface="+mn-cs"/>
+              </a:defRPr>
+            </a:lvl8pPr>
+            <a:lvl9pPr marL="3657600" indent="0" algn="ctr" defTabSz="914400" rtl="0" eaLnBrk="1" latinLnBrk="0" hangingPunct="1">
+              <a:lnSpc>
+                <a:spcPct val="90000"/>
+              </a:lnSpc>
+              <a:spcBef>
+                <a:spcPts val="500"/>
+              </a:spcBef>
+              <a:buFont typeface="Arial" panose="020B0604020202020204" pitchFamily="34" charset="0"/>
+              <a:buNone/>
+              <a:defRPr sz="1600" kern="1200">
+                <a:solidFill>
+                  <a:schemeClr val="tx1"/>
+                </a:solidFill>
+                <a:latin typeface="+mn-lt"/>
+                <a:ea typeface="+mn-ea"/>
+                <a:cs typeface="+mn-cs"/>
+              </a:defRPr>
+            </a:lvl9pPr>
+          </a:lstStyle>
+          <a:p>
+            <a:r>
+              <a:rPr lang="pt-BR" sz="1800" b="1" u="sng" dirty="0" smtClean="0"/>
+              <a:t>Dicas no Uso de PROCV</a:t>
+            </a:r>
+            <a:endParaRPr lang="pt-BR" sz="1800" b="1" u="sng" dirty="0"/>
+          </a:p>
+          <a:p>
+            <a:pPr marL="285750" indent="-285750" algn="l">
+              <a:buFont typeface="Arial" panose="020B0604020202020204" pitchFamily="34" charset="0"/>
+              <a:buChar char="•"/>
+            </a:pPr>
+            <a:r>
+              <a:rPr lang="pt-BR" sz="1800" dirty="0"/>
+              <a:t>Sempre CONGELE a referência no argumento “MATRIZ TABELA” (selecione a pressione F4)</a:t>
+            </a:r>
+            <a:endParaRPr lang="pt-BR" sz="1800" b="1" dirty="0">
+              <a:solidFill>
+                <a:srgbClr val="FF0000"/>
+              </a:solidFill>
+            </a:endParaRPr>
+          </a:p>
+          <a:p>
+            <a:pPr marL="285750" indent="-285750" algn="l">
+              <a:buFont typeface="Arial" panose="020B0604020202020204" pitchFamily="34" charset="0"/>
+              <a:buChar char="•"/>
+            </a:pPr>
+            <a:r>
+              <a:rPr lang="pt-BR" sz="1800" dirty="0" smtClean="0"/>
+              <a:t>Argumento “</a:t>
+            </a:r>
+            <a:r>
+              <a:rPr lang="pt-BR" sz="1800" dirty="0" err="1" smtClean="0"/>
+              <a:t>Num_Indice</a:t>
+            </a:r>
+            <a:r>
+              <a:rPr lang="pt-BR" sz="1800" dirty="0" smtClean="0"/>
+              <a:t> Coluna”/ </a:t>
+            </a:r>
+            <a:r>
+              <a:rPr lang="pt-BR" sz="1800" dirty="0" err="1" smtClean="0"/>
+              <a:t>Nºda</a:t>
+            </a:r>
+            <a:r>
+              <a:rPr lang="pt-BR" sz="1800" dirty="0" smtClean="0"/>
+              <a:t> Coluna: pode ser apontado para uma célula que contem a posição  da coluna (referencia externa à formula).</a:t>
+            </a:r>
+          </a:p>
+          <a:p>
+            <a:pPr marL="285750" indent="-285750" algn="l">
+              <a:buFont typeface="Arial" panose="020B0604020202020204" pitchFamily="34" charset="0"/>
+              <a:buChar char="•"/>
+            </a:pPr>
+            <a:r>
+              <a:rPr lang="pt-BR" sz="1800" dirty="0" smtClean="0"/>
+              <a:t>O Argumento de procurar intervalo:</a:t>
+            </a:r>
+          </a:p>
+          <a:p>
+            <a:pPr algn="l"/>
+            <a:r>
+              <a:rPr lang="pt-BR" sz="1800" dirty="0" smtClean="0"/>
+              <a:t>	</a:t>
+            </a:r>
+            <a:r>
+              <a:rPr lang="pt-BR" sz="1800" dirty="0" err="1" smtClean="0"/>
+              <a:t>Paramêtro</a:t>
+            </a:r>
+            <a:r>
+              <a:rPr lang="pt-BR" sz="1800" dirty="0" smtClean="0"/>
+              <a:t> Falso por ser substituído por “0”: será usado em 90% dos casos (casos onde procuro um CODIGO)</a:t>
+            </a:r>
+          </a:p>
+          <a:p>
+            <a:pPr algn="l"/>
+            <a:r>
+              <a:rPr lang="pt-BR" sz="1800" dirty="0" smtClean="0"/>
+              <a:t>	Parâmetro VERDADEIRO pode ser </a:t>
+            </a:r>
+            <a:r>
+              <a:rPr lang="pt-BR" sz="1800" dirty="0" err="1" smtClean="0"/>
+              <a:t>subsituído</a:t>
+            </a:r>
+            <a:r>
+              <a:rPr lang="pt-BR" sz="1800" dirty="0" smtClean="0"/>
+              <a:t> na digitação por “1”: usado em apurações de comissão (procuro 	um intervalo).</a:t>
+            </a:r>
+          </a:p>
+          <a:p>
+            <a:pPr algn="l"/>
+            <a:endParaRPr lang="pt-BR" sz="1800" dirty="0"/>
+          </a:p>
+          <a:p>
+            <a:endParaRPr lang="pt-BR" sz="1800" dirty="0" smtClean="0"/>
+          </a:p>
+          <a:p>
+            <a:r>
+              <a:rPr lang="pt-BR" sz="1800" dirty="0" smtClean="0"/>
+              <a:t> </a:t>
+            </a:r>
+            <a:endParaRPr lang="pt-BR" sz="1800" dirty="0"/>
+          </a:p>
+        </p:txBody>
+      </p:sp>
+      <p:sp>
+        <p:nvSpPr>
+          <p:cNvPr id="6" name="Subtítulo 2"/>
+          <p:cNvSpPr txBox="1">
+            <a:spLocks/>
+          </p:cNvSpPr>
+          <p:nvPr/>
+        </p:nvSpPr>
+        <p:spPr>
+          <a:xfrm>
+            <a:off x="210670" y="153054"/>
+            <a:ext cx="10058400" cy="718315"/>
+          </a:xfrm>
+        </p:spPr>
+        <p:txBody>
+          <a:bodyPr>
+            <a:noAutofit/>
+          </a:bodyPr>
+          <a:lstStyle>
+            <a:lvl1pPr marL="342900" indent="-342900" algn="l" rtl="0" eaLnBrk="0" fontAlgn="base" hangingPunct="0">
+              <a:spcBef>
+                <a:spcPct val="20000"/>
+              </a:spcBef>
+              <a:spcAft>
+                <a:spcPct val="0"/>
+              </a:spcAft>
+              <a:buFont typeface="Arial" charset="0"/>
+              <a:buChar char="•"/>
+              <a:defRPr lang="pt-BR" sz="2800" kern="1200" dirty="0">
+                <a:solidFill>
+                  <a:schemeClr val="tx1"/>
+                </a:solidFill>
+                <a:latin typeface="+mn-lt"/>
+                <a:ea typeface="+mn-ea"/>
+                <a:cs typeface="+mn-cs"/>
+              </a:defRPr>
+            </a:lvl1pPr>
+            <a:lvl2pPr marL="742950" indent="-285750" algn="l" rtl="0" eaLnBrk="0" fontAlgn="base" hangingPunct="0">
+              <a:spcBef>
+                <a:spcPct val="20000"/>
+              </a:spcBef>
+              <a:spcAft>
+                <a:spcPct val="0"/>
+              </a:spcAft>
+              <a:buFont typeface="Arial" charset="0"/>
+              <a:buChar char="•"/>
+              <a:defRPr lang="pt-BR" sz="2400" kern="1200" dirty="0">
+                <a:solidFill>
+                  <a:schemeClr val="tx1"/>
+                </a:solidFill>
+                <a:latin typeface="+mn-lt"/>
+                <a:ea typeface="+mn-ea"/>
+                <a:cs typeface="+mn-cs"/>
+              </a:defRPr>
+            </a:lvl2pPr>
+            <a:lvl3pPr marL="1143000" indent="-228600" algn="l" rtl="0" eaLnBrk="0" fontAlgn="base" hangingPunct="0">
+              <a:spcBef>
+                <a:spcPct val="20000"/>
+              </a:spcBef>
+              <a:spcAft>
+                <a:spcPct val="0"/>
+              </a:spcAft>
+              <a:buFont typeface="Arial" charset="0"/>
+              <a:buChar char="•"/>
+              <a:defRPr lang="pt-BR" sz="2400" kern="1200" dirty="0">
+                <a:solidFill>
+                  <a:schemeClr val="tx1"/>
+                </a:solidFill>
+                <a:latin typeface="+mn-lt"/>
+                <a:ea typeface="+mn-ea"/>
+                <a:cs typeface="+mn-cs"/>
+              </a:defRPr>
+            </a:lvl3pPr>
+            <a:lvl4pPr marL="1600200" indent="-228600" algn="l" rtl="0" eaLnBrk="0" fontAlgn="base" hangingPunct="0">
+              <a:spcBef>
+                <a:spcPct val="20000"/>
+              </a:spcBef>
+              <a:spcAft>
+                <a:spcPct val="0"/>
+              </a:spcAft>
+              <a:buFont typeface="Arial" charset="0"/>
+              <a:buChar char="•"/>
+              <a:defRPr lang="pt-BR" sz="2000" kern="1200" dirty="0">
+                <a:solidFill>
+                  <a:schemeClr val="tx1"/>
+                </a:solidFill>
+                <a:latin typeface="+mn-lt"/>
+                <a:ea typeface="+mn-ea"/>
+                <a:cs typeface="+mn-cs"/>
+              </a:defRPr>
+            </a:lvl4pPr>
+            <a:lvl5pPr marL="2057400" indent="-228600" algn="l" rtl="0" eaLnBrk="0" fontAlgn="base" hangingPunct="0">
+              <a:spcBef>
+                <a:spcPct val="20000"/>
+              </a:spcBef>
+              <a:spcAft>
+                <a:spcPct val="0"/>
+              </a:spcAft>
+              <a:buFont typeface="Arial" charset="0"/>
+              <a:buChar char="•"/>
+              <a:defRPr lang="pt-BR" sz="2000" kern="1200" dirty="0">
+                <a:solidFill>
+                  <a:schemeClr val="tx1"/>
+                </a:solidFill>
+                <a:latin typeface="+mn-lt"/>
+                <a:ea typeface="+mn-ea"/>
+                <a:cs typeface="+mn-cs"/>
+              </a:defRPr>
+            </a:lvl5pPr>
+            <a:lvl6pPr marL="2514600" indent="-228600" algn="l" defTabSz="914400" rtl="0" eaLnBrk="1" latinLnBrk="0" hangingPunct="1">
+              <a:spcBef>
+                <a:spcPct val="20000"/>
+              </a:spcBef>
+              <a:buFont typeface="Arial" pitchFamily="34" charset="0"/>
+              <a:buChar char="•"/>
+              <a:defRPr sz="2000" kern="1200">
+                <a:solidFill>
+                  <a:schemeClr val="tx1"/>
+                </a:solidFill>
+                <a:latin typeface="+mn-lt"/>
+                <a:ea typeface="+mn-ea"/>
+                <a:cs typeface="+mn-cs"/>
+              </a:defRPr>
+            </a:lvl6pPr>
+            <a:lvl7pPr marL="2971800" indent="-228600" algn="l" defTabSz="914400" rtl="0" eaLnBrk="1" latinLnBrk="0" hangingPunct="1">
+              <a:spcBef>
+                <a:spcPct val="20000"/>
+              </a:spcBef>
+              <a:buFont typeface="Arial" pitchFamily="34" charset="0"/>
+              <a:buChar char="•"/>
+              <a:defRPr sz="2000" kern="1200">
+                <a:solidFill>
+                  <a:schemeClr val="tx1"/>
+                </a:solidFill>
+                <a:latin typeface="+mn-lt"/>
+                <a:ea typeface="+mn-ea"/>
+                <a:cs typeface="+mn-cs"/>
+              </a:defRPr>
+            </a:lvl7pPr>
+            <a:lvl8pPr marL="3429000" indent="-228600" algn="l" defTabSz="914400" rtl="0" eaLnBrk="1" latinLnBrk="0" hangingPunct="1">
+              <a:spcBef>
+                <a:spcPct val="20000"/>
+              </a:spcBef>
+              <a:buFont typeface="Arial" pitchFamily="34" charset="0"/>
+              <a:buChar char="•"/>
+              <a:defRPr sz="2000" kern="1200">
+                <a:solidFill>
+                  <a:schemeClr val="tx1"/>
+                </a:solidFill>
+                <a:latin typeface="+mn-lt"/>
+                <a:ea typeface="+mn-ea"/>
+                <a:cs typeface="+mn-cs"/>
+              </a:defRPr>
+            </a:lvl8pPr>
+            <a:lvl9pPr marL="3886200" indent="-228600" algn="l" defTabSz="914400" rtl="0" eaLnBrk="1" latinLnBrk="0" hangingPunct="1">
+              <a:spcBef>
+                <a:spcPct val="20000"/>
+              </a:spcBef>
+              <a:buFont typeface="Arial" pitchFamily="34" charset="0"/>
+              <a:buChar char="•"/>
+              <a:defRPr sz="2000" kern="1200">
+                <a:solidFill>
+                  <a:schemeClr val="tx1"/>
+                </a:solidFill>
+                <a:latin typeface="+mn-lt"/>
+                <a:ea typeface="+mn-ea"/>
+                <a:cs typeface="+mn-cs"/>
+              </a:defRPr>
+            </a:lvl9pPr>
+          </a:lstStyle>
+          <a:p>
+            <a:pPr marL="0" indent="0">
+              <a:lnSpc>
+                <a:spcPct val="150000"/>
+              </a:lnSpc>
+              <a:buFont typeface="Arial" charset="0"/>
+              <a:buNone/>
+            </a:pPr>
+            <a:r>
+              <a:rPr lang="pt-BR" sz="2400" b="1" dirty="0" smtClean="0">
+                <a:solidFill>
+                  <a:schemeClr val="accent6">
+                    <a:lumMod val="75000"/>
+                  </a:schemeClr>
+                </a:solidFill>
+                <a:latin typeface="Corbel" panose="020B0503020204020204" pitchFamily="34" charset="0"/>
+              </a:rPr>
+              <a:t>Fórmulas de Busca</a:t>
+            </a:r>
+          </a:p>
+        </p:txBody>
+      </p:sp>
+      <p:pic>
+        <p:nvPicPr>
+          <p:cNvPr id="10" name="Imagem 9"/>
+          <p:cNvPicPr>
+            <a:picLocks noChangeAspect="1"/>
+          </p:cNvPicPr>
+          <p:nvPr/>
+        </p:nvPicPr>
+        <p:blipFill>
+          <a:blip r:embed="rId2"/>
+          <a:stretch>
+            <a:fillRect/>
+          </a:stretch>
+        </p:blipFill>
+        <p:spPr>
+          <a:xfrm>
+            <a:off x="285281" y="1522680"/>
+            <a:ext cx="8648776" cy="1001274"/>
+          </a:xfrm>
+          <a:prstGeom prst="rect">
+            <a:avLst/>
+          </a:prstGeom>
+        </p:spPr>
+      </p:pic>
+      <p:sp>
+        <p:nvSpPr>
+          <p:cNvPr id="11" name="Elipse 10"/>
+          <p:cNvSpPr/>
+          <p:nvPr/>
+        </p:nvSpPr>
+        <p:spPr>
+          <a:xfrm>
+            <a:off x="10682344" y="5884433"/>
+            <a:ext cx="602428" cy="516367"/>
+          </a:xfrm>
+          <a:prstGeom prst="ellipse">
+            <a:avLst/>
+          </a:prstGeom>
+          <a:solidFill>
+            <a:srgbClr val="92D050"/>
+          </a:solidFill>
+          <a:ln>
+            <a:noFill/>
+          </a:ln>
+        </p:spPr>
+        <p:style>
+          <a:lnRef idx="2">
+            <a:schemeClr val="accent1">
+              <a:shade val="50000"/>
+            </a:schemeClr>
+          </a:lnRef>
+          <a:fillRef idx="1">
+            <a:schemeClr val="accent1"/>
+          </a:fillRef>
+          <a:effectRef idx="0">
+            <a:schemeClr val="accent1"/>
+          </a:effectRef>
+          <a:fontRef idx="minor">
+            <a:schemeClr val="lt1"/>
+          </a:fontRef>
+        </p:style>
+        <p:txBody>
+          <a:bodyPr rtlCol="0" anchor="ctr"/>
+          <a:lstStyle/>
+          <a:p>
+            <a:pPr algn="ctr"/>
+            <a:r>
+              <a:rPr lang="pt-BR" dirty="0" smtClean="0"/>
+              <a:t>51</a:t>
+            </a:r>
+            <a:endParaRPr lang="pt-BR" dirty="0"/>
+          </a:p>
+        </p:txBody>
+      </p:sp>
+    </p:spTree>
+    <p:extLst>
+      <p:ext uri="{BB962C8B-B14F-4D97-AF65-F5344CB8AC3E}">
+        <p14:creationId xmlns:p14="http://schemas.microsoft.com/office/powerpoint/2010/main" val="3246057043"/>
+      </p:ext>
+    </p:extLst>
+  </p:cSld>
+  <p:clrMapOvr>
+    <a:masterClrMapping/>
+  </p:clrMapOvr>
+  <p:timing>
+    <p:tnLst>
+      <p:par>
+        <p:cTn id="1" dur="indefinite" restart="never" nodeType="tmRoot"/>
+      </p:par>
+    </p:tnLst>
+  </p:timing>
+</p:sld>
+</file>
+
+<file path=ppt/slides/slide54.xml><?xml version="1.0" encoding="utf-8"?>
 <p:sld xmlns:a="http://schemas.openxmlformats.org/drawingml/2006/main" xmlns:r="http://schemas.openxmlformats.org/officeDocument/2006/relationships" xmlns:p="http://schemas.openxmlformats.org/presentationml/2006/main">
   <p:cSld>
     <p:spTree>
@@ -31386,7 +33246,7 @@
 </p:sld>
 </file>
 
-<file path=ppt/slides/slide53.xml><?xml version="1.0" encoding="utf-8"?>
+<file path=ppt/slides/slide55.xml><?xml version="1.0" encoding="utf-8"?>
 <p:sld xmlns:a="http://schemas.openxmlformats.org/drawingml/2006/main" xmlns:r="http://schemas.openxmlformats.org/officeDocument/2006/relationships" xmlns:p="http://schemas.openxmlformats.org/presentationml/2006/main">
   <p:cSld>
     <p:spTree>
@@ -31828,20 +33688,20 @@
               <a:t>Coluna com </a:t>
             </a:r>
             <a:r>
-              <a:rPr lang="pt-BR" sz="1800" dirty="0" err="1" smtClean="0"/>
-              <a:t>tamnho</a:t>
-            </a:r>
-            <a:r>
               <a:rPr lang="pt-BR" sz="1800" dirty="0" smtClean="0"/>
-              <a:t> Fixo ou existe algum </a:t>
-            </a:r>
-            <a:r>
-              <a:rPr lang="pt-BR" sz="1800" dirty="0" err="1" smtClean="0"/>
-              <a:t>caracter</a:t>
+              <a:t>tamanho </a:t>
             </a:r>
             <a:r>
               <a:rPr lang="pt-BR" sz="1800" dirty="0" smtClean="0"/>
-              <a:t> que marca a separação de cada coluna?</a:t>
+              <a:t>Fixo ou existe algum </a:t>
+            </a:r>
+            <a:r>
+              <a:rPr lang="pt-BR" sz="1800" dirty="0" smtClean="0"/>
+              <a:t>carácter </a:t>
+            </a:r>
+            <a:r>
+              <a:rPr lang="pt-BR" sz="1800" dirty="0" smtClean="0"/>
+              <a:t>que marca a separação de cada coluna?</a:t>
             </a:r>
           </a:p>
           <a:p>
@@ -31854,13 +33714,18 @@
               <a:t>Onde separam-se as colunas (informar </a:t>
             </a:r>
             <a:r>
-              <a:rPr lang="pt-BR" sz="1800" dirty="0" err="1" smtClean="0"/>
-              <a:t>caracter</a:t>
-            </a:r>
-            <a:r>
               <a:rPr lang="pt-BR" sz="1800" dirty="0" smtClean="0"/>
-              <a:t> ou a desenhar a divisória</a:t>
-            </a:r>
+              <a:t>carácter </a:t>
+            </a:r>
+            <a:r>
+              <a:rPr lang="pt-BR" sz="1800" dirty="0" smtClean="0"/>
+              <a:t>ou a desenhar a </a:t>
+            </a:r>
+            <a:r>
+              <a:rPr lang="pt-BR" sz="1800" dirty="0" smtClean="0"/>
+              <a:t>divisória de coluna)</a:t>
+            </a:r>
+            <a:endParaRPr lang="pt-BR" sz="1800" dirty="0" smtClean="0"/>
           </a:p>
           <a:p>
             <a:pPr>
@@ -31869,7 +33734,11 @@
             </a:pPr>
             <a:r>
               <a:rPr lang="pt-BR" sz="1800" dirty="0" smtClean="0"/>
-              <a:t>Dizer o tipo de dado de cada Coluna (texto ou numero).</a:t>
+              <a:t>Dizer o tipo de dado de cada Coluna (texto ou </a:t>
+            </a:r>
+            <a:r>
+              <a:rPr lang="pt-BR" sz="1800" dirty="0" smtClean="0"/>
+              <a:t>número).</a:t>
             </a:r>
           </a:p>
           <a:p>
@@ -31977,7 +33846,7 @@
         </p:blipFill>
         <p:spPr>
           <a:xfrm>
-            <a:off x="7143245" y="4094078"/>
+            <a:off x="6972747" y="4094078"/>
             <a:ext cx="2786063" cy="2240615"/>
           </a:xfrm>
           <a:prstGeom prst="rect">
@@ -31985,6 +33854,53 @@
           </a:prstGeom>
         </p:spPr>
       </p:pic>
+      <p:sp>
+        <p:nvSpPr>
+          <p:cNvPr id="7" name="Elipse 6"/>
+          <p:cNvSpPr/>
+          <p:nvPr/>
+        </p:nvSpPr>
+        <p:spPr>
+          <a:xfrm>
+            <a:off x="10269070" y="2431262"/>
+            <a:ext cx="1798319" cy="1493520"/>
+          </a:xfrm>
+          <a:prstGeom prst="ellipse">
+            <a:avLst/>
+          </a:prstGeom>
+          <a:solidFill>
+            <a:schemeClr val="accent2"/>
+          </a:solidFill>
+        </p:spPr>
+        <p:style>
+          <a:lnRef idx="2">
+            <a:schemeClr val="accent1">
+              <a:shade val="50000"/>
+            </a:schemeClr>
+          </a:lnRef>
+          <a:fillRef idx="1">
+            <a:schemeClr val="accent1"/>
+          </a:fillRef>
+          <a:effectRef idx="0">
+            <a:schemeClr val="accent1"/>
+          </a:effectRef>
+          <a:fontRef idx="minor">
+            <a:schemeClr val="lt1"/>
+          </a:fontRef>
+        </p:style>
+        <p:txBody>
+          <a:bodyPr rtlCol="0" anchor="ctr"/>
+          <a:lstStyle/>
+          <a:p>
+            <a:pPr algn="ctr"/>
+            <a:r>
+              <a:rPr lang="pt-BR" dirty="0" smtClean="0"/>
+              <a:t>Paramos aqui</a:t>
+            </a:r>
+            <a:endParaRPr lang="pt-BR" dirty="0"/>
+          </a:p>
+        </p:txBody>
+      </p:sp>
     </p:spTree>
     <p:extLst>
       <p:ext uri="{BB962C8B-B14F-4D97-AF65-F5344CB8AC3E}">
@@ -32005,7 +33921,7 @@
 </p:sld>
 </file>
 
-<file path=ppt/slides/slide54.xml><?xml version="1.0" encoding="utf-8"?>
+<file path=ppt/slides/slide56.xml><?xml version="1.0" encoding="utf-8"?>
 <p:sld xmlns:a="http://schemas.openxmlformats.org/drawingml/2006/main" xmlns:r="http://schemas.openxmlformats.org/officeDocument/2006/relationships" xmlns:p="http://schemas.openxmlformats.org/presentationml/2006/main">
   <p:cSld>
     <p:spTree>
@@ -32649,7 +34565,7 @@
 </p:sld>
 </file>
 
-<file path=ppt/slides/slide55.xml><?xml version="1.0" encoding="utf-8"?>
+<file path=ppt/slides/slide57.xml><?xml version="1.0" encoding="utf-8"?>
 <p:sld xmlns:a="http://schemas.openxmlformats.org/drawingml/2006/main" xmlns:r="http://schemas.openxmlformats.org/officeDocument/2006/relationships" xmlns:p="http://schemas.openxmlformats.org/presentationml/2006/main">
   <p:cSld>
     <p:spTree>
@@ -33207,7 +35123,7 @@
 </p:sld>
 </file>
 
-<file path=ppt/slides/slide56.xml><?xml version="1.0" encoding="utf-8"?>
+<file path=ppt/slides/slide58.xml><?xml version="1.0" encoding="utf-8"?>
 <p:sld xmlns:a="http://schemas.openxmlformats.org/drawingml/2006/main" xmlns:r="http://schemas.openxmlformats.org/officeDocument/2006/relationships" xmlns:p="http://schemas.openxmlformats.org/presentationml/2006/main">
   <p:cSld>
     <p:spTree>
@@ -33618,7 +35534,7 @@
 </p:sld>
 </file>
 
-<file path=ppt/slides/slide57.xml><?xml version="1.0" encoding="utf-8"?>
+<file path=ppt/slides/slide59.xml><?xml version="1.0" encoding="utf-8"?>
 <p:sld xmlns:a="http://schemas.openxmlformats.org/drawingml/2006/main" xmlns:r="http://schemas.openxmlformats.org/officeDocument/2006/relationships" xmlns:p="http://schemas.openxmlformats.org/presentationml/2006/main">
   <p:cSld>
     <p:spTree>
@@ -34071,7 +35987,6 @@
               <a:rPr lang="pt-BR" sz="1800" dirty="0" smtClean="0"/>
               <a:t>Depois por empresa</a:t>
             </a:r>
-            <a:endParaRPr lang="pt-BR" sz="1800" dirty="0" smtClean="0"/>
           </a:p>
         </p:txBody>
       </p:sp>
@@ -34085,836 +36000,6 @@
   <p:clrMapOvr>
     <a:masterClrMapping/>
   </p:clrMapOvr>
-  <p:timing>
-    <p:tnLst>
-      <p:par>
-        <p:cTn id="1" dur="indefinite" restart="never" nodeType="tmRoot"/>
-      </p:par>
-    </p:tnLst>
-  </p:timing>
-</p:sld>
-</file>
-
-<file path=ppt/slides/slide58.xml><?xml version="1.0" encoding="utf-8"?>
-<p:sld xmlns:a="http://schemas.openxmlformats.org/drawingml/2006/main" xmlns:r="http://schemas.openxmlformats.org/officeDocument/2006/relationships" xmlns:p="http://schemas.openxmlformats.org/presentationml/2006/main" show="0">
-  <p:cSld>
-    <p:spTree>
-      <p:nvGrpSpPr>
-        <p:cNvPr id="1" name=""/>
-        <p:cNvGrpSpPr/>
-        <p:nvPr/>
-      </p:nvGrpSpPr>
-      <p:grpSpPr>
-        <a:xfrm>
-          <a:off x="0" y="0"/>
-          <a:ext cx="0" cy="0"/>
-          <a:chOff x="0" y="0"/>
-          <a:chExt cx="0" cy="0"/>
-        </a:xfrm>
-      </p:grpSpPr>
-      <p:sp>
-        <p:nvSpPr>
-          <p:cNvPr id="3" name="Subtítulo 1"/>
-          <p:cNvSpPr>
-            <a:spLocks noGrp="1"/>
-          </p:cNvSpPr>
-          <p:nvPr>
-            <p:ph type="subTitle" idx="4294967295"/>
-          </p:nvPr>
-        </p:nvSpPr>
-        <p:spPr>
-          <a:xfrm>
-            <a:off x="484095" y="754063"/>
-            <a:ext cx="11707906" cy="5495925"/>
-          </a:xfrm>
-        </p:spPr>
-        <p:txBody>
-          <a:bodyPr>
-            <a:noAutofit/>
-          </a:bodyPr>
-          <a:lstStyle/>
-          <a:p>
-            <a:pPr algn="just"/>
-            <a:endParaRPr lang="pt-BR" sz="2000" dirty="0" smtClean="0"/>
-          </a:p>
-          <a:p>
-            <a:pPr marL="0" indent="0" algn="just">
-              <a:buNone/>
-            </a:pPr>
-            <a:r>
-              <a:rPr lang="pt-BR" sz="2000" dirty="0" smtClean="0"/>
-              <a:t>Fazer </a:t>
-            </a:r>
-            <a:r>
-              <a:rPr lang="pt-BR" sz="2000" dirty="0"/>
-              <a:t>um relatório </a:t>
-            </a:r>
-            <a:r>
-              <a:rPr lang="pt-BR" sz="2000" dirty="0" smtClean="0"/>
-              <a:t>do </a:t>
-            </a:r>
-            <a:r>
-              <a:rPr lang="pt-BR" sz="2000" dirty="0"/>
-              <a:t>fluxo de caixa diário para 1 ano.</a:t>
-            </a:r>
-          </a:p>
-          <a:p>
-            <a:pPr algn="just"/>
-            <a:r>
-              <a:rPr lang="pt-BR" sz="2000" dirty="0" smtClean="0"/>
-              <a:t>1- Cada </a:t>
-            </a:r>
-            <a:r>
-              <a:rPr lang="pt-BR" sz="2000" dirty="0"/>
-              <a:t>mês será em uma Planilha diferente</a:t>
-            </a:r>
-          </a:p>
-          <a:p>
-            <a:pPr algn="just"/>
-            <a:r>
-              <a:rPr lang="pt-BR" sz="2000" dirty="0" smtClean="0"/>
-              <a:t>2 -Inicia </a:t>
-            </a:r>
-            <a:r>
-              <a:rPr lang="pt-BR" sz="2000" dirty="0"/>
-              <a:t>em </a:t>
-            </a:r>
-            <a:r>
-              <a:rPr lang="pt-BR" sz="2000" dirty="0" smtClean="0"/>
-              <a:t>01/01/2017 com 0 de saldo Inicial. </a:t>
-            </a:r>
-            <a:r>
-              <a:rPr lang="pt-BR" sz="2000" dirty="0"/>
-              <a:t>Termina em </a:t>
-            </a:r>
-            <a:r>
-              <a:rPr lang="pt-BR" sz="2000" dirty="0" smtClean="0"/>
-              <a:t>31/12/2017.</a:t>
-            </a:r>
-            <a:endParaRPr lang="pt-BR" sz="2000" dirty="0"/>
-          </a:p>
-          <a:p>
-            <a:pPr algn="just"/>
-            <a:r>
-              <a:rPr lang="pt-BR" sz="2000" dirty="0" smtClean="0"/>
-              <a:t>3- </a:t>
-            </a:r>
-            <a:r>
-              <a:rPr lang="pt-BR" sz="2000" dirty="0"/>
-              <a:t>Toda terça tem pagamento de fornecedor no valor de 9.000 e às terças de 8.000.</a:t>
-            </a:r>
-            <a:endParaRPr lang="pt-BR" sz="2000" dirty="0" smtClean="0"/>
-          </a:p>
-          <a:p>
-            <a:pPr algn="just"/>
-            <a:r>
-              <a:rPr lang="pt-BR" sz="2000" dirty="0" smtClean="0"/>
-              <a:t>4 -Todo </a:t>
-            </a:r>
-            <a:r>
-              <a:rPr lang="pt-BR" sz="2000" dirty="0"/>
-              <a:t>dia </a:t>
-            </a:r>
-            <a:r>
-              <a:rPr lang="pt-BR" sz="2000" dirty="0" smtClean="0"/>
-              <a:t>5 </a:t>
-            </a:r>
-            <a:r>
-              <a:rPr lang="pt-BR" sz="2000" dirty="0"/>
-              <a:t>e dia </a:t>
-            </a:r>
-            <a:r>
-              <a:rPr lang="pt-BR" sz="2000" dirty="0" smtClean="0"/>
-              <a:t>20 </a:t>
-            </a:r>
-            <a:r>
-              <a:rPr lang="pt-BR" sz="2000" dirty="0"/>
-              <a:t>de cada mês tem despesa adicional de </a:t>
-            </a:r>
-            <a:r>
-              <a:rPr lang="pt-BR" sz="2000" dirty="0" smtClean="0"/>
-              <a:t>15.000 </a:t>
-            </a:r>
-            <a:r>
-              <a:rPr lang="pt-BR" sz="2000" dirty="0"/>
-              <a:t>e </a:t>
-            </a:r>
-            <a:r>
-              <a:rPr lang="pt-BR" sz="2000" dirty="0" smtClean="0"/>
-              <a:t>7.000 </a:t>
-            </a:r>
-            <a:r>
-              <a:rPr lang="pt-BR" sz="2000" dirty="0"/>
-              <a:t>respectivamente.</a:t>
-            </a:r>
-          </a:p>
-          <a:p>
-            <a:pPr algn="just"/>
-            <a:r>
-              <a:rPr lang="pt-BR" sz="2000" dirty="0" smtClean="0"/>
-              <a:t>5- A </a:t>
-            </a:r>
-            <a:r>
-              <a:rPr lang="pt-BR" sz="2000" dirty="0"/>
-              <a:t>partir de setembro, todos os pagamentos aumentam 7%.</a:t>
-            </a:r>
-          </a:p>
-          <a:p>
-            <a:pPr algn="just"/>
-            <a:r>
-              <a:rPr lang="pt-BR" sz="2000" dirty="0" smtClean="0"/>
-              <a:t>6 – Os recebimentos de </a:t>
-            </a:r>
-            <a:r>
-              <a:rPr lang="pt-BR" sz="2000" dirty="0"/>
-              <a:t>vendas são depositadas todas as segundas no valor de </a:t>
-            </a:r>
-            <a:r>
-              <a:rPr lang="pt-BR" sz="2000" dirty="0" smtClean="0"/>
-              <a:t>21.000 (constantes o  ano inteiro)</a:t>
-            </a:r>
-          </a:p>
-          <a:p>
-            <a:pPr algn="just"/>
-            <a:r>
-              <a:rPr lang="pt-BR" sz="2000" dirty="0" smtClean="0"/>
-              <a:t>7- Os recebimentos de venda de sucata são depositadas às </a:t>
-            </a:r>
-            <a:r>
-              <a:rPr lang="pt-BR" sz="2000" dirty="0"/>
-              <a:t>quartas no valor de </a:t>
-            </a:r>
-            <a:r>
-              <a:rPr lang="pt-BR" sz="2000" dirty="0" smtClean="0"/>
-              <a:t>3.000 </a:t>
-            </a:r>
-            <a:r>
-              <a:rPr lang="pt-BR" sz="2000" dirty="0"/>
-              <a:t>(</a:t>
-            </a:r>
-            <a:r>
-              <a:rPr lang="pt-BR" sz="2000" dirty="0" smtClean="0"/>
-              <a:t>constantes </a:t>
-            </a:r>
-            <a:r>
-              <a:rPr lang="pt-BR" sz="2000" dirty="0"/>
-              <a:t>ano </a:t>
-            </a:r>
-            <a:r>
-              <a:rPr lang="pt-BR" sz="2000" dirty="0" smtClean="0"/>
-              <a:t> inteiro).</a:t>
-            </a:r>
-          </a:p>
-          <a:p>
-            <a:pPr algn="just"/>
-            <a:endParaRPr lang="pt-BR" sz="2000" dirty="0"/>
-          </a:p>
-          <a:p>
-            <a:pPr marL="0" indent="0" algn="just">
-              <a:buNone/>
-            </a:pPr>
-            <a:r>
-              <a:rPr lang="pt-BR" sz="2000" dirty="0" smtClean="0"/>
-              <a:t>No fim do ano haverá </a:t>
-            </a:r>
-            <a:r>
-              <a:rPr lang="pt-BR" sz="2000" dirty="0"/>
-              <a:t>sobra ou falta de caixa? Quanto? Destaque pela cor vermelha a  planilha referente ao mês de menor </a:t>
-            </a:r>
-            <a:r>
-              <a:rPr lang="pt-BR" sz="2000" dirty="0" smtClean="0"/>
-              <a:t>caixa e verde onde esta a de maior caixa.</a:t>
-            </a:r>
-          </a:p>
-          <a:p>
-            <a:pPr marL="0" indent="0" algn="just">
-              <a:buNone/>
-            </a:pPr>
-            <a:endParaRPr lang="pt-BR" sz="2000" dirty="0"/>
-          </a:p>
-          <a:p>
-            <a:pPr marL="0" indent="0" algn="just">
-              <a:buNone/>
-            </a:pPr>
-            <a:r>
-              <a:rPr lang="pt-BR" sz="2000" dirty="0" smtClean="0"/>
-              <a:t>Dica: use a planilha anterior, copia de planilhas e formatação, referência externa</a:t>
-            </a:r>
-            <a:endParaRPr lang="pt-BR" sz="2000" dirty="0"/>
-          </a:p>
-        </p:txBody>
-      </p:sp>
-      <p:sp>
-        <p:nvSpPr>
-          <p:cNvPr id="4" name="Subtítulo 2"/>
-          <p:cNvSpPr txBox="1">
-            <a:spLocks/>
-          </p:cNvSpPr>
-          <p:nvPr/>
-        </p:nvSpPr>
-        <p:spPr>
-          <a:xfrm>
-            <a:off x="210670" y="153054"/>
-            <a:ext cx="10058400" cy="718315"/>
-          </a:xfrm>
-        </p:spPr>
-        <p:txBody>
-          <a:bodyPr>
-            <a:noAutofit/>
-          </a:bodyPr>
-          <a:lstStyle>
-            <a:lvl1pPr marL="342900" indent="-342900" algn="l" rtl="0" eaLnBrk="0" fontAlgn="base" hangingPunct="0">
-              <a:spcBef>
-                <a:spcPct val="20000"/>
-              </a:spcBef>
-              <a:spcAft>
-                <a:spcPct val="0"/>
-              </a:spcAft>
-              <a:buFont typeface="Arial" charset="0"/>
-              <a:buChar char="•"/>
-              <a:defRPr lang="pt-BR" sz="2800" kern="1200" dirty="0">
-                <a:solidFill>
-                  <a:schemeClr val="tx1"/>
-                </a:solidFill>
-                <a:latin typeface="+mn-lt"/>
-                <a:ea typeface="+mn-ea"/>
-                <a:cs typeface="+mn-cs"/>
-              </a:defRPr>
-            </a:lvl1pPr>
-            <a:lvl2pPr marL="742950" indent="-285750" algn="l" rtl="0" eaLnBrk="0" fontAlgn="base" hangingPunct="0">
-              <a:spcBef>
-                <a:spcPct val="20000"/>
-              </a:spcBef>
-              <a:spcAft>
-                <a:spcPct val="0"/>
-              </a:spcAft>
-              <a:buFont typeface="Arial" charset="0"/>
-              <a:buChar char="•"/>
-              <a:defRPr lang="pt-BR" sz="2400" kern="1200" dirty="0">
-                <a:solidFill>
-                  <a:schemeClr val="tx1"/>
-                </a:solidFill>
-                <a:latin typeface="+mn-lt"/>
-                <a:ea typeface="+mn-ea"/>
-                <a:cs typeface="+mn-cs"/>
-              </a:defRPr>
-            </a:lvl2pPr>
-            <a:lvl3pPr marL="1143000" indent="-228600" algn="l" rtl="0" eaLnBrk="0" fontAlgn="base" hangingPunct="0">
-              <a:spcBef>
-                <a:spcPct val="20000"/>
-              </a:spcBef>
-              <a:spcAft>
-                <a:spcPct val="0"/>
-              </a:spcAft>
-              <a:buFont typeface="Arial" charset="0"/>
-              <a:buChar char="•"/>
-              <a:defRPr lang="pt-BR" sz="2400" kern="1200" dirty="0">
-                <a:solidFill>
-                  <a:schemeClr val="tx1"/>
-                </a:solidFill>
-                <a:latin typeface="+mn-lt"/>
-                <a:ea typeface="+mn-ea"/>
-                <a:cs typeface="+mn-cs"/>
-              </a:defRPr>
-            </a:lvl3pPr>
-            <a:lvl4pPr marL="1600200" indent="-228600" algn="l" rtl="0" eaLnBrk="0" fontAlgn="base" hangingPunct="0">
-              <a:spcBef>
-                <a:spcPct val="20000"/>
-              </a:spcBef>
-              <a:spcAft>
-                <a:spcPct val="0"/>
-              </a:spcAft>
-              <a:buFont typeface="Arial" charset="0"/>
-              <a:buChar char="•"/>
-              <a:defRPr lang="pt-BR" sz="2000" kern="1200" dirty="0">
-                <a:solidFill>
-                  <a:schemeClr val="tx1"/>
-                </a:solidFill>
-                <a:latin typeface="+mn-lt"/>
-                <a:ea typeface="+mn-ea"/>
-                <a:cs typeface="+mn-cs"/>
-              </a:defRPr>
-            </a:lvl4pPr>
-            <a:lvl5pPr marL="2057400" indent="-228600" algn="l" rtl="0" eaLnBrk="0" fontAlgn="base" hangingPunct="0">
-              <a:spcBef>
-                <a:spcPct val="20000"/>
-              </a:spcBef>
-              <a:spcAft>
-                <a:spcPct val="0"/>
-              </a:spcAft>
-              <a:buFont typeface="Arial" charset="0"/>
-              <a:buChar char="•"/>
-              <a:defRPr lang="pt-BR" sz="2000" kern="1200" dirty="0">
-                <a:solidFill>
-                  <a:schemeClr val="tx1"/>
-                </a:solidFill>
-                <a:latin typeface="+mn-lt"/>
-                <a:ea typeface="+mn-ea"/>
-                <a:cs typeface="+mn-cs"/>
-              </a:defRPr>
-            </a:lvl5pPr>
-            <a:lvl6pPr marL="2514600" indent="-228600" algn="l" defTabSz="914400" rtl="0" eaLnBrk="1" latinLnBrk="0" hangingPunct="1">
-              <a:spcBef>
-                <a:spcPct val="20000"/>
-              </a:spcBef>
-              <a:buFont typeface="Arial" pitchFamily="34" charset="0"/>
-              <a:buChar char="•"/>
-              <a:defRPr sz="2000" kern="1200">
-                <a:solidFill>
-                  <a:schemeClr val="tx1"/>
-                </a:solidFill>
-                <a:latin typeface="+mn-lt"/>
-                <a:ea typeface="+mn-ea"/>
-                <a:cs typeface="+mn-cs"/>
-              </a:defRPr>
-            </a:lvl6pPr>
-            <a:lvl7pPr marL="2971800" indent="-228600" algn="l" defTabSz="914400" rtl="0" eaLnBrk="1" latinLnBrk="0" hangingPunct="1">
-              <a:spcBef>
-                <a:spcPct val="20000"/>
-              </a:spcBef>
-              <a:buFont typeface="Arial" pitchFamily="34" charset="0"/>
-              <a:buChar char="•"/>
-              <a:defRPr sz="2000" kern="1200">
-                <a:solidFill>
-                  <a:schemeClr val="tx1"/>
-                </a:solidFill>
-                <a:latin typeface="+mn-lt"/>
-                <a:ea typeface="+mn-ea"/>
-                <a:cs typeface="+mn-cs"/>
-              </a:defRPr>
-            </a:lvl7pPr>
-            <a:lvl8pPr marL="3429000" indent="-228600" algn="l" defTabSz="914400" rtl="0" eaLnBrk="1" latinLnBrk="0" hangingPunct="1">
-              <a:spcBef>
-                <a:spcPct val="20000"/>
-              </a:spcBef>
-              <a:buFont typeface="Arial" pitchFamily="34" charset="0"/>
-              <a:buChar char="•"/>
-              <a:defRPr sz="2000" kern="1200">
-                <a:solidFill>
-                  <a:schemeClr val="tx1"/>
-                </a:solidFill>
-                <a:latin typeface="+mn-lt"/>
-                <a:ea typeface="+mn-ea"/>
-                <a:cs typeface="+mn-cs"/>
-              </a:defRPr>
-            </a:lvl8pPr>
-            <a:lvl9pPr marL="3886200" indent="-228600" algn="l" defTabSz="914400" rtl="0" eaLnBrk="1" latinLnBrk="0" hangingPunct="1">
-              <a:spcBef>
-                <a:spcPct val="20000"/>
-              </a:spcBef>
-              <a:buFont typeface="Arial" pitchFamily="34" charset="0"/>
-              <a:buChar char="•"/>
-              <a:defRPr sz="2000" kern="1200">
-                <a:solidFill>
-                  <a:schemeClr val="tx1"/>
-                </a:solidFill>
-                <a:latin typeface="+mn-lt"/>
-                <a:ea typeface="+mn-ea"/>
-                <a:cs typeface="+mn-cs"/>
-              </a:defRPr>
-            </a:lvl9pPr>
-          </a:lstStyle>
-          <a:p>
-            <a:pPr marL="0" indent="0">
-              <a:lnSpc>
-                <a:spcPct val="150000"/>
-              </a:lnSpc>
-              <a:buFont typeface="Arial" charset="0"/>
-              <a:buNone/>
-            </a:pPr>
-            <a:r>
-              <a:rPr lang="pt-BR" sz="2400" b="1" dirty="0" smtClean="0">
-                <a:solidFill>
-                  <a:schemeClr val="accent6">
-                    <a:lumMod val="75000"/>
-                  </a:schemeClr>
-                </a:solidFill>
-                <a:latin typeface="Corbel" panose="020B0503020204020204" pitchFamily="34" charset="0"/>
-              </a:rPr>
-              <a:t>Atividade</a:t>
-            </a:r>
-          </a:p>
-        </p:txBody>
-      </p:sp>
-    </p:spTree>
-    <p:extLst>
-      <p:ext uri="{BB962C8B-B14F-4D97-AF65-F5344CB8AC3E}">
-        <p14:creationId xmlns:p14="http://schemas.microsoft.com/office/powerpoint/2010/main" val="453914812"/>
-      </p:ext>
-    </p:extLst>
-  </p:cSld>
-  <p:clrMapOvr>
-    <a:masterClrMapping/>
-  </p:clrMapOvr>
-  <mc:AlternateContent xmlns:mc="http://schemas.openxmlformats.org/markup-compatibility/2006" xmlns:p14="http://schemas.microsoft.com/office/powerpoint/2010/main">
-    <mc:Choice Requires="p14">
-      <p:transition spd="slow" p14:dur="2000"/>
-    </mc:Choice>
-    <mc:Fallback xmlns="">
-      <p:transition spd="slow"/>
-    </mc:Fallback>
-  </mc:AlternateContent>
-  <p:timing>
-    <p:tnLst>
-      <p:par>
-        <p:cTn id="1" dur="indefinite" restart="never" nodeType="tmRoot"/>
-      </p:par>
-    </p:tnLst>
-  </p:timing>
-</p:sld>
-</file>
-
-<file path=ppt/slides/slide59.xml><?xml version="1.0" encoding="utf-8"?>
-<p:sld xmlns:a="http://schemas.openxmlformats.org/drawingml/2006/main" xmlns:r="http://schemas.openxmlformats.org/officeDocument/2006/relationships" xmlns:p="http://schemas.openxmlformats.org/presentationml/2006/main" show="0">
-  <p:cSld>
-    <p:spTree>
-      <p:nvGrpSpPr>
-        <p:cNvPr id="1" name=""/>
-        <p:cNvGrpSpPr/>
-        <p:nvPr/>
-      </p:nvGrpSpPr>
-      <p:grpSpPr>
-        <a:xfrm>
-          <a:off x="0" y="0"/>
-          <a:ext cx="0" cy="0"/>
-          <a:chOff x="0" y="0"/>
-          <a:chExt cx="0" cy="0"/>
-        </a:xfrm>
-      </p:grpSpPr>
-      <p:sp>
-        <p:nvSpPr>
-          <p:cNvPr id="3" name="Subtítulo 1"/>
-          <p:cNvSpPr>
-            <a:spLocks noGrp="1"/>
-          </p:cNvSpPr>
-          <p:nvPr>
-            <p:ph type="subTitle" idx="4294967295"/>
-          </p:nvPr>
-        </p:nvSpPr>
-        <p:spPr>
-          <a:xfrm>
-            <a:off x="591671" y="754063"/>
-            <a:ext cx="11600329" cy="5495925"/>
-          </a:xfrm>
-        </p:spPr>
-        <p:txBody>
-          <a:bodyPr>
-            <a:noAutofit/>
-          </a:bodyPr>
-          <a:lstStyle/>
-          <a:p>
-            <a:pPr marL="0" indent="0">
-              <a:buNone/>
-            </a:pPr>
-            <a:endParaRPr lang="pt-BR" sz="2000" dirty="0"/>
-          </a:p>
-          <a:p>
-            <a:pPr marL="0" indent="0" algn="just">
-              <a:buNone/>
-            </a:pPr>
-            <a:r>
-              <a:rPr lang="pt-BR" sz="2000" dirty="0" smtClean="0"/>
-              <a:t> Criar relatório de fluxo de caixa de 1 ano com entradas, saídas e saldo.</a:t>
-            </a:r>
-          </a:p>
-          <a:p>
-            <a:pPr algn="just"/>
-            <a:r>
-              <a:rPr lang="pt-BR" sz="2000" dirty="0" smtClean="0"/>
-              <a:t>1 - Um mês em cada planilha.</a:t>
-            </a:r>
-          </a:p>
-          <a:p>
-            <a:pPr algn="just"/>
-            <a:r>
-              <a:rPr lang="pt-BR" sz="2000" dirty="0" smtClean="0"/>
-              <a:t>2 - Entrada/Recebimentos  Às terças de R$ 3.000, demais dias de R$ 2.000 (bruto)</a:t>
-            </a:r>
-          </a:p>
-          <a:p>
-            <a:pPr algn="just"/>
-            <a:r>
-              <a:rPr lang="pt-BR" sz="2000" dirty="0" smtClean="0"/>
-              <a:t>3 - Saídas/Pagamentos as quintas de R$ 4.000, demais dias de R$ 1.600 (bruto)</a:t>
-            </a:r>
-          </a:p>
-          <a:p>
-            <a:pPr algn="just"/>
-            <a:r>
-              <a:rPr lang="pt-BR" sz="2000" dirty="0" smtClean="0"/>
-              <a:t>4 - Todo dia 15 de cada mês, saída adicional de 6.000 (bruto)</a:t>
-            </a:r>
-          </a:p>
-          <a:p>
-            <a:pPr algn="just"/>
-            <a:r>
-              <a:rPr lang="pt-BR" sz="2000" dirty="0" smtClean="0"/>
-              <a:t>5 - calcular imposto ICMS de 18% sobre entrada/recebimentos + </a:t>
-            </a:r>
-            <a:r>
-              <a:rPr lang="pt-BR" sz="2000" dirty="0" err="1" smtClean="0"/>
-              <a:t>Pis</a:t>
-            </a:r>
-            <a:r>
-              <a:rPr lang="pt-BR" sz="2000" dirty="0" smtClean="0"/>
-              <a:t>/</a:t>
-            </a:r>
-            <a:r>
-              <a:rPr lang="pt-BR" sz="2000" dirty="0" err="1" smtClean="0"/>
-              <a:t>Cofins</a:t>
-            </a:r>
-            <a:r>
-              <a:rPr lang="pt-BR" sz="2000" dirty="0" smtClean="0"/>
-              <a:t> de 9,25%.</a:t>
-            </a:r>
-          </a:p>
-          <a:p>
-            <a:pPr algn="just"/>
-            <a:r>
-              <a:rPr lang="pt-BR" sz="2000" dirty="0" smtClean="0"/>
-              <a:t>6 - calcular imposto de 9,25% sobre saída/pagamentos.</a:t>
-            </a:r>
-          </a:p>
-          <a:p>
-            <a:pPr algn="just"/>
-            <a:r>
-              <a:rPr lang="pt-BR" sz="2000" dirty="0" smtClean="0"/>
-              <a:t>8 - Criar uma aba resumo mostrando recebimento por dia do mês, recebimento, pagamento e impostos líquidos pagos no ano.</a:t>
-            </a:r>
-          </a:p>
-          <a:p>
-            <a:pPr algn="just"/>
-            <a:r>
-              <a:rPr lang="pt-BR" sz="2000" dirty="0" smtClean="0"/>
-              <a:t>8 - Aba resumo deverá ser o local onde digitaremos as alíquotas e as demais planilhas deverão obedecer a estas alíquotas.</a:t>
-            </a:r>
-          </a:p>
-          <a:p>
-            <a:pPr algn="just"/>
-            <a:endParaRPr lang="pt-BR" sz="2000" dirty="0"/>
-          </a:p>
-          <a:p>
-            <a:pPr marL="0" indent="0" algn="just">
-              <a:buNone/>
-            </a:pPr>
-            <a:r>
-              <a:rPr lang="pt-BR" sz="2000" dirty="0" smtClean="0"/>
-              <a:t>Dica: Fórmula soma 3D, formula aritmética, formatação, copia de planilhas, referência externa.</a:t>
-            </a:r>
-            <a:endParaRPr lang="pt-BR" sz="2000" dirty="0"/>
-          </a:p>
-        </p:txBody>
-      </p:sp>
-      <p:sp>
-        <p:nvSpPr>
-          <p:cNvPr id="4" name="Subtítulo 2"/>
-          <p:cNvSpPr txBox="1">
-            <a:spLocks/>
-          </p:cNvSpPr>
-          <p:nvPr/>
-        </p:nvSpPr>
-        <p:spPr>
-          <a:xfrm>
-            <a:off x="210670" y="153054"/>
-            <a:ext cx="10058400" cy="718315"/>
-          </a:xfrm>
-        </p:spPr>
-        <p:txBody>
-          <a:bodyPr>
-            <a:noAutofit/>
-          </a:bodyPr>
-          <a:lstStyle>
-            <a:lvl1pPr marL="342900" indent="-342900" algn="l" rtl="0" eaLnBrk="0" fontAlgn="base" hangingPunct="0">
-              <a:spcBef>
-                <a:spcPct val="20000"/>
-              </a:spcBef>
-              <a:spcAft>
-                <a:spcPct val="0"/>
-              </a:spcAft>
-              <a:buFont typeface="Arial" charset="0"/>
-              <a:buChar char="•"/>
-              <a:defRPr lang="pt-BR" sz="2800" kern="1200" dirty="0">
-                <a:solidFill>
-                  <a:schemeClr val="tx1"/>
-                </a:solidFill>
-                <a:latin typeface="+mn-lt"/>
-                <a:ea typeface="+mn-ea"/>
-                <a:cs typeface="+mn-cs"/>
-              </a:defRPr>
-            </a:lvl1pPr>
-            <a:lvl2pPr marL="742950" indent="-285750" algn="l" rtl="0" eaLnBrk="0" fontAlgn="base" hangingPunct="0">
-              <a:spcBef>
-                <a:spcPct val="20000"/>
-              </a:spcBef>
-              <a:spcAft>
-                <a:spcPct val="0"/>
-              </a:spcAft>
-              <a:buFont typeface="Arial" charset="0"/>
-              <a:buChar char="•"/>
-              <a:defRPr lang="pt-BR" sz="2400" kern="1200" dirty="0">
-                <a:solidFill>
-                  <a:schemeClr val="tx1"/>
-                </a:solidFill>
-                <a:latin typeface="+mn-lt"/>
-                <a:ea typeface="+mn-ea"/>
-                <a:cs typeface="+mn-cs"/>
-              </a:defRPr>
-            </a:lvl2pPr>
-            <a:lvl3pPr marL="1143000" indent="-228600" algn="l" rtl="0" eaLnBrk="0" fontAlgn="base" hangingPunct="0">
-              <a:spcBef>
-                <a:spcPct val="20000"/>
-              </a:spcBef>
-              <a:spcAft>
-                <a:spcPct val="0"/>
-              </a:spcAft>
-              <a:buFont typeface="Arial" charset="0"/>
-              <a:buChar char="•"/>
-              <a:defRPr lang="pt-BR" sz="2400" kern="1200" dirty="0">
-                <a:solidFill>
-                  <a:schemeClr val="tx1"/>
-                </a:solidFill>
-                <a:latin typeface="+mn-lt"/>
-                <a:ea typeface="+mn-ea"/>
-                <a:cs typeface="+mn-cs"/>
-              </a:defRPr>
-            </a:lvl3pPr>
-            <a:lvl4pPr marL="1600200" indent="-228600" algn="l" rtl="0" eaLnBrk="0" fontAlgn="base" hangingPunct="0">
-              <a:spcBef>
-                <a:spcPct val="20000"/>
-              </a:spcBef>
-              <a:spcAft>
-                <a:spcPct val="0"/>
-              </a:spcAft>
-              <a:buFont typeface="Arial" charset="0"/>
-              <a:buChar char="•"/>
-              <a:defRPr lang="pt-BR" sz="2000" kern="1200" dirty="0">
-                <a:solidFill>
-                  <a:schemeClr val="tx1"/>
-                </a:solidFill>
-                <a:latin typeface="+mn-lt"/>
-                <a:ea typeface="+mn-ea"/>
-                <a:cs typeface="+mn-cs"/>
-              </a:defRPr>
-            </a:lvl4pPr>
-            <a:lvl5pPr marL="2057400" indent="-228600" algn="l" rtl="0" eaLnBrk="0" fontAlgn="base" hangingPunct="0">
-              <a:spcBef>
-                <a:spcPct val="20000"/>
-              </a:spcBef>
-              <a:spcAft>
-                <a:spcPct val="0"/>
-              </a:spcAft>
-              <a:buFont typeface="Arial" charset="0"/>
-              <a:buChar char="•"/>
-              <a:defRPr lang="pt-BR" sz="2000" kern="1200" dirty="0">
-                <a:solidFill>
-                  <a:schemeClr val="tx1"/>
-                </a:solidFill>
-                <a:latin typeface="+mn-lt"/>
-                <a:ea typeface="+mn-ea"/>
-                <a:cs typeface="+mn-cs"/>
-              </a:defRPr>
-            </a:lvl5pPr>
-            <a:lvl6pPr marL="2514600" indent="-228600" algn="l" defTabSz="914400" rtl="0" eaLnBrk="1" latinLnBrk="0" hangingPunct="1">
-              <a:spcBef>
-                <a:spcPct val="20000"/>
-              </a:spcBef>
-              <a:buFont typeface="Arial" pitchFamily="34" charset="0"/>
-              <a:buChar char="•"/>
-              <a:defRPr sz="2000" kern="1200">
-                <a:solidFill>
-                  <a:schemeClr val="tx1"/>
-                </a:solidFill>
-                <a:latin typeface="+mn-lt"/>
-                <a:ea typeface="+mn-ea"/>
-                <a:cs typeface="+mn-cs"/>
-              </a:defRPr>
-            </a:lvl6pPr>
-            <a:lvl7pPr marL="2971800" indent="-228600" algn="l" defTabSz="914400" rtl="0" eaLnBrk="1" latinLnBrk="0" hangingPunct="1">
-              <a:spcBef>
-                <a:spcPct val="20000"/>
-              </a:spcBef>
-              <a:buFont typeface="Arial" pitchFamily="34" charset="0"/>
-              <a:buChar char="•"/>
-              <a:defRPr sz="2000" kern="1200">
-                <a:solidFill>
-                  <a:schemeClr val="tx1"/>
-                </a:solidFill>
-                <a:latin typeface="+mn-lt"/>
-                <a:ea typeface="+mn-ea"/>
-                <a:cs typeface="+mn-cs"/>
-              </a:defRPr>
-            </a:lvl7pPr>
-            <a:lvl8pPr marL="3429000" indent="-228600" algn="l" defTabSz="914400" rtl="0" eaLnBrk="1" latinLnBrk="0" hangingPunct="1">
-              <a:spcBef>
-                <a:spcPct val="20000"/>
-              </a:spcBef>
-              <a:buFont typeface="Arial" pitchFamily="34" charset="0"/>
-              <a:buChar char="•"/>
-              <a:defRPr sz="2000" kern="1200">
-                <a:solidFill>
-                  <a:schemeClr val="tx1"/>
-                </a:solidFill>
-                <a:latin typeface="+mn-lt"/>
-                <a:ea typeface="+mn-ea"/>
-                <a:cs typeface="+mn-cs"/>
-              </a:defRPr>
-            </a:lvl8pPr>
-            <a:lvl9pPr marL="3886200" indent="-228600" algn="l" defTabSz="914400" rtl="0" eaLnBrk="1" latinLnBrk="0" hangingPunct="1">
-              <a:spcBef>
-                <a:spcPct val="20000"/>
-              </a:spcBef>
-              <a:buFont typeface="Arial" pitchFamily="34" charset="0"/>
-              <a:buChar char="•"/>
-              <a:defRPr sz="2000" kern="1200">
-                <a:solidFill>
-                  <a:schemeClr val="tx1"/>
-                </a:solidFill>
-                <a:latin typeface="+mn-lt"/>
-                <a:ea typeface="+mn-ea"/>
-                <a:cs typeface="+mn-cs"/>
-              </a:defRPr>
-            </a:lvl9pPr>
-          </a:lstStyle>
-          <a:p>
-            <a:pPr marL="0" indent="0">
-              <a:lnSpc>
-                <a:spcPct val="150000"/>
-              </a:lnSpc>
-              <a:buFont typeface="Arial" charset="0"/>
-              <a:buNone/>
-            </a:pPr>
-            <a:r>
-              <a:rPr lang="pt-BR" sz="2400" b="1" dirty="0" smtClean="0">
-                <a:solidFill>
-                  <a:schemeClr val="accent6">
-                    <a:lumMod val="75000"/>
-                  </a:schemeClr>
-                </a:solidFill>
-                <a:latin typeface="Corbel" panose="020B0503020204020204" pitchFamily="34" charset="0"/>
-              </a:rPr>
-              <a:t>Atividade</a:t>
-            </a:r>
-          </a:p>
-        </p:txBody>
-      </p:sp>
-    </p:spTree>
-    <p:extLst>
-      <p:ext uri="{BB962C8B-B14F-4D97-AF65-F5344CB8AC3E}">
-        <p14:creationId xmlns:p14="http://schemas.microsoft.com/office/powerpoint/2010/main" val="2083101853"/>
-      </p:ext>
-    </p:extLst>
-  </p:cSld>
-  <p:clrMapOvr>
-    <a:masterClrMapping/>
-  </p:clrMapOvr>
-  <mc:AlternateContent xmlns:mc="http://schemas.openxmlformats.org/markup-compatibility/2006" xmlns:p14="http://schemas.microsoft.com/office/powerpoint/2010/main">
-    <mc:Choice Requires="p14">
-      <p:transition spd="slow" p14:dur="2000"/>
-    </mc:Choice>
-    <mc:Fallback xmlns="">
-      <p:transition spd="slow"/>
-    </mc:Fallback>
-  </mc:AlternateContent>
   <p:timing>
     <p:tnLst>
       <p:par>
@@ -35304,6 +36389,836 @@
 </file>
 
 <file path=ppt/slides/slide60.xml><?xml version="1.0" encoding="utf-8"?>
+<p:sld xmlns:a="http://schemas.openxmlformats.org/drawingml/2006/main" xmlns:r="http://schemas.openxmlformats.org/officeDocument/2006/relationships" xmlns:p="http://schemas.openxmlformats.org/presentationml/2006/main" show="0">
+  <p:cSld>
+    <p:spTree>
+      <p:nvGrpSpPr>
+        <p:cNvPr id="1" name=""/>
+        <p:cNvGrpSpPr/>
+        <p:nvPr/>
+      </p:nvGrpSpPr>
+      <p:grpSpPr>
+        <a:xfrm>
+          <a:off x="0" y="0"/>
+          <a:ext cx="0" cy="0"/>
+          <a:chOff x="0" y="0"/>
+          <a:chExt cx="0" cy="0"/>
+        </a:xfrm>
+      </p:grpSpPr>
+      <p:sp>
+        <p:nvSpPr>
+          <p:cNvPr id="3" name="Subtítulo 1"/>
+          <p:cNvSpPr>
+            <a:spLocks noGrp="1"/>
+          </p:cNvSpPr>
+          <p:nvPr>
+            <p:ph type="subTitle" idx="4294967295"/>
+          </p:nvPr>
+        </p:nvSpPr>
+        <p:spPr>
+          <a:xfrm>
+            <a:off x="484095" y="754063"/>
+            <a:ext cx="11707906" cy="5495925"/>
+          </a:xfrm>
+        </p:spPr>
+        <p:txBody>
+          <a:bodyPr>
+            <a:noAutofit/>
+          </a:bodyPr>
+          <a:lstStyle/>
+          <a:p>
+            <a:pPr algn="just"/>
+            <a:endParaRPr lang="pt-BR" sz="2000" dirty="0" smtClean="0"/>
+          </a:p>
+          <a:p>
+            <a:pPr marL="0" indent="0" algn="just">
+              <a:buNone/>
+            </a:pPr>
+            <a:r>
+              <a:rPr lang="pt-BR" sz="2000" dirty="0" smtClean="0"/>
+              <a:t>Fazer </a:t>
+            </a:r>
+            <a:r>
+              <a:rPr lang="pt-BR" sz="2000" dirty="0"/>
+              <a:t>um relatório </a:t>
+            </a:r>
+            <a:r>
+              <a:rPr lang="pt-BR" sz="2000" dirty="0" smtClean="0"/>
+              <a:t>do </a:t>
+            </a:r>
+            <a:r>
+              <a:rPr lang="pt-BR" sz="2000" dirty="0"/>
+              <a:t>fluxo de caixa diário para 1 ano.</a:t>
+            </a:r>
+          </a:p>
+          <a:p>
+            <a:pPr algn="just"/>
+            <a:r>
+              <a:rPr lang="pt-BR" sz="2000" dirty="0" smtClean="0"/>
+              <a:t>1- Cada </a:t>
+            </a:r>
+            <a:r>
+              <a:rPr lang="pt-BR" sz="2000" dirty="0"/>
+              <a:t>mês será em uma Planilha diferente</a:t>
+            </a:r>
+          </a:p>
+          <a:p>
+            <a:pPr algn="just"/>
+            <a:r>
+              <a:rPr lang="pt-BR" sz="2000" dirty="0" smtClean="0"/>
+              <a:t>2 -Inicia </a:t>
+            </a:r>
+            <a:r>
+              <a:rPr lang="pt-BR" sz="2000" dirty="0"/>
+              <a:t>em </a:t>
+            </a:r>
+            <a:r>
+              <a:rPr lang="pt-BR" sz="2000" dirty="0" smtClean="0"/>
+              <a:t>01/01/2017 com 0 de saldo Inicial. </a:t>
+            </a:r>
+            <a:r>
+              <a:rPr lang="pt-BR" sz="2000" dirty="0"/>
+              <a:t>Termina em </a:t>
+            </a:r>
+            <a:r>
+              <a:rPr lang="pt-BR" sz="2000" dirty="0" smtClean="0"/>
+              <a:t>31/12/2017.</a:t>
+            </a:r>
+            <a:endParaRPr lang="pt-BR" sz="2000" dirty="0"/>
+          </a:p>
+          <a:p>
+            <a:pPr algn="just"/>
+            <a:r>
+              <a:rPr lang="pt-BR" sz="2000" dirty="0" smtClean="0"/>
+              <a:t>3- </a:t>
+            </a:r>
+            <a:r>
+              <a:rPr lang="pt-BR" sz="2000" dirty="0"/>
+              <a:t>Toda terça tem pagamento de fornecedor no valor de 9.000 e às terças de 8.000.</a:t>
+            </a:r>
+            <a:endParaRPr lang="pt-BR" sz="2000" dirty="0" smtClean="0"/>
+          </a:p>
+          <a:p>
+            <a:pPr algn="just"/>
+            <a:r>
+              <a:rPr lang="pt-BR" sz="2000" dirty="0" smtClean="0"/>
+              <a:t>4 -Todo </a:t>
+            </a:r>
+            <a:r>
+              <a:rPr lang="pt-BR" sz="2000" dirty="0"/>
+              <a:t>dia </a:t>
+            </a:r>
+            <a:r>
+              <a:rPr lang="pt-BR" sz="2000" dirty="0" smtClean="0"/>
+              <a:t>5 </a:t>
+            </a:r>
+            <a:r>
+              <a:rPr lang="pt-BR" sz="2000" dirty="0"/>
+              <a:t>e dia </a:t>
+            </a:r>
+            <a:r>
+              <a:rPr lang="pt-BR" sz="2000" dirty="0" smtClean="0"/>
+              <a:t>20 </a:t>
+            </a:r>
+            <a:r>
+              <a:rPr lang="pt-BR" sz="2000" dirty="0"/>
+              <a:t>de cada mês tem despesa adicional de </a:t>
+            </a:r>
+            <a:r>
+              <a:rPr lang="pt-BR" sz="2000" dirty="0" smtClean="0"/>
+              <a:t>15.000 </a:t>
+            </a:r>
+            <a:r>
+              <a:rPr lang="pt-BR" sz="2000" dirty="0"/>
+              <a:t>e </a:t>
+            </a:r>
+            <a:r>
+              <a:rPr lang="pt-BR" sz="2000" dirty="0" smtClean="0"/>
+              <a:t>7.000 </a:t>
+            </a:r>
+            <a:r>
+              <a:rPr lang="pt-BR" sz="2000" dirty="0"/>
+              <a:t>respectivamente.</a:t>
+            </a:r>
+          </a:p>
+          <a:p>
+            <a:pPr algn="just"/>
+            <a:r>
+              <a:rPr lang="pt-BR" sz="2000" dirty="0" smtClean="0"/>
+              <a:t>5- A </a:t>
+            </a:r>
+            <a:r>
+              <a:rPr lang="pt-BR" sz="2000" dirty="0"/>
+              <a:t>partir de setembro, todos os pagamentos aumentam 7%.</a:t>
+            </a:r>
+          </a:p>
+          <a:p>
+            <a:pPr algn="just"/>
+            <a:r>
+              <a:rPr lang="pt-BR" sz="2000" dirty="0" smtClean="0"/>
+              <a:t>6 – Os recebimentos de </a:t>
+            </a:r>
+            <a:r>
+              <a:rPr lang="pt-BR" sz="2000" dirty="0"/>
+              <a:t>vendas são depositadas todas as segundas no valor de </a:t>
+            </a:r>
+            <a:r>
+              <a:rPr lang="pt-BR" sz="2000" dirty="0" smtClean="0"/>
+              <a:t>21.000 (constantes o  ano inteiro)</a:t>
+            </a:r>
+          </a:p>
+          <a:p>
+            <a:pPr algn="just"/>
+            <a:r>
+              <a:rPr lang="pt-BR" sz="2000" dirty="0" smtClean="0"/>
+              <a:t>7- Os recebimentos de venda de sucata são depositadas às </a:t>
+            </a:r>
+            <a:r>
+              <a:rPr lang="pt-BR" sz="2000" dirty="0"/>
+              <a:t>quartas no valor de </a:t>
+            </a:r>
+            <a:r>
+              <a:rPr lang="pt-BR" sz="2000" dirty="0" smtClean="0"/>
+              <a:t>3.000 </a:t>
+            </a:r>
+            <a:r>
+              <a:rPr lang="pt-BR" sz="2000" dirty="0"/>
+              <a:t>(</a:t>
+            </a:r>
+            <a:r>
+              <a:rPr lang="pt-BR" sz="2000" dirty="0" smtClean="0"/>
+              <a:t>constantes </a:t>
+            </a:r>
+            <a:r>
+              <a:rPr lang="pt-BR" sz="2000" dirty="0"/>
+              <a:t>ano </a:t>
+            </a:r>
+            <a:r>
+              <a:rPr lang="pt-BR" sz="2000" dirty="0" smtClean="0"/>
+              <a:t> inteiro).</a:t>
+            </a:r>
+          </a:p>
+          <a:p>
+            <a:pPr algn="just"/>
+            <a:endParaRPr lang="pt-BR" sz="2000" dirty="0"/>
+          </a:p>
+          <a:p>
+            <a:pPr marL="0" indent="0" algn="just">
+              <a:buNone/>
+            </a:pPr>
+            <a:r>
+              <a:rPr lang="pt-BR" sz="2000" dirty="0" smtClean="0"/>
+              <a:t>No fim do ano haverá </a:t>
+            </a:r>
+            <a:r>
+              <a:rPr lang="pt-BR" sz="2000" dirty="0"/>
+              <a:t>sobra ou falta de caixa? Quanto? Destaque pela cor vermelha a  planilha referente ao mês de menor </a:t>
+            </a:r>
+            <a:r>
+              <a:rPr lang="pt-BR" sz="2000" dirty="0" smtClean="0"/>
+              <a:t>caixa e verde onde esta a de maior caixa.</a:t>
+            </a:r>
+          </a:p>
+          <a:p>
+            <a:pPr marL="0" indent="0" algn="just">
+              <a:buNone/>
+            </a:pPr>
+            <a:endParaRPr lang="pt-BR" sz="2000" dirty="0"/>
+          </a:p>
+          <a:p>
+            <a:pPr marL="0" indent="0" algn="just">
+              <a:buNone/>
+            </a:pPr>
+            <a:r>
+              <a:rPr lang="pt-BR" sz="2000" dirty="0" smtClean="0"/>
+              <a:t>Dica: use a planilha anterior, copia de planilhas e formatação, referência externa</a:t>
+            </a:r>
+            <a:endParaRPr lang="pt-BR" sz="2000" dirty="0"/>
+          </a:p>
+        </p:txBody>
+      </p:sp>
+      <p:sp>
+        <p:nvSpPr>
+          <p:cNvPr id="4" name="Subtítulo 2"/>
+          <p:cNvSpPr txBox="1">
+            <a:spLocks/>
+          </p:cNvSpPr>
+          <p:nvPr/>
+        </p:nvSpPr>
+        <p:spPr>
+          <a:xfrm>
+            <a:off x="210670" y="153054"/>
+            <a:ext cx="10058400" cy="718315"/>
+          </a:xfrm>
+        </p:spPr>
+        <p:txBody>
+          <a:bodyPr>
+            <a:noAutofit/>
+          </a:bodyPr>
+          <a:lstStyle>
+            <a:lvl1pPr marL="342900" indent="-342900" algn="l" rtl="0" eaLnBrk="0" fontAlgn="base" hangingPunct="0">
+              <a:spcBef>
+                <a:spcPct val="20000"/>
+              </a:spcBef>
+              <a:spcAft>
+                <a:spcPct val="0"/>
+              </a:spcAft>
+              <a:buFont typeface="Arial" charset="0"/>
+              <a:buChar char="•"/>
+              <a:defRPr lang="pt-BR" sz="2800" kern="1200" dirty="0">
+                <a:solidFill>
+                  <a:schemeClr val="tx1"/>
+                </a:solidFill>
+                <a:latin typeface="+mn-lt"/>
+                <a:ea typeface="+mn-ea"/>
+                <a:cs typeface="+mn-cs"/>
+              </a:defRPr>
+            </a:lvl1pPr>
+            <a:lvl2pPr marL="742950" indent="-285750" algn="l" rtl="0" eaLnBrk="0" fontAlgn="base" hangingPunct="0">
+              <a:spcBef>
+                <a:spcPct val="20000"/>
+              </a:spcBef>
+              <a:spcAft>
+                <a:spcPct val="0"/>
+              </a:spcAft>
+              <a:buFont typeface="Arial" charset="0"/>
+              <a:buChar char="•"/>
+              <a:defRPr lang="pt-BR" sz="2400" kern="1200" dirty="0">
+                <a:solidFill>
+                  <a:schemeClr val="tx1"/>
+                </a:solidFill>
+                <a:latin typeface="+mn-lt"/>
+                <a:ea typeface="+mn-ea"/>
+                <a:cs typeface="+mn-cs"/>
+              </a:defRPr>
+            </a:lvl2pPr>
+            <a:lvl3pPr marL="1143000" indent="-228600" algn="l" rtl="0" eaLnBrk="0" fontAlgn="base" hangingPunct="0">
+              <a:spcBef>
+                <a:spcPct val="20000"/>
+              </a:spcBef>
+              <a:spcAft>
+                <a:spcPct val="0"/>
+              </a:spcAft>
+              <a:buFont typeface="Arial" charset="0"/>
+              <a:buChar char="•"/>
+              <a:defRPr lang="pt-BR" sz="2400" kern="1200" dirty="0">
+                <a:solidFill>
+                  <a:schemeClr val="tx1"/>
+                </a:solidFill>
+                <a:latin typeface="+mn-lt"/>
+                <a:ea typeface="+mn-ea"/>
+                <a:cs typeface="+mn-cs"/>
+              </a:defRPr>
+            </a:lvl3pPr>
+            <a:lvl4pPr marL="1600200" indent="-228600" algn="l" rtl="0" eaLnBrk="0" fontAlgn="base" hangingPunct="0">
+              <a:spcBef>
+                <a:spcPct val="20000"/>
+              </a:spcBef>
+              <a:spcAft>
+                <a:spcPct val="0"/>
+              </a:spcAft>
+              <a:buFont typeface="Arial" charset="0"/>
+              <a:buChar char="•"/>
+              <a:defRPr lang="pt-BR" sz="2000" kern="1200" dirty="0">
+                <a:solidFill>
+                  <a:schemeClr val="tx1"/>
+                </a:solidFill>
+                <a:latin typeface="+mn-lt"/>
+                <a:ea typeface="+mn-ea"/>
+                <a:cs typeface="+mn-cs"/>
+              </a:defRPr>
+            </a:lvl4pPr>
+            <a:lvl5pPr marL="2057400" indent="-228600" algn="l" rtl="0" eaLnBrk="0" fontAlgn="base" hangingPunct="0">
+              <a:spcBef>
+                <a:spcPct val="20000"/>
+              </a:spcBef>
+              <a:spcAft>
+                <a:spcPct val="0"/>
+              </a:spcAft>
+              <a:buFont typeface="Arial" charset="0"/>
+              <a:buChar char="•"/>
+              <a:defRPr lang="pt-BR" sz="2000" kern="1200" dirty="0">
+                <a:solidFill>
+                  <a:schemeClr val="tx1"/>
+                </a:solidFill>
+                <a:latin typeface="+mn-lt"/>
+                <a:ea typeface="+mn-ea"/>
+                <a:cs typeface="+mn-cs"/>
+              </a:defRPr>
+            </a:lvl5pPr>
+            <a:lvl6pPr marL="2514600" indent="-228600" algn="l" defTabSz="914400" rtl="0" eaLnBrk="1" latinLnBrk="0" hangingPunct="1">
+              <a:spcBef>
+                <a:spcPct val="20000"/>
+              </a:spcBef>
+              <a:buFont typeface="Arial" pitchFamily="34" charset="0"/>
+              <a:buChar char="•"/>
+              <a:defRPr sz="2000" kern="1200">
+                <a:solidFill>
+                  <a:schemeClr val="tx1"/>
+                </a:solidFill>
+                <a:latin typeface="+mn-lt"/>
+                <a:ea typeface="+mn-ea"/>
+                <a:cs typeface="+mn-cs"/>
+              </a:defRPr>
+            </a:lvl6pPr>
+            <a:lvl7pPr marL="2971800" indent="-228600" algn="l" defTabSz="914400" rtl="0" eaLnBrk="1" latinLnBrk="0" hangingPunct="1">
+              <a:spcBef>
+                <a:spcPct val="20000"/>
+              </a:spcBef>
+              <a:buFont typeface="Arial" pitchFamily="34" charset="0"/>
+              <a:buChar char="•"/>
+              <a:defRPr sz="2000" kern="1200">
+                <a:solidFill>
+                  <a:schemeClr val="tx1"/>
+                </a:solidFill>
+                <a:latin typeface="+mn-lt"/>
+                <a:ea typeface="+mn-ea"/>
+                <a:cs typeface="+mn-cs"/>
+              </a:defRPr>
+            </a:lvl7pPr>
+            <a:lvl8pPr marL="3429000" indent="-228600" algn="l" defTabSz="914400" rtl="0" eaLnBrk="1" latinLnBrk="0" hangingPunct="1">
+              <a:spcBef>
+                <a:spcPct val="20000"/>
+              </a:spcBef>
+              <a:buFont typeface="Arial" pitchFamily="34" charset="0"/>
+              <a:buChar char="•"/>
+              <a:defRPr sz="2000" kern="1200">
+                <a:solidFill>
+                  <a:schemeClr val="tx1"/>
+                </a:solidFill>
+                <a:latin typeface="+mn-lt"/>
+                <a:ea typeface="+mn-ea"/>
+                <a:cs typeface="+mn-cs"/>
+              </a:defRPr>
+            </a:lvl8pPr>
+            <a:lvl9pPr marL="3886200" indent="-228600" algn="l" defTabSz="914400" rtl="0" eaLnBrk="1" latinLnBrk="0" hangingPunct="1">
+              <a:spcBef>
+                <a:spcPct val="20000"/>
+              </a:spcBef>
+              <a:buFont typeface="Arial" pitchFamily="34" charset="0"/>
+              <a:buChar char="•"/>
+              <a:defRPr sz="2000" kern="1200">
+                <a:solidFill>
+                  <a:schemeClr val="tx1"/>
+                </a:solidFill>
+                <a:latin typeface="+mn-lt"/>
+                <a:ea typeface="+mn-ea"/>
+                <a:cs typeface="+mn-cs"/>
+              </a:defRPr>
+            </a:lvl9pPr>
+          </a:lstStyle>
+          <a:p>
+            <a:pPr marL="0" indent="0">
+              <a:lnSpc>
+                <a:spcPct val="150000"/>
+              </a:lnSpc>
+              <a:buFont typeface="Arial" charset="0"/>
+              <a:buNone/>
+            </a:pPr>
+            <a:r>
+              <a:rPr lang="pt-BR" sz="2400" b="1" dirty="0" smtClean="0">
+                <a:solidFill>
+                  <a:schemeClr val="accent6">
+                    <a:lumMod val="75000"/>
+                  </a:schemeClr>
+                </a:solidFill>
+                <a:latin typeface="Corbel" panose="020B0503020204020204" pitchFamily="34" charset="0"/>
+              </a:rPr>
+              <a:t>Atividade</a:t>
+            </a:r>
+          </a:p>
+        </p:txBody>
+      </p:sp>
+    </p:spTree>
+    <p:extLst>
+      <p:ext uri="{BB962C8B-B14F-4D97-AF65-F5344CB8AC3E}">
+        <p14:creationId xmlns:p14="http://schemas.microsoft.com/office/powerpoint/2010/main" val="453914812"/>
+      </p:ext>
+    </p:extLst>
+  </p:cSld>
+  <p:clrMapOvr>
+    <a:masterClrMapping/>
+  </p:clrMapOvr>
+  <mc:AlternateContent xmlns:mc="http://schemas.openxmlformats.org/markup-compatibility/2006" xmlns:p14="http://schemas.microsoft.com/office/powerpoint/2010/main">
+    <mc:Choice Requires="p14">
+      <p:transition spd="slow" p14:dur="2000"/>
+    </mc:Choice>
+    <mc:Fallback xmlns="">
+      <p:transition spd="slow"/>
+    </mc:Fallback>
+  </mc:AlternateContent>
+  <p:timing>
+    <p:tnLst>
+      <p:par>
+        <p:cTn id="1" dur="indefinite" restart="never" nodeType="tmRoot"/>
+      </p:par>
+    </p:tnLst>
+  </p:timing>
+</p:sld>
+</file>
+
+<file path=ppt/slides/slide61.xml><?xml version="1.0" encoding="utf-8"?>
+<p:sld xmlns:a="http://schemas.openxmlformats.org/drawingml/2006/main" xmlns:r="http://schemas.openxmlformats.org/officeDocument/2006/relationships" xmlns:p="http://schemas.openxmlformats.org/presentationml/2006/main" show="0">
+  <p:cSld>
+    <p:spTree>
+      <p:nvGrpSpPr>
+        <p:cNvPr id="1" name=""/>
+        <p:cNvGrpSpPr/>
+        <p:nvPr/>
+      </p:nvGrpSpPr>
+      <p:grpSpPr>
+        <a:xfrm>
+          <a:off x="0" y="0"/>
+          <a:ext cx="0" cy="0"/>
+          <a:chOff x="0" y="0"/>
+          <a:chExt cx="0" cy="0"/>
+        </a:xfrm>
+      </p:grpSpPr>
+      <p:sp>
+        <p:nvSpPr>
+          <p:cNvPr id="3" name="Subtítulo 1"/>
+          <p:cNvSpPr>
+            <a:spLocks noGrp="1"/>
+          </p:cNvSpPr>
+          <p:nvPr>
+            <p:ph type="subTitle" idx="4294967295"/>
+          </p:nvPr>
+        </p:nvSpPr>
+        <p:spPr>
+          <a:xfrm>
+            <a:off x="591671" y="754063"/>
+            <a:ext cx="11600329" cy="5495925"/>
+          </a:xfrm>
+        </p:spPr>
+        <p:txBody>
+          <a:bodyPr>
+            <a:noAutofit/>
+          </a:bodyPr>
+          <a:lstStyle/>
+          <a:p>
+            <a:pPr marL="0" indent="0">
+              <a:buNone/>
+            </a:pPr>
+            <a:endParaRPr lang="pt-BR" sz="2000" dirty="0"/>
+          </a:p>
+          <a:p>
+            <a:pPr marL="0" indent="0" algn="just">
+              <a:buNone/>
+            </a:pPr>
+            <a:r>
+              <a:rPr lang="pt-BR" sz="2000" dirty="0" smtClean="0"/>
+              <a:t> Criar relatório de fluxo de caixa de 1 ano com entradas, saídas e saldo.</a:t>
+            </a:r>
+          </a:p>
+          <a:p>
+            <a:pPr algn="just"/>
+            <a:r>
+              <a:rPr lang="pt-BR" sz="2000" dirty="0" smtClean="0"/>
+              <a:t>1 - Um mês em cada planilha.</a:t>
+            </a:r>
+          </a:p>
+          <a:p>
+            <a:pPr algn="just"/>
+            <a:r>
+              <a:rPr lang="pt-BR" sz="2000" dirty="0" smtClean="0"/>
+              <a:t>2 - Entrada/Recebimentos  Às terças de R$ 3.000, demais dias de R$ 2.000 (bruto)</a:t>
+            </a:r>
+          </a:p>
+          <a:p>
+            <a:pPr algn="just"/>
+            <a:r>
+              <a:rPr lang="pt-BR" sz="2000" dirty="0" smtClean="0"/>
+              <a:t>3 - Saídas/Pagamentos as quintas de R$ 4.000, demais dias de R$ 1.600 (bruto)</a:t>
+            </a:r>
+          </a:p>
+          <a:p>
+            <a:pPr algn="just"/>
+            <a:r>
+              <a:rPr lang="pt-BR" sz="2000" dirty="0" smtClean="0"/>
+              <a:t>4 - Todo dia 15 de cada mês, saída adicional de 6.000 (bruto)</a:t>
+            </a:r>
+          </a:p>
+          <a:p>
+            <a:pPr algn="just"/>
+            <a:r>
+              <a:rPr lang="pt-BR" sz="2000" dirty="0" smtClean="0"/>
+              <a:t>5 - calcular imposto ICMS de 18% sobre entrada/recebimentos + </a:t>
+            </a:r>
+            <a:r>
+              <a:rPr lang="pt-BR" sz="2000" dirty="0" err="1" smtClean="0"/>
+              <a:t>Pis</a:t>
+            </a:r>
+            <a:r>
+              <a:rPr lang="pt-BR" sz="2000" dirty="0" smtClean="0"/>
+              <a:t>/</a:t>
+            </a:r>
+            <a:r>
+              <a:rPr lang="pt-BR" sz="2000" dirty="0" err="1" smtClean="0"/>
+              <a:t>Cofins</a:t>
+            </a:r>
+            <a:r>
+              <a:rPr lang="pt-BR" sz="2000" dirty="0" smtClean="0"/>
+              <a:t> de 9,25%.</a:t>
+            </a:r>
+          </a:p>
+          <a:p>
+            <a:pPr algn="just"/>
+            <a:r>
+              <a:rPr lang="pt-BR" sz="2000" dirty="0" smtClean="0"/>
+              <a:t>6 - calcular imposto de 9,25% sobre saída/pagamentos.</a:t>
+            </a:r>
+          </a:p>
+          <a:p>
+            <a:pPr algn="just"/>
+            <a:r>
+              <a:rPr lang="pt-BR" sz="2000" dirty="0" smtClean="0"/>
+              <a:t>8 - Criar uma aba resumo mostrando recebimento por dia do mês, recebimento, pagamento e impostos líquidos pagos no ano.</a:t>
+            </a:r>
+          </a:p>
+          <a:p>
+            <a:pPr algn="just"/>
+            <a:r>
+              <a:rPr lang="pt-BR" sz="2000" dirty="0" smtClean="0"/>
+              <a:t>8 - Aba resumo deverá ser o local onde digitaremos as alíquotas e as demais planilhas deverão obedecer a estas alíquotas.</a:t>
+            </a:r>
+          </a:p>
+          <a:p>
+            <a:pPr algn="just"/>
+            <a:endParaRPr lang="pt-BR" sz="2000" dirty="0"/>
+          </a:p>
+          <a:p>
+            <a:pPr marL="0" indent="0" algn="just">
+              <a:buNone/>
+            </a:pPr>
+            <a:r>
+              <a:rPr lang="pt-BR" sz="2000" dirty="0" smtClean="0"/>
+              <a:t>Dica: Fórmula soma 3D, formula aritmética, formatação, copia de planilhas, referência externa.</a:t>
+            </a:r>
+            <a:endParaRPr lang="pt-BR" sz="2000" dirty="0"/>
+          </a:p>
+        </p:txBody>
+      </p:sp>
+      <p:sp>
+        <p:nvSpPr>
+          <p:cNvPr id="4" name="Subtítulo 2"/>
+          <p:cNvSpPr txBox="1">
+            <a:spLocks/>
+          </p:cNvSpPr>
+          <p:nvPr/>
+        </p:nvSpPr>
+        <p:spPr>
+          <a:xfrm>
+            <a:off x="210670" y="153054"/>
+            <a:ext cx="10058400" cy="718315"/>
+          </a:xfrm>
+        </p:spPr>
+        <p:txBody>
+          <a:bodyPr>
+            <a:noAutofit/>
+          </a:bodyPr>
+          <a:lstStyle>
+            <a:lvl1pPr marL="342900" indent="-342900" algn="l" rtl="0" eaLnBrk="0" fontAlgn="base" hangingPunct="0">
+              <a:spcBef>
+                <a:spcPct val="20000"/>
+              </a:spcBef>
+              <a:spcAft>
+                <a:spcPct val="0"/>
+              </a:spcAft>
+              <a:buFont typeface="Arial" charset="0"/>
+              <a:buChar char="•"/>
+              <a:defRPr lang="pt-BR" sz="2800" kern="1200" dirty="0">
+                <a:solidFill>
+                  <a:schemeClr val="tx1"/>
+                </a:solidFill>
+                <a:latin typeface="+mn-lt"/>
+                <a:ea typeface="+mn-ea"/>
+                <a:cs typeface="+mn-cs"/>
+              </a:defRPr>
+            </a:lvl1pPr>
+            <a:lvl2pPr marL="742950" indent="-285750" algn="l" rtl="0" eaLnBrk="0" fontAlgn="base" hangingPunct="0">
+              <a:spcBef>
+                <a:spcPct val="20000"/>
+              </a:spcBef>
+              <a:spcAft>
+                <a:spcPct val="0"/>
+              </a:spcAft>
+              <a:buFont typeface="Arial" charset="0"/>
+              <a:buChar char="•"/>
+              <a:defRPr lang="pt-BR" sz="2400" kern="1200" dirty="0">
+                <a:solidFill>
+                  <a:schemeClr val="tx1"/>
+                </a:solidFill>
+                <a:latin typeface="+mn-lt"/>
+                <a:ea typeface="+mn-ea"/>
+                <a:cs typeface="+mn-cs"/>
+              </a:defRPr>
+            </a:lvl2pPr>
+            <a:lvl3pPr marL="1143000" indent="-228600" algn="l" rtl="0" eaLnBrk="0" fontAlgn="base" hangingPunct="0">
+              <a:spcBef>
+                <a:spcPct val="20000"/>
+              </a:spcBef>
+              <a:spcAft>
+                <a:spcPct val="0"/>
+              </a:spcAft>
+              <a:buFont typeface="Arial" charset="0"/>
+              <a:buChar char="•"/>
+              <a:defRPr lang="pt-BR" sz="2400" kern="1200" dirty="0">
+                <a:solidFill>
+                  <a:schemeClr val="tx1"/>
+                </a:solidFill>
+                <a:latin typeface="+mn-lt"/>
+                <a:ea typeface="+mn-ea"/>
+                <a:cs typeface="+mn-cs"/>
+              </a:defRPr>
+            </a:lvl3pPr>
+            <a:lvl4pPr marL="1600200" indent="-228600" algn="l" rtl="0" eaLnBrk="0" fontAlgn="base" hangingPunct="0">
+              <a:spcBef>
+                <a:spcPct val="20000"/>
+              </a:spcBef>
+              <a:spcAft>
+                <a:spcPct val="0"/>
+              </a:spcAft>
+              <a:buFont typeface="Arial" charset="0"/>
+              <a:buChar char="•"/>
+              <a:defRPr lang="pt-BR" sz="2000" kern="1200" dirty="0">
+                <a:solidFill>
+                  <a:schemeClr val="tx1"/>
+                </a:solidFill>
+                <a:latin typeface="+mn-lt"/>
+                <a:ea typeface="+mn-ea"/>
+                <a:cs typeface="+mn-cs"/>
+              </a:defRPr>
+            </a:lvl4pPr>
+            <a:lvl5pPr marL="2057400" indent="-228600" algn="l" rtl="0" eaLnBrk="0" fontAlgn="base" hangingPunct="0">
+              <a:spcBef>
+                <a:spcPct val="20000"/>
+              </a:spcBef>
+              <a:spcAft>
+                <a:spcPct val="0"/>
+              </a:spcAft>
+              <a:buFont typeface="Arial" charset="0"/>
+              <a:buChar char="•"/>
+              <a:defRPr lang="pt-BR" sz="2000" kern="1200" dirty="0">
+                <a:solidFill>
+                  <a:schemeClr val="tx1"/>
+                </a:solidFill>
+                <a:latin typeface="+mn-lt"/>
+                <a:ea typeface="+mn-ea"/>
+                <a:cs typeface="+mn-cs"/>
+              </a:defRPr>
+            </a:lvl5pPr>
+            <a:lvl6pPr marL="2514600" indent="-228600" algn="l" defTabSz="914400" rtl="0" eaLnBrk="1" latinLnBrk="0" hangingPunct="1">
+              <a:spcBef>
+                <a:spcPct val="20000"/>
+              </a:spcBef>
+              <a:buFont typeface="Arial" pitchFamily="34" charset="0"/>
+              <a:buChar char="•"/>
+              <a:defRPr sz="2000" kern="1200">
+                <a:solidFill>
+                  <a:schemeClr val="tx1"/>
+                </a:solidFill>
+                <a:latin typeface="+mn-lt"/>
+                <a:ea typeface="+mn-ea"/>
+                <a:cs typeface="+mn-cs"/>
+              </a:defRPr>
+            </a:lvl6pPr>
+            <a:lvl7pPr marL="2971800" indent="-228600" algn="l" defTabSz="914400" rtl="0" eaLnBrk="1" latinLnBrk="0" hangingPunct="1">
+              <a:spcBef>
+                <a:spcPct val="20000"/>
+              </a:spcBef>
+              <a:buFont typeface="Arial" pitchFamily="34" charset="0"/>
+              <a:buChar char="•"/>
+              <a:defRPr sz="2000" kern="1200">
+                <a:solidFill>
+                  <a:schemeClr val="tx1"/>
+                </a:solidFill>
+                <a:latin typeface="+mn-lt"/>
+                <a:ea typeface="+mn-ea"/>
+                <a:cs typeface="+mn-cs"/>
+              </a:defRPr>
+            </a:lvl7pPr>
+            <a:lvl8pPr marL="3429000" indent="-228600" algn="l" defTabSz="914400" rtl="0" eaLnBrk="1" latinLnBrk="0" hangingPunct="1">
+              <a:spcBef>
+                <a:spcPct val="20000"/>
+              </a:spcBef>
+              <a:buFont typeface="Arial" pitchFamily="34" charset="0"/>
+              <a:buChar char="•"/>
+              <a:defRPr sz="2000" kern="1200">
+                <a:solidFill>
+                  <a:schemeClr val="tx1"/>
+                </a:solidFill>
+                <a:latin typeface="+mn-lt"/>
+                <a:ea typeface="+mn-ea"/>
+                <a:cs typeface="+mn-cs"/>
+              </a:defRPr>
+            </a:lvl8pPr>
+            <a:lvl9pPr marL="3886200" indent="-228600" algn="l" defTabSz="914400" rtl="0" eaLnBrk="1" latinLnBrk="0" hangingPunct="1">
+              <a:spcBef>
+                <a:spcPct val="20000"/>
+              </a:spcBef>
+              <a:buFont typeface="Arial" pitchFamily="34" charset="0"/>
+              <a:buChar char="•"/>
+              <a:defRPr sz="2000" kern="1200">
+                <a:solidFill>
+                  <a:schemeClr val="tx1"/>
+                </a:solidFill>
+                <a:latin typeface="+mn-lt"/>
+                <a:ea typeface="+mn-ea"/>
+                <a:cs typeface="+mn-cs"/>
+              </a:defRPr>
+            </a:lvl9pPr>
+          </a:lstStyle>
+          <a:p>
+            <a:pPr marL="0" indent="0">
+              <a:lnSpc>
+                <a:spcPct val="150000"/>
+              </a:lnSpc>
+              <a:buFont typeface="Arial" charset="0"/>
+              <a:buNone/>
+            </a:pPr>
+            <a:r>
+              <a:rPr lang="pt-BR" sz="2400" b="1" dirty="0" smtClean="0">
+                <a:solidFill>
+                  <a:schemeClr val="accent6">
+                    <a:lumMod val="75000"/>
+                  </a:schemeClr>
+                </a:solidFill>
+                <a:latin typeface="Corbel" panose="020B0503020204020204" pitchFamily="34" charset="0"/>
+              </a:rPr>
+              <a:t>Atividade</a:t>
+            </a:r>
+          </a:p>
+        </p:txBody>
+      </p:sp>
+    </p:spTree>
+    <p:extLst>
+      <p:ext uri="{BB962C8B-B14F-4D97-AF65-F5344CB8AC3E}">
+        <p14:creationId xmlns:p14="http://schemas.microsoft.com/office/powerpoint/2010/main" val="2083101853"/>
+      </p:ext>
+    </p:extLst>
+  </p:cSld>
+  <p:clrMapOvr>
+    <a:masterClrMapping/>
+  </p:clrMapOvr>
+  <mc:AlternateContent xmlns:mc="http://schemas.openxmlformats.org/markup-compatibility/2006" xmlns:p14="http://schemas.microsoft.com/office/powerpoint/2010/main">
+    <mc:Choice Requires="p14">
+      <p:transition spd="slow" p14:dur="2000"/>
+    </mc:Choice>
+    <mc:Fallback xmlns="">
+      <p:transition spd="slow"/>
+    </mc:Fallback>
+  </mc:AlternateContent>
+  <p:timing>
+    <p:tnLst>
+      <p:par>
+        <p:cTn id="1" dur="indefinite" restart="never" nodeType="tmRoot"/>
+      </p:par>
+    </p:tnLst>
+  </p:timing>
+</p:sld>
+</file>
+
+<file path=ppt/slides/slide62.xml><?xml version="1.0" encoding="utf-8"?>
 <p:sld xmlns:a="http://schemas.openxmlformats.org/drawingml/2006/main" xmlns:r="http://schemas.openxmlformats.org/officeDocument/2006/relationships" xmlns:p="http://schemas.openxmlformats.org/presentationml/2006/main" show="0">
   <p:cSld>
     <p:spTree>

</xml_diff>

<commit_message>
Aula 08-12 pré aula
</commit_message>
<xml_diff>
--- a/Professor/Aula3.pptx
+++ b/Professor/Aula3.pptx
@@ -5,10 +5,10 @@
     <p:sldMasterId id="2147483672" r:id="rId1"/>
   </p:sldMasterIdLst>
   <p:notesMasterIdLst>
-    <p:notesMasterId r:id="rId78"/>
+    <p:notesMasterId r:id="rId79"/>
   </p:notesMasterIdLst>
   <p:handoutMasterIdLst>
-    <p:handoutMasterId r:id="rId79"/>
+    <p:handoutMasterId r:id="rId80"/>
   </p:handoutMasterIdLst>
   <p:sldIdLst>
     <p:sldId id="256" r:id="rId2"/>
@@ -75,18 +75,19 @@
     <p:sldId id="343" r:id="rId63"/>
     <p:sldId id="344" r:id="rId64"/>
     <p:sldId id="345" r:id="rId65"/>
-    <p:sldId id="338" r:id="rId66"/>
-    <p:sldId id="334" r:id="rId67"/>
-    <p:sldId id="336" r:id="rId68"/>
-    <p:sldId id="309" r:id="rId69"/>
-    <p:sldId id="337" r:id="rId70"/>
-    <p:sldId id="339" r:id="rId71"/>
+    <p:sldId id="346" r:id="rId66"/>
+    <p:sldId id="338" r:id="rId67"/>
+    <p:sldId id="334" r:id="rId68"/>
+    <p:sldId id="336" r:id="rId69"/>
+    <p:sldId id="309" r:id="rId70"/>
+    <p:sldId id="337" r:id="rId71"/>
     <p:sldId id="340" r:id="rId72"/>
     <p:sldId id="341" r:id="rId73"/>
     <p:sldId id="290" r:id="rId74"/>
-    <p:sldId id="281" r:id="rId75"/>
-    <p:sldId id="289" r:id="rId76"/>
-    <p:sldId id="342" r:id="rId77"/>
+    <p:sldId id="339" r:id="rId75"/>
+    <p:sldId id="281" r:id="rId76"/>
+    <p:sldId id="289" r:id="rId77"/>
+    <p:sldId id="342" r:id="rId78"/>
   </p:sldIdLst>
   <p:sldSz cx="12192000" cy="6858000"/>
   <p:notesSz cx="6858000" cy="9144000"/>
@@ -236,7 +237,6 @@
           </a:p>
         </c:rich>
       </c:tx>
-      <c:layout/>
       <c:overlay val="0"/>
       <c:spPr>
         <a:noFill/>
@@ -533,7 +533,6 @@
           </a:p>
         </c:rich>
       </c:tx>
-      <c:layout/>
       <c:overlay val="0"/>
       <c:spPr>
         <a:noFill/>
@@ -831,7 +830,6 @@
           </a:p>
         </c:rich>
       </c:tx>
-      <c:layout/>
       <c:overlay val="0"/>
       <c:spPr>
         <a:noFill/>
@@ -9806,7 +9804,7 @@
           <a:graphicData uri="http://schemas.openxmlformats.org/presentationml/2006/ole">
             <mc:AlternateContent xmlns:mc="http://schemas.openxmlformats.org/markup-compatibility/2006">
               <mc:Choice xmlns:v="urn:schemas-microsoft-com:vml" Requires="v">
-                <p:oleObj spid="_x0000_s1232" name="Slide do think-cell" r:id="rId7" imgW="270" imgH="270" progId="TCLayout.ActiveDocument.1">
+                <p:oleObj spid="_x0000_s1239" name="Slide do think-cell" r:id="rId7" imgW="270" imgH="270" progId="TCLayout.ActiveDocument.1">
                   <p:embed/>
                 </p:oleObj>
               </mc:Choice>
@@ -41617,13 +41615,8 @@
             </a:pPr>
             <a:r>
               <a:rPr lang="pt-BR" sz="1600" dirty="0" smtClean="0"/>
-              <a:t>2)Selecionar dados e pressionar </a:t>
-            </a:r>
-            <a:r>
-              <a:rPr lang="pt-BR" sz="1600" dirty="0" smtClean="0"/>
-              <a:t>F11 .</a:t>
-            </a:r>
-            <a:endParaRPr lang="pt-BR" sz="1600" dirty="0" smtClean="0"/>
+              <a:t>2)Selecionar dados e pressionar F11 .</a:t>
+            </a:r>
           </a:p>
           <a:p>
             <a:pPr marL="0" indent="0">
@@ -42957,6 +42950,461 @@
       </p:grpSpPr>
       <p:sp>
         <p:nvSpPr>
+          <p:cNvPr id="3" name="Subtítulo 1"/>
+          <p:cNvSpPr>
+            <a:spLocks noGrp="1"/>
+          </p:cNvSpPr>
+          <p:nvPr>
+            <p:ph type="subTitle" idx="4294967295"/>
+          </p:nvPr>
+        </p:nvSpPr>
+        <p:spPr>
+          <a:xfrm>
+            <a:off x="1929205" y="1156518"/>
+            <a:ext cx="9144000" cy="5701482"/>
+          </a:xfrm>
+        </p:spPr>
+        <p:txBody>
+          <a:bodyPr>
+            <a:noAutofit/>
+          </a:bodyPr>
+          <a:lstStyle/>
+          <a:p>
+            <a:pPr>
+              <a:lnSpc>
+                <a:spcPct val="150000"/>
+              </a:lnSpc>
+            </a:pPr>
+            <a:r>
+              <a:rPr lang="pt-BR" sz="2000" dirty="0" smtClean="0"/>
+              <a:t>Abrir Arquivo DRE</a:t>
+            </a:r>
+            <a:endParaRPr lang="pt-BR" sz="2000" dirty="0"/>
+          </a:p>
+        </p:txBody>
+      </p:sp>
+      <p:sp>
+        <p:nvSpPr>
+          <p:cNvPr id="4" name="Subtítulo 1"/>
+          <p:cNvSpPr txBox="1">
+            <a:spLocks/>
+          </p:cNvSpPr>
+          <p:nvPr/>
+        </p:nvSpPr>
+        <p:spPr>
+          <a:xfrm>
+            <a:off x="1450490" y="613204"/>
+            <a:ext cx="9144000" cy="5924230"/>
+          </a:xfrm>
+          <a:prstGeom prst="rect">
+            <a:avLst/>
+          </a:prstGeom>
+        </p:spPr>
+        <p:txBody>
+          <a:bodyPr vert="horz" lIns="91440" tIns="45720" rIns="91440" bIns="45720" rtlCol="0">
+            <a:normAutofit/>
+          </a:bodyPr>
+          <a:lstStyle>
+            <a:lvl1pPr marL="0" indent="0" algn="ctr" defTabSz="914400" rtl="0" eaLnBrk="1" latinLnBrk="0" hangingPunct="1">
+              <a:lnSpc>
+                <a:spcPct val="90000"/>
+              </a:lnSpc>
+              <a:spcBef>
+                <a:spcPts val="1000"/>
+              </a:spcBef>
+              <a:buFont typeface="Arial" panose="020B0604020202020204" pitchFamily="34" charset="0"/>
+              <a:buNone/>
+              <a:defRPr sz="2400" kern="1200">
+                <a:solidFill>
+                  <a:schemeClr val="tx1"/>
+                </a:solidFill>
+                <a:latin typeface="+mn-lt"/>
+                <a:ea typeface="+mn-ea"/>
+                <a:cs typeface="+mn-cs"/>
+              </a:defRPr>
+            </a:lvl1pPr>
+            <a:lvl2pPr marL="457200" indent="0" algn="ctr" defTabSz="914400" rtl="0" eaLnBrk="1" latinLnBrk="0" hangingPunct="1">
+              <a:lnSpc>
+                <a:spcPct val="90000"/>
+              </a:lnSpc>
+              <a:spcBef>
+                <a:spcPts val="500"/>
+              </a:spcBef>
+              <a:buFont typeface="Arial" panose="020B0604020202020204" pitchFamily="34" charset="0"/>
+              <a:buNone/>
+              <a:defRPr sz="2000" kern="1200">
+                <a:solidFill>
+                  <a:schemeClr val="tx1"/>
+                </a:solidFill>
+                <a:latin typeface="+mn-lt"/>
+                <a:ea typeface="+mn-ea"/>
+                <a:cs typeface="+mn-cs"/>
+              </a:defRPr>
+            </a:lvl2pPr>
+            <a:lvl3pPr marL="914400" indent="0" algn="ctr" defTabSz="914400" rtl="0" eaLnBrk="1" latinLnBrk="0" hangingPunct="1">
+              <a:lnSpc>
+                <a:spcPct val="90000"/>
+              </a:lnSpc>
+              <a:spcBef>
+                <a:spcPts val="500"/>
+              </a:spcBef>
+              <a:buFont typeface="Arial" panose="020B0604020202020204" pitchFamily="34" charset="0"/>
+              <a:buNone/>
+              <a:defRPr sz="1800" kern="1200">
+                <a:solidFill>
+                  <a:schemeClr val="tx1"/>
+                </a:solidFill>
+                <a:latin typeface="+mn-lt"/>
+                <a:ea typeface="+mn-ea"/>
+                <a:cs typeface="+mn-cs"/>
+              </a:defRPr>
+            </a:lvl3pPr>
+            <a:lvl4pPr marL="1371600" indent="0" algn="ctr" defTabSz="914400" rtl="0" eaLnBrk="1" latinLnBrk="0" hangingPunct="1">
+              <a:lnSpc>
+                <a:spcPct val="90000"/>
+              </a:lnSpc>
+              <a:spcBef>
+                <a:spcPts val="500"/>
+              </a:spcBef>
+              <a:buFont typeface="Arial" panose="020B0604020202020204" pitchFamily="34" charset="0"/>
+              <a:buNone/>
+              <a:defRPr sz="1600" kern="1200">
+                <a:solidFill>
+                  <a:schemeClr val="tx1"/>
+                </a:solidFill>
+                <a:latin typeface="+mn-lt"/>
+                <a:ea typeface="+mn-ea"/>
+                <a:cs typeface="+mn-cs"/>
+              </a:defRPr>
+            </a:lvl4pPr>
+            <a:lvl5pPr marL="1828800" indent="0" algn="ctr" defTabSz="914400" rtl="0" eaLnBrk="1" latinLnBrk="0" hangingPunct="1">
+              <a:lnSpc>
+                <a:spcPct val="90000"/>
+              </a:lnSpc>
+              <a:spcBef>
+                <a:spcPts val="500"/>
+              </a:spcBef>
+              <a:buFont typeface="Arial" panose="020B0604020202020204" pitchFamily="34" charset="0"/>
+              <a:buNone/>
+              <a:defRPr sz="1600" kern="1200">
+                <a:solidFill>
+                  <a:schemeClr val="tx1"/>
+                </a:solidFill>
+                <a:latin typeface="+mn-lt"/>
+                <a:ea typeface="+mn-ea"/>
+                <a:cs typeface="+mn-cs"/>
+              </a:defRPr>
+            </a:lvl5pPr>
+            <a:lvl6pPr marL="2286000" indent="0" algn="ctr" defTabSz="914400" rtl="0" eaLnBrk="1" latinLnBrk="0" hangingPunct="1">
+              <a:lnSpc>
+                <a:spcPct val="90000"/>
+              </a:lnSpc>
+              <a:spcBef>
+                <a:spcPts val="500"/>
+              </a:spcBef>
+              <a:buFont typeface="Arial" panose="020B0604020202020204" pitchFamily="34" charset="0"/>
+              <a:buNone/>
+              <a:defRPr sz="1600" kern="1200">
+                <a:solidFill>
+                  <a:schemeClr val="tx1"/>
+                </a:solidFill>
+                <a:latin typeface="+mn-lt"/>
+                <a:ea typeface="+mn-ea"/>
+                <a:cs typeface="+mn-cs"/>
+              </a:defRPr>
+            </a:lvl6pPr>
+            <a:lvl7pPr marL="2743200" indent="0" algn="ctr" defTabSz="914400" rtl="0" eaLnBrk="1" latinLnBrk="0" hangingPunct="1">
+              <a:lnSpc>
+                <a:spcPct val="90000"/>
+              </a:lnSpc>
+              <a:spcBef>
+                <a:spcPts val="500"/>
+              </a:spcBef>
+              <a:buFont typeface="Arial" panose="020B0604020202020204" pitchFamily="34" charset="0"/>
+              <a:buNone/>
+              <a:defRPr sz="1600" kern="1200">
+                <a:solidFill>
+                  <a:schemeClr val="tx1"/>
+                </a:solidFill>
+                <a:latin typeface="+mn-lt"/>
+                <a:ea typeface="+mn-ea"/>
+                <a:cs typeface="+mn-cs"/>
+              </a:defRPr>
+            </a:lvl7pPr>
+            <a:lvl8pPr marL="3200400" indent="0" algn="ctr" defTabSz="914400" rtl="0" eaLnBrk="1" latinLnBrk="0" hangingPunct="1">
+              <a:lnSpc>
+                <a:spcPct val="90000"/>
+              </a:lnSpc>
+              <a:spcBef>
+                <a:spcPts val="500"/>
+              </a:spcBef>
+              <a:buFont typeface="Arial" panose="020B0604020202020204" pitchFamily="34" charset="0"/>
+              <a:buNone/>
+              <a:defRPr sz="1600" kern="1200">
+                <a:solidFill>
+                  <a:schemeClr val="tx1"/>
+                </a:solidFill>
+                <a:latin typeface="+mn-lt"/>
+                <a:ea typeface="+mn-ea"/>
+                <a:cs typeface="+mn-cs"/>
+              </a:defRPr>
+            </a:lvl8pPr>
+            <a:lvl9pPr marL="3657600" indent="0" algn="ctr" defTabSz="914400" rtl="0" eaLnBrk="1" latinLnBrk="0" hangingPunct="1">
+              <a:lnSpc>
+                <a:spcPct val="90000"/>
+              </a:lnSpc>
+              <a:spcBef>
+                <a:spcPts val="500"/>
+              </a:spcBef>
+              <a:buFont typeface="Arial" panose="020B0604020202020204" pitchFamily="34" charset="0"/>
+              <a:buNone/>
+              <a:defRPr sz="1600" kern="1200">
+                <a:solidFill>
+                  <a:schemeClr val="tx1"/>
+                </a:solidFill>
+                <a:latin typeface="+mn-lt"/>
+                <a:ea typeface="+mn-ea"/>
+                <a:cs typeface="+mn-cs"/>
+              </a:defRPr>
+            </a:lvl9pPr>
+          </a:lstStyle>
+          <a:p>
+            <a:endParaRPr lang="pt-BR" dirty="0"/>
+          </a:p>
+        </p:txBody>
+      </p:sp>
+      <p:sp>
+        <p:nvSpPr>
+          <p:cNvPr id="6" name="Subtítulo 2"/>
+          <p:cNvSpPr txBox="1">
+            <a:spLocks/>
+          </p:cNvSpPr>
+          <p:nvPr/>
+        </p:nvSpPr>
+        <p:spPr>
+          <a:xfrm>
+            <a:off x="210670" y="153054"/>
+            <a:ext cx="10058400" cy="777492"/>
+          </a:xfrm>
+        </p:spPr>
+        <p:txBody>
+          <a:bodyPr>
+            <a:noAutofit/>
+          </a:bodyPr>
+          <a:lstStyle>
+            <a:lvl1pPr marL="342900" indent="-342900" algn="l" rtl="0" eaLnBrk="0" fontAlgn="base" hangingPunct="0">
+              <a:spcBef>
+                <a:spcPct val="20000"/>
+              </a:spcBef>
+              <a:spcAft>
+                <a:spcPct val="0"/>
+              </a:spcAft>
+              <a:buFont typeface="Arial" charset="0"/>
+              <a:buChar char="•"/>
+              <a:defRPr lang="pt-BR" sz="2800" kern="1200" dirty="0">
+                <a:solidFill>
+                  <a:schemeClr val="tx1"/>
+                </a:solidFill>
+                <a:latin typeface="+mn-lt"/>
+                <a:ea typeface="+mn-ea"/>
+                <a:cs typeface="+mn-cs"/>
+              </a:defRPr>
+            </a:lvl1pPr>
+            <a:lvl2pPr marL="742950" indent="-285750" algn="l" rtl="0" eaLnBrk="0" fontAlgn="base" hangingPunct="0">
+              <a:spcBef>
+                <a:spcPct val="20000"/>
+              </a:spcBef>
+              <a:spcAft>
+                <a:spcPct val="0"/>
+              </a:spcAft>
+              <a:buFont typeface="Arial" charset="0"/>
+              <a:buChar char="•"/>
+              <a:defRPr lang="pt-BR" sz="2400" kern="1200" dirty="0">
+                <a:solidFill>
+                  <a:schemeClr val="tx1"/>
+                </a:solidFill>
+                <a:latin typeface="+mn-lt"/>
+                <a:ea typeface="+mn-ea"/>
+                <a:cs typeface="+mn-cs"/>
+              </a:defRPr>
+            </a:lvl2pPr>
+            <a:lvl3pPr marL="1143000" indent="-228600" algn="l" rtl="0" eaLnBrk="0" fontAlgn="base" hangingPunct="0">
+              <a:spcBef>
+                <a:spcPct val="20000"/>
+              </a:spcBef>
+              <a:spcAft>
+                <a:spcPct val="0"/>
+              </a:spcAft>
+              <a:buFont typeface="Arial" charset="0"/>
+              <a:buChar char="•"/>
+              <a:defRPr lang="pt-BR" sz="2400" kern="1200" dirty="0">
+                <a:solidFill>
+                  <a:schemeClr val="tx1"/>
+                </a:solidFill>
+                <a:latin typeface="+mn-lt"/>
+                <a:ea typeface="+mn-ea"/>
+                <a:cs typeface="+mn-cs"/>
+              </a:defRPr>
+            </a:lvl3pPr>
+            <a:lvl4pPr marL="1600200" indent="-228600" algn="l" rtl="0" eaLnBrk="0" fontAlgn="base" hangingPunct="0">
+              <a:spcBef>
+                <a:spcPct val="20000"/>
+              </a:spcBef>
+              <a:spcAft>
+                <a:spcPct val="0"/>
+              </a:spcAft>
+              <a:buFont typeface="Arial" charset="0"/>
+              <a:buChar char="•"/>
+              <a:defRPr lang="pt-BR" sz="2000" kern="1200" dirty="0">
+                <a:solidFill>
+                  <a:schemeClr val="tx1"/>
+                </a:solidFill>
+                <a:latin typeface="+mn-lt"/>
+                <a:ea typeface="+mn-ea"/>
+                <a:cs typeface="+mn-cs"/>
+              </a:defRPr>
+            </a:lvl4pPr>
+            <a:lvl5pPr marL="2057400" indent="-228600" algn="l" rtl="0" eaLnBrk="0" fontAlgn="base" hangingPunct="0">
+              <a:spcBef>
+                <a:spcPct val="20000"/>
+              </a:spcBef>
+              <a:spcAft>
+                <a:spcPct val="0"/>
+              </a:spcAft>
+              <a:buFont typeface="Arial" charset="0"/>
+              <a:buChar char="•"/>
+              <a:defRPr lang="pt-BR" sz="2000" kern="1200" dirty="0">
+                <a:solidFill>
+                  <a:schemeClr val="tx1"/>
+                </a:solidFill>
+                <a:latin typeface="+mn-lt"/>
+                <a:ea typeface="+mn-ea"/>
+                <a:cs typeface="+mn-cs"/>
+              </a:defRPr>
+            </a:lvl5pPr>
+            <a:lvl6pPr marL="2514600" indent="-228600" algn="l" defTabSz="914400" rtl="0" eaLnBrk="1" latinLnBrk="0" hangingPunct="1">
+              <a:spcBef>
+                <a:spcPct val="20000"/>
+              </a:spcBef>
+              <a:buFont typeface="Arial" pitchFamily="34" charset="0"/>
+              <a:buChar char="•"/>
+              <a:defRPr sz="2000" kern="1200">
+                <a:solidFill>
+                  <a:schemeClr val="tx1"/>
+                </a:solidFill>
+                <a:latin typeface="+mn-lt"/>
+                <a:ea typeface="+mn-ea"/>
+                <a:cs typeface="+mn-cs"/>
+              </a:defRPr>
+            </a:lvl6pPr>
+            <a:lvl7pPr marL="2971800" indent="-228600" algn="l" defTabSz="914400" rtl="0" eaLnBrk="1" latinLnBrk="0" hangingPunct="1">
+              <a:spcBef>
+                <a:spcPct val="20000"/>
+              </a:spcBef>
+              <a:buFont typeface="Arial" pitchFamily="34" charset="0"/>
+              <a:buChar char="•"/>
+              <a:defRPr sz="2000" kern="1200">
+                <a:solidFill>
+                  <a:schemeClr val="tx1"/>
+                </a:solidFill>
+                <a:latin typeface="+mn-lt"/>
+                <a:ea typeface="+mn-ea"/>
+                <a:cs typeface="+mn-cs"/>
+              </a:defRPr>
+            </a:lvl7pPr>
+            <a:lvl8pPr marL="3429000" indent="-228600" algn="l" defTabSz="914400" rtl="0" eaLnBrk="1" latinLnBrk="0" hangingPunct="1">
+              <a:spcBef>
+                <a:spcPct val="20000"/>
+              </a:spcBef>
+              <a:buFont typeface="Arial" pitchFamily="34" charset="0"/>
+              <a:buChar char="•"/>
+              <a:defRPr sz="2000" kern="1200">
+                <a:solidFill>
+                  <a:schemeClr val="tx1"/>
+                </a:solidFill>
+                <a:latin typeface="+mn-lt"/>
+                <a:ea typeface="+mn-ea"/>
+                <a:cs typeface="+mn-cs"/>
+              </a:defRPr>
+            </a:lvl8pPr>
+            <a:lvl9pPr marL="3886200" indent="-228600" algn="l" defTabSz="914400" rtl="0" eaLnBrk="1" latinLnBrk="0" hangingPunct="1">
+              <a:spcBef>
+                <a:spcPct val="20000"/>
+              </a:spcBef>
+              <a:buFont typeface="Arial" pitchFamily="34" charset="0"/>
+              <a:buChar char="•"/>
+              <a:defRPr sz="2000" kern="1200">
+                <a:solidFill>
+                  <a:schemeClr val="tx1"/>
+                </a:solidFill>
+                <a:latin typeface="+mn-lt"/>
+                <a:ea typeface="+mn-ea"/>
+                <a:cs typeface="+mn-cs"/>
+              </a:defRPr>
+            </a:lvl9pPr>
+          </a:lstStyle>
+          <a:p>
+            <a:pPr marL="0" indent="0">
+              <a:lnSpc>
+                <a:spcPct val="150000"/>
+              </a:lnSpc>
+              <a:buFont typeface="Arial" charset="0"/>
+              <a:buNone/>
+            </a:pPr>
+            <a:r>
+              <a:rPr lang="pt-BR" sz="2400" b="1" dirty="0" smtClean="0">
+                <a:solidFill>
+                  <a:schemeClr val="accent6">
+                    <a:lumMod val="75000"/>
+                  </a:schemeClr>
+                </a:solidFill>
+                <a:latin typeface="Corbel" panose="020B0503020204020204" pitchFamily="34" charset="0"/>
+              </a:rPr>
+              <a:t>RELEMBRAR GRAFICO</a:t>
+            </a:r>
+            <a:endParaRPr lang="pt-BR" sz="2400" b="1" dirty="0">
+              <a:solidFill>
+                <a:schemeClr val="accent6">
+                  <a:lumMod val="75000"/>
+                </a:schemeClr>
+              </a:solidFill>
+              <a:latin typeface="Corbel" panose="020B0503020204020204" pitchFamily="34" charset="0"/>
+            </a:endParaRPr>
+          </a:p>
+        </p:txBody>
+      </p:sp>
+    </p:spTree>
+    <p:extLst>
+      <p:ext uri="{BB962C8B-B14F-4D97-AF65-F5344CB8AC3E}">
+        <p14:creationId xmlns:p14="http://schemas.microsoft.com/office/powerpoint/2010/main" val="2697023134"/>
+      </p:ext>
+    </p:extLst>
+  </p:cSld>
+  <p:clrMapOvr>
+    <a:masterClrMapping/>
+  </p:clrMapOvr>
+</p:sld>
+</file>
+
+<file path=ppt/slides/slide66.xml><?xml version="1.0" encoding="utf-8"?>
+<p:sld xmlns:a="http://schemas.openxmlformats.org/drawingml/2006/main" xmlns:r="http://schemas.openxmlformats.org/officeDocument/2006/relationships" xmlns:p="http://schemas.openxmlformats.org/presentationml/2006/main">
+  <p:cSld>
+    <p:spTree>
+      <p:nvGrpSpPr>
+        <p:cNvPr id="1" name=""/>
+        <p:cNvGrpSpPr/>
+        <p:nvPr/>
+      </p:nvGrpSpPr>
+      <p:grpSpPr>
+        <a:xfrm>
+          <a:off x="0" y="0"/>
+          <a:ext cx="0" cy="0"/>
+          <a:chOff x="0" y="0"/>
+          <a:chExt cx="0" cy="0"/>
+        </a:xfrm>
+      </p:grpSpPr>
+      <p:sp>
+        <p:nvSpPr>
           <p:cNvPr id="6" name="Subtítulo 2"/>
           <p:cNvSpPr txBox="1">
             <a:spLocks/>
@@ -43401,13 +43849,18 @@
               <a:t>Você pode ainda </a:t>
             </a:r>
             <a:r>
-              <a:rPr lang="pt-BR" sz="1800" dirty="0" err="1"/>
-              <a:t>slecionar</a:t>
+              <a:rPr lang="pt-BR" sz="1800" dirty="0" smtClean="0"/>
+              <a:t>selecionar </a:t>
             </a:r>
             <a:r>
               <a:rPr lang="pt-BR" sz="1800" dirty="0"/>
-              <a:t> o tipo de equação : Linear, Exponencial, Potenciação, etc...</a:t>
-            </a:r>
+              <a:t>o tipo de equação : Linear, Exponencial, Potenciação, etc</a:t>
+            </a:r>
+            <a:r>
+              <a:rPr lang="pt-BR" sz="1800" dirty="0" smtClean="0"/>
+              <a:t>... inclusive fazer uma projeção futura.</a:t>
+            </a:r>
+            <a:endParaRPr lang="pt-BR" sz="1800" dirty="0"/>
           </a:p>
           <a:p>
             <a:pPr marL="0" indent="0">
@@ -43431,7 +43884,7 @@
 </p:sld>
 </file>
 
-<file path=ppt/slides/slide66.xml><?xml version="1.0" encoding="utf-8"?>
+<file path=ppt/slides/slide67.xml><?xml version="1.0" encoding="utf-8"?>
 <p:sld xmlns:a="http://schemas.openxmlformats.org/drawingml/2006/main" xmlns:r="http://schemas.openxmlformats.org/officeDocument/2006/relationships" xmlns:p="http://schemas.openxmlformats.org/presentationml/2006/main">
   <p:cSld>
     <p:spTree>
@@ -44082,477 +44535,6 @@
 </p:sld>
 </file>
 
-<file path=ppt/slides/slide67.xml><?xml version="1.0" encoding="utf-8"?>
-<p:sld xmlns:a="http://schemas.openxmlformats.org/drawingml/2006/main" xmlns:r="http://schemas.openxmlformats.org/officeDocument/2006/relationships" xmlns:p="http://schemas.openxmlformats.org/presentationml/2006/main">
-  <p:cSld>
-    <p:spTree>
-      <p:nvGrpSpPr>
-        <p:cNvPr id="1" name=""/>
-        <p:cNvGrpSpPr/>
-        <p:nvPr/>
-      </p:nvGrpSpPr>
-      <p:grpSpPr>
-        <a:xfrm>
-          <a:off x="0" y="0"/>
-          <a:ext cx="0" cy="0"/>
-          <a:chOff x="0" y="0"/>
-          <a:chExt cx="0" cy="0"/>
-        </a:xfrm>
-      </p:grpSpPr>
-      <p:sp>
-        <p:nvSpPr>
-          <p:cNvPr id="6" name="Subtítulo 2"/>
-          <p:cNvSpPr txBox="1">
-            <a:spLocks/>
-          </p:cNvSpPr>
-          <p:nvPr/>
-        </p:nvSpPr>
-        <p:spPr>
-          <a:xfrm>
-            <a:off x="210670" y="153054"/>
-            <a:ext cx="10058400" cy="718315"/>
-          </a:xfrm>
-        </p:spPr>
-        <p:txBody>
-          <a:bodyPr>
-            <a:noAutofit/>
-          </a:bodyPr>
-          <a:lstStyle>
-            <a:lvl1pPr marL="342900" indent="-342900" algn="l" rtl="0" eaLnBrk="0" fontAlgn="base" hangingPunct="0">
-              <a:spcBef>
-                <a:spcPct val="20000"/>
-              </a:spcBef>
-              <a:spcAft>
-                <a:spcPct val="0"/>
-              </a:spcAft>
-              <a:buFont typeface="Arial" charset="0"/>
-              <a:buChar char="•"/>
-              <a:defRPr lang="pt-BR" sz="2800" kern="1200" dirty="0">
-                <a:solidFill>
-                  <a:schemeClr val="tx1"/>
-                </a:solidFill>
-                <a:latin typeface="+mn-lt"/>
-                <a:ea typeface="+mn-ea"/>
-                <a:cs typeface="+mn-cs"/>
-              </a:defRPr>
-            </a:lvl1pPr>
-            <a:lvl2pPr marL="742950" indent="-285750" algn="l" rtl="0" eaLnBrk="0" fontAlgn="base" hangingPunct="0">
-              <a:spcBef>
-                <a:spcPct val="20000"/>
-              </a:spcBef>
-              <a:spcAft>
-                <a:spcPct val="0"/>
-              </a:spcAft>
-              <a:buFont typeface="Arial" charset="0"/>
-              <a:buChar char="•"/>
-              <a:defRPr lang="pt-BR" sz="2400" kern="1200" dirty="0">
-                <a:solidFill>
-                  <a:schemeClr val="tx1"/>
-                </a:solidFill>
-                <a:latin typeface="+mn-lt"/>
-                <a:ea typeface="+mn-ea"/>
-                <a:cs typeface="+mn-cs"/>
-              </a:defRPr>
-            </a:lvl2pPr>
-            <a:lvl3pPr marL="1143000" indent="-228600" algn="l" rtl="0" eaLnBrk="0" fontAlgn="base" hangingPunct="0">
-              <a:spcBef>
-                <a:spcPct val="20000"/>
-              </a:spcBef>
-              <a:spcAft>
-                <a:spcPct val="0"/>
-              </a:spcAft>
-              <a:buFont typeface="Arial" charset="0"/>
-              <a:buChar char="•"/>
-              <a:defRPr lang="pt-BR" sz="2400" kern="1200" dirty="0">
-                <a:solidFill>
-                  <a:schemeClr val="tx1"/>
-                </a:solidFill>
-                <a:latin typeface="+mn-lt"/>
-                <a:ea typeface="+mn-ea"/>
-                <a:cs typeface="+mn-cs"/>
-              </a:defRPr>
-            </a:lvl3pPr>
-            <a:lvl4pPr marL="1600200" indent="-228600" algn="l" rtl="0" eaLnBrk="0" fontAlgn="base" hangingPunct="0">
-              <a:spcBef>
-                <a:spcPct val="20000"/>
-              </a:spcBef>
-              <a:spcAft>
-                <a:spcPct val="0"/>
-              </a:spcAft>
-              <a:buFont typeface="Arial" charset="0"/>
-              <a:buChar char="•"/>
-              <a:defRPr lang="pt-BR" sz="2000" kern="1200" dirty="0">
-                <a:solidFill>
-                  <a:schemeClr val="tx1"/>
-                </a:solidFill>
-                <a:latin typeface="+mn-lt"/>
-                <a:ea typeface="+mn-ea"/>
-                <a:cs typeface="+mn-cs"/>
-              </a:defRPr>
-            </a:lvl4pPr>
-            <a:lvl5pPr marL="2057400" indent="-228600" algn="l" rtl="0" eaLnBrk="0" fontAlgn="base" hangingPunct="0">
-              <a:spcBef>
-                <a:spcPct val="20000"/>
-              </a:spcBef>
-              <a:spcAft>
-                <a:spcPct val="0"/>
-              </a:spcAft>
-              <a:buFont typeface="Arial" charset="0"/>
-              <a:buChar char="•"/>
-              <a:defRPr lang="pt-BR" sz="2000" kern="1200" dirty="0">
-                <a:solidFill>
-                  <a:schemeClr val="tx1"/>
-                </a:solidFill>
-                <a:latin typeface="+mn-lt"/>
-                <a:ea typeface="+mn-ea"/>
-                <a:cs typeface="+mn-cs"/>
-              </a:defRPr>
-            </a:lvl5pPr>
-            <a:lvl6pPr marL="2514600" indent="-228600" algn="l" defTabSz="914400" rtl="0" eaLnBrk="1" latinLnBrk="0" hangingPunct="1">
-              <a:spcBef>
-                <a:spcPct val="20000"/>
-              </a:spcBef>
-              <a:buFont typeface="Arial" pitchFamily="34" charset="0"/>
-              <a:buChar char="•"/>
-              <a:defRPr sz="2000" kern="1200">
-                <a:solidFill>
-                  <a:schemeClr val="tx1"/>
-                </a:solidFill>
-                <a:latin typeface="+mn-lt"/>
-                <a:ea typeface="+mn-ea"/>
-                <a:cs typeface="+mn-cs"/>
-              </a:defRPr>
-            </a:lvl6pPr>
-            <a:lvl7pPr marL="2971800" indent="-228600" algn="l" defTabSz="914400" rtl="0" eaLnBrk="1" latinLnBrk="0" hangingPunct="1">
-              <a:spcBef>
-                <a:spcPct val="20000"/>
-              </a:spcBef>
-              <a:buFont typeface="Arial" pitchFamily="34" charset="0"/>
-              <a:buChar char="•"/>
-              <a:defRPr sz="2000" kern="1200">
-                <a:solidFill>
-                  <a:schemeClr val="tx1"/>
-                </a:solidFill>
-                <a:latin typeface="+mn-lt"/>
-                <a:ea typeface="+mn-ea"/>
-                <a:cs typeface="+mn-cs"/>
-              </a:defRPr>
-            </a:lvl7pPr>
-            <a:lvl8pPr marL="3429000" indent="-228600" algn="l" defTabSz="914400" rtl="0" eaLnBrk="1" latinLnBrk="0" hangingPunct="1">
-              <a:spcBef>
-                <a:spcPct val="20000"/>
-              </a:spcBef>
-              <a:buFont typeface="Arial" pitchFamily="34" charset="0"/>
-              <a:buChar char="•"/>
-              <a:defRPr sz="2000" kern="1200">
-                <a:solidFill>
-                  <a:schemeClr val="tx1"/>
-                </a:solidFill>
-                <a:latin typeface="+mn-lt"/>
-                <a:ea typeface="+mn-ea"/>
-                <a:cs typeface="+mn-cs"/>
-              </a:defRPr>
-            </a:lvl8pPr>
-            <a:lvl9pPr marL="3886200" indent="-228600" algn="l" defTabSz="914400" rtl="0" eaLnBrk="1" latinLnBrk="0" hangingPunct="1">
-              <a:spcBef>
-                <a:spcPct val="20000"/>
-              </a:spcBef>
-              <a:buFont typeface="Arial" pitchFamily="34" charset="0"/>
-              <a:buChar char="•"/>
-              <a:defRPr sz="2000" kern="1200">
-                <a:solidFill>
-                  <a:schemeClr val="tx1"/>
-                </a:solidFill>
-                <a:latin typeface="+mn-lt"/>
-                <a:ea typeface="+mn-ea"/>
-                <a:cs typeface="+mn-cs"/>
-              </a:defRPr>
-            </a:lvl9pPr>
-          </a:lstStyle>
-          <a:p>
-            <a:pPr marL="0" indent="0">
-              <a:lnSpc>
-                <a:spcPct val="150000"/>
-              </a:lnSpc>
-              <a:buFont typeface="Arial" charset="0"/>
-              <a:buNone/>
-            </a:pPr>
-            <a:r>
-              <a:rPr lang="pt-BR" sz="2400" b="1" dirty="0">
-                <a:solidFill>
-                  <a:schemeClr val="accent6">
-                    <a:lumMod val="75000"/>
-                  </a:schemeClr>
-                </a:solidFill>
-                <a:latin typeface="Corbel" panose="020B0503020204020204" pitchFamily="34" charset="0"/>
-              </a:rPr>
-              <a:t>ATIVIDADE - 3</a:t>
-            </a:r>
-          </a:p>
-        </p:txBody>
-      </p:sp>
-      <p:sp>
-        <p:nvSpPr>
-          <p:cNvPr id="11" name="Subtítulo 1"/>
-          <p:cNvSpPr txBox="1">
-            <a:spLocks/>
-          </p:cNvSpPr>
-          <p:nvPr/>
-        </p:nvSpPr>
-        <p:spPr>
-          <a:xfrm>
-            <a:off x="692971" y="1913794"/>
-            <a:ext cx="10896600" cy="2817812"/>
-          </a:xfrm>
-        </p:spPr>
-        <p:txBody>
-          <a:bodyPr>
-            <a:noAutofit/>
-          </a:bodyPr>
-          <a:lstStyle>
-            <a:lvl1pPr marL="342900" indent="-342900" algn="l" rtl="0" eaLnBrk="0" fontAlgn="base" hangingPunct="0">
-              <a:spcBef>
-                <a:spcPct val="20000"/>
-              </a:spcBef>
-              <a:spcAft>
-                <a:spcPct val="0"/>
-              </a:spcAft>
-              <a:buFont typeface="Arial" charset="0"/>
-              <a:buChar char="•"/>
-              <a:defRPr lang="pt-BR" sz="2800" kern="1200" dirty="0">
-                <a:solidFill>
-                  <a:schemeClr val="tx1"/>
-                </a:solidFill>
-                <a:latin typeface="+mn-lt"/>
-                <a:ea typeface="+mn-ea"/>
-                <a:cs typeface="+mn-cs"/>
-              </a:defRPr>
-            </a:lvl1pPr>
-            <a:lvl2pPr marL="742950" indent="-285750" algn="l" rtl="0" eaLnBrk="0" fontAlgn="base" hangingPunct="0">
-              <a:spcBef>
-                <a:spcPct val="20000"/>
-              </a:spcBef>
-              <a:spcAft>
-                <a:spcPct val="0"/>
-              </a:spcAft>
-              <a:buFont typeface="Arial" charset="0"/>
-              <a:buChar char="•"/>
-              <a:defRPr lang="pt-BR" sz="2400" kern="1200" dirty="0">
-                <a:solidFill>
-                  <a:schemeClr val="tx1"/>
-                </a:solidFill>
-                <a:latin typeface="+mn-lt"/>
-                <a:ea typeface="+mn-ea"/>
-                <a:cs typeface="+mn-cs"/>
-              </a:defRPr>
-            </a:lvl2pPr>
-            <a:lvl3pPr marL="1143000" indent="-228600" algn="l" rtl="0" eaLnBrk="0" fontAlgn="base" hangingPunct="0">
-              <a:spcBef>
-                <a:spcPct val="20000"/>
-              </a:spcBef>
-              <a:spcAft>
-                <a:spcPct val="0"/>
-              </a:spcAft>
-              <a:buFont typeface="Arial" charset="0"/>
-              <a:buChar char="•"/>
-              <a:defRPr lang="pt-BR" sz="2400" kern="1200" dirty="0">
-                <a:solidFill>
-                  <a:schemeClr val="tx1"/>
-                </a:solidFill>
-                <a:latin typeface="+mn-lt"/>
-                <a:ea typeface="+mn-ea"/>
-                <a:cs typeface="+mn-cs"/>
-              </a:defRPr>
-            </a:lvl3pPr>
-            <a:lvl4pPr marL="1600200" indent="-228600" algn="l" rtl="0" eaLnBrk="0" fontAlgn="base" hangingPunct="0">
-              <a:spcBef>
-                <a:spcPct val="20000"/>
-              </a:spcBef>
-              <a:spcAft>
-                <a:spcPct val="0"/>
-              </a:spcAft>
-              <a:buFont typeface="Arial" charset="0"/>
-              <a:buChar char="•"/>
-              <a:defRPr lang="pt-BR" sz="2000" kern="1200" dirty="0">
-                <a:solidFill>
-                  <a:schemeClr val="tx1"/>
-                </a:solidFill>
-                <a:latin typeface="+mn-lt"/>
-                <a:ea typeface="+mn-ea"/>
-                <a:cs typeface="+mn-cs"/>
-              </a:defRPr>
-            </a:lvl4pPr>
-            <a:lvl5pPr marL="2057400" indent="-228600" algn="l" rtl="0" eaLnBrk="0" fontAlgn="base" hangingPunct="0">
-              <a:spcBef>
-                <a:spcPct val="20000"/>
-              </a:spcBef>
-              <a:spcAft>
-                <a:spcPct val="0"/>
-              </a:spcAft>
-              <a:buFont typeface="Arial" charset="0"/>
-              <a:buChar char="•"/>
-              <a:defRPr lang="pt-BR" sz="2000" kern="1200" dirty="0">
-                <a:solidFill>
-                  <a:schemeClr val="tx1"/>
-                </a:solidFill>
-                <a:latin typeface="+mn-lt"/>
-                <a:ea typeface="+mn-ea"/>
-                <a:cs typeface="+mn-cs"/>
-              </a:defRPr>
-            </a:lvl5pPr>
-            <a:lvl6pPr marL="2514600" indent="-228600" algn="l" defTabSz="914400" rtl="0" eaLnBrk="1" latinLnBrk="0" hangingPunct="1">
-              <a:spcBef>
-                <a:spcPct val="20000"/>
-              </a:spcBef>
-              <a:buFont typeface="Arial" pitchFamily="34" charset="0"/>
-              <a:buChar char="•"/>
-              <a:defRPr sz="2000" kern="1200">
-                <a:solidFill>
-                  <a:schemeClr val="tx1"/>
-                </a:solidFill>
-                <a:latin typeface="+mn-lt"/>
-                <a:ea typeface="+mn-ea"/>
-                <a:cs typeface="+mn-cs"/>
-              </a:defRPr>
-            </a:lvl6pPr>
-            <a:lvl7pPr marL="2971800" indent="-228600" algn="l" defTabSz="914400" rtl="0" eaLnBrk="1" latinLnBrk="0" hangingPunct="1">
-              <a:spcBef>
-                <a:spcPct val="20000"/>
-              </a:spcBef>
-              <a:buFont typeface="Arial" pitchFamily="34" charset="0"/>
-              <a:buChar char="•"/>
-              <a:defRPr sz="2000" kern="1200">
-                <a:solidFill>
-                  <a:schemeClr val="tx1"/>
-                </a:solidFill>
-                <a:latin typeface="+mn-lt"/>
-                <a:ea typeface="+mn-ea"/>
-                <a:cs typeface="+mn-cs"/>
-              </a:defRPr>
-            </a:lvl7pPr>
-            <a:lvl8pPr marL="3429000" indent="-228600" algn="l" defTabSz="914400" rtl="0" eaLnBrk="1" latinLnBrk="0" hangingPunct="1">
-              <a:spcBef>
-                <a:spcPct val="20000"/>
-              </a:spcBef>
-              <a:buFont typeface="Arial" pitchFamily="34" charset="0"/>
-              <a:buChar char="•"/>
-              <a:defRPr sz="2000" kern="1200">
-                <a:solidFill>
-                  <a:schemeClr val="tx1"/>
-                </a:solidFill>
-                <a:latin typeface="+mn-lt"/>
-                <a:ea typeface="+mn-ea"/>
-                <a:cs typeface="+mn-cs"/>
-              </a:defRPr>
-            </a:lvl8pPr>
-            <a:lvl9pPr marL="3886200" indent="-228600" algn="l" defTabSz="914400" rtl="0" eaLnBrk="1" latinLnBrk="0" hangingPunct="1">
-              <a:spcBef>
-                <a:spcPct val="20000"/>
-              </a:spcBef>
-              <a:buFont typeface="Arial" pitchFamily="34" charset="0"/>
-              <a:buChar char="•"/>
-              <a:defRPr sz="2000" kern="1200">
-                <a:solidFill>
-                  <a:schemeClr val="tx1"/>
-                </a:solidFill>
-                <a:latin typeface="+mn-lt"/>
-                <a:ea typeface="+mn-ea"/>
-                <a:cs typeface="+mn-cs"/>
-              </a:defRPr>
-            </a:lvl9pPr>
-          </a:lstStyle>
-          <a:p>
-            <a:pPr marL="0" indent="0">
-              <a:buFont typeface="Arial" charset="0"/>
-              <a:buNone/>
-            </a:pPr>
-            <a:r>
-              <a:rPr lang="pt-BR" sz="1800" dirty="0"/>
-              <a:t>Retorne no arquivo de VENDAS (exercício anterior) e usando o soma.se e cont.se calcule o total de vendas e contagem de vendas para cada:</a:t>
-            </a:r>
-          </a:p>
-          <a:p>
-            <a:pPr>
-              <a:buFont typeface="Arial" charset="0"/>
-              <a:buAutoNum type="arabicParenR"/>
-            </a:pPr>
-            <a:r>
-              <a:rPr lang="pt-BR" sz="1800" dirty="0"/>
-              <a:t>categoria,</a:t>
-            </a:r>
-          </a:p>
-          <a:p>
-            <a:pPr>
-              <a:buFont typeface="Arial" charset="0"/>
-              <a:buAutoNum type="arabicParenR"/>
-            </a:pPr>
-            <a:r>
-              <a:rPr lang="pt-BR" sz="1800" dirty="0"/>
-              <a:t>Vendedores</a:t>
-            </a:r>
-          </a:p>
-          <a:p>
-            <a:pPr>
-              <a:buFont typeface="Arial" charset="0"/>
-              <a:buAutoNum type="arabicParenR"/>
-            </a:pPr>
-            <a:r>
-              <a:rPr lang="pt-BR" sz="1800" dirty="0"/>
-              <a:t>e fabricantes</a:t>
-            </a:r>
-          </a:p>
-          <a:p>
-            <a:pPr>
-              <a:buFont typeface="Arial" charset="0"/>
-              <a:buAutoNum type="arabicParenR"/>
-            </a:pPr>
-            <a:r>
-              <a:rPr lang="pt-BR" sz="1800" dirty="0"/>
-              <a:t>Produto</a:t>
-            </a:r>
-          </a:p>
-          <a:p>
-            <a:pPr>
-              <a:buFont typeface="Arial" charset="0"/>
-              <a:buAutoNum type="arabicParenR"/>
-            </a:pPr>
-            <a:r>
-              <a:rPr lang="pt-BR" sz="1800" dirty="0"/>
-              <a:t>Cidade</a:t>
-            </a:r>
-          </a:p>
-          <a:p>
-            <a:pPr marL="0" indent="0">
-              <a:buFont typeface="Arial" charset="0"/>
-              <a:buNone/>
-            </a:pPr>
-            <a:endParaRPr lang="pt-BR" sz="1800" dirty="0"/>
-          </a:p>
-          <a:p>
-            <a:pPr marL="0" indent="0">
-              <a:buFont typeface="Arial" charset="0"/>
-              <a:buNone/>
-            </a:pPr>
-            <a:r>
-              <a:rPr lang="pt-BR" sz="1800" dirty="0"/>
-              <a:t>Calcule o preço médio de cada um dos itens acima (total de vendas dividido pela contagem de registros).</a:t>
-            </a:r>
-          </a:p>
-        </p:txBody>
-      </p:sp>
-    </p:spTree>
-    <p:extLst>
-      <p:ext uri="{BB962C8B-B14F-4D97-AF65-F5344CB8AC3E}">
-        <p14:creationId xmlns:p14="http://schemas.microsoft.com/office/powerpoint/2010/main" val="2143110309"/>
-      </p:ext>
-    </p:extLst>
-  </p:cSld>
-  <p:clrMapOvr>
-    <a:masterClrMapping/>
-  </p:clrMapOvr>
-</p:sld>
-</file>
-
 <file path=ppt/slides/slide68.xml><?xml version="1.0" encoding="utf-8"?>
 <p:sld xmlns:a="http://schemas.openxmlformats.org/drawingml/2006/main" xmlns:r="http://schemas.openxmlformats.org/officeDocument/2006/relationships" xmlns:p="http://schemas.openxmlformats.org/presentationml/2006/main">
   <p:cSld>
@@ -44757,14 +44739,14 @@
                 </a:solidFill>
                 <a:latin typeface="Corbel" panose="020B0503020204020204" pitchFamily="34" charset="0"/>
               </a:rPr>
-              <a:t>Atividade - 4</a:t>
+              <a:t>ATIVIDADE - 3</a:t>
             </a:r>
           </a:p>
         </p:txBody>
       </p:sp>
       <p:sp>
         <p:nvSpPr>
-          <p:cNvPr id="4" name="Subtítulo 1"/>
+          <p:cNvPr id="11" name="Subtítulo 1"/>
           <p:cNvSpPr txBox="1">
             <a:spLocks/>
           </p:cNvSpPr>
@@ -44772,7 +44754,7 @@
         </p:nvSpPr>
         <p:spPr>
           <a:xfrm>
-            <a:off x="327211" y="988637"/>
+            <a:off x="692971" y="1913794"/>
             <a:ext cx="10896600" cy="2817812"/>
           </a:xfrm>
         </p:spPr>
@@ -44934,229 +44916,137 @@
           </a:lstStyle>
           <a:p>
             <a:pPr marL="0" indent="0">
+              <a:buFont typeface="Arial" charset="0"/>
               <a:buNone/>
             </a:pPr>
             <a:r>
-              <a:rPr lang="pt-BR" sz="1800" dirty="0">
-                <a:latin typeface="Corbel" panose="020B0503020204020204" pitchFamily="34" charset="0"/>
-              </a:rPr>
-              <a:t>Você recebeu uma base de dados sobre as despesas da Empresa em </a:t>
-            </a:r>
-            <a:r>
-              <a:rPr lang="pt-BR" sz="1800" dirty="0" err="1">
-                <a:latin typeface="Corbel" panose="020B0503020204020204" pitchFamily="34" charset="0"/>
-              </a:rPr>
-              <a:t>txt</a:t>
-            </a:r>
-            <a:r>
-              <a:rPr lang="pt-BR" sz="1800" dirty="0">
-                <a:latin typeface="Corbel" panose="020B0503020204020204" pitchFamily="34" charset="0"/>
-              </a:rPr>
-              <a:t> extraída do sistema ERP de um relatório da contabilidade que não possui campos de descrição do Diretor responsável (arquivo Fornecedores.txt). </a:t>
+              <a:rPr lang="pt-BR" sz="1800" dirty="0"/>
+              <a:t>Retorne no arquivo de VENDAS (exercício anterior) e usando o soma.se e cont.se calcule o total de vendas e contagem de vendas para cada:</a:t>
+            </a:r>
+          </a:p>
+          <a:p>
+            <a:pPr>
+              <a:buFont typeface="Arial" charset="0"/>
+              <a:buAutoNum type="arabicParenR"/>
+            </a:pPr>
+            <a:r>
+              <a:rPr lang="pt-BR" sz="1800" dirty="0"/>
+              <a:t>categoria,</a:t>
+            </a:r>
+          </a:p>
+          <a:p>
+            <a:pPr>
+              <a:buFont typeface="Arial" charset="0"/>
+              <a:buAutoNum type="arabicParenR"/>
+            </a:pPr>
+            <a:r>
+              <a:rPr lang="pt-BR" sz="1800" dirty="0"/>
+              <a:t>Vendedores</a:t>
+            </a:r>
+          </a:p>
+          <a:p>
+            <a:pPr>
+              <a:buFont typeface="Arial" charset="0"/>
+              <a:buAutoNum type="arabicParenR"/>
+            </a:pPr>
+            <a:r>
+              <a:rPr lang="pt-BR" sz="1800" dirty="0"/>
+              <a:t>e fabricantes</a:t>
+            </a:r>
+          </a:p>
+          <a:p>
+            <a:pPr>
+              <a:buFont typeface="Arial" charset="0"/>
+              <a:buAutoNum type="arabicParenR"/>
+            </a:pPr>
+            <a:r>
+              <a:rPr lang="pt-BR" sz="1800" dirty="0"/>
+              <a:t>Produto</a:t>
+            </a:r>
+          </a:p>
+          <a:p>
+            <a:pPr>
+              <a:buFont typeface="Arial" charset="0"/>
+              <a:buAutoNum type="arabicParenR"/>
+            </a:pPr>
+            <a:r>
+              <a:rPr lang="pt-BR" sz="1800" dirty="0"/>
+              <a:t>Cidade</a:t>
             </a:r>
           </a:p>
           <a:p>
             <a:pPr marL="0" indent="0">
+              <a:buFont typeface="Arial" charset="0"/>
               <a:buNone/>
             </a:pPr>
-            <a:r>
-              <a:rPr lang="pt-BR" sz="1800" dirty="0">
-                <a:latin typeface="Corbel" panose="020B0503020204020204" pitchFamily="34" charset="0"/>
-              </a:rPr>
-              <a:t>Cada linha/registro  representa uma nota de pagamento</a:t>
-            </a:r>
+            <a:endParaRPr lang="pt-BR" sz="1800" dirty="0"/>
           </a:p>
           <a:p>
             <a:pPr marL="0" indent="0">
               <a:buFont typeface="Arial" charset="0"/>
               <a:buNone/>
             </a:pPr>
-            <a:endParaRPr lang="pt-BR" sz="1800" dirty="0">
-              <a:latin typeface="Corbel" panose="020B0503020204020204" pitchFamily="34" charset="0"/>
-            </a:endParaRPr>
+            <a:r>
+              <a:rPr lang="pt-BR" sz="1800" dirty="0"/>
+              <a:t>Calcule o preço médio de cada um dos itens acima (total de vendas dividido pela contagem de registros</a:t>
+            </a:r>
+            <a:r>
+              <a:rPr lang="pt-BR" sz="1800" dirty="0" smtClean="0"/>
+              <a:t>).</a:t>
+            </a:r>
           </a:p>
           <a:p>
             <a:pPr marL="0" indent="0">
+              <a:buFont typeface="Arial" charset="0"/>
               <a:buNone/>
             </a:pPr>
-            <a:r>
-              <a:rPr lang="pt-BR" sz="1800" dirty="0">
-                <a:latin typeface="Corbel" panose="020B0503020204020204" pitchFamily="34" charset="0"/>
-              </a:rPr>
-              <a:t>Cruze este banco de dados com o cadastro de outro sistema (De para </a:t>
-            </a:r>
-            <a:r>
-              <a:rPr lang="pt-BR" sz="1800" dirty="0" err="1">
-                <a:latin typeface="Corbel" panose="020B0503020204020204" pitchFamily="34" charset="0"/>
-              </a:rPr>
-              <a:t>CCusto</a:t>
-            </a:r>
-            <a:r>
-              <a:rPr lang="pt-BR" sz="1800" dirty="0">
-                <a:latin typeface="Corbel" panose="020B0503020204020204" pitchFamily="34" charset="0"/>
-              </a:rPr>
-              <a:t> X Fornecedores.xlsx) e descubra:</a:t>
-            </a:r>
+            <a:endParaRPr lang="pt-BR" sz="1800" dirty="0" smtClean="0"/>
           </a:p>
           <a:p>
             <a:pPr marL="0" indent="0">
               <a:buFont typeface="Arial" charset="0"/>
               <a:buNone/>
             </a:pPr>
-            <a:endParaRPr lang="pt-BR" sz="1800" dirty="0">
-              <a:latin typeface="Corbel" panose="020B0503020204020204" pitchFamily="34" charset="0"/>
-            </a:endParaRPr>
+            <a:r>
+              <a:rPr lang="pt-BR" sz="1800" dirty="0" smtClean="0"/>
+              <a:t>Faça </a:t>
+            </a:r>
+            <a:r>
+              <a:rPr lang="pt-BR" sz="1800" dirty="0" err="1" smtClean="0"/>
+              <a:t>Grafico</a:t>
+            </a:r>
+            <a:r>
+              <a:rPr lang="pt-BR" sz="1800" dirty="0" smtClean="0"/>
+              <a:t> de Pizza para saber qual fatia de cada  ESTADO.</a:t>
+            </a:r>
           </a:p>
           <a:p>
             <a:pPr marL="0" indent="0">
+              <a:buFont typeface="Arial" charset="0"/>
               <a:buNone/>
             </a:pPr>
-            <a:endParaRPr lang="pt-BR" sz="1800" dirty="0">
-              <a:latin typeface="Corbel" panose="020B0503020204020204" pitchFamily="34" charset="0"/>
-            </a:endParaRPr>
-          </a:p>
-          <a:p>
-            <a:pPr>
-              <a:buFont typeface="Arial" panose="020B0604020202020204" pitchFamily="34" charset="0"/>
-              <a:buChar char="•"/>
-            </a:pPr>
-            <a:r>
-              <a:rPr lang="pt-BR" sz="1800" dirty="0">
-                <a:latin typeface="Corbel" panose="020B0503020204020204" pitchFamily="34" charset="0"/>
-              </a:rPr>
-              <a:t>Qual o valor gasto total da empresa com “MATERIAL IMPRESSO FÁBRICA”?</a:t>
-            </a:r>
-          </a:p>
-          <a:p>
-            <a:pPr>
-              <a:buFont typeface="Arial" panose="020B0604020202020204" pitchFamily="34" charset="0"/>
-              <a:buChar char="•"/>
-            </a:pPr>
-            <a:r>
-              <a:rPr lang="pt-BR" sz="1800" dirty="0">
-                <a:latin typeface="Corbel" panose="020B0503020204020204" pitchFamily="34" charset="0"/>
-              </a:rPr>
-              <a:t>Qual o gasto total do Diretor Silvio (para centros de custo identificados)?</a:t>
-            </a:r>
-          </a:p>
-          <a:p>
-            <a:pPr>
-              <a:buFont typeface="Arial" panose="020B0604020202020204" pitchFamily="34" charset="0"/>
-              <a:buChar char="•"/>
-            </a:pPr>
-            <a:r>
-              <a:rPr lang="pt-BR" sz="1800" dirty="0">
-                <a:latin typeface="Corbel" panose="020B0503020204020204" pitchFamily="34" charset="0"/>
-              </a:rPr>
-              <a:t>Quais os dados (responsável, fornecedor, diretor)  da NOTA de maior valor?</a:t>
-            </a:r>
-          </a:p>
-          <a:p>
-            <a:pPr>
-              <a:buFont typeface="Arial" panose="020B0604020202020204" pitchFamily="34" charset="0"/>
-              <a:buChar char="•"/>
-            </a:pPr>
-            <a:r>
-              <a:rPr lang="pt-BR" sz="1800" dirty="0">
-                <a:latin typeface="Corbel" panose="020B0503020204020204" pitchFamily="34" charset="0"/>
-              </a:rPr>
-              <a:t>Faça um relatório de Gasto por Diretor (inclua diretores não identificados = vazio)</a:t>
-            </a:r>
-          </a:p>
-          <a:p>
-            <a:pPr>
-              <a:buFont typeface="Arial" panose="020B0604020202020204" pitchFamily="34" charset="0"/>
-              <a:buChar char="•"/>
-            </a:pPr>
-            <a:endParaRPr lang="pt-BR" sz="1800" dirty="0">
-              <a:latin typeface="Corbel" panose="020B0503020204020204" pitchFamily="34" charset="0"/>
-            </a:endParaRPr>
-          </a:p>
-          <a:p>
-            <a:pPr>
-              <a:buFont typeface="Arial" panose="020B0604020202020204" pitchFamily="34" charset="0"/>
-              <a:buChar char="•"/>
-            </a:pPr>
-            <a:endParaRPr lang="pt-BR" sz="1800" dirty="0">
-              <a:latin typeface="Corbel" panose="020B0503020204020204" pitchFamily="34" charset="0"/>
-            </a:endParaRPr>
-          </a:p>
-          <a:p>
-            <a:pPr>
-              <a:buFont typeface="Arial" panose="020B0604020202020204" pitchFamily="34" charset="0"/>
-              <a:buChar char="•"/>
-            </a:pPr>
-            <a:endParaRPr lang="pt-BR" sz="1800" dirty="0">
-              <a:latin typeface="Corbel" panose="020B0503020204020204" pitchFamily="34" charset="0"/>
-            </a:endParaRPr>
+            <a:r>
+              <a:rPr lang="pt-BR" sz="1800" dirty="0" err="1" smtClean="0"/>
+              <a:t>Grafico</a:t>
+            </a:r>
+            <a:r>
+              <a:rPr lang="pt-BR" sz="1800" dirty="0" smtClean="0"/>
+              <a:t> DE COLUNAS para Comparar ENTRE VENDEDORES.</a:t>
+            </a:r>
           </a:p>
           <a:p>
             <a:pPr marL="0" indent="0">
+              <a:buFont typeface="Arial" charset="0"/>
               <a:buNone/>
             </a:pPr>
-            <a:r>
-              <a:rPr lang="pt-BR" sz="1800" dirty="0">
-                <a:latin typeface="Corbel" panose="020B0503020204020204" pitchFamily="34" charset="0"/>
-              </a:rPr>
-              <a:t>Dica: Converter Todos os IDS para numero (usar substituição), PROCV, Relatório Subtotal, Texto para Coluna, FILTRO, Classificação, formula banco de dados .</a:t>
-            </a:r>
-          </a:p>
-          <a:p>
-            <a:pPr marL="0" indent="0">
-              <a:buNone/>
-            </a:pPr>
-            <a:endParaRPr lang="pt-BR" sz="1800" dirty="0">
-              <a:latin typeface="Corbel" panose="020B0503020204020204" pitchFamily="34" charset="0"/>
-            </a:endParaRPr>
-          </a:p>
-          <a:p>
-            <a:pPr marL="0" indent="0">
-              <a:buNone/>
-            </a:pPr>
-            <a:endParaRPr lang="pt-BR" sz="1800" dirty="0">
-              <a:latin typeface="Corbel" panose="020B0503020204020204" pitchFamily="34" charset="0"/>
-            </a:endParaRPr>
-          </a:p>
-          <a:p>
-            <a:pPr marL="0" indent="0">
-              <a:buNone/>
-            </a:pPr>
-            <a:endParaRPr lang="pt-BR" sz="1800" dirty="0">
-              <a:latin typeface="Corbel" panose="020B0503020204020204" pitchFamily="34" charset="0"/>
-            </a:endParaRPr>
-          </a:p>
-          <a:p>
-            <a:pPr marL="0" indent="0">
-              <a:buNone/>
-            </a:pPr>
-            <a:endParaRPr lang="pt-BR" sz="1800" dirty="0">
-              <a:latin typeface="Corbel" panose="020B0503020204020204" pitchFamily="34" charset="0"/>
-            </a:endParaRPr>
-          </a:p>
-          <a:p>
-            <a:pPr marL="0" indent="0">
-              <a:buFont typeface="Arial" charset="0"/>
-              <a:buNone/>
-            </a:pPr>
-            <a:endParaRPr lang="pt-BR" sz="1800" dirty="0">
-              <a:latin typeface="Corbel" panose="020B0503020204020204" pitchFamily="34" charset="0"/>
-            </a:endParaRPr>
-          </a:p>
-          <a:p>
-            <a:pPr marL="0" indent="0">
-              <a:buFont typeface="Arial" charset="0"/>
-              <a:buNone/>
-            </a:pPr>
-            <a:endParaRPr lang="pt-BR" sz="1800" dirty="0">
-              <a:latin typeface="Corbel" panose="020B0503020204020204" pitchFamily="34" charset="0"/>
-            </a:endParaRPr>
+            <a:endParaRPr lang="pt-BR" sz="1800" dirty="0"/>
           </a:p>
         </p:txBody>
       </p:sp>
     </p:spTree>
     <p:extLst>
       <p:ext uri="{BB962C8B-B14F-4D97-AF65-F5344CB8AC3E}">
-        <p14:creationId xmlns:p14="http://schemas.microsoft.com/office/powerpoint/2010/main" val="1602921918"/>
+        <p14:creationId xmlns:p14="http://schemas.microsoft.com/office/powerpoint/2010/main" val="2143110309"/>
       </p:ext>
     </p:extLst>
   </p:cSld>
@@ -45370,14 +45260,14 @@
                 </a:solidFill>
                 <a:latin typeface="Corbel" panose="020B0503020204020204" pitchFamily="34" charset="0"/>
               </a:rPr>
-              <a:t>ATIVIDADE - 5</a:t>
+              <a:t>Atividade - 4</a:t>
             </a:r>
           </a:p>
         </p:txBody>
       </p:sp>
       <p:sp>
         <p:nvSpPr>
-          <p:cNvPr id="11" name="Subtítulo 1"/>
+          <p:cNvPr id="4" name="Subtítulo 1"/>
           <p:cNvSpPr txBox="1">
             <a:spLocks/>
           </p:cNvSpPr>
@@ -45385,7 +45275,7 @@
         </p:nvSpPr>
         <p:spPr>
           <a:xfrm>
-            <a:off x="692971" y="1913794"/>
+            <a:off x="327211" y="988637"/>
             <a:ext cx="10896600" cy="2817812"/>
           </a:xfrm>
         </p:spPr>
@@ -45547,22 +45437,36 @@
           </a:lstStyle>
           <a:p>
             <a:pPr marL="0" indent="0">
-              <a:buFont typeface="Arial" charset="0"/>
               <a:buNone/>
             </a:pPr>
             <a:r>
-              <a:rPr lang="pt-BR" sz="1800" dirty="0"/>
-              <a:t>Utilize o relatório de Vendas para mostrar graficamente:</a:t>
+              <a:rPr lang="pt-BR" sz="1800" dirty="0">
+                <a:latin typeface="Corbel" panose="020B0503020204020204" pitchFamily="34" charset="0"/>
+              </a:rPr>
+              <a:t>Você recebeu uma base de dados sobre as despesas da Empresa em </a:t>
+            </a:r>
+            <a:r>
+              <a:rPr lang="pt-BR" sz="1800" dirty="0" err="1">
+                <a:latin typeface="Corbel" panose="020B0503020204020204" pitchFamily="34" charset="0"/>
+              </a:rPr>
+              <a:t>txt</a:t>
+            </a:r>
+            <a:r>
+              <a:rPr lang="pt-BR" sz="1800" dirty="0">
+                <a:latin typeface="Corbel" panose="020B0503020204020204" pitchFamily="34" charset="0"/>
+              </a:rPr>
+              <a:t> extraída do sistema ERP de um relatório da contabilidade que não possui campos de descrição do Diretor responsável (arquivo Fornecedores.txt). </a:t>
             </a:r>
           </a:p>
           <a:p>
             <a:pPr marL="0" indent="0">
-              <a:buFont typeface="Arial" charset="0"/>
               <a:buNone/>
             </a:pPr>
             <a:r>
-              <a:rPr lang="pt-BR" sz="1800" dirty="0"/>
-              <a:t>1)Durante todos o período, qual a curva de Vendas Totais mês a mês.</a:t>
+              <a:rPr lang="pt-BR" sz="1800" dirty="0">
+                <a:latin typeface="Corbel" panose="020B0503020204020204" pitchFamily="34" charset="0"/>
+              </a:rPr>
+              <a:t>Cada linha/registro  representa uma nota de pagamento</a:t>
             </a:r>
           </a:p>
           <a:p>
@@ -45570,27 +45474,31 @@
               <a:buFont typeface="Arial" charset="0"/>
               <a:buNone/>
             </a:pPr>
-            <a:r>
-              <a:rPr lang="pt-BR" sz="1800" dirty="0"/>
-              <a:t>2) Como é representado graficamente as vendas por </a:t>
-            </a:r>
-            <a:r>
-              <a:rPr lang="pt-BR" sz="1800" dirty="0" err="1"/>
-              <a:t>Forncedor</a:t>
-            </a:r>
-            <a:r>
-              <a:rPr lang="pt-BR" sz="1800" dirty="0"/>
-              <a:t> (barra).</a:t>
-            </a:r>
+            <a:endParaRPr lang="pt-BR" sz="1800" dirty="0">
+              <a:latin typeface="Corbel" panose="020B0503020204020204" pitchFamily="34" charset="0"/>
+            </a:endParaRPr>
           </a:p>
           <a:p>
             <a:pPr marL="0" indent="0">
-              <a:buFont typeface="Arial" charset="0"/>
               <a:buNone/>
             </a:pPr>
             <a:r>
-              <a:rPr lang="pt-BR" sz="1800" dirty="0"/>
-              <a:t>	Quem vendeu mais /  Quem vendeu Menos</a:t>
+              <a:rPr lang="pt-BR" sz="1800" dirty="0">
+                <a:latin typeface="Corbel" panose="020B0503020204020204" pitchFamily="34" charset="0"/>
+              </a:rPr>
+              <a:t>Cruze este banco de dados com o cadastro de outro sistema (De para </a:t>
+            </a:r>
+            <a:r>
+              <a:rPr lang="pt-BR" sz="1800" dirty="0" err="1">
+                <a:latin typeface="Corbel" panose="020B0503020204020204" pitchFamily="34" charset="0"/>
+              </a:rPr>
+              <a:t>CCusto</a:t>
+            </a:r>
+            <a:r>
+              <a:rPr lang="pt-BR" sz="1800" dirty="0">
+                <a:latin typeface="Corbel" panose="020B0503020204020204" pitchFamily="34" charset="0"/>
+              </a:rPr>
+              <a:t> X Fornecedores.xlsx) e descubra:</a:t>
             </a:r>
           </a:p>
           <a:p>
@@ -45598,34 +45506,238 @@
               <a:buFont typeface="Arial" charset="0"/>
               <a:buNone/>
             </a:pPr>
-            <a:r>
-              <a:rPr lang="pt-BR" sz="1800" dirty="0"/>
-              <a:t>3) Mostre graficamente a participação de cada vendedor no total de vendas.</a:t>
-            </a:r>
+            <a:endParaRPr lang="pt-BR" sz="1800" dirty="0">
+              <a:latin typeface="Corbel" panose="020B0503020204020204" pitchFamily="34" charset="0"/>
+            </a:endParaRPr>
           </a:p>
           <a:p>
             <a:pPr marL="0" indent="0">
-              <a:buFont typeface="Arial" charset="0"/>
               <a:buNone/>
             </a:pPr>
-            <a:r>
-              <a:rPr lang="pt-BR" sz="1800" dirty="0"/>
-              <a:t>	Quem vendeu mais / Quem vendeu Menos</a:t>
-            </a:r>
+            <a:endParaRPr lang="pt-BR" sz="1800" dirty="0">
+              <a:latin typeface="Corbel" panose="020B0503020204020204" pitchFamily="34" charset="0"/>
+            </a:endParaRPr>
+          </a:p>
+          <a:p>
+            <a:pPr>
+              <a:buFont typeface="Arial" panose="020B0604020202020204" pitchFamily="34" charset="0"/>
+              <a:buChar char="•"/>
+            </a:pPr>
+            <a:r>
+              <a:rPr lang="pt-BR" sz="1800" dirty="0">
+                <a:latin typeface="Corbel" panose="020B0503020204020204" pitchFamily="34" charset="0"/>
+              </a:rPr>
+              <a:t>Qual o valor gasto total da empresa com “MATERIAL IMPRESSO FÁBRICA”?</a:t>
+            </a:r>
+          </a:p>
+          <a:p>
+            <a:pPr>
+              <a:buFont typeface="Arial" panose="020B0604020202020204" pitchFamily="34" charset="0"/>
+              <a:buChar char="•"/>
+            </a:pPr>
+            <a:r>
+              <a:rPr lang="pt-BR" sz="1800" dirty="0">
+                <a:latin typeface="Corbel" panose="020B0503020204020204" pitchFamily="34" charset="0"/>
+              </a:rPr>
+              <a:t>Qual o gasto total do Diretor </a:t>
+            </a:r>
+            <a:r>
+              <a:rPr lang="pt-BR" sz="1800" dirty="0" smtClean="0">
+                <a:latin typeface="Corbel" panose="020B0503020204020204" pitchFamily="34" charset="0"/>
+              </a:rPr>
+              <a:t>Silvio?</a:t>
+            </a:r>
+            <a:endParaRPr lang="pt-BR" sz="1800" dirty="0">
+              <a:latin typeface="Corbel" panose="020B0503020204020204" pitchFamily="34" charset="0"/>
+            </a:endParaRPr>
+          </a:p>
+          <a:p>
+            <a:pPr>
+              <a:buFont typeface="Arial" panose="020B0604020202020204" pitchFamily="34" charset="0"/>
+              <a:buChar char="•"/>
+            </a:pPr>
+            <a:r>
+              <a:rPr lang="pt-BR" sz="1800" dirty="0" smtClean="0">
+                <a:latin typeface="Corbel" panose="020B0503020204020204" pitchFamily="34" charset="0"/>
+              </a:rPr>
+              <a:t>Faça </a:t>
+            </a:r>
+            <a:r>
+              <a:rPr lang="pt-BR" sz="1800" dirty="0">
+                <a:latin typeface="Corbel" panose="020B0503020204020204" pitchFamily="34" charset="0"/>
+              </a:rPr>
+              <a:t>um relatório de Gasto por Diretor (inclua diretores não identificados = vazio</a:t>
+            </a:r>
+            <a:r>
+              <a:rPr lang="pt-BR" sz="1800" dirty="0" smtClean="0">
+                <a:latin typeface="Corbel" panose="020B0503020204020204" pitchFamily="34" charset="0"/>
+              </a:rPr>
+              <a:t>)</a:t>
+            </a:r>
+          </a:p>
+          <a:p>
+            <a:pPr>
+              <a:buFont typeface="Arial" panose="020B0604020202020204" pitchFamily="34" charset="0"/>
+              <a:buChar char="•"/>
+            </a:pPr>
+            <a:r>
+              <a:rPr lang="pt-BR" sz="1800" dirty="0" smtClean="0">
+                <a:latin typeface="Corbel" panose="020B0503020204020204" pitchFamily="34" charset="0"/>
+              </a:rPr>
+              <a:t>Faça um Gráfico de Colunas de Despesa por Diretor e Outro por DENOMINAÇÃO do Centro de Custo.</a:t>
+            </a:r>
+            <a:endParaRPr lang="pt-BR" sz="1800" dirty="0">
+              <a:latin typeface="Corbel" panose="020B0503020204020204" pitchFamily="34" charset="0"/>
+            </a:endParaRPr>
+          </a:p>
+          <a:p>
+            <a:pPr>
+              <a:buFont typeface="Arial" panose="020B0604020202020204" pitchFamily="34" charset="0"/>
+              <a:buChar char="•"/>
+            </a:pPr>
+            <a:endParaRPr lang="pt-BR" sz="1800" dirty="0">
+              <a:latin typeface="Corbel" panose="020B0503020204020204" pitchFamily="34" charset="0"/>
+            </a:endParaRPr>
+          </a:p>
+          <a:p>
+            <a:pPr>
+              <a:buFont typeface="Arial" panose="020B0604020202020204" pitchFamily="34" charset="0"/>
+              <a:buChar char="•"/>
+            </a:pPr>
+            <a:endParaRPr lang="pt-BR" sz="1800" dirty="0">
+              <a:latin typeface="Corbel" panose="020B0503020204020204" pitchFamily="34" charset="0"/>
+            </a:endParaRPr>
+          </a:p>
+          <a:p>
+            <a:pPr>
+              <a:buFont typeface="Arial" panose="020B0604020202020204" pitchFamily="34" charset="0"/>
+              <a:buChar char="•"/>
+            </a:pPr>
+            <a:endParaRPr lang="pt-BR" sz="1800" dirty="0">
+              <a:latin typeface="Corbel" panose="020B0503020204020204" pitchFamily="34" charset="0"/>
+            </a:endParaRPr>
           </a:p>
           <a:p>
             <a:pPr marL="0" indent="0">
-              <a:buFont typeface="Arial" charset="0"/>
               <a:buNone/>
             </a:pPr>
-            <a:endParaRPr lang="pt-BR" sz="1800" dirty="0"/>
+            <a:r>
+              <a:rPr lang="pt-BR" sz="1800" dirty="0">
+                <a:latin typeface="Corbel" panose="020B0503020204020204" pitchFamily="34" charset="0"/>
+              </a:rPr>
+              <a:t>Dica: Converter Todos os IDS para numero (usar substituição), </a:t>
+            </a:r>
+            <a:r>
+              <a:rPr lang="pt-BR" sz="1800" dirty="0" err="1" smtClean="0">
+                <a:latin typeface="Corbel" panose="020B0503020204020204" pitchFamily="34" charset="0"/>
+              </a:rPr>
+              <a:t>PROCV,Texto</a:t>
+            </a:r>
+            <a:r>
+              <a:rPr lang="pt-BR" sz="1800" dirty="0" smtClean="0">
+                <a:latin typeface="Corbel" panose="020B0503020204020204" pitchFamily="34" charset="0"/>
+              </a:rPr>
+              <a:t> </a:t>
+            </a:r>
+            <a:r>
+              <a:rPr lang="pt-BR" sz="1800" dirty="0">
+                <a:latin typeface="Corbel" panose="020B0503020204020204" pitchFamily="34" charset="0"/>
+              </a:rPr>
+              <a:t>para Coluna, FILTRO, </a:t>
+            </a:r>
+            <a:r>
+              <a:rPr lang="pt-BR" sz="1800" dirty="0" smtClean="0">
+                <a:latin typeface="Corbel" panose="020B0503020204020204" pitchFamily="34" charset="0"/>
+              </a:rPr>
+              <a:t>Classificação, formula </a:t>
+            </a:r>
+            <a:r>
+              <a:rPr lang="pt-BR" sz="1800" dirty="0">
+                <a:latin typeface="Corbel" panose="020B0503020204020204" pitchFamily="34" charset="0"/>
+              </a:rPr>
+              <a:t>banco de </a:t>
+            </a:r>
+            <a:r>
+              <a:rPr lang="pt-BR" sz="1800" dirty="0" smtClean="0">
+                <a:latin typeface="Corbel" panose="020B0503020204020204" pitchFamily="34" charset="0"/>
+              </a:rPr>
+              <a:t>dados, </a:t>
+            </a:r>
+            <a:r>
+              <a:rPr lang="pt-BR" sz="1800" dirty="0" err="1" smtClean="0">
+                <a:latin typeface="Corbel" panose="020B0503020204020204" pitchFamily="34" charset="0"/>
+              </a:rPr>
+              <a:t>Graficos</a:t>
+            </a:r>
+            <a:r>
+              <a:rPr lang="pt-BR" sz="1800" dirty="0" smtClean="0">
+                <a:latin typeface="Corbel" panose="020B0503020204020204" pitchFamily="34" charset="0"/>
+              </a:rPr>
+              <a:t> </a:t>
+            </a:r>
+            <a:r>
+              <a:rPr lang="pt-BR" sz="1800" dirty="0">
+                <a:latin typeface="Corbel" panose="020B0503020204020204" pitchFamily="34" charset="0"/>
+              </a:rPr>
+              <a:t>.</a:t>
+            </a:r>
+          </a:p>
+          <a:p>
+            <a:pPr marL="0" indent="0">
+              <a:buNone/>
+            </a:pPr>
+            <a:endParaRPr lang="pt-BR" sz="1800" dirty="0">
+              <a:latin typeface="Corbel" panose="020B0503020204020204" pitchFamily="34" charset="0"/>
+            </a:endParaRPr>
+          </a:p>
+          <a:p>
+            <a:pPr marL="0" indent="0">
+              <a:buNone/>
+            </a:pPr>
+            <a:endParaRPr lang="pt-BR" sz="1800" dirty="0">
+              <a:latin typeface="Corbel" panose="020B0503020204020204" pitchFamily="34" charset="0"/>
+            </a:endParaRPr>
+          </a:p>
+          <a:p>
+            <a:pPr marL="0" indent="0">
+              <a:buNone/>
+            </a:pPr>
+            <a:endParaRPr lang="pt-BR" sz="1800" dirty="0">
+              <a:latin typeface="Corbel" panose="020B0503020204020204" pitchFamily="34" charset="0"/>
+            </a:endParaRPr>
+          </a:p>
+          <a:p>
+            <a:pPr marL="0" indent="0">
+              <a:buNone/>
+            </a:pPr>
+            <a:endParaRPr lang="pt-BR" sz="1800" dirty="0">
+              <a:latin typeface="Corbel" panose="020B0503020204020204" pitchFamily="34" charset="0"/>
+            </a:endParaRPr>
+          </a:p>
+          <a:p>
+            <a:pPr marL="0" indent="0">
+              <a:buFont typeface="Arial" charset="0"/>
+              <a:buNone/>
+            </a:pPr>
+            <a:endParaRPr lang="pt-BR" sz="1800" dirty="0">
+              <a:latin typeface="Corbel" panose="020B0503020204020204" pitchFamily="34" charset="0"/>
+            </a:endParaRPr>
+          </a:p>
+          <a:p>
+            <a:pPr marL="0" indent="0">
+              <a:buFont typeface="Arial" charset="0"/>
+              <a:buNone/>
+            </a:pPr>
+            <a:endParaRPr lang="pt-BR" sz="1800" dirty="0">
+              <a:latin typeface="Corbel" panose="020B0503020204020204" pitchFamily="34" charset="0"/>
+            </a:endParaRPr>
           </a:p>
         </p:txBody>
       </p:sp>
     </p:spTree>
     <p:extLst>
       <p:ext uri="{BB962C8B-B14F-4D97-AF65-F5344CB8AC3E}">
-        <p14:creationId xmlns:p14="http://schemas.microsoft.com/office/powerpoint/2010/main" val="3718216112"/>
+        <p14:creationId xmlns:p14="http://schemas.microsoft.com/office/powerpoint/2010/main" val="1602921918"/>
       </p:ext>
     </p:extLst>
   </p:cSld>
@@ -46184,7 +46296,7 @@
                 </a:solidFill>
                 <a:latin typeface="Corbel" panose="020B0503020204020204" pitchFamily="34" charset="0"/>
               </a:rPr>
-              <a:t>ATIVIDADE - 6</a:t>
+              <a:t>ATIVIDADE - 5</a:t>
             </a:r>
           </a:p>
         </p:txBody>
@@ -46366,7 +46478,7 @@
             </a:pPr>
             <a:r>
               <a:rPr lang="pt-BR" sz="1800" dirty="0"/>
-              <a:t>Projete 2 anos de vendas no relatório de VENDAS. </a:t>
+              <a:t>Utilize o relatório de Vendas para mostrar graficamente:</a:t>
             </a:r>
           </a:p>
           <a:p>
@@ -46376,15 +46488,55 @@
             </a:pPr>
             <a:r>
               <a:rPr lang="pt-BR" sz="1800" dirty="0"/>
-              <a:t>Faça um gráfico de linhas e estime pela equação Linear, potenciação, </a:t>
+              <a:t>1)Durante todos o período, qual a curva de Vendas Totais mês a mês.</a:t>
+            </a:r>
+          </a:p>
+          <a:p>
+            <a:pPr marL="0" indent="0">
+              <a:buFont typeface="Arial" charset="0"/>
+              <a:buNone/>
+            </a:pPr>
+            <a:r>
+              <a:rPr lang="pt-BR" sz="1800" dirty="0"/>
+              <a:t>2) Como é representado graficamente as vendas por </a:t>
             </a:r>
             <a:r>
               <a:rPr lang="pt-BR" sz="1800" dirty="0" err="1"/>
-              <a:t>exponenciação</a:t>
+              <a:t>Forncedor</a:t>
             </a:r>
             <a:r>
               <a:rPr lang="pt-BR" sz="1800" dirty="0"/>
-              <a:t>.</a:t>
+              <a:t> (barra).</a:t>
+            </a:r>
+          </a:p>
+          <a:p>
+            <a:pPr marL="0" indent="0">
+              <a:buFont typeface="Arial" charset="0"/>
+              <a:buNone/>
+            </a:pPr>
+            <a:r>
+              <a:rPr lang="pt-BR" sz="1800" dirty="0"/>
+              <a:t>	Quem vendeu mais /  Quem vendeu Menos</a:t>
+            </a:r>
+          </a:p>
+          <a:p>
+            <a:pPr marL="0" indent="0">
+              <a:buFont typeface="Arial" charset="0"/>
+              <a:buNone/>
+            </a:pPr>
+            <a:r>
+              <a:rPr lang="pt-BR" sz="1800" dirty="0"/>
+              <a:t>3) Mostre graficamente a participação de cada vendedor no total de vendas.</a:t>
+            </a:r>
+          </a:p>
+          <a:p>
+            <a:pPr marL="0" indent="0">
+              <a:buFont typeface="Arial" charset="0"/>
+              <a:buNone/>
+            </a:pPr>
+            <a:r>
+              <a:rPr lang="pt-BR" sz="1800" dirty="0"/>
+              <a:t>	Quem vendeu mais / Quem vendeu Menos</a:t>
             </a:r>
           </a:p>
           <a:p>
@@ -46399,7 +46551,7 @@
     </p:spTree>
     <p:extLst>
       <p:ext uri="{BB962C8B-B14F-4D97-AF65-F5344CB8AC3E}">
-        <p14:creationId xmlns:p14="http://schemas.microsoft.com/office/powerpoint/2010/main" val="2816037545"/>
+        <p14:creationId xmlns:p14="http://schemas.microsoft.com/office/powerpoint/2010/main" val="3718216112"/>
       </p:ext>
     </p:extLst>
   </p:cSld>
@@ -47602,6 +47754,435 @@
 </file>
 
 <file path=ppt/slides/slide74.xml><?xml version="1.0" encoding="utf-8"?>
+<p:sld xmlns:a="http://schemas.openxmlformats.org/drawingml/2006/main" xmlns:r="http://schemas.openxmlformats.org/officeDocument/2006/relationships" xmlns:p="http://schemas.openxmlformats.org/presentationml/2006/main">
+  <p:cSld>
+    <p:spTree>
+      <p:nvGrpSpPr>
+        <p:cNvPr id="1" name=""/>
+        <p:cNvGrpSpPr/>
+        <p:nvPr/>
+      </p:nvGrpSpPr>
+      <p:grpSpPr>
+        <a:xfrm>
+          <a:off x="0" y="0"/>
+          <a:ext cx="0" cy="0"/>
+          <a:chOff x="0" y="0"/>
+          <a:chExt cx="0" cy="0"/>
+        </a:xfrm>
+      </p:grpSpPr>
+      <p:sp>
+        <p:nvSpPr>
+          <p:cNvPr id="6" name="Subtítulo 2"/>
+          <p:cNvSpPr txBox="1">
+            <a:spLocks/>
+          </p:cNvSpPr>
+          <p:nvPr/>
+        </p:nvSpPr>
+        <p:spPr>
+          <a:xfrm>
+            <a:off x="210670" y="153054"/>
+            <a:ext cx="10058400" cy="718315"/>
+          </a:xfrm>
+        </p:spPr>
+        <p:txBody>
+          <a:bodyPr>
+            <a:noAutofit/>
+          </a:bodyPr>
+          <a:lstStyle>
+            <a:lvl1pPr marL="342900" indent="-342900" algn="l" rtl="0" eaLnBrk="0" fontAlgn="base" hangingPunct="0">
+              <a:spcBef>
+                <a:spcPct val="20000"/>
+              </a:spcBef>
+              <a:spcAft>
+                <a:spcPct val="0"/>
+              </a:spcAft>
+              <a:buFont typeface="Arial" charset="0"/>
+              <a:buChar char="•"/>
+              <a:defRPr lang="pt-BR" sz="2800" kern="1200" dirty="0">
+                <a:solidFill>
+                  <a:schemeClr val="tx1"/>
+                </a:solidFill>
+                <a:latin typeface="+mn-lt"/>
+                <a:ea typeface="+mn-ea"/>
+                <a:cs typeface="+mn-cs"/>
+              </a:defRPr>
+            </a:lvl1pPr>
+            <a:lvl2pPr marL="742950" indent="-285750" algn="l" rtl="0" eaLnBrk="0" fontAlgn="base" hangingPunct="0">
+              <a:spcBef>
+                <a:spcPct val="20000"/>
+              </a:spcBef>
+              <a:spcAft>
+                <a:spcPct val="0"/>
+              </a:spcAft>
+              <a:buFont typeface="Arial" charset="0"/>
+              <a:buChar char="•"/>
+              <a:defRPr lang="pt-BR" sz="2400" kern="1200" dirty="0">
+                <a:solidFill>
+                  <a:schemeClr val="tx1"/>
+                </a:solidFill>
+                <a:latin typeface="+mn-lt"/>
+                <a:ea typeface="+mn-ea"/>
+                <a:cs typeface="+mn-cs"/>
+              </a:defRPr>
+            </a:lvl2pPr>
+            <a:lvl3pPr marL="1143000" indent="-228600" algn="l" rtl="0" eaLnBrk="0" fontAlgn="base" hangingPunct="0">
+              <a:spcBef>
+                <a:spcPct val="20000"/>
+              </a:spcBef>
+              <a:spcAft>
+                <a:spcPct val="0"/>
+              </a:spcAft>
+              <a:buFont typeface="Arial" charset="0"/>
+              <a:buChar char="•"/>
+              <a:defRPr lang="pt-BR" sz="2400" kern="1200" dirty="0">
+                <a:solidFill>
+                  <a:schemeClr val="tx1"/>
+                </a:solidFill>
+                <a:latin typeface="+mn-lt"/>
+                <a:ea typeface="+mn-ea"/>
+                <a:cs typeface="+mn-cs"/>
+              </a:defRPr>
+            </a:lvl3pPr>
+            <a:lvl4pPr marL="1600200" indent="-228600" algn="l" rtl="0" eaLnBrk="0" fontAlgn="base" hangingPunct="0">
+              <a:spcBef>
+                <a:spcPct val="20000"/>
+              </a:spcBef>
+              <a:spcAft>
+                <a:spcPct val="0"/>
+              </a:spcAft>
+              <a:buFont typeface="Arial" charset="0"/>
+              <a:buChar char="•"/>
+              <a:defRPr lang="pt-BR" sz="2000" kern="1200" dirty="0">
+                <a:solidFill>
+                  <a:schemeClr val="tx1"/>
+                </a:solidFill>
+                <a:latin typeface="+mn-lt"/>
+                <a:ea typeface="+mn-ea"/>
+                <a:cs typeface="+mn-cs"/>
+              </a:defRPr>
+            </a:lvl4pPr>
+            <a:lvl5pPr marL="2057400" indent="-228600" algn="l" rtl="0" eaLnBrk="0" fontAlgn="base" hangingPunct="0">
+              <a:spcBef>
+                <a:spcPct val="20000"/>
+              </a:spcBef>
+              <a:spcAft>
+                <a:spcPct val="0"/>
+              </a:spcAft>
+              <a:buFont typeface="Arial" charset="0"/>
+              <a:buChar char="•"/>
+              <a:defRPr lang="pt-BR" sz="2000" kern="1200" dirty="0">
+                <a:solidFill>
+                  <a:schemeClr val="tx1"/>
+                </a:solidFill>
+                <a:latin typeface="+mn-lt"/>
+                <a:ea typeface="+mn-ea"/>
+                <a:cs typeface="+mn-cs"/>
+              </a:defRPr>
+            </a:lvl5pPr>
+            <a:lvl6pPr marL="2514600" indent="-228600" algn="l" defTabSz="914400" rtl="0" eaLnBrk="1" latinLnBrk="0" hangingPunct="1">
+              <a:spcBef>
+                <a:spcPct val="20000"/>
+              </a:spcBef>
+              <a:buFont typeface="Arial" pitchFamily="34" charset="0"/>
+              <a:buChar char="•"/>
+              <a:defRPr sz="2000" kern="1200">
+                <a:solidFill>
+                  <a:schemeClr val="tx1"/>
+                </a:solidFill>
+                <a:latin typeface="+mn-lt"/>
+                <a:ea typeface="+mn-ea"/>
+                <a:cs typeface="+mn-cs"/>
+              </a:defRPr>
+            </a:lvl6pPr>
+            <a:lvl7pPr marL="2971800" indent="-228600" algn="l" defTabSz="914400" rtl="0" eaLnBrk="1" latinLnBrk="0" hangingPunct="1">
+              <a:spcBef>
+                <a:spcPct val="20000"/>
+              </a:spcBef>
+              <a:buFont typeface="Arial" pitchFamily="34" charset="0"/>
+              <a:buChar char="•"/>
+              <a:defRPr sz="2000" kern="1200">
+                <a:solidFill>
+                  <a:schemeClr val="tx1"/>
+                </a:solidFill>
+                <a:latin typeface="+mn-lt"/>
+                <a:ea typeface="+mn-ea"/>
+                <a:cs typeface="+mn-cs"/>
+              </a:defRPr>
+            </a:lvl7pPr>
+            <a:lvl8pPr marL="3429000" indent="-228600" algn="l" defTabSz="914400" rtl="0" eaLnBrk="1" latinLnBrk="0" hangingPunct="1">
+              <a:spcBef>
+                <a:spcPct val="20000"/>
+              </a:spcBef>
+              <a:buFont typeface="Arial" pitchFamily="34" charset="0"/>
+              <a:buChar char="•"/>
+              <a:defRPr sz="2000" kern="1200">
+                <a:solidFill>
+                  <a:schemeClr val="tx1"/>
+                </a:solidFill>
+                <a:latin typeface="+mn-lt"/>
+                <a:ea typeface="+mn-ea"/>
+                <a:cs typeface="+mn-cs"/>
+              </a:defRPr>
+            </a:lvl8pPr>
+            <a:lvl9pPr marL="3886200" indent="-228600" algn="l" defTabSz="914400" rtl="0" eaLnBrk="1" latinLnBrk="0" hangingPunct="1">
+              <a:spcBef>
+                <a:spcPct val="20000"/>
+              </a:spcBef>
+              <a:buFont typeface="Arial" pitchFamily="34" charset="0"/>
+              <a:buChar char="•"/>
+              <a:defRPr sz="2000" kern="1200">
+                <a:solidFill>
+                  <a:schemeClr val="tx1"/>
+                </a:solidFill>
+                <a:latin typeface="+mn-lt"/>
+                <a:ea typeface="+mn-ea"/>
+                <a:cs typeface="+mn-cs"/>
+              </a:defRPr>
+            </a:lvl9pPr>
+          </a:lstStyle>
+          <a:p>
+            <a:pPr marL="0" indent="0">
+              <a:lnSpc>
+                <a:spcPct val="150000"/>
+              </a:lnSpc>
+              <a:buFont typeface="Arial" charset="0"/>
+              <a:buNone/>
+            </a:pPr>
+            <a:r>
+              <a:rPr lang="pt-BR" sz="2400" b="1" dirty="0">
+                <a:solidFill>
+                  <a:schemeClr val="accent6">
+                    <a:lumMod val="75000"/>
+                  </a:schemeClr>
+                </a:solidFill>
+                <a:latin typeface="Corbel" panose="020B0503020204020204" pitchFamily="34" charset="0"/>
+              </a:rPr>
+              <a:t>ATIVIDADE - 6</a:t>
+            </a:r>
+          </a:p>
+        </p:txBody>
+      </p:sp>
+      <p:sp>
+        <p:nvSpPr>
+          <p:cNvPr id="11" name="Subtítulo 1"/>
+          <p:cNvSpPr txBox="1">
+            <a:spLocks/>
+          </p:cNvSpPr>
+          <p:nvPr/>
+        </p:nvSpPr>
+        <p:spPr>
+          <a:xfrm>
+            <a:off x="692971" y="1913794"/>
+            <a:ext cx="10896600" cy="2817812"/>
+          </a:xfrm>
+        </p:spPr>
+        <p:txBody>
+          <a:bodyPr>
+            <a:noAutofit/>
+          </a:bodyPr>
+          <a:lstStyle>
+            <a:lvl1pPr marL="342900" indent="-342900" algn="l" rtl="0" eaLnBrk="0" fontAlgn="base" hangingPunct="0">
+              <a:spcBef>
+                <a:spcPct val="20000"/>
+              </a:spcBef>
+              <a:spcAft>
+                <a:spcPct val="0"/>
+              </a:spcAft>
+              <a:buFont typeface="Arial" charset="0"/>
+              <a:buChar char="•"/>
+              <a:defRPr lang="pt-BR" sz="2800" kern="1200" dirty="0">
+                <a:solidFill>
+                  <a:schemeClr val="tx1"/>
+                </a:solidFill>
+                <a:latin typeface="+mn-lt"/>
+                <a:ea typeface="+mn-ea"/>
+                <a:cs typeface="+mn-cs"/>
+              </a:defRPr>
+            </a:lvl1pPr>
+            <a:lvl2pPr marL="742950" indent="-285750" algn="l" rtl="0" eaLnBrk="0" fontAlgn="base" hangingPunct="0">
+              <a:spcBef>
+                <a:spcPct val="20000"/>
+              </a:spcBef>
+              <a:spcAft>
+                <a:spcPct val="0"/>
+              </a:spcAft>
+              <a:buFont typeface="Arial" charset="0"/>
+              <a:buChar char="•"/>
+              <a:defRPr lang="pt-BR" sz="2400" kern="1200" dirty="0">
+                <a:solidFill>
+                  <a:schemeClr val="tx1"/>
+                </a:solidFill>
+                <a:latin typeface="+mn-lt"/>
+                <a:ea typeface="+mn-ea"/>
+                <a:cs typeface="+mn-cs"/>
+              </a:defRPr>
+            </a:lvl2pPr>
+            <a:lvl3pPr marL="1143000" indent="-228600" algn="l" rtl="0" eaLnBrk="0" fontAlgn="base" hangingPunct="0">
+              <a:spcBef>
+                <a:spcPct val="20000"/>
+              </a:spcBef>
+              <a:spcAft>
+                <a:spcPct val="0"/>
+              </a:spcAft>
+              <a:buFont typeface="Arial" charset="0"/>
+              <a:buChar char="•"/>
+              <a:defRPr lang="pt-BR" sz="2400" kern="1200" dirty="0">
+                <a:solidFill>
+                  <a:schemeClr val="tx1"/>
+                </a:solidFill>
+                <a:latin typeface="+mn-lt"/>
+                <a:ea typeface="+mn-ea"/>
+                <a:cs typeface="+mn-cs"/>
+              </a:defRPr>
+            </a:lvl3pPr>
+            <a:lvl4pPr marL="1600200" indent="-228600" algn="l" rtl="0" eaLnBrk="0" fontAlgn="base" hangingPunct="0">
+              <a:spcBef>
+                <a:spcPct val="20000"/>
+              </a:spcBef>
+              <a:spcAft>
+                <a:spcPct val="0"/>
+              </a:spcAft>
+              <a:buFont typeface="Arial" charset="0"/>
+              <a:buChar char="•"/>
+              <a:defRPr lang="pt-BR" sz="2000" kern="1200" dirty="0">
+                <a:solidFill>
+                  <a:schemeClr val="tx1"/>
+                </a:solidFill>
+                <a:latin typeface="+mn-lt"/>
+                <a:ea typeface="+mn-ea"/>
+                <a:cs typeface="+mn-cs"/>
+              </a:defRPr>
+            </a:lvl4pPr>
+            <a:lvl5pPr marL="2057400" indent="-228600" algn="l" rtl="0" eaLnBrk="0" fontAlgn="base" hangingPunct="0">
+              <a:spcBef>
+                <a:spcPct val="20000"/>
+              </a:spcBef>
+              <a:spcAft>
+                <a:spcPct val="0"/>
+              </a:spcAft>
+              <a:buFont typeface="Arial" charset="0"/>
+              <a:buChar char="•"/>
+              <a:defRPr lang="pt-BR" sz="2000" kern="1200" dirty="0">
+                <a:solidFill>
+                  <a:schemeClr val="tx1"/>
+                </a:solidFill>
+                <a:latin typeface="+mn-lt"/>
+                <a:ea typeface="+mn-ea"/>
+                <a:cs typeface="+mn-cs"/>
+              </a:defRPr>
+            </a:lvl5pPr>
+            <a:lvl6pPr marL="2514600" indent="-228600" algn="l" defTabSz="914400" rtl="0" eaLnBrk="1" latinLnBrk="0" hangingPunct="1">
+              <a:spcBef>
+                <a:spcPct val="20000"/>
+              </a:spcBef>
+              <a:buFont typeface="Arial" pitchFamily="34" charset="0"/>
+              <a:buChar char="•"/>
+              <a:defRPr sz="2000" kern="1200">
+                <a:solidFill>
+                  <a:schemeClr val="tx1"/>
+                </a:solidFill>
+                <a:latin typeface="+mn-lt"/>
+                <a:ea typeface="+mn-ea"/>
+                <a:cs typeface="+mn-cs"/>
+              </a:defRPr>
+            </a:lvl6pPr>
+            <a:lvl7pPr marL="2971800" indent="-228600" algn="l" defTabSz="914400" rtl="0" eaLnBrk="1" latinLnBrk="0" hangingPunct="1">
+              <a:spcBef>
+                <a:spcPct val="20000"/>
+              </a:spcBef>
+              <a:buFont typeface="Arial" pitchFamily="34" charset="0"/>
+              <a:buChar char="•"/>
+              <a:defRPr sz="2000" kern="1200">
+                <a:solidFill>
+                  <a:schemeClr val="tx1"/>
+                </a:solidFill>
+                <a:latin typeface="+mn-lt"/>
+                <a:ea typeface="+mn-ea"/>
+                <a:cs typeface="+mn-cs"/>
+              </a:defRPr>
+            </a:lvl7pPr>
+            <a:lvl8pPr marL="3429000" indent="-228600" algn="l" defTabSz="914400" rtl="0" eaLnBrk="1" latinLnBrk="0" hangingPunct="1">
+              <a:spcBef>
+                <a:spcPct val="20000"/>
+              </a:spcBef>
+              <a:buFont typeface="Arial" pitchFamily="34" charset="0"/>
+              <a:buChar char="•"/>
+              <a:defRPr sz="2000" kern="1200">
+                <a:solidFill>
+                  <a:schemeClr val="tx1"/>
+                </a:solidFill>
+                <a:latin typeface="+mn-lt"/>
+                <a:ea typeface="+mn-ea"/>
+                <a:cs typeface="+mn-cs"/>
+              </a:defRPr>
+            </a:lvl8pPr>
+            <a:lvl9pPr marL="3886200" indent="-228600" algn="l" defTabSz="914400" rtl="0" eaLnBrk="1" latinLnBrk="0" hangingPunct="1">
+              <a:spcBef>
+                <a:spcPct val="20000"/>
+              </a:spcBef>
+              <a:buFont typeface="Arial" pitchFamily="34" charset="0"/>
+              <a:buChar char="•"/>
+              <a:defRPr sz="2000" kern="1200">
+                <a:solidFill>
+                  <a:schemeClr val="tx1"/>
+                </a:solidFill>
+                <a:latin typeface="+mn-lt"/>
+                <a:ea typeface="+mn-ea"/>
+                <a:cs typeface="+mn-cs"/>
+              </a:defRPr>
+            </a:lvl9pPr>
+          </a:lstStyle>
+          <a:p>
+            <a:pPr marL="0" indent="0">
+              <a:buFont typeface="Arial" charset="0"/>
+              <a:buNone/>
+            </a:pPr>
+            <a:r>
+              <a:rPr lang="pt-BR" sz="1800" dirty="0"/>
+              <a:t>Projete 2 anos de vendas no relatório de VENDAS. </a:t>
+            </a:r>
+          </a:p>
+          <a:p>
+            <a:pPr marL="0" indent="0">
+              <a:buFont typeface="Arial" charset="0"/>
+              <a:buNone/>
+            </a:pPr>
+            <a:r>
+              <a:rPr lang="pt-BR" sz="1800" dirty="0"/>
+              <a:t>Faça um gráfico de linhas e estime pela equação Linear, potenciação, </a:t>
+            </a:r>
+            <a:r>
+              <a:rPr lang="pt-BR" sz="1800" dirty="0" err="1"/>
+              <a:t>exponenciação</a:t>
+            </a:r>
+            <a:r>
+              <a:rPr lang="pt-BR" sz="1800" dirty="0"/>
+              <a:t>.</a:t>
+            </a:r>
+          </a:p>
+          <a:p>
+            <a:pPr marL="0" indent="0">
+              <a:buFont typeface="Arial" charset="0"/>
+              <a:buNone/>
+            </a:pPr>
+            <a:endParaRPr lang="pt-BR" sz="1800" dirty="0"/>
+          </a:p>
+        </p:txBody>
+      </p:sp>
+    </p:spTree>
+    <p:extLst>
+      <p:ext uri="{BB962C8B-B14F-4D97-AF65-F5344CB8AC3E}">
+        <p14:creationId xmlns:p14="http://schemas.microsoft.com/office/powerpoint/2010/main" val="2816037545"/>
+      </p:ext>
+    </p:extLst>
+  </p:cSld>
+  <p:clrMapOvr>
+    <a:masterClrMapping/>
+  </p:clrMapOvr>
+</p:sld>
+</file>
+
+<file path=ppt/slides/slide75.xml><?xml version="1.0" encoding="utf-8"?>
 <p:sld xmlns:a="http://schemas.openxmlformats.org/drawingml/2006/main" xmlns:r="http://schemas.openxmlformats.org/officeDocument/2006/relationships" xmlns:p="http://schemas.openxmlformats.org/presentationml/2006/main" show="0">
   <p:cSld>
     <p:spTree>
@@ -47954,7 +48535,7 @@
 </p:sld>
 </file>
 
-<file path=ppt/slides/slide75.xml><?xml version="1.0" encoding="utf-8"?>
+<file path=ppt/slides/slide76.xml><?xml version="1.0" encoding="utf-8"?>
 <p:sld xmlns:a="http://schemas.openxmlformats.org/drawingml/2006/main" xmlns:r="http://schemas.openxmlformats.org/officeDocument/2006/relationships" xmlns:p="http://schemas.openxmlformats.org/presentationml/2006/main" show="0">
   <p:cSld>
     <p:spTree>
@@ -48245,7 +48826,7 @@
 </p:sld>
 </file>
 
-<file path=ppt/slides/slide76.xml><?xml version="1.0" encoding="utf-8"?>
+<file path=ppt/slides/slide77.xml><?xml version="1.0" encoding="utf-8"?>
 <p:sld xmlns:a="http://schemas.openxmlformats.org/drawingml/2006/main" xmlns:r="http://schemas.openxmlformats.org/officeDocument/2006/relationships" xmlns:p="http://schemas.openxmlformats.org/presentationml/2006/main">
   <p:cSld>
     <p:spTree>

</xml_diff>

<commit_message>
Aula 5 - 3 para natal dia anrterior
</commit_message>
<xml_diff>
--- a/Professor/Aula3.pptx
+++ b/Professor/Aula3.pptx
@@ -5,10 +5,10 @@
     <p:sldMasterId id="2147483672" r:id="rId1"/>
   </p:sldMasterIdLst>
   <p:notesMasterIdLst>
-    <p:notesMasterId r:id="rId79"/>
+    <p:notesMasterId r:id="rId80"/>
   </p:notesMasterIdLst>
   <p:handoutMasterIdLst>
-    <p:handoutMasterId r:id="rId80"/>
+    <p:handoutMasterId r:id="rId81"/>
   </p:handoutMasterIdLst>
   <p:sldIdLst>
     <p:sldId id="256" r:id="rId2"/>
@@ -77,17 +77,18 @@
     <p:sldId id="345" r:id="rId65"/>
     <p:sldId id="346" r:id="rId66"/>
     <p:sldId id="338" r:id="rId67"/>
-    <p:sldId id="334" r:id="rId68"/>
-    <p:sldId id="336" r:id="rId69"/>
-    <p:sldId id="309" r:id="rId70"/>
-    <p:sldId id="337" r:id="rId71"/>
-    <p:sldId id="340" r:id="rId72"/>
-    <p:sldId id="341" r:id="rId73"/>
-    <p:sldId id="290" r:id="rId74"/>
-    <p:sldId id="339" r:id="rId75"/>
-    <p:sldId id="281" r:id="rId76"/>
-    <p:sldId id="289" r:id="rId77"/>
-    <p:sldId id="342" r:id="rId78"/>
+    <p:sldId id="347" r:id="rId68"/>
+    <p:sldId id="334" r:id="rId69"/>
+    <p:sldId id="336" r:id="rId70"/>
+    <p:sldId id="309" r:id="rId71"/>
+    <p:sldId id="337" r:id="rId72"/>
+    <p:sldId id="340" r:id="rId73"/>
+    <p:sldId id="341" r:id="rId74"/>
+    <p:sldId id="290" r:id="rId75"/>
+    <p:sldId id="339" r:id="rId76"/>
+    <p:sldId id="281" r:id="rId77"/>
+    <p:sldId id="289" r:id="rId78"/>
+    <p:sldId id="342" r:id="rId79"/>
   </p:sldIdLst>
   <p:sldSz cx="12192000" cy="6858000"/>
   <p:notesSz cx="6858000" cy="9144000"/>
@@ -9107,7 +9108,7 @@
           <a:p>
             <a:fld id="{CE9EE758-9CAE-433F-B796-16C56E17460B}" type="datetimeFigureOut">
               <a:rPr lang="pt-BR" smtClean="0"/>
-              <a:t>06/12/2018</a:t>
+              <a:t>07/12/2018</a:t>
             </a:fld>
             <a:endParaRPr lang="pt-BR"/>
           </a:p>
@@ -9273,7 +9274,7 @@
           <a:p>
             <a:fld id="{FBCA46B2-73EF-4C4A-BBF3-1FCF65D31F9F}" type="datetimeFigureOut">
               <a:rPr lang="pt-BR" smtClean="0"/>
-              <a:t>06/12/2018</a:t>
+              <a:t>07/12/2018</a:t>
             </a:fld>
             <a:endParaRPr lang="pt-BR"/>
           </a:p>
@@ -9804,7 +9805,7 @@
           <a:graphicData uri="http://schemas.openxmlformats.org/presentationml/2006/ole">
             <mc:AlternateContent xmlns:mc="http://schemas.openxmlformats.org/markup-compatibility/2006">
               <mc:Choice xmlns:v="urn:schemas-microsoft-com:vml" Requires="v">
-                <p:oleObj spid="_x0000_s1239" name="Slide do think-cell" r:id="rId7" imgW="270" imgH="270" progId="TCLayout.ActiveDocument.1">
+                <p:oleObj spid="_x0000_s1243" name="Slide do think-cell" r:id="rId7" imgW="270" imgH="270" progId="TCLayout.ActiveDocument.1">
                   <p:embed/>
                 </p:oleObj>
               </mc:Choice>
@@ -44080,6 +44081,495 @@
               <a:buNone/>
             </a:pPr>
             <a:r>
+              <a:rPr lang="pt-BR" sz="2400" b="1" dirty="0" smtClean="0">
+                <a:solidFill>
+                  <a:schemeClr val="accent6">
+                    <a:lumMod val="75000"/>
+                  </a:schemeClr>
+                </a:solidFill>
+                <a:latin typeface="Corbel" panose="020B0503020204020204" pitchFamily="34" charset="0"/>
+              </a:rPr>
+              <a:t>Gráficos Criativos</a:t>
+            </a:r>
+            <a:endParaRPr lang="pt-BR" sz="2400" b="1" dirty="0">
+              <a:solidFill>
+                <a:schemeClr val="accent6">
+                  <a:lumMod val="75000"/>
+                </a:schemeClr>
+              </a:solidFill>
+              <a:latin typeface="Corbel" panose="020B0503020204020204" pitchFamily="34" charset="0"/>
+            </a:endParaRPr>
+          </a:p>
+        </p:txBody>
+      </p:sp>
+      <p:sp>
+        <p:nvSpPr>
+          <p:cNvPr id="11" name="Subtítulo 1"/>
+          <p:cNvSpPr txBox="1">
+            <a:spLocks/>
+          </p:cNvSpPr>
+          <p:nvPr/>
+        </p:nvSpPr>
+        <p:spPr>
+          <a:xfrm>
+            <a:off x="210670" y="1128485"/>
+            <a:ext cx="10896600" cy="3217603"/>
+          </a:xfrm>
+        </p:spPr>
+        <p:txBody>
+          <a:bodyPr>
+            <a:noAutofit/>
+          </a:bodyPr>
+          <a:lstStyle>
+            <a:lvl1pPr marL="342900" indent="-342900" algn="l" rtl="0" eaLnBrk="0" fontAlgn="base" hangingPunct="0">
+              <a:spcBef>
+                <a:spcPct val="20000"/>
+              </a:spcBef>
+              <a:spcAft>
+                <a:spcPct val="0"/>
+              </a:spcAft>
+              <a:buFont typeface="Arial" charset="0"/>
+              <a:buChar char="•"/>
+              <a:defRPr lang="pt-BR" sz="2800" kern="1200" dirty="0">
+                <a:solidFill>
+                  <a:schemeClr val="tx1"/>
+                </a:solidFill>
+                <a:latin typeface="+mn-lt"/>
+                <a:ea typeface="+mn-ea"/>
+                <a:cs typeface="+mn-cs"/>
+              </a:defRPr>
+            </a:lvl1pPr>
+            <a:lvl2pPr marL="742950" indent="-285750" algn="l" rtl="0" eaLnBrk="0" fontAlgn="base" hangingPunct="0">
+              <a:spcBef>
+                <a:spcPct val="20000"/>
+              </a:spcBef>
+              <a:spcAft>
+                <a:spcPct val="0"/>
+              </a:spcAft>
+              <a:buFont typeface="Arial" charset="0"/>
+              <a:buChar char="•"/>
+              <a:defRPr lang="pt-BR" sz="2400" kern="1200" dirty="0">
+                <a:solidFill>
+                  <a:schemeClr val="tx1"/>
+                </a:solidFill>
+                <a:latin typeface="+mn-lt"/>
+                <a:ea typeface="+mn-ea"/>
+                <a:cs typeface="+mn-cs"/>
+              </a:defRPr>
+            </a:lvl2pPr>
+            <a:lvl3pPr marL="1143000" indent="-228600" algn="l" rtl="0" eaLnBrk="0" fontAlgn="base" hangingPunct="0">
+              <a:spcBef>
+                <a:spcPct val="20000"/>
+              </a:spcBef>
+              <a:spcAft>
+                <a:spcPct val="0"/>
+              </a:spcAft>
+              <a:buFont typeface="Arial" charset="0"/>
+              <a:buChar char="•"/>
+              <a:defRPr lang="pt-BR" sz="2400" kern="1200" dirty="0">
+                <a:solidFill>
+                  <a:schemeClr val="tx1"/>
+                </a:solidFill>
+                <a:latin typeface="+mn-lt"/>
+                <a:ea typeface="+mn-ea"/>
+                <a:cs typeface="+mn-cs"/>
+              </a:defRPr>
+            </a:lvl3pPr>
+            <a:lvl4pPr marL="1600200" indent="-228600" algn="l" rtl="0" eaLnBrk="0" fontAlgn="base" hangingPunct="0">
+              <a:spcBef>
+                <a:spcPct val="20000"/>
+              </a:spcBef>
+              <a:spcAft>
+                <a:spcPct val="0"/>
+              </a:spcAft>
+              <a:buFont typeface="Arial" charset="0"/>
+              <a:buChar char="•"/>
+              <a:defRPr lang="pt-BR" sz="2000" kern="1200" dirty="0">
+                <a:solidFill>
+                  <a:schemeClr val="tx1"/>
+                </a:solidFill>
+                <a:latin typeface="+mn-lt"/>
+                <a:ea typeface="+mn-ea"/>
+                <a:cs typeface="+mn-cs"/>
+              </a:defRPr>
+            </a:lvl4pPr>
+            <a:lvl5pPr marL="2057400" indent="-228600" algn="l" rtl="0" eaLnBrk="0" fontAlgn="base" hangingPunct="0">
+              <a:spcBef>
+                <a:spcPct val="20000"/>
+              </a:spcBef>
+              <a:spcAft>
+                <a:spcPct val="0"/>
+              </a:spcAft>
+              <a:buFont typeface="Arial" charset="0"/>
+              <a:buChar char="•"/>
+              <a:defRPr lang="pt-BR" sz="2000" kern="1200" dirty="0">
+                <a:solidFill>
+                  <a:schemeClr val="tx1"/>
+                </a:solidFill>
+                <a:latin typeface="+mn-lt"/>
+                <a:ea typeface="+mn-ea"/>
+                <a:cs typeface="+mn-cs"/>
+              </a:defRPr>
+            </a:lvl5pPr>
+            <a:lvl6pPr marL="2514600" indent="-228600" algn="l" defTabSz="914400" rtl="0" eaLnBrk="1" latinLnBrk="0" hangingPunct="1">
+              <a:spcBef>
+                <a:spcPct val="20000"/>
+              </a:spcBef>
+              <a:buFont typeface="Arial" pitchFamily="34" charset="0"/>
+              <a:buChar char="•"/>
+              <a:defRPr sz="2000" kern="1200">
+                <a:solidFill>
+                  <a:schemeClr val="tx1"/>
+                </a:solidFill>
+                <a:latin typeface="+mn-lt"/>
+                <a:ea typeface="+mn-ea"/>
+                <a:cs typeface="+mn-cs"/>
+              </a:defRPr>
+            </a:lvl6pPr>
+            <a:lvl7pPr marL="2971800" indent="-228600" algn="l" defTabSz="914400" rtl="0" eaLnBrk="1" latinLnBrk="0" hangingPunct="1">
+              <a:spcBef>
+                <a:spcPct val="20000"/>
+              </a:spcBef>
+              <a:buFont typeface="Arial" pitchFamily="34" charset="0"/>
+              <a:buChar char="•"/>
+              <a:defRPr sz="2000" kern="1200">
+                <a:solidFill>
+                  <a:schemeClr val="tx1"/>
+                </a:solidFill>
+                <a:latin typeface="+mn-lt"/>
+                <a:ea typeface="+mn-ea"/>
+                <a:cs typeface="+mn-cs"/>
+              </a:defRPr>
+            </a:lvl7pPr>
+            <a:lvl8pPr marL="3429000" indent="-228600" algn="l" defTabSz="914400" rtl="0" eaLnBrk="1" latinLnBrk="0" hangingPunct="1">
+              <a:spcBef>
+                <a:spcPct val="20000"/>
+              </a:spcBef>
+              <a:buFont typeface="Arial" pitchFamily="34" charset="0"/>
+              <a:buChar char="•"/>
+              <a:defRPr sz="2000" kern="1200">
+                <a:solidFill>
+                  <a:schemeClr val="tx1"/>
+                </a:solidFill>
+                <a:latin typeface="+mn-lt"/>
+                <a:ea typeface="+mn-ea"/>
+                <a:cs typeface="+mn-cs"/>
+              </a:defRPr>
+            </a:lvl8pPr>
+            <a:lvl9pPr marL="3886200" indent="-228600" algn="l" defTabSz="914400" rtl="0" eaLnBrk="1" latinLnBrk="0" hangingPunct="1">
+              <a:spcBef>
+                <a:spcPct val="20000"/>
+              </a:spcBef>
+              <a:buFont typeface="Arial" pitchFamily="34" charset="0"/>
+              <a:buChar char="•"/>
+              <a:defRPr sz="2000" kern="1200">
+                <a:solidFill>
+                  <a:schemeClr val="tx1"/>
+                </a:solidFill>
+                <a:latin typeface="+mn-lt"/>
+                <a:ea typeface="+mn-ea"/>
+                <a:cs typeface="+mn-cs"/>
+              </a:defRPr>
+            </a:lvl9pPr>
+          </a:lstStyle>
+          <a:p>
+            <a:pPr marL="0" indent="0">
+              <a:buFont typeface="Arial" charset="0"/>
+              <a:buNone/>
+            </a:pPr>
+            <a:r>
+              <a:rPr lang="pt-BR" sz="1800" dirty="0" smtClean="0"/>
+              <a:t>Por ser uma ferramenta de imagem, os Gráficos te permitem criar além do Excel interagindo com outros elementos tais como Figura, cores:</a:t>
+            </a:r>
+            <a:endParaRPr lang="pt-BR" sz="1800" dirty="0"/>
+          </a:p>
+          <a:p>
+            <a:pPr marL="0" indent="0">
+              <a:buFont typeface="Arial" charset="0"/>
+              <a:buNone/>
+            </a:pPr>
+            <a:endParaRPr lang="pt-BR" sz="1800" dirty="0" smtClean="0"/>
+          </a:p>
+          <a:p>
+            <a:pPr marL="0" indent="0">
+              <a:buFont typeface="Arial" charset="0"/>
+              <a:buNone/>
+            </a:pPr>
+            <a:r>
+              <a:rPr lang="pt-BR" sz="1800" dirty="0" smtClean="0"/>
+              <a:t>Um ótimo Exemplo é integrar os gráficos com elementos gráficos ou mesmo tornar o gráfico um figura “</a:t>
+            </a:r>
+            <a:r>
+              <a:rPr lang="pt-BR" sz="1800" dirty="0" err="1" smtClean="0"/>
+              <a:t>jpeg</a:t>
+            </a:r>
+            <a:r>
+              <a:rPr lang="pt-BR" sz="1800" dirty="0" smtClean="0"/>
+              <a:t>”.</a:t>
+            </a:r>
+          </a:p>
+          <a:p>
+            <a:pPr marL="0" indent="0">
+              <a:buFont typeface="Arial" charset="0"/>
+              <a:buNone/>
+            </a:pPr>
+            <a:r>
+              <a:rPr lang="pt-BR" sz="1800" dirty="0" smtClean="0"/>
+              <a:t> - Para inserir uma figura no Excel: Guia Inserir &gt; Ilustrações &gt; Imagens &gt; Procurar figura e clicar inserir.</a:t>
+            </a:r>
+          </a:p>
+          <a:p>
+            <a:pPr marL="0" indent="0">
+              <a:buFont typeface="Arial" charset="0"/>
+              <a:buNone/>
+            </a:pPr>
+            <a:endParaRPr lang="pt-BR" sz="1800" dirty="0" smtClean="0"/>
+          </a:p>
+          <a:p>
+            <a:pPr marL="0" indent="0">
+              <a:buFont typeface="Arial" charset="0"/>
+              <a:buNone/>
+            </a:pPr>
+            <a:r>
+              <a:rPr lang="pt-BR" sz="1800" dirty="0" smtClean="0"/>
+              <a:t>Caminhos para formatação avançada de gráfico e figuras (somente funciona quando gráfico ou figura esta selecionado).</a:t>
+            </a:r>
+          </a:p>
+          <a:p>
+            <a:pPr marL="0" indent="0">
+              <a:buFont typeface="Arial" charset="0"/>
+              <a:buNone/>
+            </a:pPr>
+            <a:r>
+              <a:rPr lang="pt-BR" sz="1800" dirty="0" smtClean="0"/>
+              <a:t> - Guia “Ferramentas de Imagem” (aba menu Superior)  &gt; Guia Formatar.</a:t>
+            </a:r>
+          </a:p>
+          <a:p>
+            <a:pPr marL="0" indent="0">
+              <a:buFont typeface="Arial" charset="0"/>
+              <a:buNone/>
+            </a:pPr>
+            <a:endParaRPr lang="pt-BR" sz="1800" dirty="0" smtClean="0"/>
+          </a:p>
+          <a:p>
+            <a:pPr marL="0" indent="0">
+              <a:buFont typeface="Arial" charset="0"/>
+              <a:buNone/>
+            </a:pPr>
+            <a:endParaRPr lang="pt-BR" sz="1800" dirty="0" smtClean="0"/>
+          </a:p>
+        </p:txBody>
+      </p:sp>
+    </p:spTree>
+    <p:extLst>
+      <p:ext uri="{BB962C8B-B14F-4D97-AF65-F5344CB8AC3E}">
+        <p14:creationId xmlns:p14="http://schemas.microsoft.com/office/powerpoint/2010/main" val="2285305447"/>
+      </p:ext>
+    </p:extLst>
+  </p:cSld>
+  <p:clrMapOvr>
+    <a:masterClrMapping/>
+  </p:clrMapOvr>
+</p:sld>
+</file>
+
+<file path=ppt/slides/slide68.xml><?xml version="1.0" encoding="utf-8"?>
+<p:sld xmlns:a="http://schemas.openxmlformats.org/drawingml/2006/main" xmlns:r="http://schemas.openxmlformats.org/officeDocument/2006/relationships" xmlns:p="http://schemas.openxmlformats.org/presentationml/2006/main">
+  <p:cSld>
+    <p:spTree>
+      <p:nvGrpSpPr>
+        <p:cNvPr id="1" name=""/>
+        <p:cNvGrpSpPr/>
+        <p:nvPr/>
+      </p:nvGrpSpPr>
+      <p:grpSpPr>
+        <a:xfrm>
+          <a:off x="0" y="0"/>
+          <a:ext cx="0" cy="0"/>
+          <a:chOff x="0" y="0"/>
+          <a:chExt cx="0" cy="0"/>
+        </a:xfrm>
+      </p:grpSpPr>
+      <p:sp>
+        <p:nvSpPr>
+          <p:cNvPr id="6" name="Subtítulo 2"/>
+          <p:cNvSpPr txBox="1">
+            <a:spLocks/>
+          </p:cNvSpPr>
+          <p:nvPr/>
+        </p:nvSpPr>
+        <p:spPr>
+          <a:xfrm>
+            <a:off x="210670" y="153054"/>
+            <a:ext cx="10058400" cy="718315"/>
+          </a:xfrm>
+        </p:spPr>
+        <p:txBody>
+          <a:bodyPr>
+            <a:noAutofit/>
+          </a:bodyPr>
+          <a:lstStyle>
+            <a:lvl1pPr marL="342900" indent="-342900" algn="l" rtl="0" eaLnBrk="0" fontAlgn="base" hangingPunct="0">
+              <a:spcBef>
+                <a:spcPct val="20000"/>
+              </a:spcBef>
+              <a:spcAft>
+                <a:spcPct val="0"/>
+              </a:spcAft>
+              <a:buFont typeface="Arial" charset="0"/>
+              <a:buChar char="•"/>
+              <a:defRPr lang="pt-BR" sz="2800" kern="1200" dirty="0">
+                <a:solidFill>
+                  <a:schemeClr val="tx1"/>
+                </a:solidFill>
+                <a:latin typeface="+mn-lt"/>
+                <a:ea typeface="+mn-ea"/>
+                <a:cs typeface="+mn-cs"/>
+              </a:defRPr>
+            </a:lvl1pPr>
+            <a:lvl2pPr marL="742950" indent="-285750" algn="l" rtl="0" eaLnBrk="0" fontAlgn="base" hangingPunct="0">
+              <a:spcBef>
+                <a:spcPct val="20000"/>
+              </a:spcBef>
+              <a:spcAft>
+                <a:spcPct val="0"/>
+              </a:spcAft>
+              <a:buFont typeface="Arial" charset="0"/>
+              <a:buChar char="•"/>
+              <a:defRPr lang="pt-BR" sz="2400" kern="1200" dirty="0">
+                <a:solidFill>
+                  <a:schemeClr val="tx1"/>
+                </a:solidFill>
+                <a:latin typeface="+mn-lt"/>
+                <a:ea typeface="+mn-ea"/>
+                <a:cs typeface="+mn-cs"/>
+              </a:defRPr>
+            </a:lvl2pPr>
+            <a:lvl3pPr marL="1143000" indent="-228600" algn="l" rtl="0" eaLnBrk="0" fontAlgn="base" hangingPunct="0">
+              <a:spcBef>
+                <a:spcPct val="20000"/>
+              </a:spcBef>
+              <a:spcAft>
+                <a:spcPct val="0"/>
+              </a:spcAft>
+              <a:buFont typeface="Arial" charset="0"/>
+              <a:buChar char="•"/>
+              <a:defRPr lang="pt-BR" sz="2400" kern="1200" dirty="0">
+                <a:solidFill>
+                  <a:schemeClr val="tx1"/>
+                </a:solidFill>
+                <a:latin typeface="+mn-lt"/>
+                <a:ea typeface="+mn-ea"/>
+                <a:cs typeface="+mn-cs"/>
+              </a:defRPr>
+            </a:lvl3pPr>
+            <a:lvl4pPr marL="1600200" indent="-228600" algn="l" rtl="0" eaLnBrk="0" fontAlgn="base" hangingPunct="0">
+              <a:spcBef>
+                <a:spcPct val="20000"/>
+              </a:spcBef>
+              <a:spcAft>
+                <a:spcPct val="0"/>
+              </a:spcAft>
+              <a:buFont typeface="Arial" charset="0"/>
+              <a:buChar char="•"/>
+              <a:defRPr lang="pt-BR" sz="2000" kern="1200" dirty="0">
+                <a:solidFill>
+                  <a:schemeClr val="tx1"/>
+                </a:solidFill>
+                <a:latin typeface="+mn-lt"/>
+                <a:ea typeface="+mn-ea"/>
+                <a:cs typeface="+mn-cs"/>
+              </a:defRPr>
+            </a:lvl4pPr>
+            <a:lvl5pPr marL="2057400" indent="-228600" algn="l" rtl="0" eaLnBrk="0" fontAlgn="base" hangingPunct="0">
+              <a:spcBef>
+                <a:spcPct val="20000"/>
+              </a:spcBef>
+              <a:spcAft>
+                <a:spcPct val="0"/>
+              </a:spcAft>
+              <a:buFont typeface="Arial" charset="0"/>
+              <a:buChar char="•"/>
+              <a:defRPr lang="pt-BR" sz="2000" kern="1200" dirty="0">
+                <a:solidFill>
+                  <a:schemeClr val="tx1"/>
+                </a:solidFill>
+                <a:latin typeface="+mn-lt"/>
+                <a:ea typeface="+mn-ea"/>
+                <a:cs typeface="+mn-cs"/>
+              </a:defRPr>
+            </a:lvl5pPr>
+            <a:lvl6pPr marL="2514600" indent="-228600" algn="l" defTabSz="914400" rtl="0" eaLnBrk="1" latinLnBrk="0" hangingPunct="1">
+              <a:spcBef>
+                <a:spcPct val="20000"/>
+              </a:spcBef>
+              <a:buFont typeface="Arial" pitchFamily="34" charset="0"/>
+              <a:buChar char="•"/>
+              <a:defRPr sz="2000" kern="1200">
+                <a:solidFill>
+                  <a:schemeClr val="tx1"/>
+                </a:solidFill>
+                <a:latin typeface="+mn-lt"/>
+                <a:ea typeface="+mn-ea"/>
+                <a:cs typeface="+mn-cs"/>
+              </a:defRPr>
+            </a:lvl6pPr>
+            <a:lvl7pPr marL="2971800" indent="-228600" algn="l" defTabSz="914400" rtl="0" eaLnBrk="1" latinLnBrk="0" hangingPunct="1">
+              <a:spcBef>
+                <a:spcPct val="20000"/>
+              </a:spcBef>
+              <a:buFont typeface="Arial" pitchFamily="34" charset="0"/>
+              <a:buChar char="•"/>
+              <a:defRPr sz="2000" kern="1200">
+                <a:solidFill>
+                  <a:schemeClr val="tx1"/>
+                </a:solidFill>
+                <a:latin typeface="+mn-lt"/>
+                <a:ea typeface="+mn-ea"/>
+                <a:cs typeface="+mn-cs"/>
+              </a:defRPr>
+            </a:lvl7pPr>
+            <a:lvl8pPr marL="3429000" indent="-228600" algn="l" defTabSz="914400" rtl="0" eaLnBrk="1" latinLnBrk="0" hangingPunct="1">
+              <a:spcBef>
+                <a:spcPct val="20000"/>
+              </a:spcBef>
+              <a:buFont typeface="Arial" pitchFamily="34" charset="0"/>
+              <a:buChar char="•"/>
+              <a:defRPr sz="2000" kern="1200">
+                <a:solidFill>
+                  <a:schemeClr val="tx1"/>
+                </a:solidFill>
+                <a:latin typeface="+mn-lt"/>
+                <a:ea typeface="+mn-ea"/>
+                <a:cs typeface="+mn-cs"/>
+              </a:defRPr>
+            </a:lvl8pPr>
+            <a:lvl9pPr marL="3886200" indent="-228600" algn="l" defTabSz="914400" rtl="0" eaLnBrk="1" latinLnBrk="0" hangingPunct="1">
+              <a:spcBef>
+                <a:spcPct val="20000"/>
+              </a:spcBef>
+              <a:buFont typeface="Arial" pitchFamily="34" charset="0"/>
+              <a:buChar char="•"/>
+              <a:defRPr sz="2000" kern="1200">
+                <a:solidFill>
+                  <a:schemeClr val="tx1"/>
+                </a:solidFill>
+                <a:latin typeface="+mn-lt"/>
+                <a:ea typeface="+mn-ea"/>
+                <a:cs typeface="+mn-cs"/>
+              </a:defRPr>
+            </a:lvl9pPr>
+          </a:lstStyle>
+          <a:p>
+            <a:pPr marL="0" indent="0">
+              <a:lnSpc>
+                <a:spcPct val="150000"/>
+              </a:lnSpc>
+              <a:buFont typeface="Arial" charset="0"/>
+              <a:buNone/>
+            </a:pPr>
+            <a:r>
               <a:rPr lang="pt-BR" sz="2400" b="1" dirty="0">
                 <a:solidFill>
                   <a:schemeClr val="accent6">
@@ -44307,7 +44797,15 @@
             </a:pPr>
             <a:r>
               <a:rPr lang="pt-BR" sz="1800" dirty="0"/>
-              <a:t>Guia dados&gt; Grupo Ferramenta de dados&gt; Comando Remover duplicatas.</a:t>
+              <a:t>Guia </a:t>
+            </a:r>
+            <a:r>
+              <a:rPr lang="pt-BR" sz="1800" dirty="0" smtClean="0"/>
+              <a:t>dados &gt; </a:t>
+            </a:r>
+            <a:r>
+              <a:rPr lang="pt-BR" sz="1800" dirty="0"/>
+              <a:t>Grupo Ferramenta de dados&gt; Comando Remover duplicatas.</a:t>
             </a:r>
           </a:p>
           <a:p>
@@ -44535,527 +45033,6 @@
 </p:sld>
 </file>
 
-<file path=ppt/slides/slide68.xml><?xml version="1.0" encoding="utf-8"?>
-<p:sld xmlns:a="http://schemas.openxmlformats.org/drawingml/2006/main" xmlns:r="http://schemas.openxmlformats.org/officeDocument/2006/relationships" xmlns:p="http://schemas.openxmlformats.org/presentationml/2006/main">
-  <p:cSld>
-    <p:spTree>
-      <p:nvGrpSpPr>
-        <p:cNvPr id="1" name=""/>
-        <p:cNvGrpSpPr/>
-        <p:nvPr/>
-      </p:nvGrpSpPr>
-      <p:grpSpPr>
-        <a:xfrm>
-          <a:off x="0" y="0"/>
-          <a:ext cx="0" cy="0"/>
-          <a:chOff x="0" y="0"/>
-          <a:chExt cx="0" cy="0"/>
-        </a:xfrm>
-      </p:grpSpPr>
-      <p:sp>
-        <p:nvSpPr>
-          <p:cNvPr id="6" name="Subtítulo 2"/>
-          <p:cNvSpPr txBox="1">
-            <a:spLocks/>
-          </p:cNvSpPr>
-          <p:nvPr/>
-        </p:nvSpPr>
-        <p:spPr>
-          <a:xfrm>
-            <a:off x="210670" y="153054"/>
-            <a:ext cx="10058400" cy="718315"/>
-          </a:xfrm>
-        </p:spPr>
-        <p:txBody>
-          <a:bodyPr>
-            <a:noAutofit/>
-          </a:bodyPr>
-          <a:lstStyle>
-            <a:lvl1pPr marL="342900" indent="-342900" algn="l" rtl="0" eaLnBrk="0" fontAlgn="base" hangingPunct="0">
-              <a:spcBef>
-                <a:spcPct val="20000"/>
-              </a:spcBef>
-              <a:spcAft>
-                <a:spcPct val="0"/>
-              </a:spcAft>
-              <a:buFont typeface="Arial" charset="0"/>
-              <a:buChar char="•"/>
-              <a:defRPr lang="pt-BR" sz="2800" kern="1200" dirty="0">
-                <a:solidFill>
-                  <a:schemeClr val="tx1"/>
-                </a:solidFill>
-                <a:latin typeface="+mn-lt"/>
-                <a:ea typeface="+mn-ea"/>
-                <a:cs typeface="+mn-cs"/>
-              </a:defRPr>
-            </a:lvl1pPr>
-            <a:lvl2pPr marL="742950" indent="-285750" algn="l" rtl="0" eaLnBrk="0" fontAlgn="base" hangingPunct="0">
-              <a:spcBef>
-                <a:spcPct val="20000"/>
-              </a:spcBef>
-              <a:spcAft>
-                <a:spcPct val="0"/>
-              </a:spcAft>
-              <a:buFont typeface="Arial" charset="0"/>
-              <a:buChar char="•"/>
-              <a:defRPr lang="pt-BR" sz="2400" kern="1200" dirty="0">
-                <a:solidFill>
-                  <a:schemeClr val="tx1"/>
-                </a:solidFill>
-                <a:latin typeface="+mn-lt"/>
-                <a:ea typeface="+mn-ea"/>
-                <a:cs typeface="+mn-cs"/>
-              </a:defRPr>
-            </a:lvl2pPr>
-            <a:lvl3pPr marL="1143000" indent="-228600" algn="l" rtl="0" eaLnBrk="0" fontAlgn="base" hangingPunct="0">
-              <a:spcBef>
-                <a:spcPct val="20000"/>
-              </a:spcBef>
-              <a:spcAft>
-                <a:spcPct val="0"/>
-              </a:spcAft>
-              <a:buFont typeface="Arial" charset="0"/>
-              <a:buChar char="•"/>
-              <a:defRPr lang="pt-BR" sz="2400" kern="1200" dirty="0">
-                <a:solidFill>
-                  <a:schemeClr val="tx1"/>
-                </a:solidFill>
-                <a:latin typeface="+mn-lt"/>
-                <a:ea typeface="+mn-ea"/>
-                <a:cs typeface="+mn-cs"/>
-              </a:defRPr>
-            </a:lvl3pPr>
-            <a:lvl4pPr marL="1600200" indent="-228600" algn="l" rtl="0" eaLnBrk="0" fontAlgn="base" hangingPunct="0">
-              <a:spcBef>
-                <a:spcPct val="20000"/>
-              </a:spcBef>
-              <a:spcAft>
-                <a:spcPct val="0"/>
-              </a:spcAft>
-              <a:buFont typeface="Arial" charset="0"/>
-              <a:buChar char="•"/>
-              <a:defRPr lang="pt-BR" sz="2000" kern="1200" dirty="0">
-                <a:solidFill>
-                  <a:schemeClr val="tx1"/>
-                </a:solidFill>
-                <a:latin typeface="+mn-lt"/>
-                <a:ea typeface="+mn-ea"/>
-                <a:cs typeface="+mn-cs"/>
-              </a:defRPr>
-            </a:lvl4pPr>
-            <a:lvl5pPr marL="2057400" indent="-228600" algn="l" rtl="0" eaLnBrk="0" fontAlgn="base" hangingPunct="0">
-              <a:spcBef>
-                <a:spcPct val="20000"/>
-              </a:spcBef>
-              <a:spcAft>
-                <a:spcPct val="0"/>
-              </a:spcAft>
-              <a:buFont typeface="Arial" charset="0"/>
-              <a:buChar char="•"/>
-              <a:defRPr lang="pt-BR" sz="2000" kern="1200" dirty="0">
-                <a:solidFill>
-                  <a:schemeClr val="tx1"/>
-                </a:solidFill>
-                <a:latin typeface="+mn-lt"/>
-                <a:ea typeface="+mn-ea"/>
-                <a:cs typeface="+mn-cs"/>
-              </a:defRPr>
-            </a:lvl5pPr>
-            <a:lvl6pPr marL="2514600" indent="-228600" algn="l" defTabSz="914400" rtl="0" eaLnBrk="1" latinLnBrk="0" hangingPunct="1">
-              <a:spcBef>
-                <a:spcPct val="20000"/>
-              </a:spcBef>
-              <a:buFont typeface="Arial" pitchFamily="34" charset="0"/>
-              <a:buChar char="•"/>
-              <a:defRPr sz="2000" kern="1200">
-                <a:solidFill>
-                  <a:schemeClr val="tx1"/>
-                </a:solidFill>
-                <a:latin typeface="+mn-lt"/>
-                <a:ea typeface="+mn-ea"/>
-                <a:cs typeface="+mn-cs"/>
-              </a:defRPr>
-            </a:lvl6pPr>
-            <a:lvl7pPr marL="2971800" indent="-228600" algn="l" defTabSz="914400" rtl="0" eaLnBrk="1" latinLnBrk="0" hangingPunct="1">
-              <a:spcBef>
-                <a:spcPct val="20000"/>
-              </a:spcBef>
-              <a:buFont typeface="Arial" pitchFamily="34" charset="0"/>
-              <a:buChar char="•"/>
-              <a:defRPr sz="2000" kern="1200">
-                <a:solidFill>
-                  <a:schemeClr val="tx1"/>
-                </a:solidFill>
-                <a:latin typeface="+mn-lt"/>
-                <a:ea typeface="+mn-ea"/>
-                <a:cs typeface="+mn-cs"/>
-              </a:defRPr>
-            </a:lvl7pPr>
-            <a:lvl8pPr marL="3429000" indent="-228600" algn="l" defTabSz="914400" rtl="0" eaLnBrk="1" latinLnBrk="0" hangingPunct="1">
-              <a:spcBef>
-                <a:spcPct val="20000"/>
-              </a:spcBef>
-              <a:buFont typeface="Arial" pitchFamily="34" charset="0"/>
-              <a:buChar char="•"/>
-              <a:defRPr sz="2000" kern="1200">
-                <a:solidFill>
-                  <a:schemeClr val="tx1"/>
-                </a:solidFill>
-                <a:latin typeface="+mn-lt"/>
-                <a:ea typeface="+mn-ea"/>
-                <a:cs typeface="+mn-cs"/>
-              </a:defRPr>
-            </a:lvl8pPr>
-            <a:lvl9pPr marL="3886200" indent="-228600" algn="l" defTabSz="914400" rtl="0" eaLnBrk="1" latinLnBrk="0" hangingPunct="1">
-              <a:spcBef>
-                <a:spcPct val="20000"/>
-              </a:spcBef>
-              <a:buFont typeface="Arial" pitchFamily="34" charset="0"/>
-              <a:buChar char="•"/>
-              <a:defRPr sz="2000" kern="1200">
-                <a:solidFill>
-                  <a:schemeClr val="tx1"/>
-                </a:solidFill>
-                <a:latin typeface="+mn-lt"/>
-                <a:ea typeface="+mn-ea"/>
-                <a:cs typeface="+mn-cs"/>
-              </a:defRPr>
-            </a:lvl9pPr>
-          </a:lstStyle>
-          <a:p>
-            <a:pPr marL="0" indent="0">
-              <a:lnSpc>
-                <a:spcPct val="150000"/>
-              </a:lnSpc>
-              <a:buFont typeface="Arial" charset="0"/>
-              <a:buNone/>
-            </a:pPr>
-            <a:r>
-              <a:rPr lang="pt-BR" sz="2400" b="1" dirty="0">
-                <a:solidFill>
-                  <a:schemeClr val="accent6">
-                    <a:lumMod val="75000"/>
-                  </a:schemeClr>
-                </a:solidFill>
-                <a:latin typeface="Corbel" panose="020B0503020204020204" pitchFamily="34" charset="0"/>
-              </a:rPr>
-              <a:t>ATIVIDADE - 3</a:t>
-            </a:r>
-          </a:p>
-        </p:txBody>
-      </p:sp>
-      <p:sp>
-        <p:nvSpPr>
-          <p:cNvPr id="11" name="Subtítulo 1"/>
-          <p:cNvSpPr txBox="1">
-            <a:spLocks/>
-          </p:cNvSpPr>
-          <p:nvPr/>
-        </p:nvSpPr>
-        <p:spPr>
-          <a:xfrm>
-            <a:off x="692971" y="1913794"/>
-            <a:ext cx="10896600" cy="2817812"/>
-          </a:xfrm>
-        </p:spPr>
-        <p:txBody>
-          <a:bodyPr>
-            <a:noAutofit/>
-          </a:bodyPr>
-          <a:lstStyle>
-            <a:lvl1pPr marL="342900" indent="-342900" algn="l" rtl="0" eaLnBrk="0" fontAlgn="base" hangingPunct="0">
-              <a:spcBef>
-                <a:spcPct val="20000"/>
-              </a:spcBef>
-              <a:spcAft>
-                <a:spcPct val="0"/>
-              </a:spcAft>
-              <a:buFont typeface="Arial" charset="0"/>
-              <a:buChar char="•"/>
-              <a:defRPr lang="pt-BR" sz="2800" kern="1200" dirty="0">
-                <a:solidFill>
-                  <a:schemeClr val="tx1"/>
-                </a:solidFill>
-                <a:latin typeface="+mn-lt"/>
-                <a:ea typeface="+mn-ea"/>
-                <a:cs typeface="+mn-cs"/>
-              </a:defRPr>
-            </a:lvl1pPr>
-            <a:lvl2pPr marL="742950" indent="-285750" algn="l" rtl="0" eaLnBrk="0" fontAlgn="base" hangingPunct="0">
-              <a:spcBef>
-                <a:spcPct val="20000"/>
-              </a:spcBef>
-              <a:spcAft>
-                <a:spcPct val="0"/>
-              </a:spcAft>
-              <a:buFont typeface="Arial" charset="0"/>
-              <a:buChar char="•"/>
-              <a:defRPr lang="pt-BR" sz="2400" kern="1200" dirty="0">
-                <a:solidFill>
-                  <a:schemeClr val="tx1"/>
-                </a:solidFill>
-                <a:latin typeface="+mn-lt"/>
-                <a:ea typeface="+mn-ea"/>
-                <a:cs typeface="+mn-cs"/>
-              </a:defRPr>
-            </a:lvl2pPr>
-            <a:lvl3pPr marL="1143000" indent="-228600" algn="l" rtl="0" eaLnBrk="0" fontAlgn="base" hangingPunct="0">
-              <a:spcBef>
-                <a:spcPct val="20000"/>
-              </a:spcBef>
-              <a:spcAft>
-                <a:spcPct val="0"/>
-              </a:spcAft>
-              <a:buFont typeface="Arial" charset="0"/>
-              <a:buChar char="•"/>
-              <a:defRPr lang="pt-BR" sz="2400" kern="1200" dirty="0">
-                <a:solidFill>
-                  <a:schemeClr val="tx1"/>
-                </a:solidFill>
-                <a:latin typeface="+mn-lt"/>
-                <a:ea typeface="+mn-ea"/>
-                <a:cs typeface="+mn-cs"/>
-              </a:defRPr>
-            </a:lvl3pPr>
-            <a:lvl4pPr marL="1600200" indent="-228600" algn="l" rtl="0" eaLnBrk="0" fontAlgn="base" hangingPunct="0">
-              <a:spcBef>
-                <a:spcPct val="20000"/>
-              </a:spcBef>
-              <a:spcAft>
-                <a:spcPct val="0"/>
-              </a:spcAft>
-              <a:buFont typeface="Arial" charset="0"/>
-              <a:buChar char="•"/>
-              <a:defRPr lang="pt-BR" sz="2000" kern="1200" dirty="0">
-                <a:solidFill>
-                  <a:schemeClr val="tx1"/>
-                </a:solidFill>
-                <a:latin typeface="+mn-lt"/>
-                <a:ea typeface="+mn-ea"/>
-                <a:cs typeface="+mn-cs"/>
-              </a:defRPr>
-            </a:lvl4pPr>
-            <a:lvl5pPr marL="2057400" indent="-228600" algn="l" rtl="0" eaLnBrk="0" fontAlgn="base" hangingPunct="0">
-              <a:spcBef>
-                <a:spcPct val="20000"/>
-              </a:spcBef>
-              <a:spcAft>
-                <a:spcPct val="0"/>
-              </a:spcAft>
-              <a:buFont typeface="Arial" charset="0"/>
-              <a:buChar char="•"/>
-              <a:defRPr lang="pt-BR" sz="2000" kern="1200" dirty="0">
-                <a:solidFill>
-                  <a:schemeClr val="tx1"/>
-                </a:solidFill>
-                <a:latin typeface="+mn-lt"/>
-                <a:ea typeface="+mn-ea"/>
-                <a:cs typeface="+mn-cs"/>
-              </a:defRPr>
-            </a:lvl5pPr>
-            <a:lvl6pPr marL="2514600" indent="-228600" algn="l" defTabSz="914400" rtl="0" eaLnBrk="1" latinLnBrk="0" hangingPunct="1">
-              <a:spcBef>
-                <a:spcPct val="20000"/>
-              </a:spcBef>
-              <a:buFont typeface="Arial" pitchFamily="34" charset="0"/>
-              <a:buChar char="•"/>
-              <a:defRPr sz="2000" kern="1200">
-                <a:solidFill>
-                  <a:schemeClr val="tx1"/>
-                </a:solidFill>
-                <a:latin typeface="+mn-lt"/>
-                <a:ea typeface="+mn-ea"/>
-                <a:cs typeface="+mn-cs"/>
-              </a:defRPr>
-            </a:lvl6pPr>
-            <a:lvl7pPr marL="2971800" indent="-228600" algn="l" defTabSz="914400" rtl="0" eaLnBrk="1" latinLnBrk="0" hangingPunct="1">
-              <a:spcBef>
-                <a:spcPct val="20000"/>
-              </a:spcBef>
-              <a:buFont typeface="Arial" pitchFamily="34" charset="0"/>
-              <a:buChar char="•"/>
-              <a:defRPr sz="2000" kern="1200">
-                <a:solidFill>
-                  <a:schemeClr val="tx1"/>
-                </a:solidFill>
-                <a:latin typeface="+mn-lt"/>
-                <a:ea typeface="+mn-ea"/>
-                <a:cs typeface="+mn-cs"/>
-              </a:defRPr>
-            </a:lvl7pPr>
-            <a:lvl8pPr marL="3429000" indent="-228600" algn="l" defTabSz="914400" rtl="0" eaLnBrk="1" latinLnBrk="0" hangingPunct="1">
-              <a:spcBef>
-                <a:spcPct val="20000"/>
-              </a:spcBef>
-              <a:buFont typeface="Arial" pitchFamily="34" charset="0"/>
-              <a:buChar char="•"/>
-              <a:defRPr sz="2000" kern="1200">
-                <a:solidFill>
-                  <a:schemeClr val="tx1"/>
-                </a:solidFill>
-                <a:latin typeface="+mn-lt"/>
-                <a:ea typeface="+mn-ea"/>
-                <a:cs typeface="+mn-cs"/>
-              </a:defRPr>
-            </a:lvl8pPr>
-            <a:lvl9pPr marL="3886200" indent="-228600" algn="l" defTabSz="914400" rtl="0" eaLnBrk="1" latinLnBrk="0" hangingPunct="1">
-              <a:spcBef>
-                <a:spcPct val="20000"/>
-              </a:spcBef>
-              <a:buFont typeface="Arial" pitchFamily="34" charset="0"/>
-              <a:buChar char="•"/>
-              <a:defRPr sz="2000" kern="1200">
-                <a:solidFill>
-                  <a:schemeClr val="tx1"/>
-                </a:solidFill>
-                <a:latin typeface="+mn-lt"/>
-                <a:ea typeface="+mn-ea"/>
-                <a:cs typeface="+mn-cs"/>
-              </a:defRPr>
-            </a:lvl9pPr>
-          </a:lstStyle>
-          <a:p>
-            <a:pPr marL="0" indent="0">
-              <a:buFont typeface="Arial" charset="0"/>
-              <a:buNone/>
-            </a:pPr>
-            <a:r>
-              <a:rPr lang="pt-BR" sz="1800" dirty="0"/>
-              <a:t>Retorne no arquivo de VENDAS (exercício anterior) e usando o soma.se e cont.se calcule o total de vendas e contagem de vendas para cada:</a:t>
-            </a:r>
-          </a:p>
-          <a:p>
-            <a:pPr>
-              <a:buFont typeface="Arial" charset="0"/>
-              <a:buAutoNum type="arabicParenR"/>
-            </a:pPr>
-            <a:r>
-              <a:rPr lang="pt-BR" sz="1800" dirty="0"/>
-              <a:t>categoria,</a:t>
-            </a:r>
-          </a:p>
-          <a:p>
-            <a:pPr>
-              <a:buFont typeface="Arial" charset="0"/>
-              <a:buAutoNum type="arabicParenR"/>
-            </a:pPr>
-            <a:r>
-              <a:rPr lang="pt-BR" sz="1800" dirty="0"/>
-              <a:t>Vendedores</a:t>
-            </a:r>
-          </a:p>
-          <a:p>
-            <a:pPr>
-              <a:buFont typeface="Arial" charset="0"/>
-              <a:buAutoNum type="arabicParenR"/>
-            </a:pPr>
-            <a:r>
-              <a:rPr lang="pt-BR" sz="1800" dirty="0"/>
-              <a:t>e fabricantes</a:t>
-            </a:r>
-          </a:p>
-          <a:p>
-            <a:pPr>
-              <a:buFont typeface="Arial" charset="0"/>
-              <a:buAutoNum type="arabicParenR"/>
-            </a:pPr>
-            <a:r>
-              <a:rPr lang="pt-BR" sz="1800" dirty="0"/>
-              <a:t>Produto</a:t>
-            </a:r>
-          </a:p>
-          <a:p>
-            <a:pPr>
-              <a:buFont typeface="Arial" charset="0"/>
-              <a:buAutoNum type="arabicParenR"/>
-            </a:pPr>
-            <a:r>
-              <a:rPr lang="pt-BR" sz="1800" dirty="0"/>
-              <a:t>Cidade</a:t>
-            </a:r>
-          </a:p>
-          <a:p>
-            <a:pPr marL="0" indent="0">
-              <a:buFont typeface="Arial" charset="0"/>
-              <a:buNone/>
-            </a:pPr>
-            <a:endParaRPr lang="pt-BR" sz="1800" dirty="0"/>
-          </a:p>
-          <a:p>
-            <a:pPr marL="0" indent="0">
-              <a:buFont typeface="Arial" charset="0"/>
-              <a:buNone/>
-            </a:pPr>
-            <a:r>
-              <a:rPr lang="pt-BR" sz="1800" dirty="0"/>
-              <a:t>Calcule o preço médio de cada um dos itens acima (total de vendas dividido pela contagem de registros</a:t>
-            </a:r>
-            <a:r>
-              <a:rPr lang="pt-BR" sz="1800" dirty="0" smtClean="0"/>
-              <a:t>).</a:t>
-            </a:r>
-          </a:p>
-          <a:p>
-            <a:pPr marL="0" indent="0">
-              <a:buFont typeface="Arial" charset="0"/>
-              <a:buNone/>
-            </a:pPr>
-            <a:endParaRPr lang="pt-BR" sz="1800" dirty="0" smtClean="0"/>
-          </a:p>
-          <a:p>
-            <a:pPr marL="0" indent="0">
-              <a:buFont typeface="Arial" charset="0"/>
-              <a:buNone/>
-            </a:pPr>
-            <a:r>
-              <a:rPr lang="pt-BR" sz="1800" dirty="0" smtClean="0"/>
-              <a:t>Faça </a:t>
-            </a:r>
-            <a:r>
-              <a:rPr lang="pt-BR" sz="1800" dirty="0" err="1" smtClean="0"/>
-              <a:t>Grafico</a:t>
-            </a:r>
-            <a:r>
-              <a:rPr lang="pt-BR" sz="1800" dirty="0" smtClean="0"/>
-              <a:t> de Pizza para saber qual fatia de cada  ESTADO.</a:t>
-            </a:r>
-          </a:p>
-          <a:p>
-            <a:pPr marL="0" indent="0">
-              <a:buFont typeface="Arial" charset="0"/>
-              <a:buNone/>
-            </a:pPr>
-            <a:r>
-              <a:rPr lang="pt-BR" sz="1800" dirty="0" err="1" smtClean="0"/>
-              <a:t>Grafico</a:t>
-            </a:r>
-            <a:r>
-              <a:rPr lang="pt-BR" sz="1800" dirty="0" smtClean="0"/>
-              <a:t> DE COLUNAS para Comparar ENTRE VENDEDORES.</a:t>
-            </a:r>
-          </a:p>
-          <a:p>
-            <a:pPr marL="0" indent="0">
-              <a:buFont typeface="Arial" charset="0"/>
-              <a:buNone/>
-            </a:pPr>
-            <a:endParaRPr lang="pt-BR" sz="1800" dirty="0"/>
-          </a:p>
-        </p:txBody>
-      </p:sp>
-    </p:spTree>
-    <p:extLst>
-      <p:ext uri="{BB962C8B-B14F-4D97-AF65-F5344CB8AC3E}">
-        <p14:creationId xmlns:p14="http://schemas.microsoft.com/office/powerpoint/2010/main" val="2143110309"/>
-      </p:ext>
-    </p:extLst>
-  </p:cSld>
-  <p:clrMapOvr>
-    <a:masterClrMapping/>
-  </p:clrMapOvr>
-</p:sld>
-</file>
-
 <file path=ppt/slides/slide69.xml><?xml version="1.0" encoding="utf-8"?>
 <p:sld xmlns:a="http://schemas.openxmlformats.org/drawingml/2006/main" xmlns:r="http://schemas.openxmlformats.org/officeDocument/2006/relationships" xmlns:p="http://schemas.openxmlformats.org/presentationml/2006/main">
   <p:cSld>
@@ -45260,14 +45237,14 @@
                 </a:solidFill>
                 <a:latin typeface="Corbel" panose="020B0503020204020204" pitchFamily="34" charset="0"/>
               </a:rPr>
-              <a:t>Atividade - 4</a:t>
+              <a:t>ATIVIDADE - 3</a:t>
             </a:r>
           </a:p>
         </p:txBody>
       </p:sp>
       <p:sp>
         <p:nvSpPr>
-          <p:cNvPr id="4" name="Subtítulo 1"/>
+          <p:cNvPr id="11" name="Subtítulo 1"/>
           <p:cNvSpPr txBox="1">
             <a:spLocks/>
           </p:cNvSpPr>
@@ -45275,7 +45252,7 @@
         </p:nvSpPr>
         <p:spPr>
           <a:xfrm>
-            <a:off x="327211" y="988637"/>
+            <a:off x="692971" y="1913794"/>
             <a:ext cx="10896600" cy="2817812"/>
           </a:xfrm>
         </p:spPr>
@@ -45437,307 +45414,137 @@
           </a:lstStyle>
           <a:p>
             <a:pPr marL="0" indent="0">
+              <a:buFont typeface="Arial" charset="0"/>
               <a:buNone/>
             </a:pPr>
             <a:r>
-              <a:rPr lang="pt-BR" sz="1800" dirty="0">
-                <a:latin typeface="Corbel" panose="020B0503020204020204" pitchFamily="34" charset="0"/>
-              </a:rPr>
-              <a:t>Você recebeu uma base de dados sobre as despesas da Empresa em </a:t>
-            </a:r>
-            <a:r>
-              <a:rPr lang="pt-BR" sz="1800" dirty="0" err="1">
-                <a:latin typeface="Corbel" panose="020B0503020204020204" pitchFamily="34" charset="0"/>
-              </a:rPr>
-              <a:t>txt</a:t>
-            </a:r>
-            <a:r>
-              <a:rPr lang="pt-BR" sz="1800" dirty="0">
-                <a:latin typeface="Corbel" panose="020B0503020204020204" pitchFamily="34" charset="0"/>
-              </a:rPr>
-              <a:t> extraída do sistema ERP de um relatório da contabilidade que não possui campos de descrição do Diretor responsável (arquivo Fornecedores.txt). </a:t>
+              <a:rPr lang="pt-BR" sz="1800" dirty="0"/>
+              <a:t>Retorne no arquivo de VENDAS (exercício anterior) e usando o soma.se e cont.se calcule o total de vendas e contagem de vendas para cada:</a:t>
+            </a:r>
+          </a:p>
+          <a:p>
+            <a:pPr>
+              <a:buFont typeface="Arial" charset="0"/>
+              <a:buAutoNum type="arabicParenR"/>
+            </a:pPr>
+            <a:r>
+              <a:rPr lang="pt-BR" sz="1800" dirty="0"/>
+              <a:t>categoria,</a:t>
+            </a:r>
+          </a:p>
+          <a:p>
+            <a:pPr>
+              <a:buFont typeface="Arial" charset="0"/>
+              <a:buAutoNum type="arabicParenR"/>
+            </a:pPr>
+            <a:r>
+              <a:rPr lang="pt-BR" sz="1800" dirty="0"/>
+              <a:t>Vendedores</a:t>
+            </a:r>
+          </a:p>
+          <a:p>
+            <a:pPr>
+              <a:buFont typeface="Arial" charset="0"/>
+              <a:buAutoNum type="arabicParenR"/>
+            </a:pPr>
+            <a:r>
+              <a:rPr lang="pt-BR" sz="1800" dirty="0"/>
+              <a:t>e fabricantes</a:t>
+            </a:r>
+          </a:p>
+          <a:p>
+            <a:pPr>
+              <a:buFont typeface="Arial" charset="0"/>
+              <a:buAutoNum type="arabicParenR"/>
+            </a:pPr>
+            <a:r>
+              <a:rPr lang="pt-BR" sz="1800" dirty="0"/>
+              <a:t>Produto</a:t>
+            </a:r>
+          </a:p>
+          <a:p>
+            <a:pPr>
+              <a:buFont typeface="Arial" charset="0"/>
+              <a:buAutoNum type="arabicParenR"/>
+            </a:pPr>
+            <a:r>
+              <a:rPr lang="pt-BR" sz="1800" dirty="0"/>
+              <a:t>Cidade</a:t>
             </a:r>
           </a:p>
           <a:p>
             <a:pPr marL="0" indent="0">
+              <a:buFont typeface="Arial" charset="0"/>
               <a:buNone/>
             </a:pPr>
-            <a:r>
-              <a:rPr lang="pt-BR" sz="1800" dirty="0">
-                <a:latin typeface="Corbel" panose="020B0503020204020204" pitchFamily="34" charset="0"/>
-              </a:rPr>
-              <a:t>Cada linha/registro  representa uma nota de pagamento</a:t>
-            </a:r>
+            <a:endParaRPr lang="pt-BR" sz="1800" dirty="0"/>
           </a:p>
           <a:p>
             <a:pPr marL="0" indent="0">
               <a:buFont typeface="Arial" charset="0"/>
               <a:buNone/>
             </a:pPr>
-            <a:endParaRPr lang="pt-BR" sz="1800" dirty="0">
-              <a:latin typeface="Corbel" panose="020B0503020204020204" pitchFamily="34" charset="0"/>
-            </a:endParaRPr>
+            <a:r>
+              <a:rPr lang="pt-BR" sz="1800" dirty="0"/>
+              <a:t>Calcule o preço médio de cada um dos itens acima (total de vendas dividido pela contagem de registros</a:t>
+            </a:r>
+            <a:r>
+              <a:rPr lang="pt-BR" sz="1800" dirty="0" smtClean="0"/>
+              <a:t>).</a:t>
+            </a:r>
           </a:p>
           <a:p>
             <a:pPr marL="0" indent="0">
+              <a:buFont typeface="Arial" charset="0"/>
               <a:buNone/>
             </a:pPr>
-            <a:r>
-              <a:rPr lang="pt-BR" sz="1800" dirty="0">
-                <a:latin typeface="Corbel" panose="020B0503020204020204" pitchFamily="34" charset="0"/>
-              </a:rPr>
-              <a:t>Cruze este banco de dados com o cadastro de outro sistema (De para </a:t>
-            </a:r>
-            <a:r>
-              <a:rPr lang="pt-BR" sz="1800" dirty="0" err="1">
-                <a:latin typeface="Corbel" panose="020B0503020204020204" pitchFamily="34" charset="0"/>
-              </a:rPr>
-              <a:t>CCusto</a:t>
-            </a:r>
-            <a:r>
-              <a:rPr lang="pt-BR" sz="1800" dirty="0">
-                <a:latin typeface="Corbel" panose="020B0503020204020204" pitchFamily="34" charset="0"/>
-              </a:rPr>
-              <a:t> X Fornecedores.xlsx) e descubra:</a:t>
-            </a:r>
+            <a:endParaRPr lang="pt-BR" sz="1800" dirty="0" smtClean="0"/>
           </a:p>
           <a:p>
             <a:pPr marL="0" indent="0">
               <a:buFont typeface="Arial" charset="0"/>
               <a:buNone/>
             </a:pPr>
-            <a:endParaRPr lang="pt-BR" sz="1800" dirty="0">
-              <a:latin typeface="Corbel" panose="020B0503020204020204" pitchFamily="34" charset="0"/>
-            </a:endParaRPr>
+            <a:r>
+              <a:rPr lang="pt-BR" sz="1800" dirty="0" smtClean="0"/>
+              <a:t>Faça </a:t>
+            </a:r>
+            <a:r>
+              <a:rPr lang="pt-BR" sz="1800" dirty="0" err="1" smtClean="0"/>
+              <a:t>Grafico</a:t>
+            </a:r>
+            <a:r>
+              <a:rPr lang="pt-BR" sz="1800" dirty="0" smtClean="0"/>
+              <a:t> de Pizza para saber qual fatia de cada  ESTADO.</a:t>
+            </a:r>
           </a:p>
           <a:p>
             <a:pPr marL="0" indent="0">
+              <a:buFont typeface="Arial" charset="0"/>
               <a:buNone/>
             </a:pPr>
-            <a:endParaRPr lang="pt-BR" sz="1800" dirty="0">
-              <a:latin typeface="Corbel" panose="020B0503020204020204" pitchFamily="34" charset="0"/>
-            </a:endParaRPr>
-          </a:p>
-          <a:p>
-            <a:pPr>
-              <a:buFont typeface="Arial" panose="020B0604020202020204" pitchFamily="34" charset="0"/>
-              <a:buChar char="•"/>
-            </a:pPr>
-            <a:r>
-              <a:rPr lang="pt-BR" sz="1800" dirty="0">
-                <a:latin typeface="Corbel" panose="020B0503020204020204" pitchFamily="34" charset="0"/>
-              </a:rPr>
-              <a:t>Qual o valor gasto total da empresa com “MATERIAL IMPRESSO FÁBRICA”?</a:t>
-            </a:r>
-          </a:p>
-          <a:p>
-            <a:pPr>
-              <a:buFont typeface="Arial" panose="020B0604020202020204" pitchFamily="34" charset="0"/>
-              <a:buChar char="•"/>
-            </a:pPr>
-            <a:r>
-              <a:rPr lang="pt-BR" sz="1800" dirty="0">
-                <a:latin typeface="Corbel" panose="020B0503020204020204" pitchFamily="34" charset="0"/>
-              </a:rPr>
-              <a:t>Qual o gasto total do Diretor </a:t>
-            </a:r>
-            <a:r>
-              <a:rPr lang="pt-BR" sz="1800" dirty="0" smtClean="0">
-                <a:latin typeface="Corbel" panose="020B0503020204020204" pitchFamily="34" charset="0"/>
-              </a:rPr>
-              <a:t>Silvio?</a:t>
-            </a:r>
-            <a:endParaRPr lang="pt-BR" sz="1800" dirty="0">
-              <a:latin typeface="Corbel" panose="020B0503020204020204" pitchFamily="34" charset="0"/>
-            </a:endParaRPr>
-          </a:p>
-          <a:p>
-            <a:pPr>
-              <a:buFont typeface="Arial" panose="020B0604020202020204" pitchFamily="34" charset="0"/>
-              <a:buChar char="•"/>
-            </a:pPr>
-            <a:r>
-              <a:rPr lang="pt-BR" sz="1800" dirty="0" smtClean="0">
-                <a:latin typeface="Corbel" panose="020B0503020204020204" pitchFamily="34" charset="0"/>
-              </a:rPr>
-              <a:t>Faça </a:t>
-            </a:r>
-            <a:r>
-              <a:rPr lang="pt-BR" sz="1800" dirty="0">
-                <a:latin typeface="Corbel" panose="020B0503020204020204" pitchFamily="34" charset="0"/>
-              </a:rPr>
-              <a:t>um relatório de Gasto por Diretor (inclua diretores não identificados = vazio</a:t>
-            </a:r>
-            <a:r>
-              <a:rPr lang="pt-BR" sz="1800" dirty="0" smtClean="0">
-                <a:latin typeface="Corbel" panose="020B0503020204020204" pitchFamily="34" charset="0"/>
-              </a:rPr>
-              <a:t>)</a:t>
-            </a:r>
-          </a:p>
-          <a:p>
-            <a:pPr>
-              <a:buFont typeface="Arial" panose="020B0604020202020204" pitchFamily="34" charset="0"/>
-              <a:buChar char="•"/>
-            </a:pPr>
-            <a:r>
-              <a:rPr lang="pt-BR" sz="1800" dirty="0" smtClean="0">
-                <a:latin typeface="Corbel" panose="020B0503020204020204" pitchFamily="34" charset="0"/>
-              </a:rPr>
-              <a:t>Faça um Gráfico de Colunas de Despesa por Diretor e Outro por DENOMINAÇÃO do Centro de Custo.</a:t>
-            </a:r>
-            <a:endParaRPr lang="pt-BR" sz="1800" dirty="0">
-              <a:latin typeface="Corbel" panose="020B0503020204020204" pitchFamily="34" charset="0"/>
-            </a:endParaRPr>
-          </a:p>
-          <a:p>
-            <a:pPr>
-              <a:buFont typeface="Arial" panose="020B0604020202020204" pitchFamily="34" charset="0"/>
-              <a:buChar char="•"/>
-            </a:pPr>
-            <a:endParaRPr lang="pt-BR" sz="1800" dirty="0">
-              <a:latin typeface="Corbel" panose="020B0503020204020204" pitchFamily="34" charset="0"/>
-            </a:endParaRPr>
-          </a:p>
-          <a:p>
-            <a:pPr>
-              <a:buFont typeface="Arial" panose="020B0604020202020204" pitchFamily="34" charset="0"/>
-              <a:buChar char="•"/>
-            </a:pPr>
-            <a:endParaRPr lang="pt-BR" sz="1800" dirty="0">
-              <a:latin typeface="Corbel" panose="020B0503020204020204" pitchFamily="34" charset="0"/>
-            </a:endParaRPr>
-          </a:p>
-          <a:p>
-            <a:pPr>
-              <a:buFont typeface="Arial" panose="020B0604020202020204" pitchFamily="34" charset="0"/>
-              <a:buChar char="•"/>
-            </a:pPr>
-            <a:endParaRPr lang="pt-BR" sz="1800" dirty="0">
-              <a:latin typeface="Corbel" panose="020B0503020204020204" pitchFamily="34" charset="0"/>
-            </a:endParaRPr>
+            <a:r>
+              <a:rPr lang="pt-BR" sz="1800" dirty="0" err="1" smtClean="0"/>
+              <a:t>Grafico</a:t>
+            </a:r>
+            <a:r>
+              <a:rPr lang="pt-BR" sz="1800" dirty="0" smtClean="0"/>
+              <a:t> DE COLUNAS para Comparar ENTRE VENDEDORES.</a:t>
+            </a:r>
           </a:p>
           <a:p>
             <a:pPr marL="0" indent="0">
+              <a:buFont typeface="Arial" charset="0"/>
               <a:buNone/>
             </a:pPr>
-            <a:r>
-              <a:rPr lang="pt-BR" sz="1800" dirty="0">
-                <a:latin typeface="Corbel" panose="020B0503020204020204" pitchFamily="34" charset="0"/>
-              </a:rPr>
-              <a:t>Dica: Converter Todos os IDS para numero (usar substituição), </a:t>
-            </a:r>
-            <a:r>
-              <a:rPr lang="pt-BR" sz="1800" dirty="0" err="1" smtClean="0">
-                <a:latin typeface="Corbel" panose="020B0503020204020204" pitchFamily="34" charset="0"/>
-              </a:rPr>
-              <a:t>PROCV,Texto</a:t>
-            </a:r>
-            <a:r>
-              <a:rPr lang="pt-BR" sz="1800" dirty="0" smtClean="0">
-                <a:latin typeface="Corbel" panose="020B0503020204020204" pitchFamily="34" charset="0"/>
-              </a:rPr>
-              <a:t> </a:t>
-            </a:r>
-            <a:r>
-              <a:rPr lang="pt-BR" sz="1800" dirty="0">
-                <a:latin typeface="Corbel" panose="020B0503020204020204" pitchFamily="34" charset="0"/>
-              </a:rPr>
-              <a:t>para Coluna, FILTRO, </a:t>
-            </a:r>
-            <a:r>
-              <a:rPr lang="pt-BR" sz="1800" dirty="0" smtClean="0">
-                <a:latin typeface="Corbel" panose="020B0503020204020204" pitchFamily="34" charset="0"/>
-              </a:rPr>
-              <a:t>Classificação, formula </a:t>
-            </a:r>
-            <a:r>
-              <a:rPr lang="pt-BR" sz="1800" dirty="0">
-                <a:latin typeface="Corbel" panose="020B0503020204020204" pitchFamily="34" charset="0"/>
-              </a:rPr>
-              <a:t>banco de </a:t>
-            </a:r>
-            <a:r>
-              <a:rPr lang="pt-BR" sz="1800" dirty="0" smtClean="0">
-                <a:latin typeface="Corbel" panose="020B0503020204020204" pitchFamily="34" charset="0"/>
-              </a:rPr>
-              <a:t>dados, </a:t>
-            </a:r>
-            <a:r>
-              <a:rPr lang="pt-BR" sz="1800" dirty="0" err="1" smtClean="0">
-                <a:latin typeface="Corbel" panose="020B0503020204020204" pitchFamily="34" charset="0"/>
-              </a:rPr>
-              <a:t>Graficos</a:t>
-            </a:r>
-            <a:r>
-              <a:rPr lang="pt-BR" sz="1800" dirty="0" smtClean="0">
-                <a:latin typeface="Corbel" panose="020B0503020204020204" pitchFamily="34" charset="0"/>
-              </a:rPr>
-              <a:t> </a:t>
-            </a:r>
-            <a:r>
-              <a:rPr lang="pt-BR" sz="1800" dirty="0">
-                <a:latin typeface="Corbel" panose="020B0503020204020204" pitchFamily="34" charset="0"/>
-              </a:rPr>
-              <a:t>.</a:t>
-            </a:r>
-          </a:p>
-          <a:p>
-            <a:pPr marL="0" indent="0">
-              <a:buNone/>
-            </a:pPr>
-            <a:endParaRPr lang="pt-BR" sz="1800" dirty="0">
-              <a:latin typeface="Corbel" panose="020B0503020204020204" pitchFamily="34" charset="0"/>
-            </a:endParaRPr>
-          </a:p>
-          <a:p>
-            <a:pPr marL="0" indent="0">
-              <a:buNone/>
-            </a:pPr>
-            <a:endParaRPr lang="pt-BR" sz="1800" dirty="0">
-              <a:latin typeface="Corbel" panose="020B0503020204020204" pitchFamily="34" charset="0"/>
-            </a:endParaRPr>
-          </a:p>
-          <a:p>
-            <a:pPr marL="0" indent="0">
-              <a:buNone/>
-            </a:pPr>
-            <a:endParaRPr lang="pt-BR" sz="1800" dirty="0">
-              <a:latin typeface="Corbel" panose="020B0503020204020204" pitchFamily="34" charset="0"/>
-            </a:endParaRPr>
-          </a:p>
-          <a:p>
-            <a:pPr marL="0" indent="0">
-              <a:buNone/>
-            </a:pPr>
-            <a:endParaRPr lang="pt-BR" sz="1800" dirty="0">
-              <a:latin typeface="Corbel" panose="020B0503020204020204" pitchFamily="34" charset="0"/>
-            </a:endParaRPr>
-          </a:p>
-          <a:p>
-            <a:pPr marL="0" indent="0">
-              <a:buFont typeface="Arial" charset="0"/>
-              <a:buNone/>
-            </a:pPr>
-            <a:endParaRPr lang="pt-BR" sz="1800" dirty="0">
-              <a:latin typeface="Corbel" panose="020B0503020204020204" pitchFamily="34" charset="0"/>
-            </a:endParaRPr>
-          </a:p>
-          <a:p>
-            <a:pPr marL="0" indent="0">
-              <a:buFont typeface="Arial" charset="0"/>
-              <a:buNone/>
-            </a:pPr>
-            <a:endParaRPr lang="pt-BR" sz="1800" dirty="0">
-              <a:latin typeface="Corbel" panose="020B0503020204020204" pitchFamily="34" charset="0"/>
-            </a:endParaRPr>
+            <a:endParaRPr lang="pt-BR" sz="1800" dirty="0"/>
           </a:p>
         </p:txBody>
       </p:sp>
     </p:spTree>
     <p:extLst>
       <p:ext uri="{BB962C8B-B14F-4D97-AF65-F5344CB8AC3E}">
-        <p14:creationId xmlns:p14="http://schemas.microsoft.com/office/powerpoint/2010/main" val="1602921918"/>
+        <p14:creationId xmlns:p14="http://schemas.microsoft.com/office/powerpoint/2010/main" val="2143110309"/>
       </p:ext>
     </p:extLst>
   </p:cSld>
@@ -46296,14 +46103,14 @@
                 </a:solidFill>
                 <a:latin typeface="Corbel" panose="020B0503020204020204" pitchFamily="34" charset="0"/>
               </a:rPr>
-              <a:t>ATIVIDADE - 5</a:t>
+              <a:t>Atividade - 4</a:t>
             </a:r>
           </a:p>
         </p:txBody>
       </p:sp>
       <p:sp>
         <p:nvSpPr>
-          <p:cNvPr id="11" name="Subtítulo 1"/>
+          <p:cNvPr id="4" name="Subtítulo 1"/>
           <p:cNvSpPr txBox="1">
             <a:spLocks/>
           </p:cNvSpPr>
@@ -46311,7 +46118,7 @@
         </p:nvSpPr>
         <p:spPr>
           <a:xfrm>
-            <a:off x="692971" y="1913794"/>
+            <a:off x="327211" y="988637"/>
             <a:ext cx="10896600" cy="2817812"/>
           </a:xfrm>
         </p:spPr>
@@ -46473,22 +46280,36 @@
           </a:lstStyle>
           <a:p>
             <a:pPr marL="0" indent="0">
-              <a:buFont typeface="Arial" charset="0"/>
               <a:buNone/>
             </a:pPr>
             <a:r>
-              <a:rPr lang="pt-BR" sz="1800" dirty="0"/>
-              <a:t>Utilize o relatório de Vendas para mostrar graficamente:</a:t>
+              <a:rPr lang="pt-BR" sz="1800" dirty="0">
+                <a:latin typeface="Corbel" panose="020B0503020204020204" pitchFamily="34" charset="0"/>
+              </a:rPr>
+              <a:t>Você recebeu uma base de dados sobre as despesas da Empresa em </a:t>
+            </a:r>
+            <a:r>
+              <a:rPr lang="pt-BR" sz="1800" dirty="0" err="1">
+                <a:latin typeface="Corbel" panose="020B0503020204020204" pitchFamily="34" charset="0"/>
+              </a:rPr>
+              <a:t>txt</a:t>
+            </a:r>
+            <a:r>
+              <a:rPr lang="pt-BR" sz="1800" dirty="0">
+                <a:latin typeface="Corbel" panose="020B0503020204020204" pitchFamily="34" charset="0"/>
+              </a:rPr>
+              <a:t> extraída do sistema ERP de um relatório da contabilidade que não possui campos de descrição do Diretor responsável (arquivo Fornecedores.txt). </a:t>
             </a:r>
           </a:p>
           <a:p>
             <a:pPr marL="0" indent="0">
-              <a:buFont typeface="Arial" charset="0"/>
               <a:buNone/>
             </a:pPr>
             <a:r>
-              <a:rPr lang="pt-BR" sz="1800" dirty="0"/>
-              <a:t>1)Durante todos o período, qual a curva de Vendas Totais mês a mês.</a:t>
+              <a:rPr lang="pt-BR" sz="1800" dirty="0">
+                <a:latin typeface="Corbel" panose="020B0503020204020204" pitchFamily="34" charset="0"/>
+              </a:rPr>
+              <a:t>Cada linha/registro  representa uma nota de pagamento</a:t>
             </a:r>
           </a:p>
           <a:p>
@@ -46496,27 +46317,31 @@
               <a:buFont typeface="Arial" charset="0"/>
               <a:buNone/>
             </a:pPr>
-            <a:r>
-              <a:rPr lang="pt-BR" sz="1800" dirty="0"/>
-              <a:t>2) Como é representado graficamente as vendas por </a:t>
-            </a:r>
-            <a:r>
-              <a:rPr lang="pt-BR" sz="1800" dirty="0" err="1"/>
-              <a:t>Forncedor</a:t>
-            </a:r>
-            <a:r>
-              <a:rPr lang="pt-BR" sz="1800" dirty="0"/>
-              <a:t> (barra).</a:t>
-            </a:r>
+            <a:endParaRPr lang="pt-BR" sz="1800" dirty="0">
+              <a:latin typeface="Corbel" panose="020B0503020204020204" pitchFamily="34" charset="0"/>
+            </a:endParaRPr>
           </a:p>
           <a:p>
             <a:pPr marL="0" indent="0">
-              <a:buFont typeface="Arial" charset="0"/>
               <a:buNone/>
             </a:pPr>
             <a:r>
-              <a:rPr lang="pt-BR" sz="1800" dirty="0"/>
-              <a:t>	Quem vendeu mais /  Quem vendeu Menos</a:t>
+              <a:rPr lang="pt-BR" sz="1800" dirty="0">
+                <a:latin typeface="Corbel" panose="020B0503020204020204" pitchFamily="34" charset="0"/>
+              </a:rPr>
+              <a:t>Cruze este banco de dados com o cadastro de outro sistema (De para </a:t>
+            </a:r>
+            <a:r>
+              <a:rPr lang="pt-BR" sz="1800" dirty="0" err="1">
+                <a:latin typeface="Corbel" panose="020B0503020204020204" pitchFamily="34" charset="0"/>
+              </a:rPr>
+              <a:t>CCusto</a:t>
+            </a:r>
+            <a:r>
+              <a:rPr lang="pt-BR" sz="1800" dirty="0">
+                <a:latin typeface="Corbel" panose="020B0503020204020204" pitchFamily="34" charset="0"/>
+              </a:rPr>
+              <a:t> X Fornecedores.xlsx) e descubra:</a:t>
             </a:r>
           </a:p>
           <a:p>
@@ -46524,34 +46349,238 @@
               <a:buFont typeface="Arial" charset="0"/>
               <a:buNone/>
             </a:pPr>
-            <a:r>
-              <a:rPr lang="pt-BR" sz="1800" dirty="0"/>
-              <a:t>3) Mostre graficamente a participação de cada vendedor no total de vendas.</a:t>
-            </a:r>
+            <a:endParaRPr lang="pt-BR" sz="1800" dirty="0">
+              <a:latin typeface="Corbel" panose="020B0503020204020204" pitchFamily="34" charset="0"/>
+            </a:endParaRPr>
           </a:p>
           <a:p>
             <a:pPr marL="0" indent="0">
-              <a:buFont typeface="Arial" charset="0"/>
               <a:buNone/>
             </a:pPr>
-            <a:r>
-              <a:rPr lang="pt-BR" sz="1800" dirty="0"/>
-              <a:t>	Quem vendeu mais / Quem vendeu Menos</a:t>
-            </a:r>
+            <a:endParaRPr lang="pt-BR" sz="1800" dirty="0">
+              <a:latin typeface="Corbel" panose="020B0503020204020204" pitchFamily="34" charset="0"/>
+            </a:endParaRPr>
+          </a:p>
+          <a:p>
+            <a:pPr>
+              <a:buFont typeface="Arial" panose="020B0604020202020204" pitchFamily="34" charset="0"/>
+              <a:buChar char="•"/>
+            </a:pPr>
+            <a:r>
+              <a:rPr lang="pt-BR" sz="1800" dirty="0">
+                <a:latin typeface="Corbel" panose="020B0503020204020204" pitchFamily="34" charset="0"/>
+              </a:rPr>
+              <a:t>Qual o valor gasto total da empresa com “MATERIAL IMPRESSO FÁBRICA”?</a:t>
+            </a:r>
+          </a:p>
+          <a:p>
+            <a:pPr>
+              <a:buFont typeface="Arial" panose="020B0604020202020204" pitchFamily="34" charset="0"/>
+              <a:buChar char="•"/>
+            </a:pPr>
+            <a:r>
+              <a:rPr lang="pt-BR" sz="1800" dirty="0">
+                <a:latin typeface="Corbel" panose="020B0503020204020204" pitchFamily="34" charset="0"/>
+              </a:rPr>
+              <a:t>Qual o gasto total do Diretor </a:t>
+            </a:r>
+            <a:r>
+              <a:rPr lang="pt-BR" sz="1800" dirty="0" smtClean="0">
+                <a:latin typeface="Corbel" panose="020B0503020204020204" pitchFamily="34" charset="0"/>
+              </a:rPr>
+              <a:t>Silvio?</a:t>
+            </a:r>
+            <a:endParaRPr lang="pt-BR" sz="1800" dirty="0">
+              <a:latin typeface="Corbel" panose="020B0503020204020204" pitchFamily="34" charset="0"/>
+            </a:endParaRPr>
+          </a:p>
+          <a:p>
+            <a:pPr>
+              <a:buFont typeface="Arial" panose="020B0604020202020204" pitchFamily="34" charset="0"/>
+              <a:buChar char="•"/>
+            </a:pPr>
+            <a:r>
+              <a:rPr lang="pt-BR" sz="1800" dirty="0" smtClean="0">
+                <a:latin typeface="Corbel" panose="020B0503020204020204" pitchFamily="34" charset="0"/>
+              </a:rPr>
+              <a:t>Faça </a:t>
+            </a:r>
+            <a:r>
+              <a:rPr lang="pt-BR" sz="1800" dirty="0">
+                <a:latin typeface="Corbel" panose="020B0503020204020204" pitchFamily="34" charset="0"/>
+              </a:rPr>
+              <a:t>um relatório de Gasto por Diretor (inclua diretores não identificados = vazio</a:t>
+            </a:r>
+            <a:r>
+              <a:rPr lang="pt-BR" sz="1800" dirty="0" smtClean="0">
+                <a:latin typeface="Corbel" panose="020B0503020204020204" pitchFamily="34" charset="0"/>
+              </a:rPr>
+              <a:t>)</a:t>
+            </a:r>
+          </a:p>
+          <a:p>
+            <a:pPr>
+              <a:buFont typeface="Arial" panose="020B0604020202020204" pitchFamily="34" charset="0"/>
+              <a:buChar char="•"/>
+            </a:pPr>
+            <a:r>
+              <a:rPr lang="pt-BR" sz="1800" dirty="0" smtClean="0">
+                <a:latin typeface="Corbel" panose="020B0503020204020204" pitchFamily="34" charset="0"/>
+              </a:rPr>
+              <a:t>Faça um Gráfico de Colunas de Despesa por Diretor e Outro por DENOMINAÇÃO do Centro de Custo.</a:t>
+            </a:r>
+            <a:endParaRPr lang="pt-BR" sz="1800" dirty="0">
+              <a:latin typeface="Corbel" panose="020B0503020204020204" pitchFamily="34" charset="0"/>
+            </a:endParaRPr>
+          </a:p>
+          <a:p>
+            <a:pPr>
+              <a:buFont typeface="Arial" panose="020B0604020202020204" pitchFamily="34" charset="0"/>
+              <a:buChar char="•"/>
+            </a:pPr>
+            <a:endParaRPr lang="pt-BR" sz="1800" dirty="0">
+              <a:latin typeface="Corbel" panose="020B0503020204020204" pitchFamily="34" charset="0"/>
+            </a:endParaRPr>
+          </a:p>
+          <a:p>
+            <a:pPr>
+              <a:buFont typeface="Arial" panose="020B0604020202020204" pitchFamily="34" charset="0"/>
+              <a:buChar char="•"/>
+            </a:pPr>
+            <a:endParaRPr lang="pt-BR" sz="1800" dirty="0">
+              <a:latin typeface="Corbel" panose="020B0503020204020204" pitchFamily="34" charset="0"/>
+            </a:endParaRPr>
+          </a:p>
+          <a:p>
+            <a:pPr>
+              <a:buFont typeface="Arial" panose="020B0604020202020204" pitchFamily="34" charset="0"/>
+              <a:buChar char="•"/>
+            </a:pPr>
+            <a:endParaRPr lang="pt-BR" sz="1800" dirty="0">
+              <a:latin typeface="Corbel" panose="020B0503020204020204" pitchFamily="34" charset="0"/>
+            </a:endParaRPr>
           </a:p>
           <a:p>
             <a:pPr marL="0" indent="0">
-              <a:buFont typeface="Arial" charset="0"/>
               <a:buNone/>
             </a:pPr>
-            <a:endParaRPr lang="pt-BR" sz="1800" dirty="0"/>
+            <a:r>
+              <a:rPr lang="pt-BR" sz="1800" dirty="0">
+                <a:latin typeface="Corbel" panose="020B0503020204020204" pitchFamily="34" charset="0"/>
+              </a:rPr>
+              <a:t>Dica: Converter Todos os IDS para numero (usar substituição), </a:t>
+            </a:r>
+            <a:r>
+              <a:rPr lang="pt-BR" sz="1800" dirty="0" err="1" smtClean="0">
+                <a:latin typeface="Corbel" panose="020B0503020204020204" pitchFamily="34" charset="0"/>
+              </a:rPr>
+              <a:t>PROCV,Texto</a:t>
+            </a:r>
+            <a:r>
+              <a:rPr lang="pt-BR" sz="1800" dirty="0" smtClean="0">
+                <a:latin typeface="Corbel" panose="020B0503020204020204" pitchFamily="34" charset="0"/>
+              </a:rPr>
+              <a:t> </a:t>
+            </a:r>
+            <a:r>
+              <a:rPr lang="pt-BR" sz="1800" dirty="0">
+                <a:latin typeface="Corbel" panose="020B0503020204020204" pitchFamily="34" charset="0"/>
+              </a:rPr>
+              <a:t>para Coluna, FILTRO, </a:t>
+            </a:r>
+            <a:r>
+              <a:rPr lang="pt-BR" sz="1800" dirty="0" smtClean="0">
+                <a:latin typeface="Corbel" panose="020B0503020204020204" pitchFamily="34" charset="0"/>
+              </a:rPr>
+              <a:t>Classificação, formula </a:t>
+            </a:r>
+            <a:r>
+              <a:rPr lang="pt-BR" sz="1800" dirty="0">
+                <a:latin typeface="Corbel" panose="020B0503020204020204" pitchFamily="34" charset="0"/>
+              </a:rPr>
+              <a:t>banco de </a:t>
+            </a:r>
+            <a:r>
+              <a:rPr lang="pt-BR" sz="1800" dirty="0" smtClean="0">
+                <a:latin typeface="Corbel" panose="020B0503020204020204" pitchFamily="34" charset="0"/>
+              </a:rPr>
+              <a:t>dados, </a:t>
+            </a:r>
+            <a:r>
+              <a:rPr lang="pt-BR" sz="1800" dirty="0" err="1" smtClean="0">
+                <a:latin typeface="Corbel" panose="020B0503020204020204" pitchFamily="34" charset="0"/>
+              </a:rPr>
+              <a:t>Graficos</a:t>
+            </a:r>
+            <a:r>
+              <a:rPr lang="pt-BR" sz="1800" dirty="0" smtClean="0">
+                <a:latin typeface="Corbel" panose="020B0503020204020204" pitchFamily="34" charset="0"/>
+              </a:rPr>
+              <a:t> </a:t>
+            </a:r>
+            <a:r>
+              <a:rPr lang="pt-BR" sz="1800" dirty="0">
+                <a:latin typeface="Corbel" panose="020B0503020204020204" pitchFamily="34" charset="0"/>
+              </a:rPr>
+              <a:t>.</a:t>
+            </a:r>
+          </a:p>
+          <a:p>
+            <a:pPr marL="0" indent="0">
+              <a:buNone/>
+            </a:pPr>
+            <a:endParaRPr lang="pt-BR" sz="1800" dirty="0">
+              <a:latin typeface="Corbel" panose="020B0503020204020204" pitchFamily="34" charset="0"/>
+            </a:endParaRPr>
+          </a:p>
+          <a:p>
+            <a:pPr marL="0" indent="0">
+              <a:buNone/>
+            </a:pPr>
+            <a:endParaRPr lang="pt-BR" sz="1800" dirty="0">
+              <a:latin typeface="Corbel" panose="020B0503020204020204" pitchFamily="34" charset="0"/>
+            </a:endParaRPr>
+          </a:p>
+          <a:p>
+            <a:pPr marL="0" indent="0">
+              <a:buNone/>
+            </a:pPr>
+            <a:endParaRPr lang="pt-BR" sz="1800" dirty="0">
+              <a:latin typeface="Corbel" panose="020B0503020204020204" pitchFamily="34" charset="0"/>
+            </a:endParaRPr>
+          </a:p>
+          <a:p>
+            <a:pPr marL="0" indent="0">
+              <a:buNone/>
+            </a:pPr>
+            <a:endParaRPr lang="pt-BR" sz="1800" dirty="0">
+              <a:latin typeface="Corbel" panose="020B0503020204020204" pitchFamily="34" charset="0"/>
+            </a:endParaRPr>
+          </a:p>
+          <a:p>
+            <a:pPr marL="0" indent="0">
+              <a:buFont typeface="Arial" charset="0"/>
+              <a:buNone/>
+            </a:pPr>
+            <a:endParaRPr lang="pt-BR" sz="1800" dirty="0">
+              <a:latin typeface="Corbel" panose="020B0503020204020204" pitchFamily="34" charset="0"/>
+            </a:endParaRPr>
+          </a:p>
+          <a:p>
+            <a:pPr marL="0" indent="0">
+              <a:buFont typeface="Arial" charset="0"/>
+              <a:buNone/>
+            </a:pPr>
+            <a:endParaRPr lang="pt-BR" sz="1800" dirty="0">
+              <a:latin typeface="Corbel" panose="020B0503020204020204" pitchFamily="34" charset="0"/>
+            </a:endParaRPr>
           </a:p>
         </p:txBody>
       </p:sp>
     </p:spTree>
     <p:extLst>
       <p:ext uri="{BB962C8B-B14F-4D97-AF65-F5344CB8AC3E}">
-        <p14:creationId xmlns:p14="http://schemas.microsoft.com/office/powerpoint/2010/main" val="3718216112"/>
+        <p14:creationId xmlns:p14="http://schemas.microsoft.com/office/powerpoint/2010/main" val="1602921918"/>
       </p:ext>
     </p:extLst>
   </p:cSld>
@@ -46765,7 +46794,7 @@
                 </a:solidFill>
                 <a:latin typeface="Corbel" panose="020B0503020204020204" pitchFamily="34" charset="0"/>
               </a:rPr>
-              <a:t>CRIAR LISTA PERSONALIZADA</a:t>
+              <a:t>ATIVIDADE - 5</a:t>
             </a:r>
           </a:p>
         </p:txBody>
@@ -46947,7 +46976,7 @@
             </a:pPr>
             <a:r>
               <a:rPr lang="pt-BR" sz="1800" dirty="0"/>
-              <a:t>Guia Arquivos, Menu Opções, Menu Avançado, Espaço Geral, Editar Lista Personalizada, Selecionar lista e clicar em Importar.</a:t>
+              <a:t>Utilize o relatório de Vendas para mostrar graficamente:</a:t>
             </a:r>
           </a:p>
           <a:p>
@@ -46955,7 +46984,58 @@
               <a:buFont typeface="Arial" charset="0"/>
               <a:buNone/>
             </a:pPr>
-            <a:endParaRPr lang="pt-BR" sz="1800" dirty="0"/>
+            <a:r>
+              <a:rPr lang="pt-BR" sz="1800" dirty="0"/>
+              <a:t>1)Durante todos o período, qual a curva de Vendas Totais mês a mês.</a:t>
+            </a:r>
+          </a:p>
+          <a:p>
+            <a:pPr marL="0" indent="0">
+              <a:buFont typeface="Arial" charset="0"/>
+              <a:buNone/>
+            </a:pPr>
+            <a:r>
+              <a:rPr lang="pt-BR" sz="1800" dirty="0"/>
+              <a:t>2) Como é representado graficamente as vendas por </a:t>
+            </a:r>
+            <a:r>
+              <a:rPr lang="pt-BR" sz="1800" dirty="0" err="1"/>
+              <a:t>Forncedor</a:t>
+            </a:r>
+            <a:r>
+              <a:rPr lang="pt-BR" sz="1800" dirty="0"/>
+              <a:t> (barra).</a:t>
+            </a:r>
+          </a:p>
+          <a:p>
+            <a:pPr marL="0" indent="0">
+              <a:buFont typeface="Arial" charset="0"/>
+              <a:buNone/>
+            </a:pPr>
+            <a:r>
+              <a:rPr lang="pt-BR" sz="1800" dirty="0"/>
+              <a:t>	Quem vendeu mais /  Quem vendeu Menos</a:t>
+            </a:r>
+          </a:p>
+          <a:p>
+            <a:pPr marL="0" indent="0">
+              <a:buFont typeface="Arial" charset="0"/>
+              <a:buNone/>
+            </a:pPr>
+            <a:r>
+              <a:rPr lang="pt-BR" sz="1800" dirty="0"/>
+              <a:t>3) Mostre graficamente a participação de cada vendedor no total de vendas.</a:t>
+            </a:r>
+          </a:p>
+          <a:p>
+            <a:pPr marL="0" indent="0">
+              <a:buFont typeface="Arial" charset="0"/>
+              <a:buNone/>
+            </a:pPr>
+            <a:r>
+              <a:rPr lang="pt-BR" sz="1800" dirty="0"/>
+              <a:t>	Quem vendeu mais / Quem vendeu Menos</a:t>
+            </a:r>
           </a:p>
           <a:p>
             <a:pPr marL="0" indent="0">
@@ -46969,7 +47049,7 @@
     </p:spTree>
     <p:extLst>
       <p:ext uri="{BB962C8B-B14F-4D97-AF65-F5344CB8AC3E}">
-        <p14:creationId xmlns:p14="http://schemas.microsoft.com/office/powerpoint/2010/main" val="4064205487"/>
+        <p14:creationId xmlns:p14="http://schemas.microsoft.com/office/powerpoint/2010/main" val="3718216112"/>
       </p:ext>
     </p:extLst>
   </p:cSld>
@@ -47183,7 +47263,7 @@
                 </a:solidFill>
                 <a:latin typeface="Corbel" panose="020B0503020204020204" pitchFamily="34" charset="0"/>
               </a:rPr>
-              <a:t>ATIVIDADE</a:t>
+              <a:t>CRIAR LISTA PERSONALIZADA</a:t>
             </a:r>
           </a:p>
         </p:txBody>
@@ -47365,6 +47445,424 @@
             </a:pPr>
             <a:r>
               <a:rPr lang="pt-BR" sz="1800" dirty="0"/>
+              <a:t>Guia Arquivos, Menu Opções, Menu Avançado, Espaço Geral, Editar Lista Personalizada, Selecionar lista e clicar em Importar.</a:t>
+            </a:r>
+          </a:p>
+          <a:p>
+            <a:pPr marL="0" indent="0">
+              <a:buFont typeface="Arial" charset="0"/>
+              <a:buNone/>
+            </a:pPr>
+            <a:endParaRPr lang="pt-BR" sz="1800" dirty="0"/>
+          </a:p>
+          <a:p>
+            <a:pPr marL="0" indent="0">
+              <a:buFont typeface="Arial" charset="0"/>
+              <a:buNone/>
+            </a:pPr>
+            <a:endParaRPr lang="pt-BR" sz="1800" dirty="0"/>
+          </a:p>
+        </p:txBody>
+      </p:sp>
+    </p:spTree>
+    <p:extLst>
+      <p:ext uri="{BB962C8B-B14F-4D97-AF65-F5344CB8AC3E}">
+        <p14:creationId xmlns:p14="http://schemas.microsoft.com/office/powerpoint/2010/main" val="4064205487"/>
+      </p:ext>
+    </p:extLst>
+  </p:cSld>
+  <p:clrMapOvr>
+    <a:masterClrMapping/>
+  </p:clrMapOvr>
+</p:sld>
+</file>
+
+<file path=ppt/slides/slide73.xml><?xml version="1.0" encoding="utf-8"?>
+<p:sld xmlns:a="http://schemas.openxmlformats.org/drawingml/2006/main" xmlns:r="http://schemas.openxmlformats.org/officeDocument/2006/relationships" xmlns:p="http://schemas.openxmlformats.org/presentationml/2006/main">
+  <p:cSld>
+    <p:spTree>
+      <p:nvGrpSpPr>
+        <p:cNvPr id="1" name=""/>
+        <p:cNvGrpSpPr/>
+        <p:nvPr/>
+      </p:nvGrpSpPr>
+      <p:grpSpPr>
+        <a:xfrm>
+          <a:off x="0" y="0"/>
+          <a:ext cx="0" cy="0"/>
+          <a:chOff x="0" y="0"/>
+          <a:chExt cx="0" cy="0"/>
+        </a:xfrm>
+      </p:grpSpPr>
+      <p:sp>
+        <p:nvSpPr>
+          <p:cNvPr id="6" name="Subtítulo 2"/>
+          <p:cNvSpPr txBox="1">
+            <a:spLocks/>
+          </p:cNvSpPr>
+          <p:nvPr/>
+        </p:nvSpPr>
+        <p:spPr>
+          <a:xfrm>
+            <a:off x="210670" y="153054"/>
+            <a:ext cx="10058400" cy="718315"/>
+          </a:xfrm>
+        </p:spPr>
+        <p:txBody>
+          <a:bodyPr>
+            <a:noAutofit/>
+          </a:bodyPr>
+          <a:lstStyle>
+            <a:lvl1pPr marL="342900" indent="-342900" algn="l" rtl="0" eaLnBrk="0" fontAlgn="base" hangingPunct="0">
+              <a:spcBef>
+                <a:spcPct val="20000"/>
+              </a:spcBef>
+              <a:spcAft>
+                <a:spcPct val="0"/>
+              </a:spcAft>
+              <a:buFont typeface="Arial" charset="0"/>
+              <a:buChar char="•"/>
+              <a:defRPr lang="pt-BR" sz="2800" kern="1200" dirty="0">
+                <a:solidFill>
+                  <a:schemeClr val="tx1"/>
+                </a:solidFill>
+                <a:latin typeface="+mn-lt"/>
+                <a:ea typeface="+mn-ea"/>
+                <a:cs typeface="+mn-cs"/>
+              </a:defRPr>
+            </a:lvl1pPr>
+            <a:lvl2pPr marL="742950" indent="-285750" algn="l" rtl="0" eaLnBrk="0" fontAlgn="base" hangingPunct="0">
+              <a:spcBef>
+                <a:spcPct val="20000"/>
+              </a:spcBef>
+              <a:spcAft>
+                <a:spcPct val="0"/>
+              </a:spcAft>
+              <a:buFont typeface="Arial" charset="0"/>
+              <a:buChar char="•"/>
+              <a:defRPr lang="pt-BR" sz="2400" kern="1200" dirty="0">
+                <a:solidFill>
+                  <a:schemeClr val="tx1"/>
+                </a:solidFill>
+                <a:latin typeface="+mn-lt"/>
+                <a:ea typeface="+mn-ea"/>
+                <a:cs typeface="+mn-cs"/>
+              </a:defRPr>
+            </a:lvl2pPr>
+            <a:lvl3pPr marL="1143000" indent="-228600" algn="l" rtl="0" eaLnBrk="0" fontAlgn="base" hangingPunct="0">
+              <a:spcBef>
+                <a:spcPct val="20000"/>
+              </a:spcBef>
+              <a:spcAft>
+                <a:spcPct val="0"/>
+              </a:spcAft>
+              <a:buFont typeface="Arial" charset="0"/>
+              <a:buChar char="•"/>
+              <a:defRPr lang="pt-BR" sz="2400" kern="1200" dirty="0">
+                <a:solidFill>
+                  <a:schemeClr val="tx1"/>
+                </a:solidFill>
+                <a:latin typeface="+mn-lt"/>
+                <a:ea typeface="+mn-ea"/>
+                <a:cs typeface="+mn-cs"/>
+              </a:defRPr>
+            </a:lvl3pPr>
+            <a:lvl4pPr marL="1600200" indent="-228600" algn="l" rtl="0" eaLnBrk="0" fontAlgn="base" hangingPunct="0">
+              <a:spcBef>
+                <a:spcPct val="20000"/>
+              </a:spcBef>
+              <a:spcAft>
+                <a:spcPct val="0"/>
+              </a:spcAft>
+              <a:buFont typeface="Arial" charset="0"/>
+              <a:buChar char="•"/>
+              <a:defRPr lang="pt-BR" sz="2000" kern="1200" dirty="0">
+                <a:solidFill>
+                  <a:schemeClr val="tx1"/>
+                </a:solidFill>
+                <a:latin typeface="+mn-lt"/>
+                <a:ea typeface="+mn-ea"/>
+                <a:cs typeface="+mn-cs"/>
+              </a:defRPr>
+            </a:lvl4pPr>
+            <a:lvl5pPr marL="2057400" indent="-228600" algn="l" rtl="0" eaLnBrk="0" fontAlgn="base" hangingPunct="0">
+              <a:spcBef>
+                <a:spcPct val="20000"/>
+              </a:spcBef>
+              <a:spcAft>
+                <a:spcPct val="0"/>
+              </a:spcAft>
+              <a:buFont typeface="Arial" charset="0"/>
+              <a:buChar char="•"/>
+              <a:defRPr lang="pt-BR" sz="2000" kern="1200" dirty="0">
+                <a:solidFill>
+                  <a:schemeClr val="tx1"/>
+                </a:solidFill>
+                <a:latin typeface="+mn-lt"/>
+                <a:ea typeface="+mn-ea"/>
+                <a:cs typeface="+mn-cs"/>
+              </a:defRPr>
+            </a:lvl5pPr>
+            <a:lvl6pPr marL="2514600" indent="-228600" algn="l" defTabSz="914400" rtl="0" eaLnBrk="1" latinLnBrk="0" hangingPunct="1">
+              <a:spcBef>
+                <a:spcPct val="20000"/>
+              </a:spcBef>
+              <a:buFont typeface="Arial" pitchFamily="34" charset="0"/>
+              <a:buChar char="•"/>
+              <a:defRPr sz="2000" kern="1200">
+                <a:solidFill>
+                  <a:schemeClr val="tx1"/>
+                </a:solidFill>
+                <a:latin typeface="+mn-lt"/>
+                <a:ea typeface="+mn-ea"/>
+                <a:cs typeface="+mn-cs"/>
+              </a:defRPr>
+            </a:lvl6pPr>
+            <a:lvl7pPr marL="2971800" indent="-228600" algn="l" defTabSz="914400" rtl="0" eaLnBrk="1" latinLnBrk="0" hangingPunct="1">
+              <a:spcBef>
+                <a:spcPct val="20000"/>
+              </a:spcBef>
+              <a:buFont typeface="Arial" pitchFamily="34" charset="0"/>
+              <a:buChar char="•"/>
+              <a:defRPr sz="2000" kern="1200">
+                <a:solidFill>
+                  <a:schemeClr val="tx1"/>
+                </a:solidFill>
+                <a:latin typeface="+mn-lt"/>
+                <a:ea typeface="+mn-ea"/>
+                <a:cs typeface="+mn-cs"/>
+              </a:defRPr>
+            </a:lvl7pPr>
+            <a:lvl8pPr marL="3429000" indent="-228600" algn="l" defTabSz="914400" rtl="0" eaLnBrk="1" latinLnBrk="0" hangingPunct="1">
+              <a:spcBef>
+                <a:spcPct val="20000"/>
+              </a:spcBef>
+              <a:buFont typeface="Arial" pitchFamily="34" charset="0"/>
+              <a:buChar char="•"/>
+              <a:defRPr sz="2000" kern="1200">
+                <a:solidFill>
+                  <a:schemeClr val="tx1"/>
+                </a:solidFill>
+                <a:latin typeface="+mn-lt"/>
+                <a:ea typeface="+mn-ea"/>
+                <a:cs typeface="+mn-cs"/>
+              </a:defRPr>
+            </a:lvl8pPr>
+            <a:lvl9pPr marL="3886200" indent="-228600" algn="l" defTabSz="914400" rtl="0" eaLnBrk="1" latinLnBrk="0" hangingPunct="1">
+              <a:spcBef>
+                <a:spcPct val="20000"/>
+              </a:spcBef>
+              <a:buFont typeface="Arial" pitchFamily="34" charset="0"/>
+              <a:buChar char="•"/>
+              <a:defRPr sz="2000" kern="1200">
+                <a:solidFill>
+                  <a:schemeClr val="tx1"/>
+                </a:solidFill>
+                <a:latin typeface="+mn-lt"/>
+                <a:ea typeface="+mn-ea"/>
+                <a:cs typeface="+mn-cs"/>
+              </a:defRPr>
+            </a:lvl9pPr>
+          </a:lstStyle>
+          <a:p>
+            <a:pPr marL="0" indent="0">
+              <a:lnSpc>
+                <a:spcPct val="150000"/>
+              </a:lnSpc>
+              <a:buFont typeface="Arial" charset="0"/>
+              <a:buNone/>
+            </a:pPr>
+            <a:r>
+              <a:rPr lang="pt-BR" sz="2400" b="1" dirty="0">
+                <a:solidFill>
+                  <a:schemeClr val="accent6">
+                    <a:lumMod val="75000"/>
+                  </a:schemeClr>
+                </a:solidFill>
+                <a:latin typeface="Corbel" panose="020B0503020204020204" pitchFamily="34" charset="0"/>
+              </a:rPr>
+              <a:t>ATIVIDADE</a:t>
+            </a:r>
+          </a:p>
+        </p:txBody>
+      </p:sp>
+      <p:sp>
+        <p:nvSpPr>
+          <p:cNvPr id="11" name="Subtítulo 1"/>
+          <p:cNvSpPr txBox="1">
+            <a:spLocks/>
+          </p:cNvSpPr>
+          <p:nvPr/>
+        </p:nvSpPr>
+        <p:spPr>
+          <a:xfrm>
+            <a:off x="692971" y="1913794"/>
+            <a:ext cx="10896600" cy="2817812"/>
+          </a:xfrm>
+        </p:spPr>
+        <p:txBody>
+          <a:bodyPr>
+            <a:noAutofit/>
+          </a:bodyPr>
+          <a:lstStyle>
+            <a:lvl1pPr marL="342900" indent="-342900" algn="l" rtl="0" eaLnBrk="0" fontAlgn="base" hangingPunct="0">
+              <a:spcBef>
+                <a:spcPct val="20000"/>
+              </a:spcBef>
+              <a:spcAft>
+                <a:spcPct val="0"/>
+              </a:spcAft>
+              <a:buFont typeface="Arial" charset="0"/>
+              <a:buChar char="•"/>
+              <a:defRPr lang="pt-BR" sz="2800" kern="1200" dirty="0">
+                <a:solidFill>
+                  <a:schemeClr val="tx1"/>
+                </a:solidFill>
+                <a:latin typeface="+mn-lt"/>
+                <a:ea typeface="+mn-ea"/>
+                <a:cs typeface="+mn-cs"/>
+              </a:defRPr>
+            </a:lvl1pPr>
+            <a:lvl2pPr marL="742950" indent="-285750" algn="l" rtl="0" eaLnBrk="0" fontAlgn="base" hangingPunct="0">
+              <a:spcBef>
+                <a:spcPct val="20000"/>
+              </a:spcBef>
+              <a:spcAft>
+                <a:spcPct val="0"/>
+              </a:spcAft>
+              <a:buFont typeface="Arial" charset="0"/>
+              <a:buChar char="•"/>
+              <a:defRPr lang="pt-BR" sz="2400" kern="1200" dirty="0">
+                <a:solidFill>
+                  <a:schemeClr val="tx1"/>
+                </a:solidFill>
+                <a:latin typeface="+mn-lt"/>
+                <a:ea typeface="+mn-ea"/>
+                <a:cs typeface="+mn-cs"/>
+              </a:defRPr>
+            </a:lvl2pPr>
+            <a:lvl3pPr marL="1143000" indent="-228600" algn="l" rtl="0" eaLnBrk="0" fontAlgn="base" hangingPunct="0">
+              <a:spcBef>
+                <a:spcPct val="20000"/>
+              </a:spcBef>
+              <a:spcAft>
+                <a:spcPct val="0"/>
+              </a:spcAft>
+              <a:buFont typeface="Arial" charset="0"/>
+              <a:buChar char="•"/>
+              <a:defRPr lang="pt-BR" sz="2400" kern="1200" dirty="0">
+                <a:solidFill>
+                  <a:schemeClr val="tx1"/>
+                </a:solidFill>
+                <a:latin typeface="+mn-lt"/>
+                <a:ea typeface="+mn-ea"/>
+                <a:cs typeface="+mn-cs"/>
+              </a:defRPr>
+            </a:lvl3pPr>
+            <a:lvl4pPr marL="1600200" indent="-228600" algn="l" rtl="0" eaLnBrk="0" fontAlgn="base" hangingPunct="0">
+              <a:spcBef>
+                <a:spcPct val="20000"/>
+              </a:spcBef>
+              <a:spcAft>
+                <a:spcPct val="0"/>
+              </a:spcAft>
+              <a:buFont typeface="Arial" charset="0"/>
+              <a:buChar char="•"/>
+              <a:defRPr lang="pt-BR" sz="2000" kern="1200" dirty="0">
+                <a:solidFill>
+                  <a:schemeClr val="tx1"/>
+                </a:solidFill>
+                <a:latin typeface="+mn-lt"/>
+                <a:ea typeface="+mn-ea"/>
+                <a:cs typeface="+mn-cs"/>
+              </a:defRPr>
+            </a:lvl4pPr>
+            <a:lvl5pPr marL="2057400" indent="-228600" algn="l" rtl="0" eaLnBrk="0" fontAlgn="base" hangingPunct="0">
+              <a:spcBef>
+                <a:spcPct val="20000"/>
+              </a:spcBef>
+              <a:spcAft>
+                <a:spcPct val="0"/>
+              </a:spcAft>
+              <a:buFont typeface="Arial" charset="0"/>
+              <a:buChar char="•"/>
+              <a:defRPr lang="pt-BR" sz="2000" kern="1200" dirty="0">
+                <a:solidFill>
+                  <a:schemeClr val="tx1"/>
+                </a:solidFill>
+                <a:latin typeface="+mn-lt"/>
+                <a:ea typeface="+mn-ea"/>
+                <a:cs typeface="+mn-cs"/>
+              </a:defRPr>
+            </a:lvl5pPr>
+            <a:lvl6pPr marL="2514600" indent="-228600" algn="l" defTabSz="914400" rtl="0" eaLnBrk="1" latinLnBrk="0" hangingPunct="1">
+              <a:spcBef>
+                <a:spcPct val="20000"/>
+              </a:spcBef>
+              <a:buFont typeface="Arial" pitchFamily="34" charset="0"/>
+              <a:buChar char="•"/>
+              <a:defRPr sz="2000" kern="1200">
+                <a:solidFill>
+                  <a:schemeClr val="tx1"/>
+                </a:solidFill>
+                <a:latin typeface="+mn-lt"/>
+                <a:ea typeface="+mn-ea"/>
+                <a:cs typeface="+mn-cs"/>
+              </a:defRPr>
+            </a:lvl6pPr>
+            <a:lvl7pPr marL="2971800" indent="-228600" algn="l" defTabSz="914400" rtl="0" eaLnBrk="1" latinLnBrk="0" hangingPunct="1">
+              <a:spcBef>
+                <a:spcPct val="20000"/>
+              </a:spcBef>
+              <a:buFont typeface="Arial" pitchFamily="34" charset="0"/>
+              <a:buChar char="•"/>
+              <a:defRPr sz="2000" kern="1200">
+                <a:solidFill>
+                  <a:schemeClr val="tx1"/>
+                </a:solidFill>
+                <a:latin typeface="+mn-lt"/>
+                <a:ea typeface="+mn-ea"/>
+                <a:cs typeface="+mn-cs"/>
+              </a:defRPr>
+            </a:lvl7pPr>
+            <a:lvl8pPr marL="3429000" indent="-228600" algn="l" defTabSz="914400" rtl="0" eaLnBrk="1" latinLnBrk="0" hangingPunct="1">
+              <a:spcBef>
+                <a:spcPct val="20000"/>
+              </a:spcBef>
+              <a:buFont typeface="Arial" pitchFamily="34" charset="0"/>
+              <a:buChar char="•"/>
+              <a:defRPr sz="2000" kern="1200">
+                <a:solidFill>
+                  <a:schemeClr val="tx1"/>
+                </a:solidFill>
+                <a:latin typeface="+mn-lt"/>
+                <a:ea typeface="+mn-ea"/>
+                <a:cs typeface="+mn-cs"/>
+              </a:defRPr>
+            </a:lvl8pPr>
+            <a:lvl9pPr marL="3886200" indent="-228600" algn="l" defTabSz="914400" rtl="0" eaLnBrk="1" latinLnBrk="0" hangingPunct="1">
+              <a:spcBef>
+                <a:spcPct val="20000"/>
+              </a:spcBef>
+              <a:buFont typeface="Arial" pitchFamily="34" charset="0"/>
+              <a:buChar char="•"/>
+              <a:defRPr sz="2000" kern="1200">
+                <a:solidFill>
+                  <a:schemeClr val="tx1"/>
+                </a:solidFill>
+                <a:latin typeface="+mn-lt"/>
+                <a:ea typeface="+mn-ea"/>
+                <a:cs typeface="+mn-cs"/>
+              </a:defRPr>
+            </a:lvl9pPr>
+          </a:lstStyle>
+          <a:p>
+            <a:pPr marL="0" indent="0">
+              <a:buFont typeface="Arial" charset="0"/>
+              <a:buNone/>
+            </a:pPr>
+            <a:r>
+              <a:rPr lang="pt-BR" sz="1800" dirty="0"/>
               <a:t>Uma Empresa em Dificuldades financeira precisa priorizar seus pagamentos.</a:t>
             </a:r>
           </a:p>
@@ -47410,7 +47908,7 @@
 </p:sld>
 </file>
 
-<file path=ppt/slides/slide73.xml><?xml version="1.0" encoding="utf-8"?>
+<file path=ppt/slides/slide74.xml><?xml version="1.0" encoding="utf-8"?>
 <p:sld xmlns:a="http://schemas.openxmlformats.org/drawingml/2006/main" xmlns:r="http://schemas.openxmlformats.org/officeDocument/2006/relationships" xmlns:p="http://schemas.openxmlformats.org/presentationml/2006/main" show="0">
   <p:cSld>
     <p:spTree>
@@ -47753,7 +48251,7 @@
 </p:sld>
 </file>
 
-<file path=ppt/slides/slide74.xml><?xml version="1.0" encoding="utf-8"?>
+<file path=ppt/slides/slide75.xml><?xml version="1.0" encoding="utf-8"?>
 <p:sld xmlns:a="http://schemas.openxmlformats.org/drawingml/2006/main" xmlns:r="http://schemas.openxmlformats.org/officeDocument/2006/relationships" xmlns:p="http://schemas.openxmlformats.org/presentationml/2006/main">
   <p:cSld>
     <p:spTree>
@@ -48182,7 +48680,7 @@
 </p:sld>
 </file>
 
-<file path=ppt/slides/slide75.xml><?xml version="1.0" encoding="utf-8"?>
+<file path=ppt/slides/slide76.xml><?xml version="1.0" encoding="utf-8"?>
 <p:sld xmlns:a="http://schemas.openxmlformats.org/drawingml/2006/main" xmlns:r="http://schemas.openxmlformats.org/officeDocument/2006/relationships" xmlns:p="http://schemas.openxmlformats.org/presentationml/2006/main" show="0">
   <p:cSld>
     <p:spTree>
@@ -48535,7 +49033,7 @@
 </p:sld>
 </file>
 
-<file path=ppt/slides/slide76.xml><?xml version="1.0" encoding="utf-8"?>
+<file path=ppt/slides/slide77.xml><?xml version="1.0" encoding="utf-8"?>
 <p:sld xmlns:a="http://schemas.openxmlformats.org/drawingml/2006/main" xmlns:r="http://schemas.openxmlformats.org/officeDocument/2006/relationships" xmlns:p="http://schemas.openxmlformats.org/presentationml/2006/main" show="0">
   <p:cSld>
     <p:spTree>
@@ -48826,7 +49324,7 @@
 </p:sld>
 </file>
 
-<file path=ppt/slides/slide77.xml><?xml version="1.0" encoding="utf-8"?>
+<file path=ppt/slides/slide78.xml><?xml version="1.0" encoding="utf-8"?>
 <p:sld xmlns:a="http://schemas.openxmlformats.org/drawingml/2006/main" xmlns:r="http://schemas.openxmlformats.org/officeDocument/2006/relationships" xmlns:p="http://schemas.openxmlformats.org/presentationml/2006/main">
   <p:cSld>
     <p:spTree>

</xml_diff>

<commit_message>
Aula 08-12 pos aula
</commit_message>
<xml_diff>
--- a/Professor/Aula3.pptx
+++ b/Professor/Aula3.pptx
@@ -5,10 +5,10 @@
     <p:sldMasterId id="2147483672" r:id="rId1"/>
   </p:sldMasterIdLst>
   <p:notesMasterIdLst>
-    <p:notesMasterId r:id="rId85"/>
+    <p:notesMasterId r:id="rId87"/>
   </p:notesMasterIdLst>
   <p:handoutMasterIdLst>
-    <p:handoutMasterId r:id="rId86"/>
+    <p:handoutMasterId r:id="rId88"/>
   </p:handoutMasterIdLst>
   <p:sldIdLst>
     <p:sldId id="256" r:id="rId2"/>
@@ -85,15 +85,17 @@
     <p:sldId id="350" r:id="rId73"/>
     <p:sldId id="341" r:id="rId74"/>
     <p:sldId id="351" r:id="rId75"/>
-    <p:sldId id="352" r:id="rId76"/>
+    <p:sldId id="354" r:id="rId76"/>
     <p:sldId id="353" r:id="rId77"/>
-    <p:sldId id="290" r:id="rId78"/>
-    <p:sldId id="339" r:id="rId79"/>
-    <p:sldId id="281" r:id="rId80"/>
-    <p:sldId id="289" r:id="rId81"/>
-    <p:sldId id="347" r:id="rId82"/>
-    <p:sldId id="348" r:id="rId83"/>
-    <p:sldId id="342" r:id="rId84"/>
+    <p:sldId id="355" r:id="rId78"/>
+    <p:sldId id="290" r:id="rId79"/>
+    <p:sldId id="339" r:id="rId80"/>
+    <p:sldId id="281" r:id="rId81"/>
+    <p:sldId id="289" r:id="rId82"/>
+    <p:sldId id="347" r:id="rId83"/>
+    <p:sldId id="348" r:id="rId84"/>
+    <p:sldId id="342" r:id="rId85"/>
+    <p:sldId id="356" r:id="rId86"/>
   </p:sldIdLst>
   <p:sldSz cx="12192000" cy="6858000"/>
   <p:notesSz cx="6858000" cy="9144000"/>
@@ -6199,13 +6201,6 @@
         </dgm:presLayoutVars>
       </dgm:prSet>
       <dgm:spPr/>
-      <dgm:t>
-        <a:bodyPr/>
-        <a:lstStyle/>
-        <a:p>
-          <a:endParaRPr lang="pt-BR"/>
-        </a:p>
-      </dgm:t>
     </dgm:pt>
     <dgm:pt modelId="{BFBD74D8-0595-4A99-AB59-E323C1F019A5}" type="pres">
       <dgm:prSet presAssocID="{44C4C1B8-05AA-4FA2-ACC6-F46A89EC3BA0}" presName="children" presStyleCnt="0"/>
@@ -6218,13 +6213,6 @@
     <dgm:pt modelId="{7283E380-2BF3-48FF-A1E9-CB8123B99BCA}" type="pres">
       <dgm:prSet presAssocID="{44C4C1B8-05AA-4FA2-ACC6-F46A89EC3BA0}" presName="child1" presStyleLbl="bgAcc1" presStyleIdx="0" presStyleCnt="4"/>
       <dgm:spPr/>
-      <dgm:t>
-        <a:bodyPr/>
-        <a:lstStyle/>
-        <a:p>
-          <a:endParaRPr lang="pt-BR"/>
-        </a:p>
-      </dgm:t>
     </dgm:pt>
     <dgm:pt modelId="{89946784-A747-4392-88FE-CC18B7D8C75C}" type="pres">
       <dgm:prSet presAssocID="{44C4C1B8-05AA-4FA2-ACC6-F46A89EC3BA0}" presName="child1Text" presStyleLbl="bgAcc1" presStyleIdx="0" presStyleCnt="4">
@@ -6233,13 +6221,6 @@
         </dgm:presLayoutVars>
       </dgm:prSet>
       <dgm:spPr/>
-      <dgm:t>
-        <a:bodyPr/>
-        <a:lstStyle/>
-        <a:p>
-          <a:endParaRPr lang="pt-BR"/>
-        </a:p>
-      </dgm:t>
     </dgm:pt>
     <dgm:pt modelId="{E8A5A0C7-4AC0-4184-8687-F4BC00B20ECD}" type="pres">
       <dgm:prSet presAssocID="{44C4C1B8-05AA-4FA2-ACC6-F46A89EC3BA0}" presName="child2group" presStyleCnt="0"/>
@@ -6248,13 +6229,6 @@
     <dgm:pt modelId="{8BA94ED0-8ABF-4943-87D1-E44A48027B75}" type="pres">
       <dgm:prSet presAssocID="{44C4C1B8-05AA-4FA2-ACC6-F46A89EC3BA0}" presName="child2" presStyleLbl="bgAcc1" presStyleIdx="1" presStyleCnt="4"/>
       <dgm:spPr/>
-      <dgm:t>
-        <a:bodyPr/>
-        <a:lstStyle/>
-        <a:p>
-          <a:endParaRPr lang="pt-BR"/>
-        </a:p>
-      </dgm:t>
     </dgm:pt>
     <dgm:pt modelId="{F5B3F73C-FC25-42C5-AF3F-61226329D5CA}" type="pres">
       <dgm:prSet presAssocID="{44C4C1B8-05AA-4FA2-ACC6-F46A89EC3BA0}" presName="child2Text" presStyleLbl="bgAcc1" presStyleIdx="1" presStyleCnt="4">
@@ -6263,13 +6237,6 @@
         </dgm:presLayoutVars>
       </dgm:prSet>
       <dgm:spPr/>
-      <dgm:t>
-        <a:bodyPr/>
-        <a:lstStyle/>
-        <a:p>
-          <a:endParaRPr lang="pt-BR"/>
-        </a:p>
-      </dgm:t>
     </dgm:pt>
     <dgm:pt modelId="{4C942BF4-6668-4D15-A484-6B4E032CC0BC}" type="pres">
       <dgm:prSet presAssocID="{44C4C1B8-05AA-4FA2-ACC6-F46A89EC3BA0}" presName="child3group" presStyleCnt="0"/>
@@ -6278,13 +6245,6 @@
     <dgm:pt modelId="{5FA442E1-6AE5-4CEF-8B17-723121F89E2C}" type="pres">
       <dgm:prSet presAssocID="{44C4C1B8-05AA-4FA2-ACC6-F46A89EC3BA0}" presName="child3" presStyleLbl="bgAcc1" presStyleIdx="2" presStyleCnt="4"/>
       <dgm:spPr/>
-      <dgm:t>
-        <a:bodyPr/>
-        <a:lstStyle/>
-        <a:p>
-          <a:endParaRPr lang="pt-BR"/>
-        </a:p>
-      </dgm:t>
     </dgm:pt>
     <dgm:pt modelId="{1BF485B6-A773-47C6-A4D1-39A4C4D7BF11}" type="pres">
       <dgm:prSet presAssocID="{44C4C1B8-05AA-4FA2-ACC6-F46A89EC3BA0}" presName="child3Text" presStyleLbl="bgAcc1" presStyleIdx="2" presStyleCnt="4">
@@ -6293,13 +6253,6 @@
         </dgm:presLayoutVars>
       </dgm:prSet>
       <dgm:spPr/>
-      <dgm:t>
-        <a:bodyPr/>
-        <a:lstStyle/>
-        <a:p>
-          <a:endParaRPr lang="pt-BR"/>
-        </a:p>
-      </dgm:t>
     </dgm:pt>
     <dgm:pt modelId="{70D17FAC-8FF9-4D04-B0C4-8CB0C209BE71}" type="pres">
       <dgm:prSet presAssocID="{44C4C1B8-05AA-4FA2-ACC6-F46A89EC3BA0}" presName="child4group" presStyleCnt="0"/>
@@ -6308,13 +6261,6 @@
     <dgm:pt modelId="{E5F8B966-BD45-4641-A194-4A7BAA57E942}" type="pres">
       <dgm:prSet presAssocID="{44C4C1B8-05AA-4FA2-ACC6-F46A89EC3BA0}" presName="child4" presStyleLbl="bgAcc1" presStyleIdx="3" presStyleCnt="4"/>
       <dgm:spPr/>
-      <dgm:t>
-        <a:bodyPr/>
-        <a:lstStyle/>
-        <a:p>
-          <a:endParaRPr lang="pt-BR"/>
-        </a:p>
-      </dgm:t>
     </dgm:pt>
     <dgm:pt modelId="{FDCAB2DC-AFBC-4D64-AF47-0737C719BF8B}" type="pres">
       <dgm:prSet presAssocID="{44C4C1B8-05AA-4FA2-ACC6-F46A89EC3BA0}" presName="child4Text" presStyleLbl="bgAcc1" presStyleIdx="3" presStyleCnt="4">
@@ -6323,13 +6269,6 @@
         </dgm:presLayoutVars>
       </dgm:prSet>
       <dgm:spPr/>
-      <dgm:t>
-        <a:bodyPr/>
-        <a:lstStyle/>
-        <a:p>
-          <a:endParaRPr lang="pt-BR"/>
-        </a:p>
-      </dgm:t>
     </dgm:pt>
     <dgm:pt modelId="{7A8937CB-2F55-4115-8348-13701B3A6F20}" type="pres">
       <dgm:prSet presAssocID="{44C4C1B8-05AA-4FA2-ACC6-F46A89EC3BA0}" presName="childPlaceholder" presStyleCnt="0"/>
@@ -6347,13 +6286,6 @@
         </dgm:presLayoutVars>
       </dgm:prSet>
       <dgm:spPr/>
-      <dgm:t>
-        <a:bodyPr/>
-        <a:lstStyle/>
-        <a:p>
-          <a:endParaRPr lang="pt-BR"/>
-        </a:p>
-      </dgm:t>
     </dgm:pt>
     <dgm:pt modelId="{95D9F98F-67AC-49A4-9785-B9FCBBF88C76}" type="pres">
       <dgm:prSet presAssocID="{44C4C1B8-05AA-4FA2-ACC6-F46A89EC3BA0}" presName="quadrant2" presStyleLbl="node1" presStyleIdx="1" presStyleCnt="4">
@@ -6363,13 +6295,6 @@
         </dgm:presLayoutVars>
       </dgm:prSet>
       <dgm:spPr/>
-      <dgm:t>
-        <a:bodyPr/>
-        <a:lstStyle/>
-        <a:p>
-          <a:endParaRPr lang="pt-BR"/>
-        </a:p>
-      </dgm:t>
     </dgm:pt>
     <dgm:pt modelId="{1899BCB1-AE2E-4FEB-ACAA-7AD3F077C35E}" type="pres">
       <dgm:prSet presAssocID="{44C4C1B8-05AA-4FA2-ACC6-F46A89EC3BA0}" presName="quadrant3" presStyleLbl="node1" presStyleIdx="2" presStyleCnt="4">
@@ -6379,13 +6304,6 @@
         </dgm:presLayoutVars>
       </dgm:prSet>
       <dgm:spPr/>
-      <dgm:t>
-        <a:bodyPr/>
-        <a:lstStyle/>
-        <a:p>
-          <a:endParaRPr lang="pt-BR"/>
-        </a:p>
-      </dgm:t>
     </dgm:pt>
     <dgm:pt modelId="{B5E4330D-365E-43B5-AC5B-1D77D60DF1E7}" type="pres">
       <dgm:prSet presAssocID="{44C4C1B8-05AA-4FA2-ACC6-F46A89EC3BA0}" presName="quadrant4" presStyleLbl="node1" presStyleIdx="3" presStyleCnt="4">
@@ -6395,13 +6313,6 @@
         </dgm:presLayoutVars>
       </dgm:prSet>
       <dgm:spPr/>
-      <dgm:t>
-        <a:bodyPr/>
-        <a:lstStyle/>
-        <a:p>
-          <a:endParaRPr lang="pt-BR"/>
-        </a:p>
-      </dgm:t>
     </dgm:pt>
     <dgm:pt modelId="{6039BCC1-DD89-437A-A14A-D3B580CA3910}" type="pres">
       <dgm:prSet presAssocID="{44C4C1B8-05AA-4FA2-ACC6-F46A89EC3BA0}" presName="quadrantPlaceholder" presStyleCnt="0"/>
@@ -6417,39 +6328,39 @@
     </dgm:pt>
   </dgm:ptLst>
   <dgm:cxnLst>
+    <dgm:cxn modelId="{1A6EEB0F-112B-412D-880C-F69C54D2192C}" srcId="{8EF7DD04-B549-4B8D-B285-623DA6E59C30}" destId="{C21B34E9-0E51-4E4D-B010-5E3144BC52D3}" srcOrd="1" destOrd="0" parTransId="{D5F39B3E-2D5A-49BF-B165-5E5C773153F7}" sibTransId="{C1E07FBC-CD32-444B-AB9D-21A3BE617B33}"/>
+    <dgm:cxn modelId="{38850311-885E-4604-95A6-5521006449D4}" type="presOf" srcId="{5C2E9E48-C3BB-472A-AAAB-81328E2FBD49}" destId="{5FA442E1-6AE5-4CEF-8B17-723121F89E2C}" srcOrd="0" destOrd="0" presId="urn:microsoft.com/office/officeart/2005/8/layout/cycle4"/>
+    <dgm:cxn modelId="{BE2C0129-C8C1-4D08-8F30-4424F96903AA}" srcId="{C9203E37-0572-40D0-8D8B-76A6CA06E2AC}" destId="{2850CB3B-4BE4-403A-BF0A-05C96D4F7844}" srcOrd="1" destOrd="0" parTransId="{00B6A140-6809-49D2-A821-EE500A990780}" sibTransId="{916082B7-A0CB-4B71-B5BB-6BEB2D43A79A}"/>
+    <dgm:cxn modelId="{88AA5B2E-3DD5-445D-A643-67BB8C909305}" type="presOf" srcId="{AC18428D-3BF2-493B-B3F7-2E46EF0600F4}" destId="{FDCAB2DC-AFBC-4D64-AF47-0737C719BF8B}" srcOrd="1" destOrd="1" presId="urn:microsoft.com/office/officeart/2005/8/layout/cycle4"/>
+    <dgm:cxn modelId="{C938DC34-ECA3-401B-AFC3-1C14C1CBB0FC}" type="presOf" srcId="{8801F77C-26D5-47B1-95F4-FE95A515011D}" destId="{8BA94ED0-8ABF-4943-87D1-E44A48027B75}" srcOrd="0" destOrd="0" presId="urn:microsoft.com/office/officeart/2005/8/layout/cycle4"/>
+    <dgm:cxn modelId="{8A1DA236-93B0-4E26-9EF7-9A109F8AFBD3}" type="presOf" srcId="{5D697BCE-FBBF-40B1-8BF3-BD802560D91F}" destId="{E5F8B966-BD45-4641-A194-4A7BAA57E942}" srcOrd="0" destOrd="0" presId="urn:microsoft.com/office/officeart/2005/8/layout/cycle4"/>
+    <dgm:cxn modelId="{78F1E13E-D5AD-4BB9-A549-D2F649AAC3D0}" type="presOf" srcId="{44C4C1B8-05AA-4FA2-ACC6-F46A89EC3BA0}" destId="{370B2954-BC96-4CDA-81C9-5DF098110F21}" srcOrd="0" destOrd="0" presId="urn:microsoft.com/office/officeart/2005/8/layout/cycle4"/>
+    <dgm:cxn modelId="{A4718A3F-D7FF-4ED2-8189-DDE7E16EA3ED}" srcId="{D63F9D11-88D2-4FBB-BF92-59F1CF6D7EB4}" destId="{5D697BCE-FBBF-40B1-8BF3-BD802560D91F}" srcOrd="0" destOrd="0" parTransId="{CAB160E4-1AEA-484B-93F3-1291AB4874B5}" sibTransId="{7FD7BE94-9B6A-413D-B5C3-76DCF1F23507}"/>
+    <dgm:cxn modelId="{A2F51A41-7CC7-43CE-A3CB-C235A5618C05}" type="presOf" srcId="{AC18428D-3BF2-493B-B3F7-2E46EF0600F4}" destId="{E5F8B966-BD45-4641-A194-4A7BAA57E942}" srcOrd="0" destOrd="1" presId="urn:microsoft.com/office/officeart/2005/8/layout/cycle4"/>
+    <dgm:cxn modelId="{3C83D864-3B3B-4E69-B16F-A75E5B5A456B}" type="presOf" srcId="{D63F9D11-88D2-4FBB-BF92-59F1CF6D7EB4}" destId="{B5E4330D-365E-43B5-AC5B-1D77D60DF1E7}" srcOrd="0" destOrd="0" presId="urn:microsoft.com/office/officeart/2005/8/layout/cycle4"/>
+    <dgm:cxn modelId="{6B66C36A-A15C-46D6-A484-0B4B20E0FD02}" srcId="{44C4C1B8-05AA-4FA2-ACC6-F46A89EC3BA0}" destId="{8EF7DD04-B549-4B8D-B285-623DA6E59C30}" srcOrd="1" destOrd="0" parTransId="{C946F3FA-0DFB-44CF-9853-DFA19E73CEA9}" sibTransId="{554332B6-4611-4489-840F-73761A6D6FFA}"/>
     <dgm:cxn modelId="{8D4D2B6D-CDDD-4800-9029-954AAED6C75E}" srcId="{8EF7DD04-B549-4B8D-B285-623DA6E59C30}" destId="{8801F77C-26D5-47B1-95F4-FE95A515011D}" srcOrd="0" destOrd="0" parTransId="{87F45977-CD48-42CA-8186-226996DC40D4}" sibTransId="{137A0769-72AE-4D22-B52B-A129C3E42ED4}"/>
+    <dgm:cxn modelId="{6BB78974-0ED0-48F1-9983-E7DD24B0EA95}" type="presOf" srcId="{2850CB3B-4BE4-403A-BF0A-05C96D4F7844}" destId="{1BF485B6-A773-47C6-A4D1-39A4C4D7BF11}" srcOrd="1" destOrd="1" presId="urn:microsoft.com/office/officeart/2005/8/layout/cycle4"/>
+    <dgm:cxn modelId="{70B3B055-066D-4F70-9657-9C60607F4378}" type="presOf" srcId="{8EF7DD04-B549-4B8D-B285-623DA6E59C30}" destId="{95D9F98F-67AC-49A4-9785-B9FCBBF88C76}" srcOrd="0" destOrd="0" presId="urn:microsoft.com/office/officeart/2005/8/layout/cycle4"/>
+    <dgm:cxn modelId="{1ED26378-AB2D-4D28-8C61-4D90CD1AD91C}" type="presOf" srcId="{A5AAC5A0-C4BF-4AD9-BE87-B2BD1BA6258F}" destId="{7283E380-2BF3-48FF-A1E9-CB8123B99BCA}" srcOrd="0" destOrd="0" presId="urn:microsoft.com/office/officeart/2005/8/layout/cycle4"/>
     <dgm:cxn modelId="{5DEEC386-BF04-4C8A-951F-D4860DB27E66}" srcId="{D63F9D11-88D2-4FBB-BF92-59F1CF6D7EB4}" destId="{AC18428D-3BF2-493B-B3F7-2E46EF0600F4}" srcOrd="1" destOrd="0" parTransId="{FC9F2A68-932F-4C9B-BA3E-B104BBCEB445}" sibTransId="{115D35AA-B67A-4822-8D90-7CF129C3FC28}"/>
-    <dgm:cxn modelId="{1ED26378-AB2D-4D28-8C61-4D90CD1AD91C}" type="presOf" srcId="{A5AAC5A0-C4BF-4AD9-BE87-B2BD1BA6258F}" destId="{7283E380-2BF3-48FF-A1E9-CB8123B99BCA}" srcOrd="0" destOrd="0" presId="urn:microsoft.com/office/officeart/2005/8/layout/cycle4"/>
-    <dgm:cxn modelId="{88AA5B2E-3DD5-445D-A643-67BB8C909305}" type="presOf" srcId="{AC18428D-3BF2-493B-B3F7-2E46EF0600F4}" destId="{FDCAB2DC-AFBC-4D64-AF47-0737C719BF8B}" srcOrd="1" destOrd="1" presId="urn:microsoft.com/office/officeart/2005/8/layout/cycle4"/>
+    <dgm:cxn modelId="{A7B1DA8E-3D8C-4FED-BB8A-D5D0C109ABFC}" type="presOf" srcId="{C9203E37-0572-40D0-8D8B-76A6CA06E2AC}" destId="{1899BCB1-AE2E-4FEB-ACAA-7AD3F077C35E}" srcOrd="0" destOrd="0" presId="urn:microsoft.com/office/officeart/2005/8/layout/cycle4"/>
+    <dgm:cxn modelId="{585E8F97-2EFF-4530-9E88-27B1B36389C2}" type="presOf" srcId="{C21B34E9-0E51-4E4D-B010-5E3144BC52D3}" destId="{8BA94ED0-8ABF-4943-87D1-E44A48027B75}" srcOrd="0" destOrd="1" presId="urn:microsoft.com/office/officeart/2005/8/layout/cycle4"/>
+    <dgm:cxn modelId="{3B75C897-A690-4336-8659-C6FC3FD12BEB}" type="presOf" srcId="{7B5F6CA4-2F69-41B0-B9EC-12D98E4FB1E8}" destId="{29E03CAE-A1B4-4CAB-B830-CB755FF6F463}" srcOrd="0" destOrd="0" presId="urn:microsoft.com/office/officeart/2005/8/layout/cycle4"/>
+    <dgm:cxn modelId="{214110A1-71C3-45A0-9A73-88A8D878B2C4}" type="presOf" srcId="{5C2E9E48-C3BB-472A-AAAB-81328E2FBD49}" destId="{1BF485B6-A773-47C6-A4D1-39A4C4D7BF11}" srcOrd="1" destOrd="0" presId="urn:microsoft.com/office/officeart/2005/8/layout/cycle4"/>
+    <dgm:cxn modelId="{0BBA37B0-D55F-40F7-9699-25F478EDCE9D}" type="presOf" srcId="{2850CB3B-4BE4-403A-BF0A-05C96D4F7844}" destId="{5FA442E1-6AE5-4CEF-8B17-723121F89E2C}" srcOrd="0" destOrd="1" presId="urn:microsoft.com/office/officeart/2005/8/layout/cycle4"/>
     <dgm:cxn modelId="{3B1F4CB2-AC23-4AAD-A401-588CDBD7E791}" type="presOf" srcId="{A41D6D16-0F25-4161-9567-F7925E03290B}" destId="{7283E380-2BF3-48FF-A1E9-CB8123B99BCA}" srcOrd="0" destOrd="1" presId="urn:microsoft.com/office/officeart/2005/8/layout/cycle4"/>
+    <dgm:cxn modelId="{8A6A66B9-4B06-4783-B9FE-5414675EB6AA}" type="presOf" srcId="{C21B34E9-0E51-4E4D-B010-5E3144BC52D3}" destId="{F5B3F73C-FC25-42C5-AF3F-61226329D5CA}" srcOrd="1" destOrd="1" presId="urn:microsoft.com/office/officeart/2005/8/layout/cycle4"/>
+    <dgm:cxn modelId="{4CCB42BE-6D85-4B4C-86D4-B5C9330BCF5E}" type="presOf" srcId="{A5AAC5A0-C4BF-4AD9-BE87-B2BD1BA6258F}" destId="{89946784-A747-4392-88FE-CC18B7D8C75C}" srcOrd="1" destOrd="0" presId="urn:microsoft.com/office/officeart/2005/8/layout/cycle4"/>
+    <dgm:cxn modelId="{9A0D07C7-DAE3-460C-978B-4DC79D190F61}" srcId="{44C4C1B8-05AA-4FA2-ACC6-F46A89EC3BA0}" destId="{D63F9D11-88D2-4FBB-BF92-59F1CF6D7EB4}" srcOrd="3" destOrd="0" parTransId="{6AD9CB1D-6303-4BAC-B39D-DF3C4B9400BD}" sibTransId="{F380FB87-9EE8-454A-BCCB-4BDD50579363}"/>
     <dgm:cxn modelId="{2231B8C7-5DC1-4D0F-A356-E34B8C5A7D3E}" srcId="{44C4C1B8-05AA-4FA2-ACC6-F46A89EC3BA0}" destId="{7B5F6CA4-2F69-41B0-B9EC-12D98E4FB1E8}" srcOrd="0" destOrd="0" parTransId="{FCA1F349-DD3B-4CFF-8991-5227A691B1E4}" sibTransId="{8C0001AF-A7AA-47D1-99DC-57623918898A}"/>
+    <dgm:cxn modelId="{28F082D2-CD62-43F7-AE26-A17811919645}" type="presOf" srcId="{5D697BCE-FBBF-40B1-8BF3-BD802560D91F}" destId="{FDCAB2DC-AFBC-4D64-AF47-0737C719BF8B}" srcOrd="1" destOrd="0" presId="urn:microsoft.com/office/officeart/2005/8/layout/cycle4"/>
+    <dgm:cxn modelId="{CF7A0AD4-8770-4B75-9BAE-3455C569D149}" srcId="{7B5F6CA4-2F69-41B0-B9EC-12D98E4FB1E8}" destId="{A41D6D16-0F25-4161-9567-F7925E03290B}" srcOrd="1" destOrd="0" parTransId="{702BE0F4-C797-4E32-89BD-EF7592D59AAE}" sibTransId="{9EC15860-6876-4AA1-A96A-2E056F36DD11}"/>
+    <dgm:cxn modelId="{BA835ED4-C4A1-49FA-8E67-432A8EF3003F}" srcId="{C9203E37-0572-40D0-8D8B-76A6CA06E2AC}" destId="{5C2E9E48-C3BB-472A-AAAB-81328E2FBD49}" srcOrd="0" destOrd="0" parTransId="{A3A73184-C9BC-404B-9789-2C06550FB90F}" sibTransId="{F1238347-069B-4F07-9149-C0C085998ED8}"/>
     <dgm:cxn modelId="{D03C06D8-2889-475F-9377-5EB05C17A055}" type="presOf" srcId="{A41D6D16-0F25-4161-9567-F7925E03290B}" destId="{89946784-A747-4392-88FE-CC18B7D8C75C}" srcOrd="1" destOrd="1" presId="urn:microsoft.com/office/officeart/2005/8/layout/cycle4"/>
-    <dgm:cxn modelId="{A4718A3F-D7FF-4ED2-8189-DDE7E16EA3ED}" srcId="{D63F9D11-88D2-4FBB-BF92-59F1CF6D7EB4}" destId="{5D697BCE-FBBF-40B1-8BF3-BD802560D91F}" srcOrd="0" destOrd="0" parTransId="{CAB160E4-1AEA-484B-93F3-1291AB4874B5}" sibTransId="{7FD7BE94-9B6A-413D-B5C3-76DCF1F23507}"/>
-    <dgm:cxn modelId="{BE2C0129-C8C1-4D08-8F30-4424F96903AA}" srcId="{C9203E37-0572-40D0-8D8B-76A6CA06E2AC}" destId="{2850CB3B-4BE4-403A-BF0A-05C96D4F7844}" srcOrd="1" destOrd="0" parTransId="{00B6A140-6809-49D2-A821-EE500A990780}" sibTransId="{916082B7-A0CB-4B71-B5BB-6BEB2D43A79A}"/>
+    <dgm:cxn modelId="{94C2F5E4-645F-4C24-8D61-1F3638EBB51D}" type="presOf" srcId="{8801F77C-26D5-47B1-95F4-FE95A515011D}" destId="{F5B3F73C-FC25-42C5-AF3F-61226329D5CA}" srcOrd="1" destOrd="0" presId="urn:microsoft.com/office/officeart/2005/8/layout/cycle4"/>
     <dgm:cxn modelId="{CA47A5EB-EB57-4830-9AAF-4BC6F33BC754}" srcId="{44C4C1B8-05AA-4FA2-ACC6-F46A89EC3BA0}" destId="{C9203E37-0572-40D0-8D8B-76A6CA06E2AC}" srcOrd="2" destOrd="0" parTransId="{6C0714BA-DEE7-4EF2-9DE5-8DD633F8A9B9}" sibTransId="{B30CE7D8-1F74-43A0-916D-02B829239579}"/>
-    <dgm:cxn modelId="{CF7A0AD4-8770-4B75-9BAE-3455C569D149}" srcId="{7B5F6CA4-2F69-41B0-B9EC-12D98E4FB1E8}" destId="{A41D6D16-0F25-4161-9567-F7925E03290B}" srcOrd="1" destOrd="0" parTransId="{702BE0F4-C797-4E32-89BD-EF7592D59AAE}" sibTransId="{9EC15860-6876-4AA1-A96A-2E056F36DD11}"/>
-    <dgm:cxn modelId="{4CCB42BE-6D85-4B4C-86D4-B5C9330BCF5E}" type="presOf" srcId="{A5AAC5A0-C4BF-4AD9-BE87-B2BD1BA6258F}" destId="{89946784-A747-4392-88FE-CC18B7D8C75C}" srcOrd="1" destOrd="0" presId="urn:microsoft.com/office/officeart/2005/8/layout/cycle4"/>
-    <dgm:cxn modelId="{6B66C36A-A15C-46D6-A484-0B4B20E0FD02}" srcId="{44C4C1B8-05AA-4FA2-ACC6-F46A89EC3BA0}" destId="{8EF7DD04-B549-4B8D-B285-623DA6E59C30}" srcOrd="1" destOrd="0" parTransId="{C946F3FA-0DFB-44CF-9853-DFA19E73CEA9}" sibTransId="{554332B6-4611-4489-840F-73761A6D6FFA}"/>
-    <dgm:cxn modelId="{78F1E13E-D5AD-4BB9-A549-D2F649AAC3D0}" type="presOf" srcId="{44C4C1B8-05AA-4FA2-ACC6-F46A89EC3BA0}" destId="{370B2954-BC96-4CDA-81C9-5DF098110F21}" srcOrd="0" destOrd="0" presId="urn:microsoft.com/office/officeart/2005/8/layout/cycle4"/>
-    <dgm:cxn modelId="{A2F51A41-7CC7-43CE-A3CB-C235A5618C05}" type="presOf" srcId="{AC18428D-3BF2-493B-B3F7-2E46EF0600F4}" destId="{E5F8B966-BD45-4641-A194-4A7BAA57E942}" srcOrd="0" destOrd="1" presId="urn:microsoft.com/office/officeart/2005/8/layout/cycle4"/>
-    <dgm:cxn modelId="{3B75C897-A690-4336-8659-C6FC3FD12BEB}" type="presOf" srcId="{7B5F6CA4-2F69-41B0-B9EC-12D98E4FB1E8}" destId="{29E03CAE-A1B4-4CAB-B830-CB755FF6F463}" srcOrd="0" destOrd="0" presId="urn:microsoft.com/office/officeart/2005/8/layout/cycle4"/>
-    <dgm:cxn modelId="{9A0D07C7-DAE3-460C-978B-4DC79D190F61}" srcId="{44C4C1B8-05AA-4FA2-ACC6-F46A89EC3BA0}" destId="{D63F9D11-88D2-4FBB-BF92-59F1CF6D7EB4}" srcOrd="3" destOrd="0" parTransId="{6AD9CB1D-6303-4BAC-B39D-DF3C4B9400BD}" sibTransId="{F380FB87-9EE8-454A-BCCB-4BDD50579363}"/>
-    <dgm:cxn modelId="{BA835ED4-C4A1-49FA-8E67-432A8EF3003F}" srcId="{C9203E37-0572-40D0-8D8B-76A6CA06E2AC}" destId="{5C2E9E48-C3BB-472A-AAAB-81328E2FBD49}" srcOrd="0" destOrd="0" parTransId="{A3A73184-C9BC-404B-9789-2C06550FB90F}" sibTransId="{F1238347-069B-4F07-9149-C0C085998ED8}"/>
-    <dgm:cxn modelId="{38850311-885E-4604-95A6-5521006449D4}" type="presOf" srcId="{5C2E9E48-C3BB-472A-AAAB-81328E2FBD49}" destId="{5FA442E1-6AE5-4CEF-8B17-723121F89E2C}" srcOrd="0" destOrd="0" presId="urn:microsoft.com/office/officeart/2005/8/layout/cycle4"/>
-    <dgm:cxn modelId="{1A6EEB0F-112B-412D-880C-F69C54D2192C}" srcId="{8EF7DD04-B549-4B8D-B285-623DA6E59C30}" destId="{C21B34E9-0E51-4E4D-B010-5E3144BC52D3}" srcOrd="1" destOrd="0" parTransId="{D5F39B3E-2D5A-49BF-B165-5E5C773153F7}" sibTransId="{C1E07FBC-CD32-444B-AB9D-21A3BE617B33}"/>
-    <dgm:cxn modelId="{28F082D2-CD62-43F7-AE26-A17811919645}" type="presOf" srcId="{5D697BCE-FBBF-40B1-8BF3-BD802560D91F}" destId="{FDCAB2DC-AFBC-4D64-AF47-0737C719BF8B}" srcOrd="1" destOrd="0" presId="urn:microsoft.com/office/officeart/2005/8/layout/cycle4"/>
     <dgm:cxn modelId="{16AEC4F9-30B3-4817-A484-EA4E59670334}" srcId="{7B5F6CA4-2F69-41B0-B9EC-12D98E4FB1E8}" destId="{A5AAC5A0-C4BF-4AD9-BE87-B2BD1BA6258F}" srcOrd="0" destOrd="0" parTransId="{31A10A3A-F24F-456E-BD58-6FE3623FEDAC}" sibTransId="{134798DF-7C41-45CA-B64F-2504CEB8A71D}"/>
-    <dgm:cxn modelId="{C938DC34-ECA3-401B-AFC3-1C14C1CBB0FC}" type="presOf" srcId="{8801F77C-26D5-47B1-95F4-FE95A515011D}" destId="{8BA94ED0-8ABF-4943-87D1-E44A48027B75}" srcOrd="0" destOrd="0" presId="urn:microsoft.com/office/officeart/2005/8/layout/cycle4"/>
-    <dgm:cxn modelId="{585E8F97-2EFF-4530-9E88-27B1B36389C2}" type="presOf" srcId="{C21B34E9-0E51-4E4D-B010-5E3144BC52D3}" destId="{8BA94ED0-8ABF-4943-87D1-E44A48027B75}" srcOrd="0" destOrd="1" presId="urn:microsoft.com/office/officeart/2005/8/layout/cycle4"/>
-    <dgm:cxn modelId="{8A6A66B9-4B06-4783-B9FE-5414675EB6AA}" type="presOf" srcId="{C21B34E9-0E51-4E4D-B010-5E3144BC52D3}" destId="{F5B3F73C-FC25-42C5-AF3F-61226329D5CA}" srcOrd="1" destOrd="1" presId="urn:microsoft.com/office/officeart/2005/8/layout/cycle4"/>
-    <dgm:cxn modelId="{0BBA37B0-D55F-40F7-9699-25F478EDCE9D}" type="presOf" srcId="{2850CB3B-4BE4-403A-BF0A-05C96D4F7844}" destId="{5FA442E1-6AE5-4CEF-8B17-723121F89E2C}" srcOrd="0" destOrd="1" presId="urn:microsoft.com/office/officeart/2005/8/layout/cycle4"/>
-    <dgm:cxn modelId="{214110A1-71C3-45A0-9A73-88A8D878B2C4}" type="presOf" srcId="{5C2E9E48-C3BB-472A-AAAB-81328E2FBD49}" destId="{1BF485B6-A773-47C6-A4D1-39A4C4D7BF11}" srcOrd="1" destOrd="0" presId="urn:microsoft.com/office/officeart/2005/8/layout/cycle4"/>
-    <dgm:cxn modelId="{94C2F5E4-645F-4C24-8D61-1F3638EBB51D}" type="presOf" srcId="{8801F77C-26D5-47B1-95F4-FE95A515011D}" destId="{F5B3F73C-FC25-42C5-AF3F-61226329D5CA}" srcOrd="1" destOrd="0" presId="urn:microsoft.com/office/officeart/2005/8/layout/cycle4"/>
-    <dgm:cxn modelId="{6BB78974-0ED0-48F1-9983-E7DD24B0EA95}" type="presOf" srcId="{2850CB3B-4BE4-403A-BF0A-05C96D4F7844}" destId="{1BF485B6-A773-47C6-A4D1-39A4C4D7BF11}" srcOrd="1" destOrd="1" presId="urn:microsoft.com/office/officeart/2005/8/layout/cycle4"/>
-    <dgm:cxn modelId="{3C83D864-3B3B-4E69-B16F-A75E5B5A456B}" type="presOf" srcId="{D63F9D11-88D2-4FBB-BF92-59F1CF6D7EB4}" destId="{B5E4330D-365E-43B5-AC5B-1D77D60DF1E7}" srcOrd="0" destOrd="0" presId="urn:microsoft.com/office/officeart/2005/8/layout/cycle4"/>
-    <dgm:cxn modelId="{8A1DA236-93B0-4E26-9EF7-9A109F8AFBD3}" type="presOf" srcId="{5D697BCE-FBBF-40B1-8BF3-BD802560D91F}" destId="{E5F8B966-BD45-4641-A194-4A7BAA57E942}" srcOrd="0" destOrd="0" presId="urn:microsoft.com/office/officeart/2005/8/layout/cycle4"/>
-    <dgm:cxn modelId="{70B3B055-066D-4F70-9657-9C60607F4378}" type="presOf" srcId="{8EF7DD04-B549-4B8D-B285-623DA6E59C30}" destId="{95D9F98F-67AC-49A4-9785-B9FCBBF88C76}" srcOrd="0" destOrd="0" presId="urn:microsoft.com/office/officeart/2005/8/layout/cycle4"/>
-    <dgm:cxn modelId="{A7B1DA8E-3D8C-4FED-BB8A-D5D0C109ABFC}" type="presOf" srcId="{C9203E37-0572-40D0-8D8B-76A6CA06E2AC}" destId="{1899BCB1-AE2E-4FEB-ACAA-7AD3F077C35E}" srcOrd="0" destOrd="0" presId="urn:microsoft.com/office/officeart/2005/8/layout/cycle4"/>
     <dgm:cxn modelId="{0DD0588D-AA05-4E64-A38D-B6B5A25FA9F2}" type="presParOf" srcId="{370B2954-BC96-4CDA-81C9-5DF098110F21}" destId="{BFBD74D8-0595-4A99-AB59-E323C1F019A5}" srcOrd="0" destOrd="0" presId="urn:microsoft.com/office/officeart/2005/8/layout/cycle4"/>
     <dgm:cxn modelId="{B8DD2729-E590-44B3-AF25-5DF7C05DD8CE}" type="presParOf" srcId="{BFBD74D8-0595-4A99-AB59-E323C1F019A5}" destId="{320C13E6-567A-4752-AF14-4C16E1DD1711}" srcOrd="0" destOrd="0" presId="urn:microsoft.com/office/officeart/2005/8/layout/cycle4"/>
     <dgm:cxn modelId="{2972AB87-BC21-447E-B470-8B9AED61C1A7}" type="presParOf" srcId="{320C13E6-567A-4752-AF14-4C16E1DD1711}" destId="{7283E380-2BF3-48FF-A1E9-CB8123B99BCA}" srcOrd="0" destOrd="0" presId="urn:microsoft.com/office/officeart/2005/8/layout/cycle4"/>
@@ -6556,7 +6467,7 @@
             <a:spcAft>
               <a:spcPct val="15000"/>
             </a:spcAft>
-            <a:buChar char="••"/>
+            <a:buChar char="•"/>
           </a:pPr>
           <a:r>
             <a:rPr lang="pt-BR" sz="1200" kern="1200" dirty="0"/>
@@ -6574,7 +6485,7 @@
             <a:spcAft>
               <a:spcPct val="15000"/>
             </a:spcAft>
-            <a:buChar char="••"/>
+            <a:buChar char="•"/>
           </a:pPr>
           <a:r>
             <a:rPr lang="pt-BR" sz="1200" kern="1200" dirty="0"/>
@@ -6652,7 +6563,7 @@
             <a:spcAft>
               <a:spcPct val="15000"/>
             </a:spcAft>
-            <a:buChar char="••"/>
+            <a:buChar char="•"/>
           </a:pPr>
           <a:r>
             <a:rPr lang="pt-BR" sz="1200" kern="1200" dirty="0"/>
@@ -6670,7 +6581,7 @@
             <a:spcAft>
               <a:spcPct val="15000"/>
             </a:spcAft>
-            <a:buChar char="••"/>
+            <a:buChar char="•"/>
           </a:pPr>
           <a:r>
             <a:rPr lang="pt-BR" sz="1200" kern="1200" dirty="0"/>
@@ -6748,7 +6659,7 @@
             <a:spcAft>
               <a:spcPct val="15000"/>
             </a:spcAft>
-            <a:buChar char="••"/>
+            <a:buChar char="•"/>
           </a:pPr>
           <a:r>
             <a:rPr lang="pt-BR" sz="1200" kern="1200" dirty="0"/>
@@ -6766,7 +6677,7 @@
             <a:spcAft>
               <a:spcPct val="15000"/>
             </a:spcAft>
-            <a:buChar char="••"/>
+            <a:buChar char="•"/>
           </a:pPr>
           <a:r>
             <a:rPr lang="pt-BR" sz="1200" kern="1200" dirty="0"/>
@@ -6844,7 +6755,7 @@
             <a:spcAft>
               <a:spcPct val="15000"/>
             </a:spcAft>
-            <a:buChar char="••"/>
+            <a:buChar char="•"/>
           </a:pPr>
           <a:r>
             <a:rPr lang="pt-BR" sz="1200" kern="1200" dirty="0"/>
@@ -6862,7 +6773,7 @@
             <a:spcAft>
               <a:spcPct val="15000"/>
             </a:spcAft>
-            <a:buChar char="••"/>
+            <a:buChar char="•"/>
           </a:pPr>
           <a:r>
             <a:rPr lang="pt-BR" sz="1200" kern="1200" dirty="0"/>
@@ -6926,7 +6837,7 @@
         </a:bodyPr>
         <a:lstStyle/>
         <a:p>
-          <a:pPr lvl="0" algn="ctr" defTabSz="800100">
+          <a:pPr marL="0" lvl="0" indent="0" algn="ctr" defTabSz="800100">
             <a:lnSpc>
               <a:spcPct val="90000"/>
             </a:lnSpc>
@@ -6936,6 +6847,7 @@
             <a:spcAft>
               <a:spcPct val="35000"/>
             </a:spcAft>
+            <a:buNone/>
           </a:pPr>
           <a:r>
             <a:rPr lang="pt-BR" sz="1800" kern="1200" dirty="0"/>
@@ -6999,7 +6911,7 @@
         </a:bodyPr>
         <a:lstStyle/>
         <a:p>
-          <a:pPr lvl="0" algn="ctr" defTabSz="800100">
+          <a:pPr marL="0" lvl="0" indent="0" algn="ctr" defTabSz="800100">
             <a:lnSpc>
               <a:spcPct val="90000"/>
             </a:lnSpc>
@@ -7009,6 +6921,7 @@
             <a:spcAft>
               <a:spcPct val="35000"/>
             </a:spcAft>
+            <a:buNone/>
           </a:pPr>
           <a:r>
             <a:rPr lang="pt-BR" sz="1800" kern="1200" dirty="0"/>
@@ -7073,7 +6986,7 @@
         </a:bodyPr>
         <a:lstStyle/>
         <a:p>
-          <a:pPr lvl="0" algn="ctr" defTabSz="800100">
+          <a:pPr marL="0" lvl="0" indent="0" algn="ctr" defTabSz="800100">
             <a:lnSpc>
               <a:spcPct val="90000"/>
             </a:lnSpc>
@@ -7083,6 +6996,7 @@
             <a:spcAft>
               <a:spcPct val="35000"/>
             </a:spcAft>
+            <a:buNone/>
           </a:pPr>
           <a:r>
             <a:rPr lang="pt-BR" sz="1800" kern="1200" dirty="0"/>
@@ -7147,7 +7061,7 @@
         </a:bodyPr>
         <a:lstStyle/>
         <a:p>
-          <a:pPr lvl="0" algn="ctr" defTabSz="800100">
+          <a:pPr marL="0" lvl="0" indent="0" algn="ctr" defTabSz="800100">
             <a:lnSpc>
               <a:spcPct val="90000"/>
             </a:lnSpc>
@@ -7157,6 +7071,7 @@
             <a:spcAft>
               <a:spcPct val="35000"/>
             </a:spcAft>
+            <a:buNone/>
           </a:pPr>
           <a:r>
             <a:rPr lang="pt-BR" sz="1800" kern="1200" dirty="0"/>
@@ -9110,7 +9025,7 @@
           <a:p>
             <a:fld id="{CE9EE758-9CAE-433F-B796-16C56E17460B}" type="datetimeFigureOut">
               <a:rPr lang="pt-BR" smtClean="0"/>
-              <a:t>07/12/2018</a:t>
+              <a:t>08/12/2018</a:t>
             </a:fld>
             <a:endParaRPr lang="pt-BR"/>
           </a:p>
@@ -9276,7 +9191,7 @@
           <a:p>
             <a:fld id="{FBCA46B2-73EF-4C4A-BBF3-1FCF65D31F9F}" type="datetimeFigureOut">
               <a:rPr lang="pt-BR" smtClean="0"/>
-              <a:t>07/12/2018</a:t>
+              <a:t>08/12/2018</a:t>
             </a:fld>
             <a:endParaRPr lang="pt-BR"/>
           </a:p>
@@ -9807,7 +9722,7 @@
           <a:graphicData uri="http://schemas.openxmlformats.org/presentationml/2006/ole">
             <mc:AlternateContent xmlns:mc="http://schemas.openxmlformats.org/markup-compatibility/2006">
               <mc:Choice xmlns:v="urn:schemas-microsoft-com:vml" Requires="v">
-                <p:oleObj spid="_x0000_s1255" name="Slide do think-cell" r:id="rId7" imgW="270" imgH="270" progId="TCLayout.ActiveDocument.1">
+                <p:oleObj spid="_x0000_s1261" name="Slide do think-cell" r:id="rId7" imgW="270" imgH="270" progId="TCLayout.ActiveDocument.1">
                   <p:embed/>
                 </p:oleObj>
               </mc:Choice>
@@ -11715,7 +11630,7 @@
         </p:spPr>
         <p:txBody>
           <a:bodyPr>
-            <a:normAutofit fontScale="92500"/>
+            <a:normAutofit lnSpcReduction="10000"/>
           </a:bodyPr>
           <a:lstStyle/>
           <a:p>
@@ -21090,14 +21005,6 @@
   <p:clrMapOvr>
     <a:masterClrMapping/>
   </p:clrMapOvr>
-  <mc:AlternateContent xmlns:mc="http://schemas.openxmlformats.org/markup-compatibility/2006" xmlns:p14="http://schemas.microsoft.com/office/powerpoint/2010/main">
-    <mc:Choice Requires="p14">
-      <p:transition spd="slow" p14:dur="2000"/>
-    </mc:Choice>
-    <mc:Fallback xmlns="">
-      <p:transition spd="slow"/>
-    </mc:Fallback>
-  </mc:AlternateContent>
 </p:sld>
 </file>
 
@@ -29941,14 +29848,6 @@
   <p:clrMapOvr>
     <a:masterClrMapping/>
   </p:clrMapOvr>
-  <mc:AlternateContent xmlns:mc="http://schemas.openxmlformats.org/markup-compatibility/2006" xmlns:p14="http://schemas.microsoft.com/office/powerpoint/2010/main">
-    <mc:Choice Requires="p14">
-      <p:transition spd="slow" p14:dur="2000"/>
-    </mc:Choice>
-    <mc:Fallback xmlns="">
-      <p:transition spd="slow"/>
-    </mc:Fallback>
-  </mc:AlternateContent>
 </p:sld>
 </file>
 
@@ -32030,14 +31929,6 @@
   <p:clrMapOvr>
     <a:masterClrMapping/>
   </p:clrMapOvr>
-  <mc:AlternateContent xmlns:mc="http://schemas.openxmlformats.org/markup-compatibility/2006" xmlns:p14="http://schemas.microsoft.com/office/powerpoint/2010/main">
-    <mc:Choice Requires="p14">
-      <p:transition spd="slow" p14:dur="2000"/>
-    </mc:Choice>
-    <mc:Fallback xmlns="">
-      <p:transition spd="slow"/>
-    </mc:Fallback>
-  </mc:AlternateContent>
 </p:sld>
 </file>
 
@@ -32595,14 +32486,6 @@
   <p:clrMapOvr>
     <a:masterClrMapping/>
   </p:clrMapOvr>
-  <mc:AlternateContent xmlns:mc="http://schemas.openxmlformats.org/markup-compatibility/2006" xmlns:p14="http://schemas.microsoft.com/office/powerpoint/2010/main">
-    <mc:Choice Requires="p14">
-      <p:transition spd="slow" p14:dur="2000"/>
-    </mc:Choice>
-    <mc:Fallback xmlns="">
-      <p:transition spd="slow"/>
-    </mc:Fallback>
-  </mc:AlternateContent>
 </p:sld>
 </file>
 
@@ -41562,13 +41445,8 @@
             </a:pPr>
             <a:r>
               <a:rPr lang="pt-BR" sz="1600" dirty="0"/>
-              <a:t>O Excel possui uma biblioteca muito rica para analise visual de informação: </a:t>
-            </a:r>
-            <a:r>
-              <a:rPr lang="pt-BR" sz="1600" dirty="0" smtClean="0"/>
-              <a:t>Gráficos.</a:t>
-            </a:r>
-            <a:endParaRPr lang="pt-BR" sz="1600" dirty="0"/>
+              <a:t>O Excel possui uma biblioteca muito rica para analise visual de informação: Gráficos.</a:t>
+            </a:r>
           </a:p>
           <a:p>
             <a:pPr marL="0" indent="0">
@@ -41603,12 +41481,8 @@
               <a:buNone/>
             </a:pPr>
             <a:r>
-              <a:rPr lang="pt-BR" sz="1600" dirty="0" smtClean="0"/>
-              <a:t>1)Selecionar </a:t>
-            </a:r>
-            <a:r>
               <a:rPr lang="pt-BR" sz="1600" dirty="0"/>
-              <a:t>o intervalo de dados &gt; Guia Inserir&gt; Grupo Gráficos&gt; Escolher um gráfico.</a:t>
+              <a:t>1)Selecionar o intervalo de dados &gt; Guia Inserir&gt; Grupo Gráficos&gt; Escolher um gráfico.</a:t>
             </a:r>
           </a:p>
           <a:p>
@@ -41617,7 +41491,7 @@
               <a:buNone/>
             </a:pPr>
             <a:r>
-              <a:rPr lang="pt-BR" sz="1600" dirty="0" smtClean="0"/>
+              <a:rPr lang="pt-BR" sz="1600" dirty="0"/>
               <a:t>2)Selecionar dados e pressionar F11 .</a:t>
             </a:r>
           </a:p>
@@ -42137,26 +42011,25 @@
               <a:buNone/>
             </a:pPr>
             <a:r>
-              <a:rPr lang="pt-BR" sz="1600" dirty="0" smtClean="0"/>
+              <a:rPr lang="pt-BR" sz="1600" dirty="0"/>
               <a:t>Ao criar um gráfico você editar e alterar sua cor, formatação, inserir rotulo e mesmo alterar o tipo de gráfico (</a:t>
             </a:r>
             <a:r>
-              <a:rPr lang="pt-BR" sz="1600" dirty="0" err="1" smtClean="0"/>
+              <a:rPr lang="pt-BR" sz="1600" dirty="0" err="1"/>
               <a:t>Ex</a:t>
             </a:r>
             <a:r>
-              <a:rPr lang="pt-BR" sz="1600" dirty="0" smtClean="0"/>
+              <a:rPr lang="pt-BR" sz="1600" dirty="0"/>
               <a:t>: de </a:t>
             </a:r>
             <a:r>
-              <a:rPr lang="pt-BR" sz="1600" dirty="0" err="1" smtClean="0"/>
+              <a:rPr lang="pt-BR" sz="1600" dirty="0" err="1"/>
               <a:t>puizza</a:t>
             </a:r>
             <a:r>
-              <a:rPr lang="pt-BR" sz="1600" dirty="0" smtClean="0"/>
+              <a:rPr lang="pt-BR" sz="1600" dirty="0"/>
               <a:t> para Linha).</a:t>
             </a:r>
-            <a:endParaRPr lang="pt-BR" sz="1600" dirty="0"/>
           </a:p>
           <a:p>
             <a:pPr marL="0" indent="0">
@@ -42174,10 +42047,9 @@
               <a:buNone/>
             </a:pPr>
             <a:r>
-              <a:rPr lang="pt-BR" sz="1600" dirty="0" smtClean="0"/>
+              <a:rPr lang="pt-BR" sz="1600" dirty="0"/>
               <a:t>Selecionar o gráfico e clique com o botão direito do mouse.</a:t>
             </a:r>
-            <a:endParaRPr lang="pt-BR" sz="1600" dirty="0"/>
           </a:p>
           <a:p>
             <a:pPr marL="0" indent="0">
@@ -42185,7 +42057,7 @@
               <a:buNone/>
             </a:pPr>
             <a:r>
-              <a:rPr lang="pt-BR" sz="1600" dirty="0" smtClean="0"/>
+              <a:rPr lang="pt-BR" sz="1600" dirty="0"/>
               <a:t> ou Selecionar o gráfico e utilize as guias : Design e Pagina inicial.</a:t>
             </a:r>
           </a:p>
@@ -42421,7 +42293,7 @@
               </a:lnSpc>
             </a:pPr>
             <a:r>
-              <a:rPr lang="pt-BR" sz="2000" dirty="0" smtClean="0">
+              <a:rPr lang="pt-BR" sz="2000" dirty="0">
                 <a:solidFill>
                   <a:schemeClr val="bg1">
                     <a:lumMod val="65000"/>
@@ -42431,7 +42303,7 @@
               <a:t>Abrir </a:t>
             </a:r>
             <a:r>
-              <a:rPr lang="pt-BR" sz="2000" dirty="0" err="1" smtClean="0">
+              <a:rPr lang="pt-BR" sz="2000" dirty="0" err="1">
                 <a:solidFill>
                   <a:schemeClr val="bg1">
                     <a:lumMod val="65000"/>
@@ -42440,7 +42312,7 @@
               </a:rPr>
               <a:t>Txt</a:t>
             </a:r>
-            <a:endParaRPr lang="pt-BR" sz="2000" dirty="0" smtClean="0">
+            <a:endParaRPr lang="pt-BR" sz="2000" dirty="0">
               <a:solidFill>
                 <a:schemeClr val="bg1">
                   <a:lumMod val="65000"/>
@@ -42455,7 +42327,7 @@
               </a:lnSpc>
             </a:pPr>
             <a:r>
-              <a:rPr lang="pt-BR" sz="2000" dirty="0" smtClean="0">
+              <a:rPr lang="pt-BR" sz="2000" dirty="0">
                 <a:solidFill>
                   <a:schemeClr val="bg1">
                     <a:lumMod val="65000"/>
@@ -42472,7 +42344,7 @@
               </a:lnSpc>
             </a:pPr>
             <a:r>
-              <a:rPr lang="pt-BR" sz="2000" dirty="0" smtClean="0">
+              <a:rPr lang="pt-BR" sz="2000" dirty="0">
                 <a:solidFill>
                   <a:schemeClr val="bg1">
                     <a:lumMod val="65000"/>
@@ -42489,7 +42361,7 @@
               </a:lnSpc>
             </a:pPr>
             <a:r>
-              <a:rPr lang="pt-BR" sz="2000" dirty="0" smtClean="0">
+              <a:rPr lang="pt-BR" sz="2000" dirty="0">
                 <a:solidFill>
                   <a:schemeClr val="bg1">
                     <a:lumMod val="65000"/>
@@ -42506,7 +42378,7 @@
               </a:lnSpc>
             </a:pPr>
             <a:r>
-              <a:rPr lang="pt-BR" sz="2000" dirty="0" err="1" smtClean="0">
+              <a:rPr lang="pt-BR" sz="2000" dirty="0" err="1">
                 <a:solidFill>
                   <a:schemeClr val="bg1">
                     <a:lumMod val="65000"/>
@@ -42515,7 +42387,7 @@
               </a:rPr>
               <a:t>Procv</a:t>
             </a:r>
-            <a:endParaRPr lang="pt-BR" sz="2000" dirty="0" smtClean="0">
+            <a:endParaRPr lang="pt-BR" sz="2000" dirty="0">
               <a:solidFill>
                 <a:schemeClr val="bg1">
                   <a:lumMod val="65000"/>
@@ -42530,12 +42402,8 @@
               </a:lnSpc>
             </a:pPr>
             <a:r>
-              <a:rPr lang="pt-BR" sz="2000" dirty="0" smtClean="0"/>
-              <a:t>Fórmulas de Banco </a:t>
-            </a:r>
-            <a:r>
               <a:rPr lang="pt-BR" sz="2000" dirty="0"/>
-              <a:t>de </a:t>
+              <a:t>Fórmulas de Banco de </a:t>
             </a:r>
             <a:r>
               <a:rPr lang="pt-BR" sz="2000" dirty="0" err="1"/>
@@ -42558,8 +42426,8 @@
               </a:lnSpc>
             </a:pPr>
             <a:r>
-              <a:rPr lang="pt-BR" sz="2000" dirty="0" smtClean="0"/>
-              <a:t>Formulas de Texto: Concatenar</a:t>
+              <a:rPr lang="pt-BR" sz="2000" dirty="0"/>
+              <a:t>Fórmulas de Texto: Concatenar</a:t>
             </a:r>
           </a:p>
           <a:p>
@@ -42569,7 +42437,7 @@
               </a:lnSpc>
             </a:pPr>
             <a:r>
-              <a:rPr lang="pt-BR" sz="2000" dirty="0" smtClean="0"/>
+              <a:rPr lang="pt-BR" sz="2000" dirty="0"/>
               <a:t>Gráficos</a:t>
             </a:r>
           </a:p>
@@ -42580,10 +42448,9 @@
               </a:lnSpc>
             </a:pPr>
             <a:r>
-              <a:rPr lang="pt-BR" sz="2000" dirty="0" smtClean="0"/>
+              <a:rPr lang="pt-BR" sz="2000" dirty="0"/>
               <a:t>Formatação de Gráficos</a:t>
             </a:r>
-            <a:endParaRPr lang="pt-BR" sz="2000" dirty="0"/>
           </a:p>
         </p:txBody>
       </p:sp>
@@ -43027,10 +42894,9 @@
               </a:lnSpc>
             </a:pPr>
             <a:r>
-              <a:rPr lang="pt-BR" sz="2000" dirty="0" smtClean="0"/>
+              <a:rPr lang="pt-BR" sz="2000" dirty="0"/>
               <a:t>Abrir Arquivo DRE</a:t>
             </a:r>
-            <a:endParaRPr lang="pt-BR" sz="2000" dirty="0"/>
           </a:p>
         </p:txBody>
       </p:sp>
@@ -43403,7 +43269,7 @@
               <a:buNone/>
             </a:pPr>
             <a:r>
-              <a:rPr lang="pt-BR" sz="2400" b="1" dirty="0" smtClean="0">
+              <a:rPr lang="pt-BR" sz="2400" b="1" dirty="0">
                 <a:solidFill>
                   <a:schemeClr val="accent6">
                     <a:lumMod val="75000"/>
@@ -43413,14 +43279,6 @@
               </a:rPr>
               <a:t>RELEMBRAR GRAFICO</a:t>
             </a:r>
-            <a:endParaRPr lang="pt-BR" sz="2400" b="1" dirty="0">
-              <a:solidFill>
-                <a:schemeClr val="accent6">
-                  <a:lumMod val="75000"/>
-                </a:schemeClr>
-              </a:solidFill>
-              <a:latin typeface="Corbel" panose="020B0503020204020204" pitchFamily="34" charset="0"/>
-            </a:endParaRPr>
           </a:p>
         </p:txBody>
       </p:sp>
@@ -43897,21 +43755,8 @@
             </a:pPr>
             <a:r>
               <a:rPr lang="pt-BR" sz="1800" dirty="0"/>
-              <a:t>Você pode ainda </a:t>
-            </a:r>
-            <a:r>
-              <a:rPr lang="pt-BR" sz="1800" dirty="0" smtClean="0"/>
-              <a:t>selecionar </a:t>
-            </a:r>
-            <a:r>
-              <a:rPr lang="pt-BR" sz="1800" dirty="0"/>
-              <a:t>o tipo de equação : Linear, Exponencial, Potenciação, etc</a:t>
-            </a:r>
-            <a:r>
-              <a:rPr lang="pt-BR" sz="1800" dirty="0" smtClean="0"/>
-              <a:t>... inclusive fazer uma projeção futura.</a:t>
-            </a:r>
-            <a:endParaRPr lang="pt-BR" sz="1800" dirty="0"/>
+              <a:t>Você pode ainda selecionar o tipo de equação : Linear, Exponencial, Potenciação, etc... inclusive fazer uma projeção futura.</a:t>
+            </a:r>
           </a:p>
           <a:p>
             <a:pPr marL="0" indent="0">
@@ -44131,7 +43976,7 @@
               <a:buNone/>
             </a:pPr>
             <a:r>
-              <a:rPr lang="pt-BR" sz="2400" b="1" dirty="0" smtClean="0">
+              <a:rPr lang="pt-BR" sz="2400" b="1" dirty="0">
                 <a:solidFill>
                   <a:schemeClr val="accent6">
                     <a:lumMod val="75000"/>
@@ -44141,14 +43986,6 @@
               </a:rPr>
               <a:t>FUNÇÕES DE TEXTO</a:t>
             </a:r>
-            <a:endParaRPr lang="pt-BR" sz="2400" b="1" dirty="0">
-              <a:solidFill>
-                <a:schemeClr val="accent6">
-                  <a:lumMod val="75000"/>
-                </a:schemeClr>
-              </a:solidFill>
-              <a:latin typeface="Corbel" panose="020B0503020204020204" pitchFamily="34" charset="0"/>
-            </a:endParaRPr>
           </a:p>
         </p:txBody>
       </p:sp>
@@ -44328,7 +44165,7 @@
               <a:buNone/>
             </a:pPr>
             <a:r>
-              <a:rPr lang="pt-BR" sz="1800" dirty="0" smtClean="0"/>
+              <a:rPr lang="pt-BR" sz="1800" dirty="0"/>
               <a:t>Permitem extrair e combinar textos  que estão dentro das células ao invés de texto separados em cada coluna</a:t>
             </a:r>
           </a:p>
@@ -44344,12 +44181,8 @@
               <a:buNone/>
             </a:pPr>
             <a:r>
-              <a:rPr lang="pt-BR" sz="1800" dirty="0" smtClean="0"/>
-              <a:t>DIREITA =  retorna </a:t>
-            </a:r>
-            <a:r>
               <a:rPr lang="pt-BR" sz="1800" dirty="0"/>
-              <a:t>x caracteres a contar desde </a:t>
+              <a:t>DIREITA =  retorna x caracteres a contar desde </a:t>
             </a:r>
             <a:r>
               <a:rPr lang="pt-BR" sz="1800" b="1" dirty="0"/>
@@ -44370,19 +44203,11 @@
               <a:buNone/>
             </a:pPr>
             <a:r>
-              <a:rPr lang="pt-BR" sz="1800" dirty="0" smtClean="0"/>
-              <a:t>ESQUERDA = </a:t>
-            </a:r>
-            <a:r>
               <a:rPr lang="pt-BR" sz="1800" dirty="0"/>
-              <a:t>retorna x caracteres a contar </a:t>
-            </a:r>
-            <a:r>
-              <a:rPr lang="pt-BR" sz="1800" dirty="0" smtClean="0"/>
-              <a:t>desde </a:t>
-            </a:r>
-            <a:r>
-              <a:rPr lang="pt-BR" sz="1800" b="1" dirty="0" smtClean="0"/>
+              <a:t>ESQUERDA = retorna x caracteres a contar desde </a:t>
+            </a:r>
+            <a:r>
+              <a:rPr lang="pt-BR" sz="1800" b="1" dirty="0"/>
               <a:t>o primeiro </a:t>
             </a:r>
             <a:r>
@@ -44391,11 +44216,7 @@
             </a:r>
             <a:r>
               <a:rPr lang="pt-BR" sz="1800" dirty="0"/>
-              <a:t> </a:t>
-            </a:r>
-            <a:r>
-              <a:rPr lang="pt-BR" sz="1800" dirty="0" smtClean="0"/>
-              <a:t>(sentido esquerda&gt;direita)</a:t>
+              <a:t> (sentido esquerda&gt;direita)</a:t>
             </a:r>
           </a:p>
           <a:p>
@@ -44404,11 +44225,7 @@
             </a:pPr>
             <a:r>
               <a:rPr lang="pt-BR" sz="1800" dirty="0"/>
-              <a:t>EXT.TEXTO = retorna x caracteres </a:t>
-            </a:r>
-            <a:r>
-              <a:rPr lang="pt-BR" sz="1800" dirty="0" smtClean="0"/>
-              <a:t>a partir de qualquer posição que eu informar (sentido direita esquerda).</a:t>
+              <a:t>EXT.TEXTO = retorna x caracteres a partir de qualquer posição que eu informar (sentido direita esquerda).</a:t>
             </a:r>
           </a:p>
           <a:p>
@@ -44421,7 +44238,7 @@
             <a:pPr marL="0" indent="0">
               <a:buNone/>
             </a:pPr>
-            <a:endParaRPr lang="pt-BR" sz="1800" dirty="0" smtClean="0"/>
+            <a:endParaRPr lang="pt-BR" sz="1800" dirty="0"/>
           </a:p>
           <a:p>
             <a:pPr marL="0" indent="0">
@@ -44461,10 +44278,9 @@
           <a:lstStyle/>
           <a:p>
             <a:r>
-              <a:rPr lang="pt-BR" dirty="0" smtClean="0"/>
+              <a:rPr lang="pt-BR" dirty="0"/>
               <a:t>Extrai 7 caracteres começando pela direita</a:t>
             </a:r>
-            <a:endParaRPr lang="pt-BR" dirty="0"/>
           </a:p>
         </p:txBody>
       </p:sp>
@@ -44484,8 +44300,8 @@
         </p:blipFill>
         <p:spPr>
           <a:xfrm>
-            <a:off x="611449" y="3603812"/>
-            <a:ext cx="6429375" cy="1685925"/>
+            <a:off x="0" y="3513624"/>
+            <a:ext cx="7040824" cy="1846260"/>
           </a:xfrm>
           <a:prstGeom prst="rect">
             <a:avLst/>
@@ -44515,10 +44331,9 @@
           <a:lstStyle/>
           <a:p>
             <a:r>
-              <a:rPr lang="pt-BR" dirty="0" smtClean="0"/>
+              <a:rPr lang="pt-BR" dirty="0"/>
               <a:t>Extrai 4 caracteres começando pela esquerda</a:t>
             </a:r>
-            <a:endParaRPr lang="pt-BR" dirty="0"/>
           </a:p>
         </p:txBody>
       </p:sp>
@@ -44545,18 +44360,9 @@
           <a:lstStyle/>
           <a:p>
             <a:r>
-              <a:rPr lang="pt-BR" dirty="0" smtClean="0"/>
-              <a:t>A partir da 6ª posição </a:t>
-            </a:r>
-            <a:r>
               <a:rPr lang="pt-BR" dirty="0"/>
-              <a:t>Extrai 8 </a:t>
-            </a:r>
-            <a:r>
-              <a:rPr lang="pt-BR" dirty="0" smtClean="0"/>
-              <a:t>caracteres</a:t>
-            </a:r>
-            <a:endParaRPr lang="pt-BR" dirty="0"/>
+              <a:t>A partir da 6ª posição Extrai 8 caracteres</a:t>
+            </a:r>
           </a:p>
         </p:txBody>
       </p:sp>
@@ -44996,15 +44802,7 @@
             </a:pPr>
             <a:r>
               <a:rPr lang="pt-BR" sz="1800" dirty="0"/>
-              <a:t>Guia </a:t>
-            </a:r>
-            <a:r>
-              <a:rPr lang="pt-BR" sz="1800" dirty="0" smtClean="0"/>
-              <a:t>dados &gt; </a:t>
-            </a:r>
-            <a:r>
-              <a:rPr lang="pt-BR" sz="1800" dirty="0"/>
-              <a:t>Grupo Ferramenta de dados&gt; Comando Remover duplicatas.</a:t>
+              <a:t>Guia dados &gt; Grupo Ferramenta de dados&gt; Comando Remover duplicatas.</a:t>
             </a:r>
           </a:p>
           <a:p>
@@ -45685,11 +45483,7 @@
             </a:pPr>
             <a:r>
               <a:rPr lang="pt-BR" sz="1800" dirty="0"/>
-              <a:t>Calcule o preço médio de cada um dos itens acima (total de vendas dividido pela contagem de registros</a:t>
-            </a:r>
-            <a:r>
-              <a:rPr lang="pt-BR" sz="1800" dirty="0" smtClean="0"/>
-              <a:t>).</a:t>
+              <a:t>Calcule o preço médio de cada um dos itens acima (total de vendas dividido pela contagem de registros).</a:t>
             </a:r>
           </a:p>
           <a:p>
@@ -45697,7 +45491,7 @@
               <a:buFont typeface="Arial" charset="0"/>
               <a:buNone/>
             </a:pPr>
-            <a:endParaRPr lang="pt-BR" sz="1800" dirty="0" smtClean="0"/>
+            <a:endParaRPr lang="pt-BR" sz="1800" dirty="0"/>
           </a:p>
           <a:p>
             <a:pPr marL="0" indent="0">
@@ -45705,30 +45499,17 @@
               <a:buNone/>
             </a:pPr>
             <a:r>
-              <a:rPr lang="pt-BR" sz="1800" dirty="0" smtClean="0"/>
-              <a:t>Faça </a:t>
-            </a:r>
-            <a:r>
-              <a:rPr lang="pt-BR" sz="1800" dirty="0" smtClean="0"/>
-              <a:t>Gráfico </a:t>
-            </a:r>
-            <a:r>
-              <a:rPr lang="pt-BR" sz="1800" dirty="0" smtClean="0"/>
-              <a:t>de Pizza para saber qual </a:t>
-            </a:r>
-            <a:r>
-              <a:rPr lang="pt-BR" sz="1800" dirty="0" smtClean="0"/>
-              <a:t>fatia pertence a cada ESTADO. Insira  </a:t>
-            </a:r>
-            <a:r>
-              <a:rPr lang="pt-BR" sz="1800" dirty="0" err="1" smtClean="0"/>
+              <a:rPr lang="pt-BR" sz="1800" dirty="0"/>
+              <a:t>Faça Gráfico de Pizza para saber qual fatia pertence a cada ESTADO. Insira  </a:t>
+            </a:r>
+            <a:r>
+              <a:rPr lang="pt-BR" sz="1800" dirty="0" err="1"/>
               <a:t>Rotulos</a:t>
             </a:r>
             <a:r>
-              <a:rPr lang="pt-BR" sz="1800" dirty="0" smtClean="0"/>
+              <a:rPr lang="pt-BR" sz="1800" dirty="0"/>
               <a:t> de valores </a:t>
             </a:r>
-            <a:endParaRPr lang="pt-BR" sz="1800" dirty="0" smtClean="0"/>
           </a:p>
           <a:p>
             <a:pPr marL="0" indent="0">
@@ -45736,18 +45517,13 @@
               <a:buNone/>
             </a:pPr>
             <a:r>
-              <a:rPr lang="pt-BR" sz="1800" dirty="0" err="1" smtClean="0"/>
+              <a:rPr lang="pt-BR" sz="1800" dirty="0" err="1"/>
               <a:t>Grafico</a:t>
             </a:r>
             <a:r>
-              <a:rPr lang="pt-BR" sz="1800" dirty="0" smtClean="0"/>
-              <a:t> DE COLUNAS para Comparar ENTRE </a:t>
-            </a:r>
-            <a:r>
-              <a:rPr lang="pt-BR" sz="1800" dirty="0" smtClean="0"/>
-              <a:t>VENDEDORES insira rótulos com valores</a:t>
-            </a:r>
-            <a:endParaRPr lang="pt-BR" sz="1800" dirty="0" smtClean="0"/>
+              <a:rPr lang="pt-BR" sz="1800" dirty="0"/>
+              <a:t> DE COLUNAS para Comparar ENTRE VENDEDORES insira rótulos com valores</a:t>
+            </a:r>
           </a:p>
           <a:p>
             <a:pPr marL="0" indent="0">
@@ -46320,27 +46096,8 @@
                 </a:solidFill>
                 <a:latin typeface="Corbel" panose="020B0503020204020204" pitchFamily="34" charset="0"/>
               </a:rPr>
-              <a:t>ATIVIDADE </a:t>
-            </a:r>
-            <a:r>
-              <a:rPr lang="pt-BR" sz="2400" b="1" dirty="0" smtClean="0">
-                <a:solidFill>
-                  <a:schemeClr val="accent6">
-                    <a:lumMod val="75000"/>
-                  </a:schemeClr>
-                </a:solidFill>
-                <a:latin typeface="Corbel" panose="020B0503020204020204" pitchFamily="34" charset="0"/>
-              </a:rPr>
-              <a:t>– 3 continuação</a:t>
-            </a:r>
-            <a:endParaRPr lang="pt-BR" sz="2400" b="1" dirty="0">
-              <a:solidFill>
-                <a:schemeClr val="accent6">
-                  <a:lumMod val="75000"/>
-                </a:schemeClr>
-              </a:solidFill>
-              <a:latin typeface="Corbel" panose="020B0503020204020204" pitchFamily="34" charset="0"/>
-            </a:endParaRPr>
+              <a:t>ATIVIDADE – 3 continuação</a:t>
+            </a:r>
           </a:p>
         </p:txBody>
       </p:sp>
@@ -46520,42 +46277,17 @@
             </a:pPr>
             <a:r>
               <a:rPr lang="pt-BR" sz="1800" dirty="0"/>
-              <a:t>Utilize o relatório de Vendas para mostrar </a:t>
-            </a:r>
+              <a:t>Utilize o relatório de Vendas para mostrar graficamente durante todos o período, :</a:t>
+            </a:r>
+          </a:p>
+          <a:p>
+            <a:pPr marL="0" indent="0">
+              <a:buFont typeface="Arial" charset="0"/>
+              <a:buNone/>
+            </a:pPr>
             <a:r>
               <a:rPr lang="pt-BR" sz="1800" dirty="0"/>
-              <a:t>graficamente </a:t>
-            </a:r>
-            <a:r>
-              <a:rPr lang="pt-BR" sz="1800" dirty="0" smtClean="0"/>
-              <a:t>durante </a:t>
-            </a:r>
-            <a:r>
-              <a:rPr lang="pt-BR" sz="1800" dirty="0"/>
-              <a:t>todos o período, :</a:t>
-            </a:r>
-            <a:endParaRPr lang="pt-BR" sz="1800" dirty="0"/>
-          </a:p>
-          <a:p>
-            <a:pPr marL="0" indent="0">
-              <a:buFont typeface="Arial" charset="0"/>
-              <a:buNone/>
-            </a:pPr>
-            <a:r>
-              <a:rPr lang="pt-BR" sz="1800" dirty="0" smtClean="0"/>
-              <a:t>1) </a:t>
-            </a:r>
-            <a:r>
-              <a:rPr lang="pt-BR" sz="1800" dirty="0"/>
-              <a:t>Como é representado graficamente as vendas por </a:t>
-            </a:r>
-            <a:r>
-              <a:rPr lang="pt-BR" sz="1800" dirty="0" smtClean="0"/>
-              <a:t>Fornecedor ( represente com gráfico de barra</a:t>
-            </a:r>
-            <a:r>
-              <a:rPr lang="pt-BR" sz="1800" dirty="0"/>
-              <a:t>).</a:t>
+              <a:t>1) Como é representado graficamente as vendas por Fornecedor ( represente com gráfico de barra).</a:t>
             </a:r>
           </a:p>
           <a:p>
@@ -46575,15 +46307,7 @@
             </a:pPr>
             <a:r>
               <a:rPr lang="pt-BR" sz="1800" dirty="0"/>
-              <a:t>2</a:t>
-            </a:r>
-            <a:r>
-              <a:rPr lang="pt-BR" sz="1800" dirty="0" smtClean="0"/>
-              <a:t>) </a:t>
-            </a:r>
-            <a:r>
-              <a:rPr lang="pt-BR" sz="1800" dirty="0"/>
-              <a:t>Mostre graficamente a participação de cada vendedor no total de vendas.</a:t>
+              <a:t>2) Mostre graficamente a participação de cada vendedor no total de vendas.</a:t>
             </a:r>
           </a:p>
           <a:p>
@@ -47017,7 +46741,22 @@
               <a:rPr lang="pt-BR" sz="1800" dirty="0">
                 <a:latin typeface="Corbel" panose="020B0503020204020204" pitchFamily="34" charset="0"/>
               </a:rPr>
-              <a:t> extraída do sistema ERP de um relatório da contabilidade que não possui campos de descrição do Diretor responsável (arquivo Fornecedores.txt). </a:t>
+              <a:t> extraída do sistema ERP de um relatório da contabilidade que não possui campos de descrição do Diretor responsável (</a:t>
+            </a:r>
+            <a:r>
+              <a:rPr lang="pt-BR" sz="1800" dirty="0">
+                <a:highlight>
+                  <a:srgbClr val="FFFF00"/>
+                </a:highlight>
+                <a:latin typeface="Corbel" panose="020B0503020204020204" pitchFamily="34" charset="0"/>
+              </a:rPr>
+              <a:t>arquivo Fornecedores.txt</a:t>
+            </a:r>
+            <a:r>
+              <a:rPr lang="pt-BR" sz="1800" dirty="0">
+                <a:latin typeface="Corbel" panose="020B0503020204020204" pitchFamily="34" charset="0"/>
+              </a:rPr>
+              <a:t>). </a:t>
             </a:r>
           </a:p>
           <a:p>
@@ -47048,19 +46787,40 @@
               <a:rPr lang="pt-BR" sz="1800" dirty="0">
                 <a:latin typeface="Corbel" panose="020B0503020204020204" pitchFamily="34" charset="0"/>
               </a:rPr>
-              <a:t>Cruze este banco de dados com o cadastro de outro sistema (De para </a:t>
+              <a:t>Cruze este banco de dados com o cadastro de outro sistema (</a:t>
+            </a:r>
+            <a:r>
+              <a:rPr lang="pt-BR" sz="1800" dirty="0">
+                <a:highlight>
+                  <a:srgbClr val="FFFF00"/>
+                </a:highlight>
+                <a:latin typeface="Corbel" panose="020B0503020204020204" pitchFamily="34" charset="0"/>
+              </a:rPr>
+              <a:t>De para </a:t>
             </a:r>
             <a:r>
               <a:rPr lang="pt-BR" sz="1800" dirty="0" err="1">
+                <a:highlight>
+                  <a:srgbClr val="FFFF00"/>
+                </a:highlight>
                 <a:latin typeface="Corbel" panose="020B0503020204020204" pitchFamily="34" charset="0"/>
               </a:rPr>
               <a:t>CCusto</a:t>
             </a:r>
             <a:r>
               <a:rPr lang="pt-BR" sz="1800" dirty="0">
+                <a:highlight>
+                  <a:srgbClr val="FFFF00"/>
+                </a:highlight>
                 <a:latin typeface="Corbel" panose="020B0503020204020204" pitchFamily="34" charset="0"/>
               </a:rPr>
-              <a:t> X Fornecedores.xlsx) e descubra:</a:t>
+              <a:t> </a:t>
+            </a:r>
+            <a:r>
+              <a:rPr lang="pt-BR" sz="1800" dirty="0">
+                <a:latin typeface="Corbel" panose="020B0503020204020204" pitchFamily="34" charset="0"/>
+              </a:rPr>
+              <a:t>X Fornecedores.xlsx) e descubra:</a:t>
             </a:r>
           </a:p>
           <a:p>
@@ -47101,14 +46861,38 @@
               <a:rPr lang="pt-BR" sz="1800" dirty="0">
                 <a:latin typeface="Corbel" panose="020B0503020204020204" pitchFamily="34" charset="0"/>
               </a:rPr>
-              <a:t>Qual o gasto total do Diretor </a:t>
-            </a:r>
-            <a:r>
-              <a:rPr lang="pt-BR" sz="1800" dirty="0" smtClean="0">
+              <a:t>Qual o gasto total do Diretor Silvio?</a:t>
+            </a:r>
+          </a:p>
+          <a:p>
+            <a:pPr>
+              <a:buFont typeface="Arial" panose="020B0604020202020204" pitchFamily="34" charset="0"/>
+              <a:buChar char="•"/>
+            </a:pPr>
+            <a:r>
+              <a:rPr lang="pt-BR" sz="1800" b="1" dirty="0">
                 <a:latin typeface="Corbel" panose="020B0503020204020204" pitchFamily="34" charset="0"/>
               </a:rPr>
-              <a:t>Silvio?</a:t>
-            </a:r>
+              <a:t>Faça um relatório de Gasto total por Diretor (inclua diretores não identificados = vazio)</a:t>
+            </a:r>
+          </a:p>
+          <a:p>
+            <a:pPr>
+              <a:buFont typeface="Arial" panose="020B0604020202020204" pitchFamily="34" charset="0"/>
+              <a:buChar char="•"/>
+            </a:pPr>
+            <a:r>
+              <a:rPr lang="pt-BR" sz="1800" b="1" dirty="0">
+                <a:latin typeface="Corbel" panose="020B0503020204020204" pitchFamily="34" charset="0"/>
+              </a:rPr>
+              <a:t>Faça um Gráfico de Colunas de Despesa por Diretor e Outro por DENOMINAÇÃO do Centro de Custo.</a:t>
+            </a:r>
+          </a:p>
+          <a:p>
+            <a:pPr>
+              <a:buFont typeface="Arial" panose="020B0604020202020204" pitchFamily="34" charset="0"/>
+              <a:buChar char="•"/>
+            </a:pPr>
             <a:endParaRPr lang="pt-BR" sz="1800" dirty="0">
               <a:latin typeface="Corbel" panose="020B0503020204020204" pitchFamily="34" charset="0"/>
             </a:endParaRPr>
@@ -47118,140 +46902,53 @@
               <a:buFont typeface="Arial" panose="020B0604020202020204" pitchFamily="34" charset="0"/>
               <a:buChar char="•"/>
             </a:pPr>
-            <a:r>
-              <a:rPr lang="pt-BR" sz="1800" dirty="0" smtClean="0">
-                <a:latin typeface="Corbel" panose="020B0503020204020204" pitchFamily="34" charset="0"/>
-              </a:rPr>
-              <a:t>Faça </a:t>
-            </a:r>
+            <a:endParaRPr lang="pt-BR" sz="1800" dirty="0">
+              <a:latin typeface="Corbel" panose="020B0503020204020204" pitchFamily="34" charset="0"/>
+            </a:endParaRPr>
+          </a:p>
+          <a:p>
+            <a:pPr>
+              <a:buFont typeface="Arial" panose="020B0604020202020204" pitchFamily="34" charset="0"/>
+              <a:buChar char="•"/>
+            </a:pPr>
+            <a:endParaRPr lang="pt-BR" sz="1800" dirty="0">
+              <a:latin typeface="Corbel" panose="020B0503020204020204" pitchFamily="34" charset="0"/>
+            </a:endParaRPr>
+          </a:p>
+          <a:p>
+            <a:pPr marL="0" indent="0">
+              <a:buNone/>
+            </a:pPr>
             <a:r>
               <a:rPr lang="pt-BR" sz="1800" dirty="0">
                 <a:latin typeface="Corbel" panose="020B0503020204020204" pitchFamily="34" charset="0"/>
               </a:rPr>
-              <a:t>um relatório de Gasto por Diretor (inclua diretores não identificados = vazio</a:t>
-            </a:r>
-            <a:r>
-              <a:rPr lang="pt-BR" sz="1800" dirty="0" smtClean="0">
+              <a:t>Dica: Converter Todos os IDS para numero ,</a:t>
+            </a:r>
+            <a:r>
+              <a:rPr lang="pt-BR" sz="1800" dirty="0" err="1">
                 <a:latin typeface="Corbel" panose="020B0503020204020204" pitchFamily="34" charset="0"/>
               </a:rPr>
-              <a:t>)</a:t>
-            </a:r>
-          </a:p>
-          <a:p>
-            <a:pPr>
-              <a:buFont typeface="Arial" panose="020B0604020202020204" pitchFamily="34" charset="0"/>
-              <a:buChar char="•"/>
-            </a:pPr>
-            <a:r>
-              <a:rPr lang="pt-BR" sz="1800" dirty="0" smtClean="0">
-                <a:latin typeface="Corbel" panose="020B0503020204020204" pitchFamily="34" charset="0"/>
-              </a:rPr>
-              <a:t>Faça um Gráfico de Colunas de Despesa por Diretor e Outro por DENOMINAÇÃO do Centro de Custo.</a:t>
-            </a:r>
-            <a:endParaRPr lang="pt-BR" sz="1800" dirty="0">
-              <a:latin typeface="Corbel" panose="020B0503020204020204" pitchFamily="34" charset="0"/>
-            </a:endParaRPr>
-          </a:p>
-          <a:p>
-            <a:pPr>
-              <a:buFont typeface="Arial" panose="020B0604020202020204" pitchFamily="34" charset="0"/>
-              <a:buChar char="•"/>
-            </a:pPr>
-            <a:endParaRPr lang="pt-BR" sz="1800" dirty="0">
-              <a:latin typeface="Corbel" panose="020B0503020204020204" pitchFamily="34" charset="0"/>
-            </a:endParaRPr>
-          </a:p>
-          <a:p>
-            <a:pPr>
-              <a:buFont typeface="Arial" panose="020B0604020202020204" pitchFamily="34" charset="0"/>
-              <a:buChar char="•"/>
-            </a:pPr>
-            <a:endParaRPr lang="pt-BR" sz="1800" dirty="0">
-              <a:latin typeface="Corbel" panose="020B0503020204020204" pitchFamily="34" charset="0"/>
-            </a:endParaRPr>
-          </a:p>
-          <a:p>
-            <a:pPr>
-              <a:buFont typeface="Arial" panose="020B0604020202020204" pitchFamily="34" charset="0"/>
-              <a:buChar char="•"/>
-            </a:pPr>
-            <a:endParaRPr lang="pt-BR" sz="1800" dirty="0">
-              <a:latin typeface="Corbel" panose="020B0503020204020204" pitchFamily="34" charset="0"/>
-            </a:endParaRPr>
-          </a:p>
-          <a:p>
-            <a:pPr marL="0" indent="0">
-              <a:buNone/>
-            </a:pPr>
+              <a:t>PROCV,Texto</a:t>
+            </a:r>
             <a:r>
               <a:rPr lang="pt-BR" sz="1800" dirty="0">
                 <a:latin typeface="Corbel" panose="020B0503020204020204" pitchFamily="34" charset="0"/>
               </a:rPr>
-              <a:t>Dica: Converter Todos os IDS para </a:t>
-            </a:r>
-            <a:r>
-              <a:rPr lang="pt-BR" sz="1800" dirty="0" smtClean="0">
+              <a:t> para Coluna, FILTRO, Classificação, formula banco de dados (SOMASE, CONT.SE, MÉDIASE) </a:t>
+            </a:r>
+            <a:r>
+              <a:rPr lang="pt-BR" sz="1800" dirty="0" err="1">
                 <a:latin typeface="Corbel" panose="020B0503020204020204" pitchFamily="34" charset="0"/>
               </a:rPr>
-              <a:t>numero ,</a:t>
-            </a:r>
-            <a:r>
-              <a:rPr lang="pt-BR" sz="1800" dirty="0" err="1" smtClean="0">
-                <a:latin typeface="Corbel" panose="020B0503020204020204" pitchFamily="34" charset="0"/>
-              </a:rPr>
-              <a:t>PROCV,Texto</a:t>
-            </a:r>
-            <a:r>
-              <a:rPr lang="pt-BR" sz="1800" dirty="0" smtClean="0">
-                <a:latin typeface="Corbel" panose="020B0503020204020204" pitchFamily="34" charset="0"/>
-              </a:rPr>
-              <a:t> </a:t>
+              <a:t>Graficos</a:t>
             </a:r>
             <a:r>
               <a:rPr lang="pt-BR" sz="1800" dirty="0">
                 <a:latin typeface="Corbel" panose="020B0503020204020204" pitchFamily="34" charset="0"/>
               </a:rPr>
-              <a:t>para Coluna, FILTRO, </a:t>
-            </a:r>
-            <a:r>
-              <a:rPr lang="pt-BR" sz="1800" dirty="0" smtClean="0">
-                <a:latin typeface="Corbel" panose="020B0503020204020204" pitchFamily="34" charset="0"/>
-              </a:rPr>
-              <a:t>Classificação, formula </a:t>
-            </a:r>
-            <a:r>
-              <a:rPr lang="pt-BR" sz="1800" dirty="0">
-                <a:latin typeface="Corbel" panose="020B0503020204020204" pitchFamily="34" charset="0"/>
-              </a:rPr>
-              <a:t>banco de </a:t>
-            </a:r>
-            <a:r>
-              <a:rPr lang="pt-BR" sz="1800" dirty="0" smtClean="0">
-                <a:latin typeface="Corbel" panose="020B0503020204020204" pitchFamily="34" charset="0"/>
-              </a:rPr>
-              <a:t>dados (SOMASE, CONT.SE, MÉDIASE) </a:t>
-            </a:r>
-            <a:r>
-              <a:rPr lang="pt-BR" sz="1800" dirty="0" err="1" smtClean="0">
-                <a:latin typeface="Corbel" panose="020B0503020204020204" pitchFamily="34" charset="0"/>
-              </a:rPr>
-              <a:t>Graficos</a:t>
-            </a:r>
-            <a:r>
-              <a:rPr lang="pt-BR" sz="1800" dirty="0" smtClean="0">
-                <a:latin typeface="Corbel" panose="020B0503020204020204" pitchFamily="34" charset="0"/>
-              </a:rPr>
-              <a:t> </a:t>
-            </a:r>
-            <a:r>
-              <a:rPr lang="pt-BR" sz="1800" dirty="0" smtClean="0">
-                <a:latin typeface="Corbel" panose="020B0503020204020204" pitchFamily="34" charset="0"/>
-              </a:rPr>
-              <a:t>, .</a:t>
-            </a:r>
-            <a:endParaRPr lang="pt-BR" sz="1800" dirty="0">
-              <a:latin typeface="Corbel" panose="020B0503020204020204" pitchFamily="34" charset="0"/>
-            </a:endParaRPr>
+              <a:t> , .</a:t>
+            </a:r>
           </a:p>
           <a:p>
             <a:pPr marL="0" indent="0">
@@ -47703,7 +47400,7 @@
               <a:buNone/>
             </a:pPr>
             <a:r>
-              <a:rPr lang="pt-BR" sz="1800" dirty="0" smtClean="0"/>
+              <a:rPr lang="pt-BR" sz="1800" dirty="0"/>
               <a:t>Uma lista personalizada permite todos os benefícios que já vimos sobre a facilidade com alça de preenchimento e classificação similar ao comportamento com dias da semana e meses do ano ou números sequencias.</a:t>
             </a:r>
           </a:p>
@@ -47712,7 +47409,7 @@
               <a:buFont typeface="Arial" charset="0"/>
               <a:buNone/>
             </a:pPr>
-            <a:endParaRPr lang="pt-BR" sz="1800" dirty="0" smtClean="0"/>
+            <a:endParaRPr lang="pt-BR" sz="1800" dirty="0"/>
           </a:p>
           <a:p>
             <a:pPr marL="0" indent="0">
@@ -47720,17 +47417,16 @@
               <a:buNone/>
             </a:pPr>
             <a:r>
-              <a:rPr lang="pt-BR" sz="1800" dirty="0" smtClean="0"/>
+              <a:rPr lang="pt-BR" sz="1800" dirty="0"/>
               <a:t>Para criar sua lista personalizadas, selecione a lista personalizada desejada e vá no caminho:</a:t>
             </a:r>
-            <a:endParaRPr lang="pt-BR" sz="1800" dirty="0" smtClean="0"/>
           </a:p>
           <a:p>
             <a:pPr marL="0" indent="0">
               <a:buFont typeface="Arial" charset="0"/>
               <a:buNone/>
             </a:pPr>
-            <a:endParaRPr lang="pt-BR" sz="1800" dirty="0" smtClean="0"/>
+            <a:endParaRPr lang="pt-BR" sz="1800" dirty="0"/>
           </a:p>
           <a:p>
             <a:pPr marL="0" indent="0">
@@ -47738,12 +47434,8 @@
               <a:buNone/>
             </a:pPr>
             <a:r>
-              <a:rPr lang="pt-BR" sz="1800" dirty="0" smtClean="0"/>
-              <a:t>Guia </a:t>
-            </a:r>
-            <a:r>
               <a:rPr lang="pt-BR" sz="1800" dirty="0"/>
-              <a:t>Arquivos, Menu Opções, Menu Avançado, Espaço Geral, Editar Lista Personalizada, Selecionar lista e clicar em Importar.</a:t>
+              <a:t>Guia Arquivos, Menu Opções, Menu Avançado, Espaço Geral, Editar Lista Personalizada, Selecionar lista e clicar em Importar.</a:t>
             </a:r>
           </a:p>
           <a:p>
@@ -47971,7 +47663,7 @@
               <a:buNone/>
             </a:pPr>
             <a:r>
-              <a:rPr lang="pt-BR" sz="2400" b="1" dirty="0" smtClean="0">
+              <a:rPr lang="pt-BR" sz="2400" b="1" dirty="0">
                 <a:solidFill>
                   <a:schemeClr val="accent6">
                     <a:lumMod val="75000"/>
@@ -47981,14 +47673,6 @@
               </a:rPr>
               <a:t>ATIVIDADE - 5</a:t>
             </a:r>
-            <a:endParaRPr lang="pt-BR" sz="2400" b="1" dirty="0">
-              <a:solidFill>
-                <a:schemeClr val="accent6">
-                  <a:lumMod val="75000"/>
-                </a:schemeClr>
-              </a:solidFill>
-              <a:latin typeface="Corbel" panose="020B0503020204020204" pitchFamily="34" charset="0"/>
-            </a:endParaRPr>
           </a:p>
         </p:txBody>
       </p:sp>
@@ -48185,15 +47869,7 @@
             </a:pPr>
             <a:r>
               <a:rPr lang="pt-BR" sz="1800" dirty="0"/>
-              <a:t>O Banco de dados a pagar </a:t>
-            </a:r>
-            <a:r>
-              <a:rPr lang="pt-BR" sz="1800" dirty="0" smtClean="0"/>
-              <a:t>está </a:t>
-            </a:r>
-            <a:r>
-              <a:rPr lang="pt-BR" sz="1800" dirty="0"/>
-              <a:t>contido no arquivo </a:t>
+              <a:t>O Banco de dados a pagar está contido no arquivo </a:t>
             </a:r>
             <a:r>
               <a:rPr lang="pt-BR" sz="1800" b="1" u="sng" dirty="0"/>
@@ -48214,11 +47890,7 @@
             </a:pPr>
             <a:r>
               <a:rPr lang="pt-BR" sz="1800" dirty="0"/>
-              <a:t>A empresa possui apenas 400 MIL REAIS  em caixa para realizar os pagamentos. Através das diretrizes de prioridades, separe todos os boletos que precisam ser pagos em um arquivo apartado</a:t>
-            </a:r>
-            <a:r>
-              <a:rPr lang="pt-BR" sz="1800" dirty="0" smtClean="0"/>
-              <a:t>.</a:t>
+              <a:t>A empresa possui apenas 400 MIL REAIS  em caixa para realizar os pagamentos. Através das diretrizes de prioridades, separe todos os boletos que precisam ser pagos em um arquivo apartado.</a:t>
             </a:r>
           </a:p>
           <a:p>
@@ -48240,15 +47912,51 @@
               <a:buNone/>
             </a:pPr>
             <a:r>
-              <a:rPr lang="pt-BR" sz="1800" dirty="0" smtClean="0"/>
+              <a:rPr lang="pt-BR" sz="1800" dirty="0"/>
+              <a:t>DESAFIO: tente maximizar a quantidade de Notas/Registro que serão pagos: ou seja, </a:t>
+            </a:r>
+          </a:p>
+          <a:p>
+            <a:pPr marL="0" indent="0" algn="just">
+              <a:lnSpc>
+                <a:spcPct val="150000"/>
+              </a:lnSpc>
+              <a:buFont typeface="Arial" charset="0"/>
+              <a:buNone/>
+            </a:pPr>
+            <a:r>
+              <a:rPr lang="pt-BR" sz="1800" dirty="0"/>
+              <a:t> - Pago poucas notas de alto valor ou muitas de pouco valor?</a:t>
+            </a:r>
+          </a:p>
+          <a:p>
+            <a:pPr marL="0" indent="0" algn="just">
+              <a:lnSpc>
+                <a:spcPct val="150000"/>
+              </a:lnSpc>
+              <a:buFont typeface="Arial" charset="0"/>
+              <a:buNone/>
+            </a:pPr>
+            <a:endParaRPr lang="pt-BR" sz="1800" dirty="0"/>
+          </a:p>
+          <a:p>
+            <a:pPr marL="0" indent="0" algn="just">
+              <a:lnSpc>
+                <a:spcPct val="150000"/>
+              </a:lnSpc>
+              <a:buFont typeface="Arial" charset="0"/>
+              <a:buNone/>
+            </a:pPr>
+            <a:r>
+              <a:rPr lang="pt-BR" sz="1800" dirty="0"/>
               <a:t>Dica: Formulas de Texto, </a:t>
             </a:r>
             <a:r>
-              <a:rPr lang="pt-BR" sz="1800" dirty="0" err="1" smtClean="0"/>
+              <a:rPr lang="pt-BR" sz="1800" dirty="0" err="1"/>
               <a:t>Procv</a:t>
             </a:r>
             <a:r>
-              <a:rPr lang="pt-BR" sz="1800" dirty="0" smtClean="0"/>
+              <a:rPr lang="pt-BR" sz="1800" dirty="0"/>
               <a:t>, Classificação, soma, lista personalizada.</a:t>
             </a:r>
           </a:p>
@@ -48270,7 +47978,7 @@
               <a:buFont typeface="Arial" charset="0"/>
               <a:buNone/>
             </a:pPr>
-            <a:endParaRPr lang="pt-BR" sz="1800" dirty="0" smtClean="0"/>
+            <a:endParaRPr lang="pt-BR" sz="1800" dirty="0"/>
           </a:p>
           <a:p>
             <a:pPr marL="0" indent="0" algn="just">
@@ -48493,7 +48201,7 @@
               <a:buNone/>
             </a:pPr>
             <a:r>
-              <a:rPr lang="pt-BR" sz="2400" b="1" dirty="0" smtClean="0">
+              <a:rPr lang="pt-BR" sz="2400" b="1" dirty="0">
                 <a:solidFill>
                   <a:schemeClr val="accent6">
                     <a:lumMod val="75000"/>
@@ -48503,14 +48211,6 @@
               </a:rPr>
               <a:t>FUNÇÃO SE</a:t>
             </a:r>
-            <a:endParaRPr lang="pt-BR" sz="2400" b="1" dirty="0">
-              <a:solidFill>
-                <a:schemeClr val="accent6">
-                  <a:lumMod val="75000"/>
-                </a:schemeClr>
-              </a:solidFill>
-              <a:latin typeface="Corbel" panose="020B0503020204020204" pitchFamily="34" charset="0"/>
-            </a:endParaRPr>
           </a:p>
         </p:txBody>
       </p:sp>
@@ -48525,7 +48225,7 @@
         <p:spPr>
           <a:xfrm>
             <a:off x="692971" y="1913794"/>
-            <a:ext cx="10896600" cy="2817812"/>
+            <a:ext cx="10896600" cy="3014160"/>
           </a:xfrm>
         </p:spPr>
         <p:txBody>
@@ -48709,20 +48409,7 @@
                 <a:ea typeface="Segoe UI" pitchFamily="34" charset="0"/>
                 <a:cs typeface="Segoe UI" panose="020B0502040204020203" pitchFamily="34" charset="0"/>
               </a:rPr>
-              <a:t>Instruções SE possibilitam que você faça comparações lógicas entre condições. Uma instrução SE geralmente diz o seguinte: se uma condição é verdadeira, faça tal coisa; caso contrário, faça outra coisa. As fórmulas podem retornar texto, valores ou ainda mais cálculos</a:t>
-            </a:r>
-            <a:r>
-              <a:rPr lang="pt-br" sz="1800" kern="0" dirty="0" smtClean="0">
-                <a:solidFill>
-                  <a:schemeClr val="bg2">
-                    <a:lumMod val="25000"/>
-                  </a:schemeClr>
-                </a:solidFill>
-                <a:latin typeface="Segoe UI" panose="020B0502040204020203" pitchFamily="34" charset="0"/>
-                <a:ea typeface="Segoe UI" pitchFamily="34" charset="0"/>
-                <a:cs typeface="Segoe UI" panose="020B0502040204020203" pitchFamily="34" charset="0"/>
-              </a:rPr>
-              <a:t>.</a:t>
+              <a:t>Instruções SE possibilitam que você faça comparações lógicas entre condições. Uma instrução SE geralmente diz o seguinte: se uma condição é verdadeira, faça tal coisa; caso contrário, faça outra coisa. As fórmulas podem retornar texto, valores ou ainda mais cálculos.</a:t>
             </a:r>
           </a:p>
           <a:p>
@@ -48740,7 +48427,7 @@
               <a:defRPr/>
             </a:pPr>
             <a:r>
-              <a:rPr lang="pt-BR" sz="1800" kern="0" dirty="0" smtClean="0">
+              <a:rPr lang="pt-BR" sz="1800" kern="0" dirty="0">
                 <a:solidFill>
                   <a:schemeClr val="bg2">
                     <a:lumMod val="25000"/>
@@ -48768,7 +48455,7 @@
               <a:defRPr/>
             </a:pPr>
             <a:r>
-              <a:rPr lang="pt-BR" sz="1800" kern="0" dirty="0" smtClean="0">
+              <a:rPr lang="pt-BR" sz="1800" kern="0" dirty="0">
                 <a:solidFill>
                   <a:schemeClr val="bg2">
                     <a:lumMod val="25000"/>
@@ -48821,7 +48508,7 @@
               <a:defRPr/>
             </a:pPr>
             <a:r>
-              <a:rPr lang="pt-BR" sz="1800" kern="0" dirty="0" smtClean="0">
+              <a:rPr lang="pt-BR" sz="1800" kern="0" dirty="0">
                 <a:solidFill>
                   <a:schemeClr val="bg2">
                     <a:lumMod val="25000"/>
@@ -48873,7 +48560,7 @@
               <a:buNone/>
               <a:defRPr/>
             </a:pPr>
-            <a:endParaRPr lang="pt-br" sz="1800" kern="0" dirty="0" smtClean="0">
+            <a:endParaRPr lang="pt-br" sz="1800" kern="0" dirty="0">
               <a:solidFill>
                 <a:schemeClr val="bg2">
                   <a:lumMod val="25000"/>
@@ -49164,7 +48851,7 @@
               <a:buNone/>
             </a:pPr>
             <a:r>
-              <a:rPr lang="pt-BR" sz="2400" b="1" dirty="0" smtClean="0">
+              <a:rPr lang="pt-BR" sz="2400" b="1" dirty="0">
                 <a:solidFill>
                   <a:schemeClr val="accent6">
                     <a:lumMod val="75000"/>
@@ -49174,14 +48861,6 @@
               </a:rPr>
               <a:t>ATIVIDADE - 5</a:t>
             </a:r>
-            <a:endParaRPr lang="pt-BR" sz="2400" b="1" dirty="0">
-              <a:solidFill>
-                <a:schemeClr val="accent6">
-                  <a:lumMod val="75000"/>
-                </a:schemeClr>
-              </a:solidFill>
-              <a:latin typeface="Corbel" panose="020B0503020204020204" pitchFamily="34" charset="0"/>
-            </a:endParaRPr>
           </a:p>
         </p:txBody>
       </p:sp>
@@ -49364,15 +49043,15 @@
               <a:buNone/>
             </a:pPr>
             <a:r>
-              <a:rPr lang="pt-BR" sz="1800" dirty="0" smtClean="0"/>
+              <a:rPr lang="pt-BR" sz="1800" dirty="0"/>
               <a:t>Arquivo “</a:t>
             </a:r>
             <a:r>
-              <a:rPr lang="pt-BR" sz="1800" dirty="0" err="1" smtClean="0"/>
+              <a:rPr lang="pt-BR" sz="1800" dirty="0" err="1"/>
               <a:t>exercicios</a:t>
             </a:r>
             <a:r>
-              <a:rPr lang="pt-BR" sz="1800" dirty="0" smtClean="0"/>
+              <a:rPr lang="pt-BR" sz="1800" dirty="0"/>
               <a:t> se”</a:t>
             </a:r>
           </a:p>
@@ -49394,7 +49073,7 @@
               <a:buFont typeface="Arial" charset="0"/>
               <a:buNone/>
             </a:pPr>
-            <a:endParaRPr lang="pt-BR" sz="1800" dirty="0" smtClean="0"/>
+            <a:endParaRPr lang="pt-BR" sz="1800" dirty="0"/>
           </a:p>
           <a:p>
             <a:pPr marL="0" indent="0" algn="just">
@@ -49411,7 +49090,7 @@
     </p:spTree>
     <p:extLst>
       <p:ext uri="{BB962C8B-B14F-4D97-AF65-F5344CB8AC3E}">
-        <p14:creationId xmlns:p14="http://schemas.microsoft.com/office/powerpoint/2010/main" val="1597206184"/>
+        <p14:creationId xmlns:p14="http://schemas.microsoft.com/office/powerpoint/2010/main" val="2595831149"/>
       </p:ext>
     </p:extLst>
   </p:cSld>
@@ -49617,7 +49296,7 @@
               <a:buNone/>
             </a:pPr>
             <a:r>
-              <a:rPr lang="pt-BR" sz="2400" b="1" dirty="0" smtClean="0">
+              <a:rPr lang="pt-BR" sz="2400" b="1" dirty="0">
                 <a:solidFill>
                   <a:schemeClr val="accent6">
                     <a:lumMod val="75000"/>
@@ -49627,14 +49306,6 @@
               </a:rPr>
               <a:t>ATIVIDADE - 6</a:t>
             </a:r>
-            <a:endParaRPr lang="pt-BR" sz="2400" b="1" dirty="0">
-              <a:solidFill>
-                <a:schemeClr val="accent6">
-                  <a:lumMod val="75000"/>
-                </a:schemeClr>
-              </a:solidFill>
-              <a:latin typeface="Corbel" panose="020B0503020204020204" pitchFamily="34" charset="0"/>
-            </a:endParaRPr>
           </a:p>
         </p:txBody>
       </p:sp>
@@ -49817,7 +49488,7 @@
               <a:buNone/>
             </a:pPr>
             <a:r>
-              <a:rPr lang="pt-BR" sz="1800" dirty="0" smtClean="0"/>
+              <a:rPr lang="pt-BR" sz="1800" dirty="0"/>
               <a:t>Arquivo Tabela de Vendedores</a:t>
             </a:r>
           </a:p>
@@ -49840,7 +49511,7 @@
               <a:buNone/>
             </a:pPr>
             <a:r>
-              <a:rPr lang="pt-BR" sz="1800" dirty="0" smtClean="0"/>
+              <a:rPr lang="pt-BR" sz="1800" dirty="0"/>
               <a:t>Refaça o calculo de comissionamento de vendas de modo que seja possível simular rapidamente qual o gasto com comissão caso sejam alteradas as opções do tipo de comissionamento.</a:t>
             </a:r>
           </a:p>
@@ -49852,7 +49523,7 @@
               <a:buFont typeface="Arial" charset="0"/>
               <a:buNone/>
             </a:pPr>
-            <a:endParaRPr lang="pt-BR" sz="1800" dirty="0" smtClean="0"/>
+            <a:endParaRPr lang="pt-BR" sz="1800" dirty="0"/>
           </a:p>
           <a:p>
             <a:pPr marL="0" indent="0" algn="just">
@@ -49880,6 +49551,537 @@
 </file>
 
 <file path=ppt/slides/slide77.xml><?xml version="1.0" encoding="utf-8"?>
+<p:sld xmlns:a="http://schemas.openxmlformats.org/drawingml/2006/main" xmlns:r="http://schemas.openxmlformats.org/officeDocument/2006/relationships" xmlns:p="http://schemas.openxmlformats.org/presentationml/2006/main">
+  <p:cSld>
+    <p:spTree>
+      <p:nvGrpSpPr>
+        <p:cNvPr id="1" name=""/>
+        <p:cNvGrpSpPr/>
+        <p:nvPr/>
+      </p:nvGrpSpPr>
+      <p:grpSpPr>
+        <a:xfrm>
+          <a:off x="0" y="0"/>
+          <a:ext cx="0" cy="0"/>
+          <a:chOff x="0" y="0"/>
+          <a:chExt cx="0" cy="0"/>
+        </a:xfrm>
+      </p:grpSpPr>
+      <p:sp>
+        <p:nvSpPr>
+          <p:cNvPr id="6" name="Subtítulo 2"/>
+          <p:cNvSpPr txBox="1">
+            <a:spLocks/>
+          </p:cNvSpPr>
+          <p:nvPr/>
+        </p:nvSpPr>
+        <p:spPr>
+          <a:xfrm>
+            <a:off x="210670" y="153054"/>
+            <a:ext cx="10058400" cy="718315"/>
+          </a:xfrm>
+        </p:spPr>
+        <p:txBody>
+          <a:bodyPr>
+            <a:noAutofit/>
+          </a:bodyPr>
+          <a:lstStyle>
+            <a:lvl1pPr marL="342900" indent="-342900" algn="l" rtl="0" eaLnBrk="0" fontAlgn="base" hangingPunct="0">
+              <a:spcBef>
+                <a:spcPct val="20000"/>
+              </a:spcBef>
+              <a:spcAft>
+                <a:spcPct val="0"/>
+              </a:spcAft>
+              <a:buFont typeface="Arial" charset="0"/>
+              <a:buChar char="•"/>
+              <a:defRPr lang="pt-BR" sz="2800" kern="1200" dirty="0">
+                <a:solidFill>
+                  <a:schemeClr val="tx1"/>
+                </a:solidFill>
+                <a:latin typeface="+mn-lt"/>
+                <a:ea typeface="+mn-ea"/>
+                <a:cs typeface="+mn-cs"/>
+              </a:defRPr>
+            </a:lvl1pPr>
+            <a:lvl2pPr marL="742950" indent="-285750" algn="l" rtl="0" eaLnBrk="0" fontAlgn="base" hangingPunct="0">
+              <a:spcBef>
+                <a:spcPct val="20000"/>
+              </a:spcBef>
+              <a:spcAft>
+                <a:spcPct val="0"/>
+              </a:spcAft>
+              <a:buFont typeface="Arial" charset="0"/>
+              <a:buChar char="•"/>
+              <a:defRPr lang="pt-BR" sz="2400" kern="1200" dirty="0">
+                <a:solidFill>
+                  <a:schemeClr val="tx1"/>
+                </a:solidFill>
+                <a:latin typeface="+mn-lt"/>
+                <a:ea typeface="+mn-ea"/>
+                <a:cs typeface="+mn-cs"/>
+              </a:defRPr>
+            </a:lvl2pPr>
+            <a:lvl3pPr marL="1143000" indent="-228600" algn="l" rtl="0" eaLnBrk="0" fontAlgn="base" hangingPunct="0">
+              <a:spcBef>
+                <a:spcPct val="20000"/>
+              </a:spcBef>
+              <a:spcAft>
+                <a:spcPct val="0"/>
+              </a:spcAft>
+              <a:buFont typeface="Arial" charset="0"/>
+              <a:buChar char="•"/>
+              <a:defRPr lang="pt-BR" sz="2400" kern="1200" dirty="0">
+                <a:solidFill>
+                  <a:schemeClr val="tx1"/>
+                </a:solidFill>
+                <a:latin typeface="+mn-lt"/>
+                <a:ea typeface="+mn-ea"/>
+                <a:cs typeface="+mn-cs"/>
+              </a:defRPr>
+            </a:lvl3pPr>
+            <a:lvl4pPr marL="1600200" indent="-228600" algn="l" rtl="0" eaLnBrk="0" fontAlgn="base" hangingPunct="0">
+              <a:spcBef>
+                <a:spcPct val="20000"/>
+              </a:spcBef>
+              <a:spcAft>
+                <a:spcPct val="0"/>
+              </a:spcAft>
+              <a:buFont typeface="Arial" charset="0"/>
+              <a:buChar char="•"/>
+              <a:defRPr lang="pt-BR" sz="2000" kern="1200" dirty="0">
+                <a:solidFill>
+                  <a:schemeClr val="tx1"/>
+                </a:solidFill>
+                <a:latin typeface="+mn-lt"/>
+                <a:ea typeface="+mn-ea"/>
+                <a:cs typeface="+mn-cs"/>
+              </a:defRPr>
+            </a:lvl4pPr>
+            <a:lvl5pPr marL="2057400" indent="-228600" algn="l" rtl="0" eaLnBrk="0" fontAlgn="base" hangingPunct="0">
+              <a:spcBef>
+                <a:spcPct val="20000"/>
+              </a:spcBef>
+              <a:spcAft>
+                <a:spcPct val="0"/>
+              </a:spcAft>
+              <a:buFont typeface="Arial" charset="0"/>
+              <a:buChar char="•"/>
+              <a:defRPr lang="pt-BR" sz="2000" kern="1200" dirty="0">
+                <a:solidFill>
+                  <a:schemeClr val="tx1"/>
+                </a:solidFill>
+                <a:latin typeface="+mn-lt"/>
+                <a:ea typeface="+mn-ea"/>
+                <a:cs typeface="+mn-cs"/>
+              </a:defRPr>
+            </a:lvl5pPr>
+            <a:lvl6pPr marL="2514600" indent="-228600" algn="l" defTabSz="914400" rtl="0" eaLnBrk="1" latinLnBrk="0" hangingPunct="1">
+              <a:spcBef>
+                <a:spcPct val="20000"/>
+              </a:spcBef>
+              <a:buFont typeface="Arial" pitchFamily="34" charset="0"/>
+              <a:buChar char="•"/>
+              <a:defRPr sz="2000" kern="1200">
+                <a:solidFill>
+                  <a:schemeClr val="tx1"/>
+                </a:solidFill>
+                <a:latin typeface="+mn-lt"/>
+                <a:ea typeface="+mn-ea"/>
+                <a:cs typeface="+mn-cs"/>
+              </a:defRPr>
+            </a:lvl6pPr>
+            <a:lvl7pPr marL="2971800" indent="-228600" algn="l" defTabSz="914400" rtl="0" eaLnBrk="1" latinLnBrk="0" hangingPunct="1">
+              <a:spcBef>
+                <a:spcPct val="20000"/>
+              </a:spcBef>
+              <a:buFont typeface="Arial" pitchFamily="34" charset="0"/>
+              <a:buChar char="•"/>
+              <a:defRPr sz="2000" kern="1200">
+                <a:solidFill>
+                  <a:schemeClr val="tx1"/>
+                </a:solidFill>
+                <a:latin typeface="+mn-lt"/>
+                <a:ea typeface="+mn-ea"/>
+                <a:cs typeface="+mn-cs"/>
+              </a:defRPr>
+            </a:lvl7pPr>
+            <a:lvl8pPr marL="3429000" indent="-228600" algn="l" defTabSz="914400" rtl="0" eaLnBrk="1" latinLnBrk="0" hangingPunct="1">
+              <a:spcBef>
+                <a:spcPct val="20000"/>
+              </a:spcBef>
+              <a:buFont typeface="Arial" pitchFamily="34" charset="0"/>
+              <a:buChar char="•"/>
+              <a:defRPr sz="2000" kern="1200">
+                <a:solidFill>
+                  <a:schemeClr val="tx1"/>
+                </a:solidFill>
+                <a:latin typeface="+mn-lt"/>
+                <a:ea typeface="+mn-ea"/>
+                <a:cs typeface="+mn-cs"/>
+              </a:defRPr>
+            </a:lvl8pPr>
+            <a:lvl9pPr marL="3886200" indent="-228600" algn="l" defTabSz="914400" rtl="0" eaLnBrk="1" latinLnBrk="0" hangingPunct="1">
+              <a:spcBef>
+                <a:spcPct val="20000"/>
+              </a:spcBef>
+              <a:buFont typeface="Arial" pitchFamily="34" charset="0"/>
+              <a:buChar char="•"/>
+              <a:defRPr sz="2000" kern="1200">
+                <a:solidFill>
+                  <a:schemeClr val="tx1"/>
+                </a:solidFill>
+                <a:latin typeface="+mn-lt"/>
+                <a:ea typeface="+mn-ea"/>
+                <a:cs typeface="+mn-cs"/>
+              </a:defRPr>
+            </a:lvl9pPr>
+          </a:lstStyle>
+          <a:p>
+            <a:pPr marL="0" indent="0">
+              <a:lnSpc>
+                <a:spcPct val="150000"/>
+              </a:lnSpc>
+              <a:buFont typeface="Arial" charset="0"/>
+              <a:buNone/>
+            </a:pPr>
+            <a:r>
+              <a:rPr lang="pt-BR" sz="2400" b="1" dirty="0">
+                <a:solidFill>
+                  <a:schemeClr val="accent6">
+                    <a:lumMod val="75000"/>
+                  </a:schemeClr>
+                </a:solidFill>
+                <a:latin typeface="Corbel" panose="020B0503020204020204" pitchFamily="34" charset="0"/>
+              </a:rPr>
+              <a:t>ATIVIDADE – 6  -Continuação</a:t>
+            </a:r>
+          </a:p>
+        </p:txBody>
+      </p:sp>
+      <p:sp>
+        <p:nvSpPr>
+          <p:cNvPr id="11" name="Subtítulo 1"/>
+          <p:cNvSpPr txBox="1">
+            <a:spLocks/>
+          </p:cNvSpPr>
+          <p:nvPr/>
+        </p:nvSpPr>
+        <p:spPr>
+          <a:xfrm>
+            <a:off x="692971" y="1913794"/>
+            <a:ext cx="10896600" cy="2817812"/>
+          </a:xfrm>
+        </p:spPr>
+        <p:txBody>
+          <a:bodyPr>
+            <a:noAutofit/>
+          </a:bodyPr>
+          <a:lstStyle>
+            <a:lvl1pPr marL="342900" indent="-342900" algn="l" rtl="0" eaLnBrk="0" fontAlgn="base" hangingPunct="0">
+              <a:spcBef>
+                <a:spcPct val="20000"/>
+              </a:spcBef>
+              <a:spcAft>
+                <a:spcPct val="0"/>
+              </a:spcAft>
+              <a:buFont typeface="Arial" charset="0"/>
+              <a:buChar char="•"/>
+              <a:defRPr lang="pt-BR" sz="2800" kern="1200" dirty="0">
+                <a:solidFill>
+                  <a:schemeClr val="tx1"/>
+                </a:solidFill>
+                <a:latin typeface="+mn-lt"/>
+                <a:ea typeface="+mn-ea"/>
+                <a:cs typeface="+mn-cs"/>
+              </a:defRPr>
+            </a:lvl1pPr>
+            <a:lvl2pPr marL="742950" indent="-285750" algn="l" rtl="0" eaLnBrk="0" fontAlgn="base" hangingPunct="0">
+              <a:spcBef>
+                <a:spcPct val="20000"/>
+              </a:spcBef>
+              <a:spcAft>
+                <a:spcPct val="0"/>
+              </a:spcAft>
+              <a:buFont typeface="Arial" charset="0"/>
+              <a:buChar char="•"/>
+              <a:defRPr lang="pt-BR" sz="2400" kern="1200" dirty="0">
+                <a:solidFill>
+                  <a:schemeClr val="tx1"/>
+                </a:solidFill>
+                <a:latin typeface="+mn-lt"/>
+                <a:ea typeface="+mn-ea"/>
+                <a:cs typeface="+mn-cs"/>
+              </a:defRPr>
+            </a:lvl2pPr>
+            <a:lvl3pPr marL="1143000" indent="-228600" algn="l" rtl="0" eaLnBrk="0" fontAlgn="base" hangingPunct="0">
+              <a:spcBef>
+                <a:spcPct val="20000"/>
+              </a:spcBef>
+              <a:spcAft>
+                <a:spcPct val="0"/>
+              </a:spcAft>
+              <a:buFont typeface="Arial" charset="0"/>
+              <a:buChar char="•"/>
+              <a:defRPr lang="pt-BR" sz="2400" kern="1200" dirty="0">
+                <a:solidFill>
+                  <a:schemeClr val="tx1"/>
+                </a:solidFill>
+                <a:latin typeface="+mn-lt"/>
+                <a:ea typeface="+mn-ea"/>
+                <a:cs typeface="+mn-cs"/>
+              </a:defRPr>
+            </a:lvl3pPr>
+            <a:lvl4pPr marL="1600200" indent="-228600" algn="l" rtl="0" eaLnBrk="0" fontAlgn="base" hangingPunct="0">
+              <a:spcBef>
+                <a:spcPct val="20000"/>
+              </a:spcBef>
+              <a:spcAft>
+                <a:spcPct val="0"/>
+              </a:spcAft>
+              <a:buFont typeface="Arial" charset="0"/>
+              <a:buChar char="•"/>
+              <a:defRPr lang="pt-BR" sz="2000" kern="1200" dirty="0">
+                <a:solidFill>
+                  <a:schemeClr val="tx1"/>
+                </a:solidFill>
+                <a:latin typeface="+mn-lt"/>
+                <a:ea typeface="+mn-ea"/>
+                <a:cs typeface="+mn-cs"/>
+              </a:defRPr>
+            </a:lvl4pPr>
+            <a:lvl5pPr marL="2057400" indent="-228600" algn="l" rtl="0" eaLnBrk="0" fontAlgn="base" hangingPunct="0">
+              <a:spcBef>
+                <a:spcPct val="20000"/>
+              </a:spcBef>
+              <a:spcAft>
+                <a:spcPct val="0"/>
+              </a:spcAft>
+              <a:buFont typeface="Arial" charset="0"/>
+              <a:buChar char="•"/>
+              <a:defRPr lang="pt-BR" sz="2000" kern="1200" dirty="0">
+                <a:solidFill>
+                  <a:schemeClr val="tx1"/>
+                </a:solidFill>
+                <a:latin typeface="+mn-lt"/>
+                <a:ea typeface="+mn-ea"/>
+                <a:cs typeface="+mn-cs"/>
+              </a:defRPr>
+            </a:lvl5pPr>
+            <a:lvl6pPr marL="2514600" indent="-228600" algn="l" defTabSz="914400" rtl="0" eaLnBrk="1" latinLnBrk="0" hangingPunct="1">
+              <a:spcBef>
+                <a:spcPct val="20000"/>
+              </a:spcBef>
+              <a:buFont typeface="Arial" pitchFamily="34" charset="0"/>
+              <a:buChar char="•"/>
+              <a:defRPr sz="2000" kern="1200">
+                <a:solidFill>
+                  <a:schemeClr val="tx1"/>
+                </a:solidFill>
+                <a:latin typeface="+mn-lt"/>
+                <a:ea typeface="+mn-ea"/>
+                <a:cs typeface="+mn-cs"/>
+              </a:defRPr>
+            </a:lvl6pPr>
+            <a:lvl7pPr marL="2971800" indent="-228600" algn="l" defTabSz="914400" rtl="0" eaLnBrk="1" latinLnBrk="0" hangingPunct="1">
+              <a:spcBef>
+                <a:spcPct val="20000"/>
+              </a:spcBef>
+              <a:buFont typeface="Arial" pitchFamily="34" charset="0"/>
+              <a:buChar char="•"/>
+              <a:defRPr sz="2000" kern="1200">
+                <a:solidFill>
+                  <a:schemeClr val="tx1"/>
+                </a:solidFill>
+                <a:latin typeface="+mn-lt"/>
+                <a:ea typeface="+mn-ea"/>
+                <a:cs typeface="+mn-cs"/>
+              </a:defRPr>
+            </a:lvl7pPr>
+            <a:lvl8pPr marL="3429000" indent="-228600" algn="l" defTabSz="914400" rtl="0" eaLnBrk="1" latinLnBrk="0" hangingPunct="1">
+              <a:spcBef>
+                <a:spcPct val="20000"/>
+              </a:spcBef>
+              <a:buFont typeface="Arial" pitchFamily="34" charset="0"/>
+              <a:buChar char="•"/>
+              <a:defRPr sz="2000" kern="1200">
+                <a:solidFill>
+                  <a:schemeClr val="tx1"/>
+                </a:solidFill>
+                <a:latin typeface="+mn-lt"/>
+                <a:ea typeface="+mn-ea"/>
+                <a:cs typeface="+mn-cs"/>
+              </a:defRPr>
+            </a:lvl8pPr>
+            <a:lvl9pPr marL="3886200" indent="-228600" algn="l" defTabSz="914400" rtl="0" eaLnBrk="1" latinLnBrk="0" hangingPunct="1">
+              <a:spcBef>
+                <a:spcPct val="20000"/>
+              </a:spcBef>
+              <a:buFont typeface="Arial" pitchFamily="34" charset="0"/>
+              <a:buChar char="•"/>
+              <a:defRPr sz="2000" kern="1200">
+                <a:solidFill>
+                  <a:schemeClr val="tx1"/>
+                </a:solidFill>
+                <a:latin typeface="+mn-lt"/>
+                <a:ea typeface="+mn-ea"/>
+                <a:cs typeface="+mn-cs"/>
+              </a:defRPr>
+            </a:lvl9pPr>
+          </a:lstStyle>
+          <a:p>
+            <a:pPr marL="0" indent="0" algn="just">
+              <a:lnSpc>
+                <a:spcPct val="150000"/>
+              </a:lnSpc>
+              <a:buFont typeface="Arial" charset="0"/>
+              <a:buNone/>
+            </a:pPr>
+            <a:r>
+              <a:rPr lang="pt-BR" sz="1800" b="1" u="sng" dirty="0">
+                <a:highlight>
+                  <a:srgbClr val="FFFF00"/>
+                </a:highlight>
+              </a:rPr>
+              <a:t>Funções aninhadas:</a:t>
+            </a:r>
+          </a:p>
+          <a:p>
+            <a:pPr marL="0" indent="0" algn="just">
+              <a:lnSpc>
+                <a:spcPct val="150000"/>
+              </a:lnSpc>
+              <a:buFont typeface="Arial" charset="0"/>
+              <a:buNone/>
+            </a:pPr>
+            <a:endParaRPr lang="pt-BR" sz="1800" dirty="0"/>
+          </a:p>
+          <a:p>
+            <a:pPr marL="0" indent="0" algn="just">
+              <a:lnSpc>
+                <a:spcPct val="150000"/>
+              </a:lnSpc>
+              <a:buFont typeface="Arial" charset="0"/>
+              <a:buNone/>
+            </a:pPr>
+            <a:r>
+              <a:rPr lang="pt-BR" sz="1800" dirty="0"/>
+              <a:t>O Excel utiliza o resultado de uma função como argumento de outra função.</a:t>
+            </a:r>
+          </a:p>
+          <a:p>
+            <a:pPr marL="0" indent="0" algn="just">
+              <a:lnSpc>
+                <a:spcPct val="150000"/>
+              </a:lnSpc>
+              <a:buFont typeface="Arial" charset="0"/>
+              <a:buNone/>
+            </a:pPr>
+            <a:endParaRPr lang="pt-BR" sz="1800" dirty="0"/>
+          </a:p>
+          <a:p>
+            <a:pPr marL="0" indent="0" algn="just">
+              <a:lnSpc>
+                <a:spcPct val="150000"/>
+              </a:lnSpc>
+              <a:buFont typeface="Arial" charset="0"/>
+              <a:buNone/>
+            </a:pPr>
+            <a:r>
+              <a:rPr lang="pt-BR" sz="1800" dirty="0"/>
+              <a:t>Vantagem: Economia de Espaço, tempo, memoria, layout.</a:t>
+            </a:r>
+          </a:p>
+          <a:p>
+            <a:pPr marL="0" indent="0" algn="just">
+              <a:lnSpc>
+                <a:spcPct val="150000"/>
+              </a:lnSpc>
+              <a:buFont typeface="Arial" charset="0"/>
+              <a:buNone/>
+            </a:pPr>
+            <a:r>
+              <a:rPr lang="pt-BR" sz="1800" dirty="0"/>
+              <a:t>Desvantagem: complexidade em rastrear e montar logica.</a:t>
+            </a:r>
+          </a:p>
+          <a:p>
+            <a:pPr marL="0" indent="0" algn="just">
+              <a:lnSpc>
+                <a:spcPct val="150000"/>
+              </a:lnSpc>
+              <a:buFont typeface="Arial" charset="0"/>
+              <a:buNone/>
+            </a:pPr>
+            <a:endParaRPr lang="pt-BR" sz="1800" dirty="0"/>
+          </a:p>
+          <a:p>
+            <a:pPr marL="0" indent="0" algn="just">
+              <a:lnSpc>
+                <a:spcPct val="150000"/>
+              </a:lnSpc>
+              <a:buFont typeface="Arial" charset="0"/>
+              <a:buNone/>
+            </a:pPr>
+            <a:endParaRPr lang="pt-BR" sz="1800" dirty="0"/>
+          </a:p>
+          <a:p>
+            <a:pPr marL="0" indent="0" algn="just">
+              <a:lnSpc>
+                <a:spcPct val="150000"/>
+              </a:lnSpc>
+              <a:buFont typeface="Arial" charset="0"/>
+              <a:buNone/>
+            </a:pPr>
+            <a:r>
+              <a:rPr lang="pt-BR" sz="1800" dirty="0"/>
+              <a:t>Você consegue refazer o </a:t>
+            </a:r>
+            <a:r>
+              <a:rPr lang="pt-BR" sz="1800" dirty="0" err="1"/>
+              <a:t>Exercicio</a:t>
+            </a:r>
+            <a:r>
+              <a:rPr lang="pt-BR" sz="1800" dirty="0"/>
+              <a:t> anterior em apenas 1 Coluna?</a:t>
+            </a:r>
+          </a:p>
+          <a:p>
+            <a:pPr marL="0" indent="0" algn="just">
+              <a:lnSpc>
+                <a:spcPct val="150000"/>
+              </a:lnSpc>
+              <a:buFont typeface="Arial" charset="0"/>
+              <a:buNone/>
+            </a:pPr>
+            <a:endParaRPr lang="pt-BR" sz="1800" dirty="0"/>
+          </a:p>
+          <a:p>
+            <a:pPr marL="0" indent="0" algn="just">
+              <a:lnSpc>
+                <a:spcPct val="150000"/>
+              </a:lnSpc>
+              <a:buFont typeface="Arial" charset="0"/>
+              <a:buNone/>
+            </a:pPr>
+            <a:endParaRPr lang="pt-BR" sz="1800" dirty="0"/>
+          </a:p>
+        </p:txBody>
+      </p:sp>
+    </p:spTree>
+    <p:extLst>
+      <p:ext uri="{BB962C8B-B14F-4D97-AF65-F5344CB8AC3E}">
+        <p14:creationId xmlns:p14="http://schemas.microsoft.com/office/powerpoint/2010/main" val="3772334688"/>
+      </p:ext>
+    </p:extLst>
+  </p:cSld>
+  <p:clrMapOvr>
+    <a:masterClrMapping/>
+  </p:clrMapOvr>
+</p:sld>
+</file>
+
+<file path=ppt/slides/slide78.xml><?xml version="1.0" encoding="utf-8"?>
 <p:sld xmlns:a="http://schemas.openxmlformats.org/drawingml/2006/main" xmlns:r="http://schemas.openxmlformats.org/officeDocument/2006/relationships" xmlns:p="http://schemas.openxmlformats.org/presentationml/2006/main" show="0">
   <p:cSld>
     <p:spTree>
@@ -50211,18 +50413,10 @@
   <p:clrMapOvr>
     <a:masterClrMapping/>
   </p:clrMapOvr>
-  <mc:AlternateContent xmlns:mc="http://schemas.openxmlformats.org/markup-compatibility/2006" xmlns:p14="http://schemas.microsoft.com/office/powerpoint/2010/main">
-    <mc:Choice Requires="p14">
-      <p:transition spd="slow" p14:dur="2000"/>
-    </mc:Choice>
-    <mc:Fallback xmlns="">
-      <p:transition spd="slow"/>
-    </mc:Fallback>
-  </mc:AlternateContent>
 </p:sld>
 </file>
 
-<file path=ppt/slides/slide78.xml><?xml version="1.0" encoding="utf-8"?>
+<file path=ppt/slides/slide79.xml><?xml version="1.0" encoding="utf-8"?>
 <p:sld xmlns:a="http://schemas.openxmlformats.org/drawingml/2006/main" xmlns:r="http://schemas.openxmlformats.org/officeDocument/2006/relationships" xmlns:p="http://schemas.openxmlformats.org/presentationml/2006/main" show="0">
   <p:cSld>
     <p:spTree>
@@ -50648,367 +50842,6 @@
   <p:clrMapOvr>
     <a:masterClrMapping/>
   </p:clrMapOvr>
-  <mc:AlternateContent xmlns:mc="http://schemas.openxmlformats.org/markup-compatibility/2006">
-    <mc:Choice xmlns:p14="http://schemas.microsoft.com/office/powerpoint/2010/main" Requires="p14">
-      <p:transition spd="slow" p14:dur="2000"/>
-    </mc:Choice>
-    <mc:Fallback>
-      <p:transition spd="slow"/>
-    </mc:Fallback>
-  </mc:AlternateContent>
-</p:sld>
-</file>
-
-<file path=ppt/slides/slide79.xml><?xml version="1.0" encoding="utf-8"?>
-<p:sld xmlns:a="http://schemas.openxmlformats.org/drawingml/2006/main" xmlns:r="http://schemas.openxmlformats.org/officeDocument/2006/relationships" xmlns:p="http://schemas.openxmlformats.org/presentationml/2006/main" show="0">
-  <p:cSld>
-    <p:spTree>
-      <p:nvGrpSpPr>
-        <p:cNvPr id="1" name=""/>
-        <p:cNvGrpSpPr/>
-        <p:nvPr/>
-      </p:nvGrpSpPr>
-      <p:grpSpPr>
-        <a:xfrm>
-          <a:off x="0" y="0"/>
-          <a:ext cx="0" cy="0"/>
-          <a:chOff x="0" y="0"/>
-          <a:chExt cx="0" cy="0"/>
-        </a:xfrm>
-      </p:grpSpPr>
-      <p:sp>
-        <p:nvSpPr>
-          <p:cNvPr id="3" name="Subtítulo 1"/>
-          <p:cNvSpPr>
-            <a:spLocks noGrp="1"/>
-          </p:cNvSpPr>
-          <p:nvPr>
-            <p:ph type="subTitle" idx="4294967295"/>
-          </p:nvPr>
-        </p:nvSpPr>
-        <p:spPr>
-          <a:xfrm>
-            <a:off x="591671" y="754063"/>
-            <a:ext cx="11600329" cy="5495925"/>
-          </a:xfrm>
-        </p:spPr>
-        <p:txBody>
-          <a:bodyPr>
-            <a:noAutofit/>
-          </a:bodyPr>
-          <a:lstStyle/>
-          <a:p>
-            <a:pPr marL="0" indent="0">
-              <a:buNone/>
-            </a:pPr>
-            <a:endParaRPr lang="pt-BR" sz="2000" dirty="0"/>
-          </a:p>
-          <a:p>
-            <a:pPr marL="0" indent="0" algn="just">
-              <a:buNone/>
-            </a:pPr>
-            <a:r>
-              <a:rPr lang="pt-BR" sz="2000" dirty="0"/>
-              <a:t> Criar relatório de fluxo de caixa de 1 ano com entradas, saídas e saldo.</a:t>
-            </a:r>
-          </a:p>
-          <a:p>
-            <a:pPr algn="just"/>
-            <a:r>
-              <a:rPr lang="pt-BR" sz="2000" dirty="0"/>
-              <a:t>1 - Um mês em cada planilha.</a:t>
-            </a:r>
-          </a:p>
-          <a:p>
-            <a:pPr algn="just"/>
-            <a:r>
-              <a:rPr lang="pt-BR" sz="2000" dirty="0"/>
-              <a:t>2 - Entrada/Recebimentos  Às terças de R$ 3.000, demais dias de R$ 2.000 (bruto)</a:t>
-            </a:r>
-          </a:p>
-          <a:p>
-            <a:pPr algn="just"/>
-            <a:r>
-              <a:rPr lang="pt-BR" sz="2000" dirty="0"/>
-              <a:t>3 - Saídas/Pagamentos as quintas de R$ 4.000, demais dias de R$ 1.600 (bruto)</a:t>
-            </a:r>
-          </a:p>
-          <a:p>
-            <a:pPr algn="just"/>
-            <a:r>
-              <a:rPr lang="pt-BR" sz="2000" dirty="0"/>
-              <a:t>4 - Todo dia 15 de cada mês, saída adicional de 6.000 (bruto)</a:t>
-            </a:r>
-          </a:p>
-          <a:p>
-            <a:pPr algn="just"/>
-            <a:r>
-              <a:rPr lang="pt-BR" sz="2000" dirty="0"/>
-              <a:t>5 - calcular imposto ICMS de 18% sobre entrada/recebimentos + </a:t>
-            </a:r>
-            <a:r>
-              <a:rPr lang="pt-BR" sz="2000" dirty="0" err="1"/>
-              <a:t>Pis</a:t>
-            </a:r>
-            <a:r>
-              <a:rPr lang="pt-BR" sz="2000" dirty="0"/>
-              <a:t>/</a:t>
-            </a:r>
-            <a:r>
-              <a:rPr lang="pt-BR" sz="2000" dirty="0" err="1"/>
-              <a:t>Cofins</a:t>
-            </a:r>
-            <a:r>
-              <a:rPr lang="pt-BR" sz="2000" dirty="0"/>
-              <a:t> de 9,25%.</a:t>
-            </a:r>
-          </a:p>
-          <a:p>
-            <a:pPr algn="just"/>
-            <a:r>
-              <a:rPr lang="pt-BR" sz="2000" dirty="0"/>
-              <a:t>6 - calcular imposto de 9,25% sobre saída/pagamentos.</a:t>
-            </a:r>
-          </a:p>
-          <a:p>
-            <a:pPr algn="just"/>
-            <a:r>
-              <a:rPr lang="pt-BR" sz="2000" dirty="0"/>
-              <a:t>8 - Criar uma aba resumo mostrando recebimento por dia do mês, recebimento, pagamento e impostos líquidos pagos no ano.</a:t>
-            </a:r>
-          </a:p>
-          <a:p>
-            <a:pPr algn="just"/>
-            <a:r>
-              <a:rPr lang="pt-BR" sz="2000" dirty="0"/>
-              <a:t>8 - Aba resumo deverá ser o local onde digitaremos as alíquotas e as demais planilhas deverão obedecer a estas alíquotas.</a:t>
-            </a:r>
-          </a:p>
-          <a:p>
-            <a:pPr algn="just"/>
-            <a:endParaRPr lang="pt-BR" sz="2000" dirty="0"/>
-          </a:p>
-          <a:p>
-            <a:pPr marL="0" indent="0" algn="just">
-              <a:buNone/>
-            </a:pPr>
-            <a:r>
-              <a:rPr lang="pt-BR" sz="2000" dirty="0"/>
-              <a:t>Dica: Fórmula soma 3D, formula aritmética, formatação, copia de planilhas, referência externa.</a:t>
-            </a:r>
-          </a:p>
-        </p:txBody>
-      </p:sp>
-      <p:sp>
-        <p:nvSpPr>
-          <p:cNvPr id="4" name="Subtítulo 2"/>
-          <p:cNvSpPr txBox="1">
-            <a:spLocks/>
-          </p:cNvSpPr>
-          <p:nvPr/>
-        </p:nvSpPr>
-        <p:spPr>
-          <a:xfrm>
-            <a:off x="210670" y="153054"/>
-            <a:ext cx="10058400" cy="718315"/>
-          </a:xfrm>
-        </p:spPr>
-        <p:txBody>
-          <a:bodyPr>
-            <a:noAutofit/>
-          </a:bodyPr>
-          <a:lstStyle>
-            <a:lvl1pPr marL="342900" indent="-342900" algn="l" rtl="0" eaLnBrk="0" fontAlgn="base" hangingPunct="0">
-              <a:spcBef>
-                <a:spcPct val="20000"/>
-              </a:spcBef>
-              <a:spcAft>
-                <a:spcPct val="0"/>
-              </a:spcAft>
-              <a:buFont typeface="Arial" charset="0"/>
-              <a:buChar char="•"/>
-              <a:defRPr lang="pt-BR" sz="2800" kern="1200" dirty="0">
-                <a:solidFill>
-                  <a:schemeClr val="tx1"/>
-                </a:solidFill>
-                <a:latin typeface="+mn-lt"/>
-                <a:ea typeface="+mn-ea"/>
-                <a:cs typeface="+mn-cs"/>
-              </a:defRPr>
-            </a:lvl1pPr>
-            <a:lvl2pPr marL="742950" indent="-285750" algn="l" rtl="0" eaLnBrk="0" fontAlgn="base" hangingPunct="0">
-              <a:spcBef>
-                <a:spcPct val="20000"/>
-              </a:spcBef>
-              <a:spcAft>
-                <a:spcPct val="0"/>
-              </a:spcAft>
-              <a:buFont typeface="Arial" charset="0"/>
-              <a:buChar char="•"/>
-              <a:defRPr lang="pt-BR" sz="2400" kern="1200" dirty="0">
-                <a:solidFill>
-                  <a:schemeClr val="tx1"/>
-                </a:solidFill>
-                <a:latin typeface="+mn-lt"/>
-                <a:ea typeface="+mn-ea"/>
-                <a:cs typeface="+mn-cs"/>
-              </a:defRPr>
-            </a:lvl2pPr>
-            <a:lvl3pPr marL="1143000" indent="-228600" algn="l" rtl="0" eaLnBrk="0" fontAlgn="base" hangingPunct="0">
-              <a:spcBef>
-                <a:spcPct val="20000"/>
-              </a:spcBef>
-              <a:spcAft>
-                <a:spcPct val="0"/>
-              </a:spcAft>
-              <a:buFont typeface="Arial" charset="0"/>
-              <a:buChar char="•"/>
-              <a:defRPr lang="pt-BR" sz="2400" kern="1200" dirty="0">
-                <a:solidFill>
-                  <a:schemeClr val="tx1"/>
-                </a:solidFill>
-                <a:latin typeface="+mn-lt"/>
-                <a:ea typeface="+mn-ea"/>
-                <a:cs typeface="+mn-cs"/>
-              </a:defRPr>
-            </a:lvl3pPr>
-            <a:lvl4pPr marL="1600200" indent="-228600" algn="l" rtl="0" eaLnBrk="0" fontAlgn="base" hangingPunct="0">
-              <a:spcBef>
-                <a:spcPct val="20000"/>
-              </a:spcBef>
-              <a:spcAft>
-                <a:spcPct val="0"/>
-              </a:spcAft>
-              <a:buFont typeface="Arial" charset="0"/>
-              <a:buChar char="•"/>
-              <a:defRPr lang="pt-BR" sz="2000" kern="1200" dirty="0">
-                <a:solidFill>
-                  <a:schemeClr val="tx1"/>
-                </a:solidFill>
-                <a:latin typeface="+mn-lt"/>
-                <a:ea typeface="+mn-ea"/>
-                <a:cs typeface="+mn-cs"/>
-              </a:defRPr>
-            </a:lvl4pPr>
-            <a:lvl5pPr marL="2057400" indent="-228600" algn="l" rtl="0" eaLnBrk="0" fontAlgn="base" hangingPunct="0">
-              <a:spcBef>
-                <a:spcPct val="20000"/>
-              </a:spcBef>
-              <a:spcAft>
-                <a:spcPct val="0"/>
-              </a:spcAft>
-              <a:buFont typeface="Arial" charset="0"/>
-              <a:buChar char="•"/>
-              <a:defRPr lang="pt-BR" sz="2000" kern="1200" dirty="0">
-                <a:solidFill>
-                  <a:schemeClr val="tx1"/>
-                </a:solidFill>
-                <a:latin typeface="+mn-lt"/>
-                <a:ea typeface="+mn-ea"/>
-                <a:cs typeface="+mn-cs"/>
-              </a:defRPr>
-            </a:lvl5pPr>
-            <a:lvl6pPr marL="2514600" indent="-228600" algn="l" defTabSz="914400" rtl="0" eaLnBrk="1" latinLnBrk="0" hangingPunct="1">
-              <a:spcBef>
-                <a:spcPct val="20000"/>
-              </a:spcBef>
-              <a:buFont typeface="Arial" pitchFamily="34" charset="0"/>
-              <a:buChar char="•"/>
-              <a:defRPr sz="2000" kern="1200">
-                <a:solidFill>
-                  <a:schemeClr val="tx1"/>
-                </a:solidFill>
-                <a:latin typeface="+mn-lt"/>
-                <a:ea typeface="+mn-ea"/>
-                <a:cs typeface="+mn-cs"/>
-              </a:defRPr>
-            </a:lvl6pPr>
-            <a:lvl7pPr marL="2971800" indent="-228600" algn="l" defTabSz="914400" rtl="0" eaLnBrk="1" latinLnBrk="0" hangingPunct="1">
-              <a:spcBef>
-                <a:spcPct val="20000"/>
-              </a:spcBef>
-              <a:buFont typeface="Arial" pitchFamily="34" charset="0"/>
-              <a:buChar char="•"/>
-              <a:defRPr sz="2000" kern="1200">
-                <a:solidFill>
-                  <a:schemeClr val="tx1"/>
-                </a:solidFill>
-                <a:latin typeface="+mn-lt"/>
-                <a:ea typeface="+mn-ea"/>
-                <a:cs typeface="+mn-cs"/>
-              </a:defRPr>
-            </a:lvl7pPr>
-            <a:lvl8pPr marL="3429000" indent="-228600" algn="l" defTabSz="914400" rtl="0" eaLnBrk="1" latinLnBrk="0" hangingPunct="1">
-              <a:spcBef>
-                <a:spcPct val="20000"/>
-              </a:spcBef>
-              <a:buFont typeface="Arial" pitchFamily="34" charset="0"/>
-              <a:buChar char="•"/>
-              <a:defRPr sz="2000" kern="1200">
-                <a:solidFill>
-                  <a:schemeClr val="tx1"/>
-                </a:solidFill>
-                <a:latin typeface="+mn-lt"/>
-                <a:ea typeface="+mn-ea"/>
-                <a:cs typeface="+mn-cs"/>
-              </a:defRPr>
-            </a:lvl8pPr>
-            <a:lvl9pPr marL="3886200" indent="-228600" algn="l" defTabSz="914400" rtl="0" eaLnBrk="1" latinLnBrk="0" hangingPunct="1">
-              <a:spcBef>
-                <a:spcPct val="20000"/>
-              </a:spcBef>
-              <a:buFont typeface="Arial" pitchFamily="34" charset="0"/>
-              <a:buChar char="•"/>
-              <a:defRPr sz="2000" kern="1200">
-                <a:solidFill>
-                  <a:schemeClr val="tx1"/>
-                </a:solidFill>
-                <a:latin typeface="+mn-lt"/>
-                <a:ea typeface="+mn-ea"/>
-                <a:cs typeface="+mn-cs"/>
-              </a:defRPr>
-            </a:lvl9pPr>
-          </a:lstStyle>
-          <a:p>
-            <a:pPr marL="0" indent="0">
-              <a:lnSpc>
-                <a:spcPct val="150000"/>
-              </a:lnSpc>
-              <a:buFont typeface="Arial" charset="0"/>
-              <a:buNone/>
-            </a:pPr>
-            <a:r>
-              <a:rPr lang="pt-BR" sz="2400" b="1" dirty="0">
-                <a:solidFill>
-                  <a:schemeClr val="accent6">
-                    <a:lumMod val="75000"/>
-                  </a:schemeClr>
-                </a:solidFill>
-                <a:latin typeface="Corbel" panose="020B0503020204020204" pitchFamily="34" charset="0"/>
-              </a:rPr>
-              <a:t>Atividade</a:t>
-            </a:r>
-          </a:p>
-        </p:txBody>
-      </p:sp>
-    </p:spTree>
-    <p:extLst>
-      <p:ext uri="{BB962C8B-B14F-4D97-AF65-F5344CB8AC3E}">
-        <p14:creationId xmlns:p14="http://schemas.microsoft.com/office/powerpoint/2010/main" val="2083101853"/>
-      </p:ext>
-    </p:extLst>
-  </p:cSld>
-  <p:clrMapOvr>
-    <a:masterClrMapping/>
-  </p:clrMapOvr>
-  <mc:AlternateContent xmlns:mc="http://schemas.openxmlformats.org/markup-compatibility/2006" xmlns:p14="http://schemas.microsoft.com/office/powerpoint/2010/main">
-    <mc:Choice Requires="p14">
-      <p:transition spd="slow" p14:dur="2000"/>
-    </mc:Choice>
-    <mc:Fallback xmlns="">
-      <p:transition spd="slow"/>
-    </mc:Fallback>
-  </mc:AlternateContent>
 </p:sld>
 </file>
 
@@ -51576,8 +51409,8 @@
         </p:nvSpPr>
         <p:spPr>
           <a:xfrm>
-            <a:off x="450664" y="786336"/>
-            <a:ext cx="9966325" cy="5495925"/>
+            <a:off x="591671" y="754063"/>
+            <a:ext cx="11600329" cy="5495925"/>
           </a:xfrm>
         </p:spPr>
         <p:txBody>
@@ -51592,17 +51425,84 @@
             <a:endParaRPr lang="pt-BR" sz="2000" dirty="0"/>
           </a:p>
           <a:p>
+            <a:pPr marL="0" indent="0" algn="just">
+              <a:buNone/>
+            </a:pPr>
+            <a:r>
+              <a:rPr lang="pt-BR" sz="2000" dirty="0"/>
+              <a:t> Criar relatório de fluxo de caixa de 1 ano com entradas, saídas e saldo.</a:t>
+            </a:r>
+          </a:p>
+          <a:p>
             <a:pPr algn="just"/>
             <a:r>
               <a:rPr lang="pt-BR" sz="2000" dirty="0"/>
-              <a:t>1- Com base no exercício anterior, qual é o dia com o maior saldo? E com menor Saldo? Qual a media de pagamento?</a:t>
+              <a:t>1 - Um mês em cada planilha.</a:t>
             </a:r>
           </a:p>
           <a:p>
             <a:pPr algn="just"/>
             <a:r>
               <a:rPr lang="pt-BR" sz="2000" dirty="0"/>
-              <a:t>Dica: Formulas Soma, mínimo, Máximo, Média, Referencia e fórmulas 3D</a:t>
+              <a:t>2 - Entrada/Recebimentos  Às terças de R$ 3.000, demais dias de R$ 2.000 (bruto)</a:t>
+            </a:r>
+          </a:p>
+          <a:p>
+            <a:pPr algn="just"/>
+            <a:r>
+              <a:rPr lang="pt-BR" sz="2000" dirty="0"/>
+              <a:t>3 - Saídas/Pagamentos as quintas de R$ 4.000, demais dias de R$ 1.600 (bruto)</a:t>
+            </a:r>
+          </a:p>
+          <a:p>
+            <a:pPr algn="just"/>
+            <a:r>
+              <a:rPr lang="pt-BR" sz="2000" dirty="0"/>
+              <a:t>4 - Todo dia 15 de cada mês, saída adicional de 6.000 (bruto)</a:t>
+            </a:r>
+          </a:p>
+          <a:p>
+            <a:pPr algn="just"/>
+            <a:r>
+              <a:rPr lang="pt-BR" sz="2000" dirty="0"/>
+              <a:t>5 - calcular imposto ICMS de 18% sobre entrada/recebimentos + </a:t>
+            </a:r>
+            <a:r>
+              <a:rPr lang="pt-BR" sz="2000" dirty="0" err="1"/>
+              <a:t>Pis</a:t>
+            </a:r>
+            <a:r>
+              <a:rPr lang="pt-BR" sz="2000" dirty="0"/>
+              <a:t>/</a:t>
+            </a:r>
+            <a:r>
+              <a:rPr lang="pt-BR" sz="2000" dirty="0" err="1"/>
+              <a:t>Cofins</a:t>
+            </a:r>
+            <a:r>
+              <a:rPr lang="pt-BR" sz="2000" dirty="0"/>
+              <a:t> de 9,25%.</a:t>
+            </a:r>
+          </a:p>
+          <a:p>
+            <a:pPr algn="just"/>
+            <a:r>
+              <a:rPr lang="pt-BR" sz="2000" dirty="0"/>
+              <a:t>6 - calcular imposto de 9,25% sobre saída/pagamentos.</a:t>
+            </a:r>
+          </a:p>
+          <a:p>
+            <a:pPr algn="just"/>
+            <a:r>
+              <a:rPr lang="pt-BR" sz="2000" dirty="0"/>
+              <a:t>8 - Criar uma aba resumo mostrando recebimento por dia do mês, recebimento, pagamento e impostos líquidos pagos no ano.</a:t>
+            </a:r>
+          </a:p>
+          <a:p>
+            <a:pPr algn="just"/>
+            <a:r>
+              <a:rPr lang="pt-BR" sz="2000" dirty="0"/>
+              <a:t>8 - Aba resumo deverá ser o local onde digitaremos as alíquotas e as demais planilhas deverão obedecer a estas alíquotas.</a:t>
             </a:r>
           </a:p>
           <a:p>
@@ -51610,17 +51510,12 @@
             <a:endParaRPr lang="pt-BR" sz="2000" dirty="0"/>
           </a:p>
           <a:p>
-            <a:pPr algn="just"/>
+            <a:pPr marL="0" indent="0" algn="just">
+              <a:buNone/>
+            </a:pPr>
             <a:r>
               <a:rPr lang="pt-BR" sz="2000" dirty="0"/>
-              <a:t>2- Mostre os dados acima em uma única aba de forma que possamos comparar entre os meses.</a:t>
-            </a:r>
-          </a:p>
-          <a:p>
-            <a:pPr algn="just"/>
-            <a:r>
-              <a:rPr lang="pt-BR" sz="2000" dirty="0"/>
-              <a:t>Dica: Recortar e colar</a:t>
+              <a:t>Dica: Fórmula soma 3D, formula aritmética, formatação, copia de planilhas, referência externa.</a:t>
             </a:r>
           </a:p>
         </p:txBody>
@@ -51820,26 +51715,18 @@
     </p:spTree>
     <p:extLst>
       <p:ext uri="{BB962C8B-B14F-4D97-AF65-F5344CB8AC3E}">
-        <p14:creationId xmlns:p14="http://schemas.microsoft.com/office/powerpoint/2010/main" val="2118764348"/>
+        <p14:creationId xmlns:p14="http://schemas.microsoft.com/office/powerpoint/2010/main" val="2083101853"/>
       </p:ext>
     </p:extLst>
   </p:cSld>
   <p:clrMapOvr>
     <a:masterClrMapping/>
   </p:clrMapOvr>
-  <mc:AlternateContent xmlns:mc="http://schemas.openxmlformats.org/markup-compatibility/2006" xmlns:p14="http://schemas.microsoft.com/office/powerpoint/2010/main">
-    <mc:Choice Requires="p14">
-      <p:transition spd="slow" p14:dur="2000"/>
-    </mc:Choice>
-    <mc:Fallback xmlns="">
-      <p:transition spd="slow"/>
-    </mc:Fallback>
-  </mc:AlternateContent>
 </p:sld>
 </file>
 
 <file path=ppt/slides/slide81.xml><?xml version="1.0" encoding="utf-8"?>
-<p:sld xmlns:a="http://schemas.openxmlformats.org/drawingml/2006/main" xmlns:r="http://schemas.openxmlformats.org/officeDocument/2006/relationships" xmlns:p="http://schemas.openxmlformats.org/presentationml/2006/main">
+<p:sld xmlns:a="http://schemas.openxmlformats.org/drawingml/2006/main" xmlns:r="http://schemas.openxmlformats.org/officeDocument/2006/relationships" xmlns:p="http://schemas.openxmlformats.org/presentationml/2006/main" show="0">
   <p:cSld>
     <p:spTree>
       <p:nvGrpSpPr>
@@ -51857,7 +51744,68 @@
       </p:grpSpPr>
       <p:sp>
         <p:nvSpPr>
-          <p:cNvPr id="6" name="Subtítulo 2"/>
+          <p:cNvPr id="3" name="Subtítulo 1"/>
+          <p:cNvSpPr>
+            <a:spLocks noGrp="1"/>
+          </p:cNvSpPr>
+          <p:nvPr>
+            <p:ph type="subTitle" idx="4294967295"/>
+          </p:nvPr>
+        </p:nvSpPr>
+        <p:spPr>
+          <a:xfrm>
+            <a:off x="450664" y="786336"/>
+            <a:ext cx="9966325" cy="5495925"/>
+          </a:xfrm>
+        </p:spPr>
+        <p:txBody>
+          <a:bodyPr>
+            <a:noAutofit/>
+          </a:bodyPr>
+          <a:lstStyle/>
+          <a:p>
+            <a:pPr marL="0" indent="0">
+              <a:buNone/>
+            </a:pPr>
+            <a:endParaRPr lang="pt-BR" sz="2000" dirty="0"/>
+          </a:p>
+          <a:p>
+            <a:pPr algn="just"/>
+            <a:r>
+              <a:rPr lang="pt-BR" sz="2000" dirty="0"/>
+              <a:t>1- Com base no exercício anterior, qual é o dia com o maior saldo? E com menor Saldo? Qual a media de pagamento?</a:t>
+            </a:r>
+          </a:p>
+          <a:p>
+            <a:pPr algn="just"/>
+            <a:r>
+              <a:rPr lang="pt-BR" sz="2000" dirty="0"/>
+              <a:t>Dica: Formulas Soma, mínimo, Máximo, Média, Referencia e fórmulas 3D</a:t>
+            </a:r>
+          </a:p>
+          <a:p>
+            <a:pPr algn="just"/>
+            <a:endParaRPr lang="pt-BR" sz="2000" dirty="0"/>
+          </a:p>
+          <a:p>
+            <a:pPr algn="just"/>
+            <a:r>
+              <a:rPr lang="pt-BR" sz="2000" dirty="0"/>
+              <a:t>2- Mostre os dados acima em uma única aba de forma que possamos comparar entre os meses.</a:t>
+            </a:r>
+          </a:p>
+          <a:p>
+            <a:pPr algn="just"/>
+            <a:r>
+              <a:rPr lang="pt-BR" sz="2000" dirty="0"/>
+              <a:t>Dica: Recortar e colar</a:t>
+            </a:r>
+          </a:p>
+        </p:txBody>
+      </p:sp>
+      <p:sp>
+        <p:nvSpPr>
+          <p:cNvPr id="4" name="Subtítulo 2"/>
           <p:cNvSpPr txBox="1">
             <a:spLocks/>
           </p:cNvSpPr>
@@ -52034,7 +51982,7 @@
               <a:buNone/>
             </a:pPr>
             <a:r>
-              <a:rPr lang="pt-BR" sz="2400" b="1" dirty="0" smtClean="0">
+              <a:rPr lang="pt-BR" sz="2400" b="1" dirty="0">
                 <a:solidFill>
                   <a:schemeClr val="accent6">
                     <a:lumMod val="75000"/>
@@ -52042,282 +51990,15 @@
                 </a:solidFill>
                 <a:latin typeface="Corbel" panose="020B0503020204020204" pitchFamily="34" charset="0"/>
               </a:rPr>
-              <a:t>Gráficos Criativos</a:t>
-            </a:r>
-            <a:endParaRPr lang="pt-BR" sz="2400" b="1" dirty="0">
-              <a:solidFill>
-                <a:schemeClr val="accent6">
-                  <a:lumMod val="75000"/>
-                </a:schemeClr>
-              </a:solidFill>
-              <a:latin typeface="Corbel" panose="020B0503020204020204" pitchFamily="34" charset="0"/>
-            </a:endParaRPr>
-          </a:p>
-        </p:txBody>
-      </p:sp>
-      <p:sp>
-        <p:nvSpPr>
-          <p:cNvPr id="11" name="Subtítulo 1"/>
-          <p:cNvSpPr txBox="1">
-            <a:spLocks/>
-          </p:cNvSpPr>
-          <p:nvPr/>
-        </p:nvSpPr>
-        <p:spPr>
-          <a:xfrm>
-            <a:off x="210670" y="1128485"/>
-            <a:ext cx="10896600" cy="3217603"/>
-          </a:xfrm>
-        </p:spPr>
-        <p:txBody>
-          <a:bodyPr>
-            <a:noAutofit/>
-          </a:bodyPr>
-          <a:lstStyle>
-            <a:lvl1pPr marL="342900" indent="-342900" algn="l" rtl="0" eaLnBrk="0" fontAlgn="base" hangingPunct="0">
-              <a:spcBef>
-                <a:spcPct val="20000"/>
-              </a:spcBef>
-              <a:spcAft>
-                <a:spcPct val="0"/>
-              </a:spcAft>
-              <a:buFont typeface="Arial" charset="0"/>
-              <a:buChar char="•"/>
-              <a:defRPr lang="pt-BR" sz="2800" kern="1200" dirty="0">
-                <a:solidFill>
-                  <a:schemeClr val="tx1"/>
-                </a:solidFill>
-                <a:latin typeface="+mn-lt"/>
-                <a:ea typeface="+mn-ea"/>
-                <a:cs typeface="+mn-cs"/>
-              </a:defRPr>
-            </a:lvl1pPr>
-            <a:lvl2pPr marL="742950" indent="-285750" algn="l" rtl="0" eaLnBrk="0" fontAlgn="base" hangingPunct="0">
-              <a:spcBef>
-                <a:spcPct val="20000"/>
-              </a:spcBef>
-              <a:spcAft>
-                <a:spcPct val="0"/>
-              </a:spcAft>
-              <a:buFont typeface="Arial" charset="0"/>
-              <a:buChar char="•"/>
-              <a:defRPr lang="pt-BR" sz="2400" kern="1200" dirty="0">
-                <a:solidFill>
-                  <a:schemeClr val="tx1"/>
-                </a:solidFill>
-                <a:latin typeface="+mn-lt"/>
-                <a:ea typeface="+mn-ea"/>
-                <a:cs typeface="+mn-cs"/>
-              </a:defRPr>
-            </a:lvl2pPr>
-            <a:lvl3pPr marL="1143000" indent="-228600" algn="l" rtl="0" eaLnBrk="0" fontAlgn="base" hangingPunct="0">
-              <a:spcBef>
-                <a:spcPct val="20000"/>
-              </a:spcBef>
-              <a:spcAft>
-                <a:spcPct val="0"/>
-              </a:spcAft>
-              <a:buFont typeface="Arial" charset="0"/>
-              <a:buChar char="•"/>
-              <a:defRPr lang="pt-BR" sz="2400" kern="1200" dirty="0">
-                <a:solidFill>
-                  <a:schemeClr val="tx1"/>
-                </a:solidFill>
-                <a:latin typeface="+mn-lt"/>
-                <a:ea typeface="+mn-ea"/>
-                <a:cs typeface="+mn-cs"/>
-              </a:defRPr>
-            </a:lvl3pPr>
-            <a:lvl4pPr marL="1600200" indent="-228600" algn="l" rtl="0" eaLnBrk="0" fontAlgn="base" hangingPunct="0">
-              <a:spcBef>
-                <a:spcPct val="20000"/>
-              </a:spcBef>
-              <a:spcAft>
-                <a:spcPct val="0"/>
-              </a:spcAft>
-              <a:buFont typeface="Arial" charset="0"/>
-              <a:buChar char="•"/>
-              <a:defRPr lang="pt-BR" sz="2000" kern="1200" dirty="0">
-                <a:solidFill>
-                  <a:schemeClr val="tx1"/>
-                </a:solidFill>
-                <a:latin typeface="+mn-lt"/>
-                <a:ea typeface="+mn-ea"/>
-                <a:cs typeface="+mn-cs"/>
-              </a:defRPr>
-            </a:lvl4pPr>
-            <a:lvl5pPr marL="2057400" indent="-228600" algn="l" rtl="0" eaLnBrk="0" fontAlgn="base" hangingPunct="0">
-              <a:spcBef>
-                <a:spcPct val="20000"/>
-              </a:spcBef>
-              <a:spcAft>
-                <a:spcPct val="0"/>
-              </a:spcAft>
-              <a:buFont typeface="Arial" charset="0"/>
-              <a:buChar char="•"/>
-              <a:defRPr lang="pt-BR" sz="2000" kern="1200" dirty="0">
-                <a:solidFill>
-                  <a:schemeClr val="tx1"/>
-                </a:solidFill>
-                <a:latin typeface="+mn-lt"/>
-                <a:ea typeface="+mn-ea"/>
-                <a:cs typeface="+mn-cs"/>
-              </a:defRPr>
-            </a:lvl5pPr>
-            <a:lvl6pPr marL="2514600" indent="-228600" algn="l" defTabSz="914400" rtl="0" eaLnBrk="1" latinLnBrk="0" hangingPunct="1">
-              <a:spcBef>
-                <a:spcPct val="20000"/>
-              </a:spcBef>
-              <a:buFont typeface="Arial" pitchFamily="34" charset="0"/>
-              <a:buChar char="•"/>
-              <a:defRPr sz="2000" kern="1200">
-                <a:solidFill>
-                  <a:schemeClr val="tx1"/>
-                </a:solidFill>
-                <a:latin typeface="+mn-lt"/>
-                <a:ea typeface="+mn-ea"/>
-                <a:cs typeface="+mn-cs"/>
-              </a:defRPr>
-            </a:lvl6pPr>
-            <a:lvl7pPr marL="2971800" indent="-228600" algn="l" defTabSz="914400" rtl="0" eaLnBrk="1" latinLnBrk="0" hangingPunct="1">
-              <a:spcBef>
-                <a:spcPct val="20000"/>
-              </a:spcBef>
-              <a:buFont typeface="Arial" pitchFamily="34" charset="0"/>
-              <a:buChar char="•"/>
-              <a:defRPr sz="2000" kern="1200">
-                <a:solidFill>
-                  <a:schemeClr val="tx1"/>
-                </a:solidFill>
-                <a:latin typeface="+mn-lt"/>
-                <a:ea typeface="+mn-ea"/>
-                <a:cs typeface="+mn-cs"/>
-              </a:defRPr>
-            </a:lvl7pPr>
-            <a:lvl8pPr marL="3429000" indent="-228600" algn="l" defTabSz="914400" rtl="0" eaLnBrk="1" latinLnBrk="0" hangingPunct="1">
-              <a:spcBef>
-                <a:spcPct val="20000"/>
-              </a:spcBef>
-              <a:buFont typeface="Arial" pitchFamily="34" charset="0"/>
-              <a:buChar char="•"/>
-              <a:defRPr sz="2000" kern="1200">
-                <a:solidFill>
-                  <a:schemeClr val="tx1"/>
-                </a:solidFill>
-                <a:latin typeface="+mn-lt"/>
-                <a:ea typeface="+mn-ea"/>
-                <a:cs typeface="+mn-cs"/>
-              </a:defRPr>
-            </a:lvl8pPr>
-            <a:lvl9pPr marL="3886200" indent="-228600" algn="l" defTabSz="914400" rtl="0" eaLnBrk="1" latinLnBrk="0" hangingPunct="1">
-              <a:spcBef>
-                <a:spcPct val="20000"/>
-              </a:spcBef>
-              <a:buFont typeface="Arial" pitchFamily="34" charset="0"/>
-              <a:buChar char="•"/>
-              <a:defRPr sz="2000" kern="1200">
-                <a:solidFill>
-                  <a:schemeClr val="tx1"/>
-                </a:solidFill>
-                <a:latin typeface="+mn-lt"/>
-                <a:ea typeface="+mn-ea"/>
-                <a:cs typeface="+mn-cs"/>
-              </a:defRPr>
-            </a:lvl9pPr>
-          </a:lstStyle>
-          <a:p>
-            <a:pPr marL="0" indent="0">
-              <a:buFont typeface="Arial" charset="0"/>
-              <a:buNone/>
-            </a:pPr>
-            <a:r>
-              <a:rPr lang="pt-BR" sz="1800" dirty="0" smtClean="0"/>
-              <a:t>Por ser uma ferramenta de imagem, os Gráficos te permitem criar além do Excel interagindo com outros elementos tais como Figura, cores:</a:t>
-            </a:r>
-            <a:endParaRPr lang="pt-BR" sz="1800" dirty="0"/>
-          </a:p>
-          <a:p>
-            <a:pPr marL="0" indent="0">
-              <a:buFont typeface="Arial" charset="0"/>
-              <a:buNone/>
-            </a:pPr>
-            <a:endParaRPr lang="pt-BR" sz="1800" dirty="0" smtClean="0"/>
-          </a:p>
-          <a:p>
-            <a:pPr marL="0" indent="0">
-              <a:buFont typeface="Arial" charset="0"/>
-              <a:buNone/>
-            </a:pPr>
-            <a:r>
-              <a:rPr lang="pt-BR" sz="1800" dirty="0" smtClean="0"/>
-              <a:t>Um ótimo Exemplo é integrar os gráficos com elementos gráficos ou mesmo tornar o gráfico um figura “</a:t>
-            </a:r>
-            <a:r>
-              <a:rPr lang="pt-BR" sz="1800" dirty="0" err="1" smtClean="0"/>
-              <a:t>jpeg</a:t>
-            </a:r>
-            <a:r>
-              <a:rPr lang="pt-BR" sz="1800" dirty="0" smtClean="0"/>
-              <a:t>”.</a:t>
-            </a:r>
-          </a:p>
-          <a:p>
-            <a:pPr marL="0" indent="0">
-              <a:buFont typeface="Arial" charset="0"/>
-              <a:buNone/>
-            </a:pPr>
-            <a:r>
-              <a:rPr lang="pt-BR" sz="1800" dirty="0" smtClean="0"/>
-              <a:t> - Para inserir uma figura no Excel: Guia Inserir &gt; Ilustrações &gt; Imagens &gt; Procurar figura e clicar inserir.</a:t>
-            </a:r>
-          </a:p>
-          <a:p>
-            <a:pPr marL="0" indent="0">
-              <a:buFont typeface="Arial" charset="0"/>
-              <a:buNone/>
-            </a:pPr>
-            <a:endParaRPr lang="pt-BR" sz="1800" dirty="0" smtClean="0"/>
-          </a:p>
-          <a:p>
-            <a:pPr marL="0" indent="0">
-              <a:buFont typeface="Arial" charset="0"/>
-              <a:buNone/>
-            </a:pPr>
-            <a:r>
-              <a:rPr lang="pt-BR" sz="1800" dirty="0" smtClean="0"/>
-              <a:t>Caminhos para formatação avançada de gráfico e figuras (somente funciona quando gráfico ou figura esta selecionado).</a:t>
-            </a:r>
-          </a:p>
-          <a:p>
-            <a:pPr marL="0" indent="0">
-              <a:buFont typeface="Arial" charset="0"/>
-              <a:buNone/>
-            </a:pPr>
-            <a:r>
-              <a:rPr lang="pt-BR" sz="1800" dirty="0" smtClean="0"/>
-              <a:t> - Guia “Ferramentas de Imagem” (aba menu Superior)  &gt; Guia Formatar.</a:t>
-            </a:r>
-          </a:p>
-          <a:p>
-            <a:pPr marL="0" indent="0">
-              <a:buFont typeface="Arial" charset="0"/>
-              <a:buNone/>
-            </a:pPr>
-            <a:endParaRPr lang="pt-BR" sz="1800" dirty="0" smtClean="0"/>
-          </a:p>
-          <a:p>
-            <a:pPr marL="0" indent="0">
-              <a:buFont typeface="Arial" charset="0"/>
-              <a:buNone/>
-            </a:pPr>
-            <a:endParaRPr lang="pt-BR" sz="1800" dirty="0" smtClean="0"/>
+              <a:t>Atividade</a:t>
+            </a:r>
           </a:p>
         </p:txBody>
       </p:sp>
     </p:spTree>
     <p:extLst>
       <p:ext uri="{BB962C8B-B14F-4D97-AF65-F5344CB8AC3E}">
-        <p14:creationId xmlns:p14="http://schemas.microsoft.com/office/powerpoint/2010/main" val="2285305447"/>
+        <p14:creationId xmlns:p14="http://schemas.microsoft.com/office/powerpoint/2010/main" val="2118764348"/>
       </p:ext>
     </p:extLst>
   </p:cSld>
@@ -52523,7 +52204,7 @@
               <a:buNone/>
             </a:pPr>
             <a:r>
-              <a:rPr lang="pt-BR" sz="2400" b="1" dirty="0" err="1" smtClean="0">
+              <a:rPr lang="pt-BR" sz="2400" b="1" dirty="0">
                 <a:solidFill>
                   <a:schemeClr val="accent6">
                     <a:lumMod val="75000"/>
@@ -52531,16 +52212,8 @@
                 </a:solidFill>
                 <a:latin typeface="Corbel" panose="020B0503020204020204" pitchFamily="34" charset="0"/>
               </a:rPr>
-              <a:t>DashBoard</a:t>
-            </a:r>
-            <a:endParaRPr lang="pt-BR" sz="2400" b="1" dirty="0">
-              <a:solidFill>
-                <a:schemeClr val="accent6">
-                  <a:lumMod val="75000"/>
-                </a:schemeClr>
-              </a:solidFill>
-              <a:latin typeface="Corbel" panose="020B0503020204020204" pitchFamily="34" charset="0"/>
-            </a:endParaRPr>
+              <a:t>Gráficos Criativos</a:t>
+            </a:r>
           </a:p>
         </p:txBody>
       </p:sp>
@@ -52719,14 +52392,502 @@
               <a:buFont typeface="Arial" charset="0"/>
               <a:buNone/>
             </a:pPr>
-            <a:endParaRPr lang="pt-BR" sz="1800" dirty="0" smtClean="0"/>
+            <a:r>
+              <a:rPr lang="pt-BR" sz="1800" dirty="0"/>
+              <a:t>Por ser uma ferramenta de imagem, os Gráficos te permitem criar além do Excel interagindo com outros elementos tais como Figura, cores:</a:t>
+            </a:r>
           </a:p>
           <a:p>
             <a:pPr marL="0" indent="0">
               <a:buFont typeface="Arial" charset="0"/>
               <a:buNone/>
             </a:pPr>
-            <a:endParaRPr lang="pt-BR" sz="1800" dirty="0" smtClean="0"/>
+            <a:endParaRPr lang="pt-BR" sz="1800" dirty="0"/>
+          </a:p>
+          <a:p>
+            <a:pPr marL="0" indent="0">
+              <a:buFont typeface="Arial" charset="0"/>
+              <a:buNone/>
+            </a:pPr>
+            <a:r>
+              <a:rPr lang="pt-BR" sz="1800" dirty="0"/>
+              <a:t>Um ótimo Exemplo é integrar os gráficos com elementos gráficos ou mesmo tornar o gráfico um figura “</a:t>
+            </a:r>
+            <a:r>
+              <a:rPr lang="pt-BR" sz="1800" dirty="0" err="1"/>
+              <a:t>jpeg</a:t>
+            </a:r>
+            <a:r>
+              <a:rPr lang="pt-BR" sz="1800" dirty="0"/>
+              <a:t>”.</a:t>
+            </a:r>
+          </a:p>
+          <a:p>
+            <a:pPr marL="0" indent="0">
+              <a:buFont typeface="Arial" charset="0"/>
+              <a:buNone/>
+            </a:pPr>
+            <a:r>
+              <a:rPr lang="pt-BR" sz="1800" dirty="0"/>
+              <a:t> - Para inserir uma figura no Excel: Guia Inserir &gt; Ilustrações &gt; Imagens &gt; Procurar figura e clicar inserir.</a:t>
+            </a:r>
+          </a:p>
+          <a:p>
+            <a:pPr marL="0" indent="0">
+              <a:buFont typeface="Arial" charset="0"/>
+              <a:buNone/>
+            </a:pPr>
+            <a:endParaRPr lang="pt-BR" sz="1800" dirty="0"/>
+          </a:p>
+          <a:p>
+            <a:pPr marL="0" indent="0">
+              <a:buFont typeface="Arial" charset="0"/>
+              <a:buNone/>
+            </a:pPr>
+            <a:r>
+              <a:rPr lang="pt-BR" sz="1800" dirty="0"/>
+              <a:t>Caminhos para formatação avançada de gráfico e figuras (somente funciona quando gráfico ou figura esta selecionado).</a:t>
+            </a:r>
+          </a:p>
+          <a:p>
+            <a:pPr marL="0" indent="0">
+              <a:buFont typeface="Arial" charset="0"/>
+              <a:buNone/>
+            </a:pPr>
+            <a:r>
+              <a:rPr lang="pt-BR" sz="1800" dirty="0"/>
+              <a:t> - Guia “Ferramentas de Imagem” (aba menu Superior)  &gt; Guia Formatar.</a:t>
+            </a:r>
+          </a:p>
+          <a:p>
+            <a:pPr marL="0" indent="0">
+              <a:buFont typeface="Arial" charset="0"/>
+              <a:buNone/>
+            </a:pPr>
+            <a:endParaRPr lang="pt-BR" sz="1800" dirty="0"/>
+          </a:p>
+          <a:p>
+            <a:pPr marL="0" indent="0">
+              <a:buFont typeface="Arial" charset="0"/>
+              <a:buNone/>
+            </a:pPr>
+            <a:endParaRPr lang="pt-BR" sz="1800" dirty="0"/>
+          </a:p>
+        </p:txBody>
+      </p:sp>
+    </p:spTree>
+    <p:extLst>
+      <p:ext uri="{BB962C8B-B14F-4D97-AF65-F5344CB8AC3E}">
+        <p14:creationId xmlns:p14="http://schemas.microsoft.com/office/powerpoint/2010/main" val="2285305447"/>
+      </p:ext>
+    </p:extLst>
+  </p:cSld>
+  <p:clrMapOvr>
+    <a:masterClrMapping/>
+  </p:clrMapOvr>
+</p:sld>
+</file>
+
+<file path=ppt/slides/slide83.xml><?xml version="1.0" encoding="utf-8"?>
+<p:sld xmlns:a="http://schemas.openxmlformats.org/drawingml/2006/main" xmlns:r="http://schemas.openxmlformats.org/officeDocument/2006/relationships" xmlns:p="http://schemas.openxmlformats.org/presentationml/2006/main">
+  <p:cSld>
+    <p:spTree>
+      <p:nvGrpSpPr>
+        <p:cNvPr id="1" name=""/>
+        <p:cNvGrpSpPr/>
+        <p:nvPr/>
+      </p:nvGrpSpPr>
+      <p:grpSpPr>
+        <a:xfrm>
+          <a:off x="0" y="0"/>
+          <a:ext cx="0" cy="0"/>
+          <a:chOff x="0" y="0"/>
+          <a:chExt cx="0" cy="0"/>
+        </a:xfrm>
+      </p:grpSpPr>
+      <p:sp>
+        <p:nvSpPr>
+          <p:cNvPr id="6" name="Subtítulo 2"/>
+          <p:cNvSpPr txBox="1">
+            <a:spLocks/>
+          </p:cNvSpPr>
+          <p:nvPr/>
+        </p:nvSpPr>
+        <p:spPr>
+          <a:xfrm>
+            <a:off x="210670" y="153054"/>
+            <a:ext cx="10058400" cy="718315"/>
+          </a:xfrm>
+        </p:spPr>
+        <p:txBody>
+          <a:bodyPr>
+            <a:noAutofit/>
+          </a:bodyPr>
+          <a:lstStyle>
+            <a:lvl1pPr marL="342900" indent="-342900" algn="l" rtl="0" eaLnBrk="0" fontAlgn="base" hangingPunct="0">
+              <a:spcBef>
+                <a:spcPct val="20000"/>
+              </a:spcBef>
+              <a:spcAft>
+                <a:spcPct val="0"/>
+              </a:spcAft>
+              <a:buFont typeface="Arial" charset="0"/>
+              <a:buChar char="•"/>
+              <a:defRPr lang="pt-BR" sz="2800" kern="1200" dirty="0">
+                <a:solidFill>
+                  <a:schemeClr val="tx1"/>
+                </a:solidFill>
+                <a:latin typeface="+mn-lt"/>
+                <a:ea typeface="+mn-ea"/>
+                <a:cs typeface="+mn-cs"/>
+              </a:defRPr>
+            </a:lvl1pPr>
+            <a:lvl2pPr marL="742950" indent="-285750" algn="l" rtl="0" eaLnBrk="0" fontAlgn="base" hangingPunct="0">
+              <a:spcBef>
+                <a:spcPct val="20000"/>
+              </a:spcBef>
+              <a:spcAft>
+                <a:spcPct val="0"/>
+              </a:spcAft>
+              <a:buFont typeface="Arial" charset="0"/>
+              <a:buChar char="•"/>
+              <a:defRPr lang="pt-BR" sz="2400" kern="1200" dirty="0">
+                <a:solidFill>
+                  <a:schemeClr val="tx1"/>
+                </a:solidFill>
+                <a:latin typeface="+mn-lt"/>
+                <a:ea typeface="+mn-ea"/>
+                <a:cs typeface="+mn-cs"/>
+              </a:defRPr>
+            </a:lvl2pPr>
+            <a:lvl3pPr marL="1143000" indent="-228600" algn="l" rtl="0" eaLnBrk="0" fontAlgn="base" hangingPunct="0">
+              <a:spcBef>
+                <a:spcPct val="20000"/>
+              </a:spcBef>
+              <a:spcAft>
+                <a:spcPct val="0"/>
+              </a:spcAft>
+              <a:buFont typeface="Arial" charset="0"/>
+              <a:buChar char="•"/>
+              <a:defRPr lang="pt-BR" sz="2400" kern="1200" dirty="0">
+                <a:solidFill>
+                  <a:schemeClr val="tx1"/>
+                </a:solidFill>
+                <a:latin typeface="+mn-lt"/>
+                <a:ea typeface="+mn-ea"/>
+                <a:cs typeface="+mn-cs"/>
+              </a:defRPr>
+            </a:lvl3pPr>
+            <a:lvl4pPr marL="1600200" indent="-228600" algn="l" rtl="0" eaLnBrk="0" fontAlgn="base" hangingPunct="0">
+              <a:spcBef>
+                <a:spcPct val="20000"/>
+              </a:spcBef>
+              <a:spcAft>
+                <a:spcPct val="0"/>
+              </a:spcAft>
+              <a:buFont typeface="Arial" charset="0"/>
+              <a:buChar char="•"/>
+              <a:defRPr lang="pt-BR" sz="2000" kern="1200" dirty="0">
+                <a:solidFill>
+                  <a:schemeClr val="tx1"/>
+                </a:solidFill>
+                <a:latin typeface="+mn-lt"/>
+                <a:ea typeface="+mn-ea"/>
+                <a:cs typeface="+mn-cs"/>
+              </a:defRPr>
+            </a:lvl4pPr>
+            <a:lvl5pPr marL="2057400" indent="-228600" algn="l" rtl="0" eaLnBrk="0" fontAlgn="base" hangingPunct="0">
+              <a:spcBef>
+                <a:spcPct val="20000"/>
+              </a:spcBef>
+              <a:spcAft>
+                <a:spcPct val="0"/>
+              </a:spcAft>
+              <a:buFont typeface="Arial" charset="0"/>
+              <a:buChar char="•"/>
+              <a:defRPr lang="pt-BR" sz="2000" kern="1200" dirty="0">
+                <a:solidFill>
+                  <a:schemeClr val="tx1"/>
+                </a:solidFill>
+                <a:latin typeface="+mn-lt"/>
+                <a:ea typeface="+mn-ea"/>
+                <a:cs typeface="+mn-cs"/>
+              </a:defRPr>
+            </a:lvl5pPr>
+            <a:lvl6pPr marL="2514600" indent="-228600" algn="l" defTabSz="914400" rtl="0" eaLnBrk="1" latinLnBrk="0" hangingPunct="1">
+              <a:spcBef>
+                <a:spcPct val="20000"/>
+              </a:spcBef>
+              <a:buFont typeface="Arial" pitchFamily="34" charset="0"/>
+              <a:buChar char="•"/>
+              <a:defRPr sz="2000" kern="1200">
+                <a:solidFill>
+                  <a:schemeClr val="tx1"/>
+                </a:solidFill>
+                <a:latin typeface="+mn-lt"/>
+                <a:ea typeface="+mn-ea"/>
+                <a:cs typeface="+mn-cs"/>
+              </a:defRPr>
+            </a:lvl6pPr>
+            <a:lvl7pPr marL="2971800" indent="-228600" algn="l" defTabSz="914400" rtl="0" eaLnBrk="1" latinLnBrk="0" hangingPunct="1">
+              <a:spcBef>
+                <a:spcPct val="20000"/>
+              </a:spcBef>
+              <a:buFont typeface="Arial" pitchFamily="34" charset="0"/>
+              <a:buChar char="•"/>
+              <a:defRPr sz="2000" kern="1200">
+                <a:solidFill>
+                  <a:schemeClr val="tx1"/>
+                </a:solidFill>
+                <a:latin typeface="+mn-lt"/>
+                <a:ea typeface="+mn-ea"/>
+                <a:cs typeface="+mn-cs"/>
+              </a:defRPr>
+            </a:lvl7pPr>
+            <a:lvl8pPr marL="3429000" indent="-228600" algn="l" defTabSz="914400" rtl="0" eaLnBrk="1" latinLnBrk="0" hangingPunct="1">
+              <a:spcBef>
+                <a:spcPct val="20000"/>
+              </a:spcBef>
+              <a:buFont typeface="Arial" pitchFamily="34" charset="0"/>
+              <a:buChar char="•"/>
+              <a:defRPr sz="2000" kern="1200">
+                <a:solidFill>
+                  <a:schemeClr val="tx1"/>
+                </a:solidFill>
+                <a:latin typeface="+mn-lt"/>
+                <a:ea typeface="+mn-ea"/>
+                <a:cs typeface="+mn-cs"/>
+              </a:defRPr>
+            </a:lvl8pPr>
+            <a:lvl9pPr marL="3886200" indent="-228600" algn="l" defTabSz="914400" rtl="0" eaLnBrk="1" latinLnBrk="0" hangingPunct="1">
+              <a:spcBef>
+                <a:spcPct val="20000"/>
+              </a:spcBef>
+              <a:buFont typeface="Arial" pitchFamily="34" charset="0"/>
+              <a:buChar char="•"/>
+              <a:defRPr sz="2000" kern="1200">
+                <a:solidFill>
+                  <a:schemeClr val="tx1"/>
+                </a:solidFill>
+                <a:latin typeface="+mn-lt"/>
+                <a:ea typeface="+mn-ea"/>
+                <a:cs typeface="+mn-cs"/>
+              </a:defRPr>
+            </a:lvl9pPr>
+          </a:lstStyle>
+          <a:p>
+            <a:pPr marL="0" indent="0">
+              <a:lnSpc>
+                <a:spcPct val="150000"/>
+              </a:lnSpc>
+              <a:buFont typeface="Arial" charset="0"/>
+              <a:buNone/>
+            </a:pPr>
+            <a:r>
+              <a:rPr lang="pt-BR" sz="2400" b="1" dirty="0" err="1">
+                <a:solidFill>
+                  <a:schemeClr val="accent6">
+                    <a:lumMod val="75000"/>
+                  </a:schemeClr>
+                </a:solidFill>
+                <a:latin typeface="Corbel" panose="020B0503020204020204" pitchFamily="34" charset="0"/>
+              </a:rPr>
+              <a:t>DashBoard</a:t>
+            </a:r>
+            <a:endParaRPr lang="pt-BR" sz="2400" b="1" dirty="0">
+              <a:solidFill>
+                <a:schemeClr val="accent6">
+                  <a:lumMod val="75000"/>
+                </a:schemeClr>
+              </a:solidFill>
+              <a:latin typeface="Corbel" panose="020B0503020204020204" pitchFamily="34" charset="0"/>
+            </a:endParaRPr>
+          </a:p>
+        </p:txBody>
+      </p:sp>
+      <p:sp>
+        <p:nvSpPr>
+          <p:cNvPr id="11" name="Subtítulo 1"/>
+          <p:cNvSpPr txBox="1">
+            <a:spLocks/>
+          </p:cNvSpPr>
+          <p:nvPr/>
+        </p:nvSpPr>
+        <p:spPr>
+          <a:xfrm>
+            <a:off x="210670" y="1128485"/>
+            <a:ext cx="10896600" cy="3217603"/>
+          </a:xfrm>
+        </p:spPr>
+        <p:txBody>
+          <a:bodyPr>
+            <a:noAutofit/>
+          </a:bodyPr>
+          <a:lstStyle>
+            <a:lvl1pPr marL="342900" indent="-342900" algn="l" rtl="0" eaLnBrk="0" fontAlgn="base" hangingPunct="0">
+              <a:spcBef>
+                <a:spcPct val="20000"/>
+              </a:spcBef>
+              <a:spcAft>
+                <a:spcPct val="0"/>
+              </a:spcAft>
+              <a:buFont typeface="Arial" charset="0"/>
+              <a:buChar char="•"/>
+              <a:defRPr lang="pt-BR" sz="2800" kern="1200" dirty="0">
+                <a:solidFill>
+                  <a:schemeClr val="tx1"/>
+                </a:solidFill>
+                <a:latin typeface="+mn-lt"/>
+                <a:ea typeface="+mn-ea"/>
+                <a:cs typeface="+mn-cs"/>
+              </a:defRPr>
+            </a:lvl1pPr>
+            <a:lvl2pPr marL="742950" indent="-285750" algn="l" rtl="0" eaLnBrk="0" fontAlgn="base" hangingPunct="0">
+              <a:spcBef>
+                <a:spcPct val="20000"/>
+              </a:spcBef>
+              <a:spcAft>
+                <a:spcPct val="0"/>
+              </a:spcAft>
+              <a:buFont typeface="Arial" charset="0"/>
+              <a:buChar char="•"/>
+              <a:defRPr lang="pt-BR" sz="2400" kern="1200" dirty="0">
+                <a:solidFill>
+                  <a:schemeClr val="tx1"/>
+                </a:solidFill>
+                <a:latin typeface="+mn-lt"/>
+                <a:ea typeface="+mn-ea"/>
+                <a:cs typeface="+mn-cs"/>
+              </a:defRPr>
+            </a:lvl2pPr>
+            <a:lvl3pPr marL="1143000" indent="-228600" algn="l" rtl="0" eaLnBrk="0" fontAlgn="base" hangingPunct="0">
+              <a:spcBef>
+                <a:spcPct val="20000"/>
+              </a:spcBef>
+              <a:spcAft>
+                <a:spcPct val="0"/>
+              </a:spcAft>
+              <a:buFont typeface="Arial" charset="0"/>
+              <a:buChar char="•"/>
+              <a:defRPr lang="pt-BR" sz="2400" kern="1200" dirty="0">
+                <a:solidFill>
+                  <a:schemeClr val="tx1"/>
+                </a:solidFill>
+                <a:latin typeface="+mn-lt"/>
+                <a:ea typeface="+mn-ea"/>
+                <a:cs typeface="+mn-cs"/>
+              </a:defRPr>
+            </a:lvl3pPr>
+            <a:lvl4pPr marL="1600200" indent="-228600" algn="l" rtl="0" eaLnBrk="0" fontAlgn="base" hangingPunct="0">
+              <a:spcBef>
+                <a:spcPct val="20000"/>
+              </a:spcBef>
+              <a:spcAft>
+                <a:spcPct val="0"/>
+              </a:spcAft>
+              <a:buFont typeface="Arial" charset="0"/>
+              <a:buChar char="•"/>
+              <a:defRPr lang="pt-BR" sz="2000" kern="1200" dirty="0">
+                <a:solidFill>
+                  <a:schemeClr val="tx1"/>
+                </a:solidFill>
+                <a:latin typeface="+mn-lt"/>
+                <a:ea typeface="+mn-ea"/>
+                <a:cs typeface="+mn-cs"/>
+              </a:defRPr>
+            </a:lvl4pPr>
+            <a:lvl5pPr marL="2057400" indent="-228600" algn="l" rtl="0" eaLnBrk="0" fontAlgn="base" hangingPunct="0">
+              <a:spcBef>
+                <a:spcPct val="20000"/>
+              </a:spcBef>
+              <a:spcAft>
+                <a:spcPct val="0"/>
+              </a:spcAft>
+              <a:buFont typeface="Arial" charset="0"/>
+              <a:buChar char="•"/>
+              <a:defRPr lang="pt-BR" sz="2000" kern="1200" dirty="0">
+                <a:solidFill>
+                  <a:schemeClr val="tx1"/>
+                </a:solidFill>
+                <a:latin typeface="+mn-lt"/>
+                <a:ea typeface="+mn-ea"/>
+                <a:cs typeface="+mn-cs"/>
+              </a:defRPr>
+            </a:lvl5pPr>
+            <a:lvl6pPr marL="2514600" indent="-228600" algn="l" defTabSz="914400" rtl="0" eaLnBrk="1" latinLnBrk="0" hangingPunct="1">
+              <a:spcBef>
+                <a:spcPct val="20000"/>
+              </a:spcBef>
+              <a:buFont typeface="Arial" pitchFamily="34" charset="0"/>
+              <a:buChar char="•"/>
+              <a:defRPr sz="2000" kern="1200">
+                <a:solidFill>
+                  <a:schemeClr val="tx1"/>
+                </a:solidFill>
+                <a:latin typeface="+mn-lt"/>
+                <a:ea typeface="+mn-ea"/>
+                <a:cs typeface="+mn-cs"/>
+              </a:defRPr>
+            </a:lvl6pPr>
+            <a:lvl7pPr marL="2971800" indent="-228600" algn="l" defTabSz="914400" rtl="0" eaLnBrk="1" latinLnBrk="0" hangingPunct="1">
+              <a:spcBef>
+                <a:spcPct val="20000"/>
+              </a:spcBef>
+              <a:buFont typeface="Arial" pitchFamily="34" charset="0"/>
+              <a:buChar char="•"/>
+              <a:defRPr sz="2000" kern="1200">
+                <a:solidFill>
+                  <a:schemeClr val="tx1"/>
+                </a:solidFill>
+                <a:latin typeface="+mn-lt"/>
+                <a:ea typeface="+mn-ea"/>
+                <a:cs typeface="+mn-cs"/>
+              </a:defRPr>
+            </a:lvl7pPr>
+            <a:lvl8pPr marL="3429000" indent="-228600" algn="l" defTabSz="914400" rtl="0" eaLnBrk="1" latinLnBrk="0" hangingPunct="1">
+              <a:spcBef>
+                <a:spcPct val="20000"/>
+              </a:spcBef>
+              <a:buFont typeface="Arial" pitchFamily="34" charset="0"/>
+              <a:buChar char="•"/>
+              <a:defRPr sz="2000" kern="1200">
+                <a:solidFill>
+                  <a:schemeClr val="tx1"/>
+                </a:solidFill>
+                <a:latin typeface="+mn-lt"/>
+                <a:ea typeface="+mn-ea"/>
+                <a:cs typeface="+mn-cs"/>
+              </a:defRPr>
+            </a:lvl8pPr>
+            <a:lvl9pPr marL="3886200" indent="-228600" algn="l" defTabSz="914400" rtl="0" eaLnBrk="1" latinLnBrk="0" hangingPunct="1">
+              <a:spcBef>
+                <a:spcPct val="20000"/>
+              </a:spcBef>
+              <a:buFont typeface="Arial" pitchFamily="34" charset="0"/>
+              <a:buChar char="•"/>
+              <a:defRPr sz="2000" kern="1200">
+                <a:solidFill>
+                  <a:schemeClr val="tx1"/>
+                </a:solidFill>
+                <a:latin typeface="+mn-lt"/>
+                <a:ea typeface="+mn-ea"/>
+                <a:cs typeface="+mn-cs"/>
+              </a:defRPr>
+            </a:lvl9pPr>
+          </a:lstStyle>
+          <a:p>
+            <a:pPr marL="0" indent="0">
+              <a:buFont typeface="Arial" charset="0"/>
+              <a:buNone/>
+            </a:pPr>
+            <a:endParaRPr lang="pt-BR" sz="1800" dirty="0"/>
+          </a:p>
+          <a:p>
+            <a:pPr marL="0" indent="0">
+              <a:buFont typeface="Arial" charset="0"/>
+              <a:buNone/>
+            </a:pPr>
+            <a:endParaRPr lang="pt-BR" sz="1800" dirty="0"/>
           </a:p>
         </p:txBody>
       </p:sp>
@@ -52743,7 +52904,7 @@
 </p:sld>
 </file>
 
-<file path=ppt/slides/slide83.xml><?xml version="1.0" encoding="utf-8"?>
+<file path=ppt/slides/slide84.xml><?xml version="1.0" encoding="utf-8"?>
 <p:sld xmlns:a="http://schemas.openxmlformats.org/drawingml/2006/main" xmlns:r="http://schemas.openxmlformats.org/officeDocument/2006/relationships" xmlns:p="http://schemas.openxmlformats.org/presentationml/2006/main">
   <p:cSld>
     <p:spTree>
@@ -52777,7 +52938,7 @@
         <p:spPr>
           <a:xfrm>
             <a:off x="450664" y="786336"/>
-            <a:ext cx="9966325" cy="5495925"/>
+            <a:ext cx="11171493" cy="5495925"/>
           </a:xfrm>
         </p:spPr>
         <p:txBody>
@@ -52940,7 +53101,7 @@
             <a:pPr algn="just"/>
             <a:r>
               <a:rPr lang="pt-BR" sz="3600" dirty="0"/>
-              <a:t>PASTA AULA 4</a:t>
+              <a:t>PASTA AULA5 </a:t>
             </a:r>
           </a:p>
           <a:p>
@@ -52950,8 +53111,12 @@
           <a:p>
             <a:pPr algn="just"/>
             <a:r>
+              <a:rPr lang="pt-BR" sz="3600" dirty="0" err="1"/>
+              <a:t>Disponivel</a:t>
+            </a:r>
+            <a:r>
               <a:rPr lang="pt-BR" sz="3600" dirty="0"/>
-              <a:t>ARQUIVOS ESTAO NA PASTA CARRETEIROS,</a:t>
+              <a:t>  na Pasta Carreteiros</a:t>
             </a:r>
           </a:p>
           <a:p>
@@ -52975,6 +53140,225 @@
     <p:extLst>
       <p:ext uri="{BB962C8B-B14F-4D97-AF65-F5344CB8AC3E}">
         <p14:creationId xmlns:p14="http://schemas.microsoft.com/office/powerpoint/2010/main" val="3254549381"/>
+      </p:ext>
+    </p:extLst>
+  </p:cSld>
+  <p:clrMapOvr>
+    <a:masterClrMapping/>
+  </p:clrMapOvr>
+</p:sld>
+</file>
+
+<file path=ppt/slides/slide85.xml><?xml version="1.0" encoding="utf-8"?>
+<p:sld xmlns:a="http://schemas.openxmlformats.org/drawingml/2006/main" xmlns:r="http://schemas.openxmlformats.org/officeDocument/2006/relationships" xmlns:p="http://schemas.openxmlformats.org/presentationml/2006/main">
+  <p:cSld>
+    <p:spTree>
+      <p:nvGrpSpPr>
+        <p:cNvPr id="1" name=""/>
+        <p:cNvGrpSpPr/>
+        <p:nvPr/>
+      </p:nvGrpSpPr>
+      <p:grpSpPr>
+        <a:xfrm>
+          <a:off x="0" y="0"/>
+          <a:ext cx="0" cy="0"/>
+          <a:chOff x="0" y="0"/>
+          <a:chExt cx="0" cy="0"/>
+        </a:xfrm>
+      </p:grpSpPr>
+      <p:sp>
+        <p:nvSpPr>
+          <p:cNvPr id="2" name="Subtítulo 1">
+            <a:extLst>
+              <a:ext uri="{FF2B5EF4-FFF2-40B4-BE49-F238E27FC236}">
+                <a16:creationId xmlns:a16="http://schemas.microsoft.com/office/drawing/2014/main" id="{437FDA83-7F6A-40EA-BF64-6C09404FA777}"/>
+              </a:ext>
+            </a:extLst>
+          </p:cNvPr>
+          <p:cNvSpPr txBox="1">
+            <a:spLocks/>
+          </p:cNvSpPr>
+          <p:nvPr/>
+        </p:nvSpPr>
+        <p:spPr>
+          <a:xfrm>
+            <a:off x="3163384" y="2839188"/>
+            <a:ext cx="11171493" cy="1179624"/>
+          </a:xfrm>
+        </p:spPr>
+        <p:txBody>
+          <a:bodyPr>
+            <a:noAutofit/>
+          </a:bodyPr>
+          <a:lstStyle>
+            <a:lvl1pPr marL="342900" indent="-342900" algn="l" rtl="0" eaLnBrk="0" fontAlgn="base" hangingPunct="0">
+              <a:spcBef>
+                <a:spcPct val="20000"/>
+              </a:spcBef>
+              <a:spcAft>
+                <a:spcPct val="0"/>
+              </a:spcAft>
+              <a:buFont typeface="Arial" charset="0"/>
+              <a:buChar char="•"/>
+              <a:defRPr lang="pt-BR" sz="2800" kern="1200" dirty="0">
+                <a:solidFill>
+                  <a:schemeClr val="tx1"/>
+                </a:solidFill>
+                <a:latin typeface="+mn-lt"/>
+                <a:ea typeface="+mn-ea"/>
+                <a:cs typeface="+mn-cs"/>
+              </a:defRPr>
+            </a:lvl1pPr>
+            <a:lvl2pPr marL="742950" indent="-285750" algn="l" rtl="0" eaLnBrk="0" fontAlgn="base" hangingPunct="0">
+              <a:spcBef>
+                <a:spcPct val="20000"/>
+              </a:spcBef>
+              <a:spcAft>
+                <a:spcPct val="0"/>
+              </a:spcAft>
+              <a:buFont typeface="Arial" charset="0"/>
+              <a:buChar char="•"/>
+              <a:defRPr lang="pt-BR" sz="2400" kern="1200" dirty="0">
+                <a:solidFill>
+                  <a:schemeClr val="tx1"/>
+                </a:solidFill>
+                <a:latin typeface="+mn-lt"/>
+                <a:ea typeface="+mn-ea"/>
+                <a:cs typeface="+mn-cs"/>
+              </a:defRPr>
+            </a:lvl2pPr>
+            <a:lvl3pPr marL="1143000" indent="-228600" algn="l" rtl="0" eaLnBrk="0" fontAlgn="base" hangingPunct="0">
+              <a:spcBef>
+                <a:spcPct val="20000"/>
+              </a:spcBef>
+              <a:spcAft>
+                <a:spcPct val="0"/>
+              </a:spcAft>
+              <a:buFont typeface="Arial" charset="0"/>
+              <a:buChar char="•"/>
+              <a:defRPr lang="pt-BR" sz="2400" kern="1200" dirty="0">
+                <a:solidFill>
+                  <a:schemeClr val="tx1"/>
+                </a:solidFill>
+                <a:latin typeface="+mn-lt"/>
+                <a:ea typeface="+mn-ea"/>
+                <a:cs typeface="+mn-cs"/>
+              </a:defRPr>
+            </a:lvl3pPr>
+            <a:lvl4pPr marL="1600200" indent="-228600" algn="l" rtl="0" eaLnBrk="0" fontAlgn="base" hangingPunct="0">
+              <a:spcBef>
+                <a:spcPct val="20000"/>
+              </a:spcBef>
+              <a:spcAft>
+                <a:spcPct val="0"/>
+              </a:spcAft>
+              <a:buFont typeface="Arial" charset="0"/>
+              <a:buChar char="•"/>
+              <a:defRPr lang="pt-BR" sz="2000" kern="1200" dirty="0">
+                <a:solidFill>
+                  <a:schemeClr val="tx1"/>
+                </a:solidFill>
+                <a:latin typeface="+mn-lt"/>
+                <a:ea typeface="+mn-ea"/>
+                <a:cs typeface="+mn-cs"/>
+              </a:defRPr>
+            </a:lvl4pPr>
+            <a:lvl5pPr marL="2057400" indent="-228600" algn="l" rtl="0" eaLnBrk="0" fontAlgn="base" hangingPunct="0">
+              <a:spcBef>
+                <a:spcPct val="20000"/>
+              </a:spcBef>
+              <a:spcAft>
+                <a:spcPct val="0"/>
+              </a:spcAft>
+              <a:buFont typeface="Arial" charset="0"/>
+              <a:buChar char="•"/>
+              <a:defRPr lang="pt-BR" sz="2000" kern="1200" dirty="0">
+                <a:solidFill>
+                  <a:schemeClr val="tx1"/>
+                </a:solidFill>
+                <a:latin typeface="+mn-lt"/>
+                <a:ea typeface="+mn-ea"/>
+                <a:cs typeface="+mn-cs"/>
+              </a:defRPr>
+            </a:lvl5pPr>
+            <a:lvl6pPr marL="2514600" indent="-228600" algn="l" defTabSz="914400" rtl="0" eaLnBrk="1" latinLnBrk="0" hangingPunct="1">
+              <a:spcBef>
+                <a:spcPct val="20000"/>
+              </a:spcBef>
+              <a:buFont typeface="Arial" pitchFamily="34" charset="0"/>
+              <a:buChar char="•"/>
+              <a:defRPr sz="2000" kern="1200">
+                <a:solidFill>
+                  <a:schemeClr val="tx1"/>
+                </a:solidFill>
+                <a:latin typeface="+mn-lt"/>
+                <a:ea typeface="+mn-ea"/>
+                <a:cs typeface="+mn-cs"/>
+              </a:defRPr>
+            </a:lvl6pPr>
+            <a:lvl7pPr marL="2971800" indent="-228600" algn="l" defTabSz="914400" rtl="0" eaLnBrk="1" latinLnBrk="0" hangingPunct="1">
+              <a:spcBef>
+                <a:spcPct val="20000"/>
+              </a:spcBef>
+              <a:buFont typeface="Arial" pitchFamily="34" charset="0"/>
+              <a:buChar char="•"/>
+              <a:defRPr sz="2000" kern="1200">
+                <a:solidFill>
+                  <a:schemeClr val="tx1"/>
+                </a:solidFill>
+                <a:latin typeface="+mn-lt"/>
+                <a:ea typeface="+mn-ea"/>
+                <a:cs typeface="+mn-cs"/>
+              </a:defRPr>
+            </a:lvl7pPr>
+            <a:lvl8pPr marL="3429000" indent="-228600" algn="l" defTabSz="914400" rtl="0" eaLnBrk="1" latinLnBrk="0" hangingPunct="1">
+              <a:spcBef>
+                <a:spcPct val="20000"/>
+              </a:spcBef>
+              <a:buFont typeface="Arial" pitchFamily="34" charset="0"/>
+              <a:buChar char="•"/>
+              <a:defRPr sz="2000" kern="1200">
+                <a:solidFill>
+                  <a:schemeClr val="tx1"/>
+                </a:solidFill>
+                <a:latin typeface="+mn-lt"/>
+                <a:ea typeface="+mn-ea"/>
+                <a:cs typeface="+mn-cs"/>
+              </a:defRPr>
+            </a:lvl8pPr>
+            <a:lvl9pPr marL="3886200" indent="-228600" algn="l" defTabSz="914400" rtl="0" eaLnBrk="1" latinLnBrk="0" hangingPunct="1">
+              <a:spcBef>
+                <a:spcPct val="20000"/>
+              </a:spcBef>
+              <a:buFont typeface="Arial" pitchFamily="34" charset="0"/>
+              <a:buChar char="•"/>
+              <a:defRPr sz="2000" kern="1200">
+                <a:solidFill>
+                  <a:schemeClr val="tx1"/>
+                </a:solidFill>
+                <a:latin typeface="+mn-lt"/>
+                <a:ea typeface="+mn-ea"/>
+                <a:cs typeface="+mn-cs"/>
+              </a:defRPr>
+            </a:lvl9pPr>
+          </a:lstStyle>
+          <a:p>
+            <a:pPr algn="just"/>
+            <a:r>
+              <a:rPr lang="pt-BR" sz="3600" dirty="0"/>
+              <a:t>RETORNAMOS AS 13:15</a:t>
+            </a:r>
+          </a:p>
+          <a:p>
+            <a:pPr algn="just"/>
+            <a:endParaRPr lang="pt-BR" sz="3600" dirty="0"/>
+          </a:p>
+        </p:txBody>
+      </p:sp>
+    </p:spTree>
+    <p:extLst>
+      <p:ext uri="{BB962C8B-B14F-4D97-AF65-F5344CB8AC3E}">
+        <p14:creationId xmlns:p14="http://schemas.microsoft.com/office/powerpoint/2010/main" val="824637086"/>
       </p:ext>
     </p:extLst>
   </p:cSld>

</xml_diff>